<commit_message>
Added slide with wordclouds based on Objectives. Re-factored some functions to make them more generic, to do this easily.
</commit_message>
<xml_diff>
--- a/GCA_Customer_Insights_Month-Year.pptx
+++ b/GCA_Customer_Insights_Month-Year.pptx
@@ -5,10 +5,10 @@
     <p:sldMasterId id="2147483648" r:id="rId1"/>
   </p:sldMasterIdLst>
   <p:notesMasterIdLst>
-    <p:notesMasterId r:id="rId15"/>
+    <p:notesMasterId r:id="rId16"/>
   </p:notesMasterIdLst>
   <p:handoutMasterIdLst>
-    <p:handoutMasterId r:id="rId16"/>
+    <p:handoutMasterId r:id="rId17"/>
   </p:handoutMasterIdLst>
   <p:sldIdLst>
     <p:sldId id="276" r:id="rId2"/>
@@ -24,11 +24,12 @@
     <p:sldId id="288" r:id="rId12"/>
     <p:sldId id="264" r:id="rId13"/>
     <p:sldId id="289" r:id="rId14"/>
+    <p:sldId id="295" r:id="rId15"/>
   </p:sldIdLst>
   <p:sldSz cx="12192000" cy="6858000"/>
   <p:notesSz cx="7010400" cy="9296400"/>
   <p:custDataLst>
-    <p:tags r:id="rId17"/>
+    <p:tags r:id="rId18"/>
   </p:custDataLst>
   <p:defaultTextStyle>
     <a:defPPr>
@@ -272,7 +273,7 @@
           <a:p>
             <a:fld id="{3CA61830-C416-483F-955E-54203C65B711}" type="datetimeFigureOut">
               <a:rPr lang="en-US"/>
-              <a:t>3/15/2018</a:t>
+              <a:t>9/6/2018</a:t>
             </a:fld>
             <a:endParaRPr dirty="0"/>
           </a:p>
@@ -1127,6 +1128,91 @@
     <p:extLst>
       <p:ext uri="{BB962C8B-B14F-4D97-AF65-F5344CB8AC3E}">
         <p14:creationId xmlns:p14="http://schemas.microsoft.com/office/powerpoint/2010/main" val="2496052183"/>
+      </p:ext>
+    </p:extLst>
+  </p:cSld>
+  <p:clrMapOvr>
+    <a:masterClrMapping/>
+  </p:clrMapOvr>
+</p:notes>
+</file>
+
+<file path=ppt/notesSlides/notesSlide14.xml><?xml version="1.0" encoding="utf-8"?>
+<p:notes xmlns:a="http://schemas.openxmlformats.org/drawingml/2006/main" xmlns:r="http://schemas.openxmlformats.org/officeDocument/2006/relationships" xmlns:p="http://schemas.openxmlformats.org/presentationml/2006/main">
+  <p:cSld>
+    <p:spTree>
+      <p:nvGrpSpPr>
+        <p:cNvPr id="1" name=""/>
+        <p:cNvGrpSpPr/>
+        <p:nvPr/>
+      </p:nvGrpSpPr>
+      <p:grpSpPr>
+        <a:xfrm>
+          <a:off x="0" y="0"/>
+          <a:ext cx="0" cy="0"/>
+          <a:chOff x="0" y="0"/>
+          <a:chExt cx="0" cy="0"/>
+        </a:xfrm>
+      </p:grpSpPr>
+      <p:sp>
+        <p:nvSpPr>
+          <p:cNvPr id="2" name="Slide Image Placeholder 1"/>
+          <p:cNvSpPr>
+            <a:spLocks noGrp="1" noRot="1" noChangeAspect="1"/>
+          </p:cNvSpPr>
+          <p:nvPr>
+            <p:ph type="sldImg"/>
+          </p:nvPr>
+        </p:nvSpPr>
+        <p:spPr/>
+      </p:sp>
+      <p:sp>
+        <p:nvSpPr>
+          <p:cNvPr id="3" name="Notes Placeholder 2"/>
+          <p:cNvSpPr>
+            <a:spLocks noGrp="1"/>
+          </p:cNvSpPr>
+          <p:nvPr>
+            <p:ph type="body" idx="1"/>
+          </p:nvPr>
+        </p:nvSpPr>
+        <p:spPr/>
+        <p:txBody>
+          <a:bodyPr/>
+          <a:lstStyle/>
+          <a:p>
+            <a:endParaRPr lang="en-US" dirty="0"/>
+          </a:p>
+        </p:txBody>
+      </p:sp>
+      <p:sp>
+        <p:nvSpPr>
+          <p:cNvPr id="4" name="Slide Number Placeholder 3"/>
+          <p:cNvSpPr>
+            <a:spLocks noGrp="1"/>
+          </p:cNvSpPr>
+          <p:nvPr>
+            <p:ph type="sldNum" sz="quarter" idx="10"/>
+          </p:nvPr>
+        </p:nvSpPr>
+        <p:spPr/>
+        <p:txBody>
+          <a:bodyPr/>
+          <a:lstStyle/>
+          <a:p>
+            <a:fld id="{5BFEAE42-E3FE-4405-B7FC-4425D05B92A0}" type="slidenum">
+              <a:rPr lang="en-US" smtClean="0"/>
+              <a:pPr/>
+              <a:t>14</a:t>
+            </a:fld>
+            <a:endParaRPr lang="en-US"/>
+          </a:p>
+        </p:txBody>
+      </p:sp>
+    </p:spTree>
+    <p:extLst>
+      <p:ext uri="{BB962C8B-B14F-4D97-AF65-F5344CB8AC3E}">
+        <p14:creationId xmlns:p14="http://schemas.microsoft.com/office/powerpoint/2010/main" val="2480284675"/>
       </p:ext>
     </p:extLst>
   </p:cSld>
@@ -9347,7 +9433,7 @@
           <a:p>
             <a:fld id="{C07C5E14-300D-4720-B5FE-54C7D96D4160}" type="datetime4">
               <a:rPr lang="en-US" smtClean="0"/>
-              <a:t>March 15, 2018</a:t>
+              <a:t>September 6, 2018</a:t>
             </a:fld>
             <a:endParaRPr/>
           </a:p>
@@ -9683,7 +9769,7 @@
           <a:p>
             <a:fld id="{26B45FFC-9EEF-4E69-85F5-C8F54747804D}" type="datetime4">
               <a:rPr lang="en-US" smtClean="0"/>
-              <a:t>March 15, 2018</a:t>
+              <a:t>September 6, 2018</a:t>
             </a:fld>
             <a:endParaRPr/>
           </a:p>
@@ -9917,7 +10003,7 @@
           <a:p>
             <a:fld id="{684E3265-88A3-4C30-AE11-BFDF645909E9}" type="datetime4">
               <a:rPr lang="en-US" smtClean="0"/>
-              <a:t>March 15, 2018</a:t>
+              <a:t>September 6, 2018</a:t>
             </a:fld>
             <a:endParaRPr/>
           </a:p>
@@ -10028,7 +10114,7 @@
           <a:p>
             <a:fld id="{E9F763D2-AF56-4C60-80C7-7D8FC051005C}" type="datetime4">
               <a:rPr lang="en-US" smtClean="0"/>
-              <a:t>March 15, 2018</a:t>
+              <a:t>September 6, 2018</a:t>
             </a:fld>
             <a:endParaRPr/>
           </a:p>
@@ -10306,7 +10392,7 @@
           <a:p>
             <a:fld id="{65FD8143-BFA3-46F8-9B90-B0E5CFAF7F7C}" type="datetime4">
               <a:rPr lang="en-US" smtClean="0"/>
-              <a:t>March 15, 2018</a:t>
+              <a:t>September 6, 2018</a:t>
             </a:fld>
             <a:endParaRPr/>
           </a:p>
@@ -22316,6 +22402,1008 @@
 </p:sld>
 </file>
 
+<file path=ppt/slides/slide14.xml><?xml version="1.0" encoding="utf-8"?>
+<p:sld xmlns:a="http://schemas.openxmlformats.org/drawingml/2006/main" xmlns:r="http://schemas.openxmlformats.org/officeDocument/2006/relationships" xmlns:p="http://schemas.openxmlformats.org/presentationml/2006/main">
+  <p:cSld>
+    <p:spTree>
+      <p:nvGrpSpPr>
+        <p:cNvPr id="1" name=""/>
+        <p:cNvGrpSpPr/>
+        <p:nvPr/>
+      </p:nvGrpSpPr>
+      <p:grpSpPr>
+        <a:xfrm>
+          <a:off x="0" y="0"/>
+          <a:ext cx="0" cy="0"/>
+          <a:chOff x="0" y="0"/>
+          <a:chExt cx="0" cy="0"/>
+        </a:xfrm>
+      </p:grpSpPr>
+      <p:grpSp>
+        <p:nvGrpSpPr>
+          <p:cNvPr id="23" name="Group 22"/>
+          <p:cNvGrpSpPr/>
+          <p:nvPr/>
+        </p:nvGrpSpPr>
+        <p:grpSpPr>
+          <a:xfrm>
+            <a:off x="1828800" y="4531800"/>
+            <a:ext cx="8495561" cy="1545336"/>
+            <a:chOff x="2110420" y="2819992"/>
+            <a:chExt cx="7847802" cy="1545336"/>
+          </a:xfrm>
+          <a:noFill/>
+        </p:grpSpPr>
+        <p:sp>
+          <p:nvSpPr>
+            <p:cNvPr id="15" name="Content Placeholder 1"/>
+            <p:cNvSpPr txBox="1">
+              <a:spLocks/>
+            </p:cNvSpPr>
+            <p:nvPr/>
+          </p:nvSpPr>
+          <p:spPr>
+            <a:xfrm>
+              <a:off x="2110420" y="2819992"/>
+              <a:ext cx="7847802" cy="1545336"/>
+            </a:xfrm>
+            <a:prstGeom prst="rect">
+              <a:avLst/>
+            </a:prstGeom>
+            <a:grpFill/>
+            <a:ln w="38100">
+              <a:solidFill>
+                <a:schemeClr val="accent2"/>
+              </a:solidFill>
+            </a:ln>
+          </p:spPr>
+          <p:txBody>
+            <a:bodyPr vert="horz" lIns="274320" tIns="274320" rIns="1645920" bIns="274320" rtlCol="0" anchor="ctr">
+              <a:noAutofit/>
+            </a:bodyPr>
+            <a:lstStyle>
+              <a:lvl1pPr marL="182880" indent="-182880" algn="l" defTabSz="914400" rtl="0" eaLnBrk="1" latinLnBrk="0" hangingPunct="1">
+                <a:lnSpc>
+                  <a:spcPct val="90000"/>
+                </a:lnSpc>
+                <a:spcBef>
+                  <a:spcPts val="1200"/>
+                </a:spcBef>
+                <a:buClr>
+                  <a:schemeClr val="tx1"/>
+                </a:buClr>
+                <a:buFont typeface="Arial" panose="020B0604020202020204" pitchFamily="34" charset="0"/>
+                <a:buChar char="–"/>
+                <a:defRPr sz="1800" kern="1200">
+                  <a:solidFill>
+                    <a:schemeClr val="tx1"/>
+                  </a:solidFill>
+                  <a:latin typeface="+mn-lt"/>
+                  <a:ea typeface="+mn-ea"/>
+                  <a:cs typeface="+mn-cs"/>
+                </a:defRPr>
+              </a:lvl1pPr>
+              <a:lvl2pPr marL="411480" indent="-182880" algn="l" defTabSz="914400" rtl="0" eaLnBrk="1" latinLnBrk="0" hangingPunct="1">
+                <a:lnSpc>
+                  <a:spcPct val="90000"/>
+                </a:lnSpc>
+                <a:spcBef>
+                  <a:spcPts val="800"/>
+                </a:spcBef>
+                <a:buClr>
+                  <a:schemeClr val="tx1"/>
+                </a:buClr>
+                <a:buFont typeface="Arial" panose="020B0604020202020204" pitchFamily="34" charset="0"/>
+                <a:buChar char="–"/>
+                <a:defRPr sz="1600" kern="1200">
+                  <a:solidFill>
+                    <a:schemeClr val="tx1"/>
+                  </a:solidFill>
+                  <a:latin typeface="+mn-lt"/>
+                  <a:ea typeface="+mn-ea"/>
+                  <a:cs typeface="+mn-cs"/>
+                </a:defRPr>
+              </a:lvl2pPr>
+              <a:lvl3pPr marL="548640" indent="-137160" algn="l" defTabSz="914400" rtl="0" eaLnBrk="1" latinLnBrk="0" hangingPunct="1">
+                <a:lnSpc>
+                  <a:spcPct val="90000"/>
+                </a:lnSpc>
+                <a:spcBef>
+                  <a:spcPts val="600"/>
+                </a:spcBef>
+                <a:buClr>
+                  <a:schemeClr val="tx1"/>
+                </a:buClr>
+                <a:buFont typeface="Arial" panose="020B0604020202020204" pitchFamily="34" charset="0"/>
+                <a:buChar char="–"/>
+                <a:defRPr sz="1400" kern="1200">
+                  <a:solidFill>
+                    <a:schemeClr val="tx1"/>
+                  </a:solidFill>
+                  <a:latin typeface="+mn-lt"/>
+                  <a:ea typeface="+mn-ea"/>
+                  <a:cs typeface="+mn-cs"/>
+                </a:defRPr>
+              </a:lvl3pPr>
+              <a:lvl4pPr marL="731520" indent="-137160" algn="l" defTabSz="914400" rtl="0" eaLnBrk="1" latinLnBrk="0" hangingPunct="1">
+                <a:lnSpc>
+                  <a:spcPct val="90000"/>
+                </a:lnSpc>
+                <a:spcBef>
+                  <a:spcPts val="600"/>
+                </a:spcBef>
+                <a:buClr>
+                  <a:schemeClr val="tx1"/>
+                </a:buClr>
+                <a:buFont typeface="Arial" panose="020B0604020202020204" pitchFamily="34" charset="0"/>
+                <a:buChar char="–"/>
+                <a:defRPr sz="1200" kern="1200">
+                  <a:solidFill>
+                    <a:schemeClr val="tx1"/>
+                  </a:solidFill>
+                  <a:latin typeface="+mn-lt"/>
+                  <a:ea typeface="+mn-ea"/>
+                  <a:cs typeface="+mn-cs"/>
+                </a:defRPr>
+              </a:lvl4pPr>
+              <a:lvl5pPr marL="868680" indent="-137160" algn="l" defTabSz="914400" rtl="0" eaLnBrk="1" latinLnBrk="0" hangingPunct="1">
+                <a:lnSpc>
+                  <a:spcPct val="90000"/>
+                </a:lnSpc>
+                <a:spcBef>
+                  <a:spcPts val="600"/>
+                </a:spcBef>
+                <a:buClr>
+                  <a:schemeClr val="tx1"/>
+                </a:buClr>
+                <a:buFont typeface="Arial" panose="020B0604020202020204" pitchFamily="34" charset="0"/>
+                <a:buChar char="–"/>
+                <a:defRPr sz="1200" kern="1200">
+                  <a:solidFill>
+                    <a:schemeClr val="tx1"/>
+                  </a:solidFill>
+                  <a:latin typeface="+mn-lt"/>
+                  <a:ea typeface="+mn-ea"/>
+                  <a:cs typeface="+mn-cs"/>
+                </a:defRPr>
+              </a:lvl5pPr>
+              <a:lvl6pPr marL="1051560" indent="-137160" algn="l" defTabSz="914400" rtl="0" eaLnBrk="1" latinLnBrk="0" hangingPunct="1">
+                <a:lnSpc>
+                  <a:spcPct val="90000"/>
+                </a:lnSpc>
+                <a:spcBef>
+                  <a:spcPts val="600"/>
+                </a:spcBef>
+                <a:buClr>
+                  <a:schemeClr val="tx1"/>
+                </a:buClr>
+                <a:buFont typeface="Arial" panose="020B0604020202020204" pitchFamily="34" charset="0"/>
+                <a:buChar char="–"/>
+                <a:defRPr sz="1200" kern="1200">
+                  <a:solidFill>
+                    <a:schemeClr val="tx1"/>
+                  </a:solidFill>
+                  <a:latin typeface="+mn-lt"/>
+                  <a:ea typeface="+mn-ea"/>
+                  <a:cs typeface="+mn-cs"/>
+                </a:defRPr>
+              </a:lvl6pPr>
+              <a:lvl7pPr marL="1188720" indent="-137160" algn="l" defTabSz="914400" rtl="0" eaLnBrk="1" latinLnBrk="0" hangingPunct="1">
+                <a:lnSpc>
+                  <a:spcPct val="90000"/>
+                </a:lnSpc>
+                <a:spcBef>
+                  <a:spcPts val="600"/>
+                </a:spcBef>
+                <a:buClr>
+                  <a:schemeClr val="tx1"/>
+                </a:buClr>
+                <a:buFont typeface="Arial" panose="020B0604020202020204" pitchFamily="34" charset="0"/>
+                <a:buChar char="–"/>
+                <a:defRPr sz="1200" kern="1200">
+                  <a:solidFill>
+                    <a:schemeClr val="tx1"/>
+                  </a:solidFill>
+                  <a:latin typeface="+mn-lt"/>
+                  <a:ea typeface="+mn-ea"/>
+                  <a:cs typeface="+mn-cs"/>
+                </a:defRPr>
+              </a:lvl7pPr>
+              <a:lvl8pPr marL="1371600" indent="-137160" algn="l" defTabSz="914400" rtl="0" eaLnBrk="1" latinLnBrk="0" hangingPunct="1">
+                <a:lnSpc>
+                  <a:spcPct val="90000"/>
+                </a:lnSpc>
+                <a:spcBef>
+                  <a:spcPts val="600"/>
+                </a:spcBef>
+                <a:buClr>
+                  <a:schemeClr val="tx1"/>
+                </a:buClr>
+                <a:buFont typeface="Arial" panose="020B0604020202020204" pitchFamily="34" charset="0"/>
+                <a:buChar char="–"/>
+                <a:defRPr sz="1200" kern="1200">
+                  <a:solidFill>
+                    <a:schemeClr val="tx1"/>
+                  </a:solidFill>
+                  <a:latin typeface="+mn-lt"/>
+                  <a:ea typeface="+mn-ea"/>
+                  <a:cs typeface="+mn-cs"/>
+                </a:defRPr>
+              </a:lvl8pPr>
+              <a:lvl9pPr marL="1554480" indent="-137160" algn="l" defTabSz="914400" rtl="0" eaLnBrk="1" latinLnBrk="0" hangingPunct="1">
+                <a:lnSpc>
+                  <a:spcPct val="90000"/>
+                </a:lnSpc>
+                <a:spcBef>
+                  <a:spcPts val="600"/>
+                </a:spcBef>
+                <a:buClr>
+                  <a:schemeClr val="tx1"/>
+                </a:buClr>
+                <a:buFont typeface="Arial" panose="020B0604020202020204" pitchFamily="34" charset="0"/>
+                <a:buChar char="–"/>
+                <a:defRPr sz="1200" kern="1200">
+                  <a:solidFill>
+                    <a:schemeClr val="tx1"/>
+                  </a:solidFill>
+                  <a:latin typeface="+mn-lt"/>
+                  <a:ea typeface="+mn-ea"/>
+                  <a:cs typeface="+mn-cs"/>
+                </a:defRPr>
+              </a:lvl9pPr>
+            </a:lstStyle>
+            <a:p>
+              <a:pPr marL="0" indent="0">
+                <a:lnSpc>
+                  <a:spcPct val="100000"/>
+                </a:lnSpc>
+                <a:spcBef>
+                  <a:spcPts val="1000"/>
+                </a:spcBef>
+                <a:buFont typeface="Arial" panose="020B0604020202020204" pitchFamily="34" charset="0"/>
+                <a:buNone/>
+              </a:pPr>
+              <a:endParaRPr lang="en-US" b="1" dirty="0"/>
+            </a:p>
+          </p:txBody>
+        </p:sp>
+        <p:cxnSp>
+          <p:nvCxnSpPr>
+            <p:cNvPr id="17" name="Straight Connector 16"/>
+            <p:cNvCxnSpPr/>
+            <p:nvPr/>
+          </p:nvCxnSpPr>
+          <p:spPr>
+            <a:xfrm>
+              <a:off x="3328827" y="3031282"/>
+              <a:ext cx="0" cy="1122755"/>
+            </a:xfrm>
+            <a:prstGeom prst="line">
+              <a:avLst/>
+            </a:prstGeom>
+            <a:grpFill/>
+            <a:ln w="38100">
+              <a:solidFill>
+                <a:schemeClr val="bg2"/>
+              </a:solidFill>
+            </a:ln>
+          </p:spPr>
+        </p:cxnSp>
+      </p:grpSp>
+      <p:grpSp>
+        <p:nvGrpSpPr>
+          <p:cNvPr id="22" name="Group 21"/>
+          <p:cNvGrpSpPr/>
+          <p:nvPr/>
+        </p:nvGrpSpPr>
+        <p:grpSpPr>
+          <a:xfrm>
+            <a:off x="1828800" y="1198880"/>
+            <a:ext cx="8495561" cy="1545336"/>
+            <a:chOff x="2110420" y="4468336"/>
+            <a:chExt cx="7847802" cy="1545336"/>
+          </a:xfrm>
+        </p:grpSpPr>
+        <p:sp>
+          <p:nvSpPr>
+            <p:cNvPr id="16" name="Content Placeholder 1"/>
+            <p:cNvSpPr txBox="1">
+              <a:spLocks/>
+            </p:cNvSpPr>
+            <p:nvPr/>
+          </p:nvSpPr>
+          <p:spPr>
+            <a:xfrm>
+              <a:off x="2110420" y="4468336"/>
+              <a:ext cx="7847802" cy="1545336"/>
+            </a:xfrm>
+            <a:prstGeom prst="rect">
+              <a:avLst/>
+            </a:prstGeom>
+            <a:solidFill>
+              <a:schemeClr val="bg1"/>
+            </a:solidFill>
+            <a:ln w="38100">
+              <a:solidFill>
+                <a:schemeClr val="accent3"/>
+              </a:solidFill>
+            </a:ln>
+          </p:spPr>
+          <p:txBody>
+            <a:bodyPr vert="horz" lIns="274320" tIns="274320" rIns="1645920" bIns="274320" rtlCol="0" anchor="ctr">
+              <a:noAutofit/>
+            </a:bodyPr>
+            <a:lstStyle>
+              <a:lvl1pPr marL="182880" indent="-182880" algn="l" defTabSz="914400" rtl="0" eaLnBrk="1" latinLnBrk="0" hangingPunct="1">
+                <a:lnSpc>
+                  <a:spcPct val="90000"/>
+                </a:lnSpc>
+                <a:spcBef>
+                  <a:spcPts val="1200"/>
+                </a:spcBef>
+                <a:buClr>
+                  <a:schemeClr val="tx1"/>
+                </a:buClr>
+                <a:buFont typeface="Arial" panose="020B0604020202020204" pitchFamily="34" charset="0"/>
+                <a:buChar char="–"/>
+                <a:defRPr sz="1800" kern="1200">
+                  <a:solidFill>
+                    <a:schemeClr val="tx1"/>
+                  </a:solidFill>
+                  <a:latin typeface="+mn-lt"/>
+                  <a:ea typeface="+mn-ea"/>
+                  <a:cs typeface="+mn-cs"/>
+                </a:defRPr>
+              </a:lvl1pPr>
+              <a:lvl2pPr marL="411480" indent="-182880" algn="l" defTabSz="914400" rtl="0" eaLnBrk="1" latinLnBrk="0" hangingPunct="1">
+                <a:lnSpc>
+                  <a:spcPct val="90000"/>
+                </a:lnSpc>
+                <a:spcBef>
+                  <a:spcPts val="800"/>
+                </a:spcBef>
+                <a:buClr>
+                  <a:schemeClr val="tx1"/>
+                </a:buClr>
+                <a:buFont typeface="Arial" panose="020B0604020202020204" pitchFamily="34" charset="0"/>
+                <a:buChar char="–"/>
+                <a:defRPr sz="1600" kern="1200">
+                  <a:solidFill>
+                    <a:schemeClr val="tx1"/>
+                  </a:solidFill>
+                  <a:latin typeface="+mn-lt"/>
+                  <a:ea typeface="+mn-ea"/>
+                  <a:cs typeface="+mn-cs"/>
+                </a:defRPr>
+              </a:lvl2pPr>
+              <a:lvl3pPr marL="548640" indent="-137160" algn="l" defTabSz="914400" rtl="0" eaLnBrk="1" latinLnBrk="0" hangingPunct="1">
+                <a:lnSpc>
+                  <a:spcPct val="90000"/>
+                </a:lnSpc>
+                <a:spcBef>
+                  <a:spcPts val="600"/>
+                </a:spcBef>
+                <a:buClr>
+                  <a:schemeClr val="tx1"/>
+                </a:buClr>
+                <a:buFont typeface="Arial" panose="020B0604020202020204" pitchFamily="34" charset="0"/>
+                <a:buChar char="–"/>
+                <a:defRPr sz="1400" kern="1200">
+                  <a:solidFill>
+                    <a:schemeClr val="tx1"/>
+                  </a:solidFill>
+                  <a:latin typeface="+mn-lt"/>
+                  <a:ea typeface="+mn-ea"/>
+                  <a:cs typeface="+mn-cs"/>
+                </a:defRPr>
+              </a:lvl3pPr>
+              <a:lvl4pPr marL="731520" indent="-137160" algn="l" defTabSz="914400" rtl="0" eaLnBrk="1" latinLnBrk="0" hangingPunct="1">
+                <a:lnSpc>
+                  <a:spcPct val="90000"/>
+                </a:lnSpc>
+                <a:spcBef>
+                  <a:spcPts val="600"/>
+                </a:spcBef>
+                <a:buClr>
+                  <a:schemeClr val="tx1"/>
+                </a:buClr>
+                <a:buFont typeface="Arial" panose="020B0604020202020204" pitchFamily="34" charset="0"/>
+                <a:buChar char="–"/>
+                <a:defRPr sz="1200" kern="1200">
+                  <a:solidFill>
+                    <a:schemeClr val="tx1"/>
+                  </a:solidFill>
+                  <a:latin typeface="+mn-lt"/>
+                  <a:ea typeface="+mn-ea"/>
+                  <a:cs typeface="+mn-cs"/>
+                </a:defRPr>
+              </a:lvl4pPr>
+              <a:lvl5pPr marL="868680" indent="-137160" algn="l" defTabSz="914400" rtl="0" eaLnBrk="1" latinLnBrk="0" hangingPunct="1">
+                <a:lnSpc>
+                  <a:spcPct val="90000"/>
+                </a:lnSpc>
+                <a:spcBef>
+                  <a:spcPts val="600"/>
+                </a:spcBef>
+                <a:buClr>
+                  <a:schemeClr val="tx1"/>
+                </a:buClr>
+                <a:buFont typeface="Arial" panose="020B0604020202020204" pitchFamily="34" charset="0"/>
+                <a:buChar char="–"/>
+                <a:defRPr sz="1200" kern="1200">
+                  <a:solidFill>
+                    <a:schemeClr val="tx1"/>
+                  </a:solidFill>
+                  <a:latin typeface="+mn-lt"/>
+                  <a:ea typeface="+mn-ea"/>
+                  <a:cs typeface="+mn-cs"/>
+                </a:defRPr>
+              </a:lvl5pPr>
+              <a:lvl6pPr marL="1051560" indent="-137160" algn="l" defTabSz="914400" rtl="0" eaLnBrk="1" latinLnBrk="0" hangingPunct="1">
+                <a:lnSpc>
+                  <a:spcPct val="90000"/>
+                </a:lnSpc>
+                <a:spcBef>
+                  <a:spcPts val="600"/>
+                </a:spcBef>
+                <a:buClr>
+                  <a:schemeClr val="tx1"/>
+                </a:buClr>
+                <a:buFont typeface="Arial" panose="020B0604020202020204" pitchFamily="34" charset="0"/>
+                <a:buChar char="–"/>
+                <a:defRPr sz="1200" kern="1200">
+                  <a:solidFill>
+                    <a:schemeClr val="tx1"/>
+                  </a:solidFill>
+                  <a:latin typeface="+mn-lt"/>
+                  <a:ea typeface="+mn-ea"/>
+                  <a:cs typeface="+mn-cs"/>
+                </a:defRPr>
+              </a:lvl6pPr>
+              <a:lvl7pPr marL="1188720" indent="-137160" algn="l" defTabSz="914400" rtl="0" eaLnBrk="1" latinLnBrk="0" hangingPunct="1">
+                <a:lnSpc>
+                  <a:spcPct val="90000"/>
+                </a:lnSpc>
+                <a:spcBef>
+                  <a:spcPts val="600"/>
+                </a:spcBef>
+                <a:buClr>
+                  <a:schemeClr val="tx1"/>
+                </a:buClr>
+                <a:buFont typeface="Arial" panose="020B0604020202020204" pitchFamily="34" charset="0"/>
+                <a:buChar char="–"/>
+                <a:defRPr sz="1200" kern="1200">
+                  <a:solidFill>
+                    <a:schemeClr val="tx1"/>
+                  </a:solidFill>
+                  <a:latin typeface="+mn-lt"/>
+                  <a:ea typeface="+mn-ea"/>
+                  <a:cs typeface="+mn-cs"/>
+                </a:defRPr>
+              </a:lvl7pPr>
+              <a:lvl8pPr marL="1371600" indent="-137160" algn="l" defTabSz="914400" rtl="0" eaLnBrk="1" latinLnBrk="0" hangingPunct="1">
+                <a:lnSpc>
+                  <a:spcPct val="90000"/>
+                </a:lnSpc>
+                <a:spcBef>
+                  <a:spcPts val="600"/>
+                </a:spcBef>
+                <a:buClr>
+                  <a:schemeClr val="tx1"/>
+                </a:buClr>
+                <a:buFont typeface="Arial" panose="020B0604020202020204" pitchFamily="34" charset="0"/>
+                <a:buChar char="–"/>
+                <a:defRPr sz="1200" kern="1200">
+                  <a:solidFill>
+                    <a:schemeClr val="tx1"/>
+                  </a:solidFill>
+                  <a:latin typeface="+mn-lt"/>
+                  <a:ea typeface="+mn-ea"/>
+                  <a:cs typeface="+mn-cs"/>
+                </a:defRPr>
+              </a:lvl8pPr>
+              <a:lvl9pPr marL="1554480" indent="-137160" algn="l" defTabSz="914400" rtl="0" eaLnBrk="1" latinLnBrk="0" hangingPunct="1">
+                <a:lnSpc>
+                  <a:spcPct val="90000"/>
+                </a:lnSpc>
+                <a:spcBef>
+                  <a:spcPts val="600"/>
+                </a:spcBef>
+                <a:buClr>
+                  <a:schemeClr val="tx1"/>
+                </a:buClr>
+                <a:buFont typeface="Arial" panose="020B0604020202020204" pitchFamily="34" charset="0"/>
+                <a:buChar char="–"/>
+                <a:defRPr sz="1200" kern="1200">
+                  <a:solidFill>
+                    <a:schemeClr val="tx1"/>
+                  </a:solidFill>
+                  <a:latin typeface="+mn-lt"/>
+                  <a:ea typeface="+mn-ea"/>
+                  <a:cs typeface="+mn-cs"/>
+                </a:defRPr>
+              </a:lvl9pPr>
+            </a:lstStyle>
+            <a:p>
+              <a:pPr marL="0" indent="0">
+                <a:lnSpc>
+                  <a:spcPct val="100000"/>
+                </a:lnSpc>
+                <a:spcBef>
+                  <a:spcPts val="1000"/>
+                </a:spcBef>
+                <a:buFont typeface="Arial" panose="020B0604020202020204" pitchFamily="34" charset="0"/>
+                <a:buNone/>
+              </a:pPr>
+              <a:endParaRPr lang="en-US" b="1" dirty="0"/>
+            </a:p>
+          </p:txBody>
+        </p:sp>
+        <p:cxnSp>
+          <p:nvCxnSpPr>
+            <p:cNvPr id="18" name="Straight Connector 17"/>
+            <p:cNvCxnSpPr/>
+            <p:nvPr/>
+          </p:nvCxnSpPr>
+          <p:spPr>
+            <a:xfrm>
+              <a:off x="3328827" y="4679626"/>
+              <a:ext cx="0" cy="1122755"/>
+            </a:xfrm>
+            <a:prstGeom prst="line">
+              <a:avLst/>
+            </a:prstGeom>
+            <a:solidFill>
+              <a:schemeClr val="bg1"/>
+            </a:solidFill>
+            <a:ln w="38100">
+              <a:solidFill>
+                <a:schemeClr val="bg2"/>
+              </a:solidFill>
+            </a:ln>
+          </p:spPr>
+        </p:cxnSp>
+      </p:grpSp>
+      <p:sp>
+        <p:nvSpPr>
+          <p:cNvPr id="4" name="Title 3"/>
+          <p:cNvSpPr>
+            <a:spLocks noGrp="1"/>
+          </p:cNvSpPr>
+          <p:nvPr>
+            <p:ph type="title"/>
+          </p:nvPr>
+        </p:nvSpPr>
+        <p:spPr>
+          <a:xfrm>
+            <a:off x="609441" y="519236"/>
+            <a:ext cx="11508495" cy="852364"/>
+          </a:xfrm>
+        </p:spPr>
+        <p:txBody>
+          <a:bodyPr/>
+          <a:lstStyle/>
+          <a:p>
+            <a:r>
+              <a:rPr lang="en-US" dirty="0"/>
+              <a:t>3 month trend: </a:t>
+            </a:r>
+            <a:r>
+              <a:rPr lang="en-US" dirty="0" smtClean="0"/>
+              <a:t>Account </a:t>
+            </a:r>
+            <a:r>
+              <a:rPr lang="en-US" smtClean="0"/>
+              <a:t>team Objectives</a:t>
+            </a:r>
+            <a:endParaRPr lang="en-US" dirty="0"/>
+          </a:p>
+        </p:txBody>
+      </p:sp>
+      <p:grpSp>
+        <p:nvGrpSpPr>
+          <p:cNvPr id="20" name="Group 19"/>
+          <p:cNvGrpSpPr/>
+          <p:nvPr/>
+        </p:nvGrpSpPr>
+        <p:grpSpPr>
+          <a:xfrm>
+            <a:off x="1828800" y="2857114"/>
+            <a:ext cx="8495561" cy="1545336"/>
+            <a:chOff x="2110420" y="1171648"/>
+            <a:chExt cx="7847802" cy="1545336"/>
+          </a:xfrm>
+        </p:grpSpPr>
+        <p:sp>
+          <p:nvSpPr>
+            <p:cNvPr id="21" name="Content Placeholder 1"/>
+            <p:cNvSpPr txBox="1">
+              <a:spLocks/>
+            </p:cNvSpPr>
+            <p:nvPr/>
+          </p:nvSpPr>
+          <p:spPr>
+            <a:xfrm>
+              <a:off x="2110420" y="1171648"/>
+              <a:ext cx="7847802" cy="1545336"/>
+            </a:xfrm>
+            <a:prstGeom prst="rect">
+              <a:avLst/>
+            </a:prstGeom>
+            <a:solidFill>
+              <a:schemeClr val="bg1"/>
+            </a:solidFill>
+            <a:ln w="38100">
+              <a:solidFill>
+                <a:schemeClr val="accent1"/>
+              </a:solidFill>
+            </a:ln>
+          </p:spPr>
+          <p:txBody>
+            <a:bodyPr vert="horz" lIns="274320" tIns="274320" rIns="1645920" bIns="274320" rtlCol="0" anchor="ctr">
+              <a:noAutofit/>
+            </a:bodyPr>
+            <a:lstStyle>
+              <a:lvl1pPr marL="182880" indent="-182880" algn="l" defTabSz="914400" rtl="0" eaLnBrk="1" latinLnBrk="0" hangingPunct="1">
+                <a:lnSpc>
+                  <a:spcPct val="90000"/>
+                </a:lnSpc>
+                <a:spcBef>
+                  <a:spcPts val="1200"/>
+                </a:spcBef>
+                <a:buClr>
+                  <a:schemeClr val="tx1"/>
+                </a:buClr>
+                <a:buFont typeface="Arial" panose="020B0604020202020204" pitchFamily="34" charset="0"/>
+                <a:buChar char="–"/>
+                <a:defRPr sz="1800" kern="1200">
+                  <a:solidFill>
+                    <a:schemeClr val="tx1"/>
+                  </a:solidFill>
+                  <a:latin typeface="+mn-lt"/>
+                  <a:ea typeface="+mn-ea"/>
+                  <a:cs typeface="+mn-cs"/>
+                </a:defRPr>
+              </a:lvl1pPr>
+              <a:lvl2pPr marL="411480" indent="-182880" algn="l" defTabSz="914400" rtl="0" eaLnBrk="1" latinLnBrk="0" hangingPunct="1">
+                <a:lnSpc>
+                  <a:spcPct val="90000"/>
+                </a:lnSpc>
+                <a:spcBef>
+                  <a:spcPts val="800"/>
+                </a:spcBef>
+                <a:buClr>
+                  <a:schemeClr val="tx1"/>
+                </a:buClr>
+                <a:buFont typeface="Arial" panose="020B0604020202020204" pitchFamily="34" charset="0"/>
+                <a:buChar char="–"/>
+                <a:defRPr sz="1600" kern="1200">
+                  <a:solidFill>
+                    <a:schemeClr val="tx1"/>
+                  </a:solidFill>
+                  <a:latin typeface="+mn-lt"/>
+                  <a:ea typeface="+mn-ea"/>
+                  <a:cs typeface="+mn-cs"/>
+                </a:defRPr>
+              </a:lvl2pPr>
+              <a:lvl3pPr marL="548640" indent="-137160" algn="l" defTabSz="914400" rtl="0" eaLnBrk="1" latinLnBrk="0" hangingPunct="1">
+                <a:lnSpc>
+                  <a:spcPct val="90000"/>
+                </a:lnSpc>
+                <a:spcBef>
+                  <a:spcPts val="600"/>
+                </a:spcBef>
+                <a:buClr>
+                  <a:schemeClr val="tx1"/>
+                </a:buClr>
+                <a:buFont typeface="Arial" panose="020B0604020202020204" pitchFamily="34" charset="0"/>
+                <a:buChar char="–"/>
+                <a:defRPr sz="1400" kern="1200">
+                  <a:solidFill>
+                    <a:schemeClr val="tx1"/>
+                  </a:solidFill>
+                  <a:latin typeface="+mn-lt"/>
+                  <a:ea typeface="+mn-ea"/>
+                  <a:cs typeface="+mn-cs"/>
+                </a:defRPr>
+              </a:lvl3pPr>
+              <a:lvl4pPr marL="731520" indent="-137160" algn="l" defTabSz="914400" rtl="0" eaLnBrk="1" latinLnBrk="0" hangingPunct="1">
+                <a:lnSpc>
+                  <a:spcPct val="90000"/>
+                </a:lnSpc>
+                <a:spcBef>
+                  <a:spcPts val="600"/>
+                </a:spcBef>
+                <a:buClr>
+                  <a:schemeClr val="tx1"/>
+                </a:buClr>
+                <a:buFont typeface="Arial" panose="020B0604020202020204" pitchFamily="34" charset="0"/>
+                <a:buChar char="–"/>
+                <a:defRPr sz="1200" kern="1200">
+                  <a:solidFill>
+                    <a:schemeClr val="tx1"/>
+                  </a:solidFill>
+                  <a:latin typeface="+mn-lt"/>
+                  <a:ea typeface="+mn-ea"/>
+                  <a:cs typeface="+mn-cs"/>
+                </a:defRPr>
+              </a:lvl4pPr>
+              <a:lvl5pPr marL="868680" indent="-137160" algn="l" defTabSz="914400" rtl="0" eaLnBrk="1" latinLnBrk="0" hangingPunct="1">
+                <a:lnSpc>
+                  <a:spcPct val="90000"/>
+                </a:lnSpc>
+                <a:spcBef>
+                  <a:spcPts val="600"/>
+                </a:spcBef>
+                <a:buClr>
+                  <a:schemeClr val="tx1"/>
+                </a:buClr>
+                <a:buFont typeface="Arial" panose="020B0604020202020204" pitchFamily="34" charset="0"/>
+                <a:buChar char="–"/>
+                <a:defRPr sz="1200" kern="1200">
+                  <a:solidFill>
+                    <a:schemeClr val="tx1"/>
+                  </a:solidFill>
+                  <a:latin typeface="+mn-lt"/>
+                  <a:ea typeface="+mn-ea"/>
+                  <a:cs typeface="+mn-cs"/>
+                </a:defRPr>
+              </a:lvl5pPr>
+              <a:lvl6pPr marL="1051560" indent="-137160" algn="l" defTabSz="914400" rtl="0" eaLnBrk="1" latinLnBrk="0" hangingPunct="1">
+                <a:lnSpc>
+                  <a:spcPct val="90000"/>
+                </a:lnSpc>
+                <a:spcBef>
+                  <a:spcPts val="600"/>
+                </a:spcBef>
+                <a:buClr>
+                  <a:schemeClr val="tx1"/>
+                </a:buClr>
+                <a:buFont typeface="Arial" panose="020B0604020202020204" pitchFamily="34" charset="0"/>
+                <a:buChar char="–"/>
+                <a:defRPr sz="1200" kern="1200">
+                  <a:solidFill>
+                    <a:schemeClr val="tx1"/>
+                  </a:solidFill>
+                  <a:latin typeface="+mn-lt"/>
+                  <a:ea typeface="+mn-ea"/>
+                  <a:cs typeface="+mn-cs"/>
+                </a:defRPr>
+              </a:lvl6pPr>
+              <a:lvl7pPr marL="1188720" indent="-137160" algn="l" defTabSz="914400" rtl="0" eaLnBrk="1" latinLnBrk="0" hangingPunct="1">
+                <a:lnSpc>
+                  <a:spcPct val="90000"/>
+                </a:lnSpc>
+                <a:spcBef>
+                  <a:spcPts val="600"/>
+                </a:spcBef>
+                <a:buClr>
+                  <a:schemeClr val="tx1"/>
+                </a:buClr>
+                <a:buFont typeface="Arial" panose="020B0604020202020204" pitchFamily="34" charset="0"/>
+                <a:buChar char="–"/>
+                <a:defRPr sz="1200" kern="1200">
+                  <a:solidFill>
+                    <a:schemeClr val="tx1"/>
+                  </a:solidFill>
+                  <a:latin typeface="+mn-lt"/>
+                  <a:ea typeface="+mn-ea"/>
+                  <a:cs typeface="+mn-cs"/>
+                </a:defRPr>
+              </a:lvl7pPr>
+              <a:lvl8pPr marL="1371600" indent="-137160" algn="l" defTabSz="914400" rtl="0" eaLnBrk="1" latinLnBrk="0" hangingPunct="1">
+                <a:lnSpc>
+                  <a:spcPct val="90000"/>
+                </a:lnSpc>
+                <a:spcBef>
+                  <a:spcPts val="600"/>
+                </a:spcBef>
+                <a:buClr>
+                  <a:schemeClr val="tx1"/>
+                </a:buClr>
+                <a:buFont typeface="Arial" panose="020B0604020202020204" pitchFamily="34" charset="0"/>
+                <a:buChar char="–"/>
+                <a:defRPr sz="1200" kern="1200">
+                  <a:solidFill>
+                    <a:schemeClr val="tx1"/>
+                  </a:solidFill>
+                  <a:latin typeface="+mn-lt"/>
+                  <a:ea typeface="+mn-ea"/>
+                  <a:cs typeface="+mn-cs"/>
+                </a:defRPr>
+              </a:lvl8pPr>
+              <a:lvl9pPr marL="1554480" indent="-137160" algn="l" defTabSz="914400" rtl="0" eaLnBrk="1" latinLnBrk="0" hangingPunct="1">
+                <a:lnSpc>
+                  <a:spcPct val="90000"/>
+                </a:lnSpc>
+                <a:spcBef>
+                  <a:spcPts val="600"/>
+                </a:spcBef>
+                <a:buClr>
+                  <a:schemeClr val="tx1"/>
+                </a:buClr>
+                <a:buFont typeface="Arial" panose="020B0604020202020204" pitchFamily="34" charset="0"/>
+                <a:buChar char="–"/>
+                <a:defRPr sz="1200" kern="1200">
+                  <a:solidFill>
+                    <a:schemeClr val="tx1"/>
+                  </a:solidFill>
+                  <a:latin typeface="+mn-lt"/>
+                  <a:ea typeface="+mn-ea"/>
+                  <a:cs typeface="+mn-cs"/>
+                </a:defRPr>
+              </a:lvl9pPr>
+            </a:lstStyle>
+            <a:p>
+              <a:pPr marL="0" indent="0">
+                <a:lnSpc>
+                  <a:spcPct val="100000"/>
+                </a:lnSpc>
+                <a:spcBef>
+                  <a:spcPts val="1000"/>
+                </a:spcBef>
+                <a:buFont typeface="Arial" panose="020B0604020202020204" pitchFamily="34" charset="0"/>
+                <a:buNone/>
+              </a:pPr>
+              <a:endParaRPr lang="en-US" b="1" dirty="0"/>
+            </a:p>
+          </p:txBody>
+        </p:sp>
+        <p:cxnSp>
+          <p:nvCxnSpPr>
+            <p:cNvPr id="25" name="Straight Connector 24"/>
+            <p:cNvCxnSpPr/>
+            <p:nvPr/>
+          </p:nvCxnSpPr>
+          <p:spPr>
+            <a:xfrm>
+              <a:off x="3328827" y="1382938"/>
+              <a:ext cx="0" cy="1122755"/>
+            </a:xfrm>
+            <a:prstGeom prst="line">
+              <a:avLst/>
+            </a:prstGeom>
+            <a:solidFill>
+              <a:schemeClr val="bg1"/>
+            </a:solidFill>
+            <a:ln w="38100">
+              <a:solidFill>
+                <a:schemeClr val="bg2"/>
+              </a:solidFill>
+            </a:ln>
+          </p:spPr>
+        </p:cxnSp>
+      </p:grpSp>
+      <p:sp>
+        <p:nvSpPr>
+          <p:cNvPr id="2" name="TextBox 1"/>
+          <p:cNvSpPr txBox="1"/>
+          <p:nvPr/>
+        </p:nvSpPr>
+        <p:spPr>
+          <a:xfrm>
+            <a:off x="1948543" y="1861457"/>
+            <a:ext cx="1066800" cy="348343"/>
+          </a:xfrm>
+          <a:prstGeom prst="rect">
+            <a:avLst/>
+          </a:prstGeom>
+          <a:noFill/>
+        </p:spPr>
+        <p:txBody>
+          <a:bodyPr wrap="square" lIns="0" tIns="0" rIns="0" bIns="0" rtlCol="0">
+            <a:noAutofit/>
+          </a:bodyPr>
+          <a:lstStyle/>
+          <a:p>
+            <a:pPr algn="ctr">
+              <a:lnSpc>
+                <a:spcPct val="90000"/>
+              </a:lnSpc>
+            </a:pPr>
+            <a:r>
+              <a:rPr lang="en-US" dirty="0" smtClean="0"/>
+              <a:t>Month-2</a:t>
+            </a:r>
+            <a:endParaRPr lang="en-GB" dirty="0"/>
+          </a:p>
+        </p:txBody>
+      </p:sp>
+      <p:sp>
+        <p:nvSpPr>
+          <p:cNvPr id="13" name="TextBox 12"/>
+          <p:cNvSpPr txBox="1"/>
+          <p:nvPr/>
+        </p:nvSpPr>
+        <p:spPr>
+          <a:xfrm>
+            <a:off x="1948543" y="3455609"/>
+            <a:ext cx="1066800" cy="348343"/>
+          </a:xfrm>
+          <a:prstGeom prst="rect">
+            <a:avLst/>
+          </a:prstGeom>
+          <a:noFill/>
+        </p:spPr>
+        <p:txBody>
+          <a:bodyPr wrap="square" lIns="0" tIns="0" rIns="0" bIns="0" rtlCol="0">
+            <a:noAutofit/>
+          </a:bodyPr>
+          <a:lstStyle/>
+          <a:p>
+            <a:pPr algn="ctr">
+              <a:lnSpc>
+                <a:spcPct val="90000"/>
+              </a:lnSpc>
+            </a:pPr>
+            <a:r>
+              <a:rPr lang="en-US" dirty="0" smtClean="0"/>
+              <a:t>Month-1</a:t>
+            </a:r>
+            <a:endParaRPr lang="en-GB" dirty="0"/>
+          </a:p>
+        </p:txBody>
+      </p:sp>
+      <p:sp>
+        <p:nvSpPr>
+          <p:cNvPr id="26" name="TextBox 25"/>
+          <p:cNvSpPr txBox="1"/>
+          <p:nvPr/>
+        </p:nvSpPr>
+        <p:spPr>
+          <a:xfrm>
+            <a:off x="1948543" y="5130295"/>
+            <a:ext cx="1066800" cy="348343"/>
+          </a:xfrm>
+          <a:prstGeom prst="rect">
+            <a:avLst/>
+          </a:prstGeom>
+          <a:noFill/>
+        </p:spPr>
+        <p:txBody>
+          <a:bodyPr wrap="square" lIns="0" tIns="0" rIns="0" bIns="0" rtlCol="0">
+            <a:noAutofit/>
+          </a:bodyPr>
+          <a:lstStyle/>
+          <a:p>
+            <a:pPr algn="ctr">
+              <a:lnSpc>
+                <a:spcPct val="90000"/>
+              </a:lnSpc>
+            </a:pPr>
+            <a:r>
+              <a:rPr lang="en-US" dirty="0" smtClean="0"/>
+              <a:t>Month-0</a:t>
+            </a:r>
+            <a:endParaRPr lang="en-GB" dirty="0"/>
+          </a:p>
+        </p:txBody>
+      </p:sp>
+    </p:spTree>
+    <p:extLst>
+      <p:ext uri="{BB962C8B-B14F-4D97-AF65-F5344CB8AC3E}">
+        <p14:creationId xmlns:p14="http://schemas.microsoft.com/office/powerpoint/2010/main" val="4133819905"/>
+      </p:ext>
+    </p:extLst>
+  </p:cSld>
+  <p:clrMapOvr>
+    <a:masterClrMapping/>
+  </p:clrMapOvr>
+  <mc:AlternateContent xmlns:mc="http://schemas.openxmlformats.org/markup-compatibility/2006" xmlns:p14="http://schemas.microsoft.com/office/powerpoint/2010/main">
+    <mc:Choice Requires="p14">
+      <p:transition spd="med" p14:dur="700">
+        <p:fade/>
+      </p:transition>
+    </mc:Choice>
+    <mc:Fallback xmlns="">
+      <p:transition spd="med">
+        <p:fade/>
+      </p:transition>
+    </mc:Fallback>
+  </mc:AlternateContent>
+</p:sld>
+</file>
+
 <file path=ppt/slides/slide2.xml><?xml version="1.0" encoding="utf-8"?>
 <p:sld xmlns:a="http://schemas.openxmlformats.org/drawingml/2006/main" xmlns:r="http://schemas.openxmlformats.org/officeDocument/2006/relationships" xmlns:p="http://schemas.openxmlformats.org/presentationml/2006/main">
   <p:cSld>

</xml_diff>

<commit_message>
Added new pies and wordcloud for partners to replace old bar chart on slide 10.
</commit_message>
<xml_diff>
--- a/GCA_Customer_Insights_Month-Year.pptx
+++ b/GCA_Customer_Insights_Month-Year.pptx
@@ -20,7 +20,7 @@
     <p:sldId id="292" r:id="rId8"/>
     <p:sldId id="293" r:id="rId9"/>
     <p:sldId id="286" r:id="rId10"/>
-    <p:sldId id="294" r:id="rId11"/>
+    <p:sldId id="296" r:id="rId11"/>
     <p:sldId id="288" r:id="rId12"/>
     <p:sldId id="264" r:id="rId13"/>
     <p:sldId id="289" r:id="rId14"/>
@@ -273,7 +273,7 @@
           <a:p>
             <a:fld id="{3CA61830-C416-483F-955E-54203C65B711}" type="datetimeFigureOut">
               <a:rPr lang="en-US"/>
-              <a:t>9/6/2018</a:t>
+              <a:t>9/19/2018</a:t>
             </a:fld>
             <a:endParaRPr dirty="0"/>
           </a:p>
@@ -845,7 +845,7 @@
     </p:spTree>
     <p:extLst>
       <p:ext uri="{BB962C8B-B14F-4D97-AF65-F5344CB8AC3E}">
-        <p14:creationId xmlns:p14="http://schemas.microsoft.com/office/powerpoint/2010/main" val="2627961015"/>
+        <p14:creationId xmlns:p14="http://schemas.microsoft.com/office/powerpoint/2010/main" val="983811081"/>
       </p:ext>
     </p:extLst>
   </p:cSld>
@@ -9433,7 +9433,7 @@
           <a:p>
             <a:fld id="{C07C5E14-300D-4720-B5FE-54C7D96D4160}" type="datetime4">
               <a:rPr lang="en-US" smtClean="0"/>
-              <a:t>September 6, 2018</a:t>
+              <a:t>September 19, 2018</a:t>
             </a:fld>
             <a:endParaRPr/>
           </a:p>
@@ -9769,7 +9769,7 @@
           <a:p>
             <a:fld id="{26B45FFC-9EEF-4E69-85F5-C8F54747804D}" type="datetime4">
               <a:rPr lang="en-US" smtClean="0"/>
-              <a:t>September 6, 2018</a:t>
+              <a:t>September 19, 2018</a:t>
             </a:fld>
             <a:endParaRPr/>
           </a:p>
@@ -10003,7 +10003,7 @@
           <a:p>
             <a:fld id="{684E3265-88A3-4C30-AE11-BFDF645909E9}" type="datetime4">
               <a:rPr lang="en-US" smtClean="0"/>
-              <a:t>September 6, 2018</a:t>
+              <a:t>September 19, 2018</a:t>
             </a:fld>
             <a:endParaRPr/>
           </a:p>
@@ -10114,7 +10114,7 @@
           <a:p>
             <a:fld id="{E9F763D2-AF56-4C60-80C7-7D8FC051005C}" type="datetime4">
               <a:rPr lang="en-US" smtClean="0"/>
-              <a:t>September 6, 2018</a:t>
+              <a:t>September 19, 2018</a:t>
             </a:fld>
             <a:endParaRPr/>
           </a:p>
@@ -10392,7 +10392,7 @@
           <a:p>
             <a:fld id="{65FD8143-BFA3-46F8-9B90-B0E5CFAF7F7C}" type="datetime4">
               <a:rPr lang="en-US" smtClean="0"/>
-              <a:t>September 6, 2018</a:t>
+              <a:t>September 19, 2018</a:t>
             </a:fld>
             <a:endParaRPr/>
           </a:p>
@@ -13595,13 +13595,26 @@
               </a:lnSpc>
             </a:pPr>
             <a:r>
-              <a:rPr lang="en-US" sz="1600" b="1" dirty="0">
+              <a:rPr lang="en-US" sz="1600" b="1" dirty="0" smtClean="0">
                 <a:solidFill>
                   <a:schemeClr val="tx1"/>
                 </a:solidFill>
               </a:rPr>
-              <a:t>Partner engagement volume by Center</a:t>
+              <a:t>Partner Utilization of Engagement </a:t>
             </a:r>
+            <a:r>
+              <a:rPr lang="en-US" sz="1600" b="1" dirty="0" err="1" smtClean="0">
+                <a:solidFill>
+                  <a:schemeClr val="tx1"/>
+                </a:solidFill>
+              </a:rPr>
+              <a:t>Centres</a:t>
+            </a:r>
+            <a:endParaRPr lang="en-US" sz="1600" b="1" dirty="0">
+              <a:solidFill>
+                <a:schemeClr val="tx1"/>
+              </a:solidFill>
+            </a:endParaRPr>
           </a:p>
           <a:p>
             <a:pPr>
@@ -13626,7 +13639,7 @@
         <p:spPr bwMode="ltGray">
           <a:xfrm>
             <a:off x="6282813" y="1520917"/>
-            <a:ext cx="5296571" cy="4527400"/>
+            <a:ext cx="5296571" cy="2265271"/>
           </a:xfrm>
           <a:prstGeom prst="rect">
             <a:avLst/>
@@ -13801,191 +13814,6 @@
             <a:endParaRPr lang="en-US" sz="1100" b="1" i="1" dirty="0">
               <a:solidFill>
                 <a:prstClr val="black"/>
-              </a:solidFill>
-            </a:endParaRPr>
-          </a:p>
-          <a:p>
-            <a:pPr marL="60325" lvl="0" indent="-60325">
-              <a:spcBef>
-                <a:spcPts val="1000"/>
-              </a:spcBef>
-              <a:spcAft>
-                <a:spcPts val="300"/>
-              </a:spcAft>
-              <a:buClr>
-                <a:prstClr val="black"/>
-              </a:buClr>
-            </a:pPr>
-            <a:r>
-              <a:rPr lang="en-US" sz="1200" i="1" dirty="0">
-                <a:solidFill>
-                  <a:prstClr val="black"/>
-                </a:solidFill>
-              </a:rPr>
-              <a:t>“xxx.”</a:t>
-            </a:r>
-          </a:p>
-          <a:p>
-            <a:pPr marL="274320" lvl="0" indent="-171450">
-              <a:buClr>
-                <a:prstClr val="black"/>
-              </a:buClr>
-              <a:buFont typeface="MetricHPE" panose="020B0503030202060203" pitchFamily="34" charset="0"/>
-              <a:buChar char="−"/>
-            </a:pPr>
-            <a:r>
-              <a:rPr lang="en-US" sz="1100" b="1" dirty="0">
-                <a:solidFill>
-                  <a:prstClr val="black"/>
-                </a:solidFill>
-              </a:rPr>
-              <a:t>Name, Company Role</a:t>
-            </a:r>
-            <a:endParaRPr lang="en-US" sz="1100" i="1" dirty="0">
-              <a:solidFill>
-                <a:schemeClr val="tx1"/>
-              </a:solidFill>
-            </a:endParaRPr>
-          </a:p>
-          <a:p>
-            <a:pPr marL="102870" lvl="0">
-              <a:buClr>
-                <a:prstClr val="black"/>
-              </a:buClr>
-            </a:pPr>
-            <a:endParaRPr lang="en-US" sz="1100" b="1" i="1" dirty="0" smtClean="0">
-              <a:solidFill>
-                <a:prstClr val="black"/>
-              </a:solidFill>
-            </a:endParaRPr>
-          </a:p>
-          <a:p>
-            <a:pPr marL="102870" lvl="0">
-              <a:buClr>
-                <a:prstClr val="black"/>
-              </a:buClr>
-            </a:pPr>
-            <a:endParaRPr lang="en-US" sz="1100" b="1" i="1" dirty="0">
-              <a:solidFill>
-                <a:prstClr val="black"/>
-              </a:solidFill>
-            </a:endParaRPr>
-          </a:p>
-          <a:p>
-            <a:pPr marL="60325" lvl="0" indent="-60325">
-              <a:spcBef>
-                <a:spcPts val="1000"/>
-              </a:spcBef>
-              <a:spcAft>
-                <a:spcPts val="300"/>
-              </a:spcAft>
-              <a:buClr>
-                <a:prstClr val="black"/>
-              </a:buClr>
-            </a:pPr>
-            <a:r>
-              <a:rPr lang="en-US" sz="1200" i="1" dirty="0">
-                <a:solidFill>
-                  <a:prstClr val="black"/>
-                </a:solidFill>
-              </a:rPr>
-              <a:t>“xxx.”</a:t>
-            </a:r>
-          </a:p>
-          <a:p>
-            <a:pPr marL="274320" lvl="0" indent="-171450">
-              <a:buClr>
-                <a:prstClr val="black"/>
-              </a:buClr>
-              <a:buFont typeface="MetricHPE" panose="020B0503030202060203" pitchFamily="34" charset="0"/>
-              <a:buChar char="−"/>
-            </a:pPr>
-            <a:r>
-              <a:rPr lang="en-US" sz="1100" b="1" dirty="0">
-                <a:solidFill>
-                  <a:prstClr val="black"/>
-                </a:solidFill>
-              </a:rPr>
-              <a:t>Name, Company Role</a:t>
-            </a:r>
-            <a:endParaRPr lang="en-US" sz="1100" i="1" dirty="0">
-              <a:solidFill>
-                <a:schemeClr val="tx1"/>
-              </a:solidFill>
-            </a:endParaRPr>
-          </a:p>
-          <a:p>
-            <a:pPr marL="102870" lvl="0">
-              <a:buClr>
-                <a:prstClr val="black"/>
-              </a:buClr>
-            </a:pPr>
-            <a:endParaRPr lang="en-US" sz="1100" b="1" i="1" dirty="0" smtClean="0">
-              <a:solidFill>
-                <a:prstClr val="black"/>
-              </a:solidFill>
-            </a:endParaRPr>
-          </a:p>
-          <a:p>
-            <a:pPr marL="102870" lvl="0">
-              <a:buClr>
-                <a:prstClr val="black"/>
-              </a:buClr>
-            </a:pPr>
-            <a:endParaRPr lang="en-US" sz="1100" b="1" i="1" dirty="0">
-              <a:solidFill>
-                <a:prstClr val="black"/>
-              </a:solidFill>
-            </a:endParaRPr>
-          </a:p>
-          <a:p>
-            <a:pPr marL="60325" lvl="0" indent="-60325">
-              <a:spcBef>
-                <a:spcPts val="1000"/>
-              </a:spcBef>
-              <a:spcAft>
-                <a:spcPts val="300"/>
-              </a:spcAft>
-              <a:buClr>
-                <a:prstClr val="black"/>
-              </a:buClr>
-            </a:pPr>
-            <a:r>
-              <a:rPr lang="en-US" sz="1200" i="1" dirty="0">
-                <a:solidFill>
-                  <a:prstClr val="black"/>
-                </a:solidFill>
-              </a:rPr>
-              <a:t>“xxx.”</a:t>
-            </a:r>
-          </a:p>
-          <a:p>
-            <a:pPr marL="274320" lvl="0" indent="-171450">
-              <a:buClr>
-                <a:prstClr val="black"/>
-              </a:buClr>
-              <a:buFont typeface="MetricHPE" panose="020B0503030202060203" pitchFamily="34" charset="0"/>
-              <a:buChar char="−"/>
-            </a:pPr>
-            <a:r>
-              <a:rPr lang="en-US" sz="1100" b="1" dirty="0">
-                <a:solidFill>
-                  <a:prstClr val="black"/>
-                </a:solidFill>
-              </a:rPr>
-              <a:t>Name, Company </a:t>
-            </a:r>
-            <a:r>
-              <a:rPr lang="en-US" sz="1100" b="1" dirty="0" smtClean="0">
-                <a:solidFill>
-                  <a:prstClr val="black"/>
-                </a:solidFill>
-              </a:rPr>
-              <a:t>Role</a:t>
-            </a:r>
-            <a:endParaRPr lang="en-US" i="1" dirty="0" smtClean="0">
-              <a:solidFill>
-                <a:schemeClr val="tx1"/>
               </a:solidFill>
             </a:endParaRPr>
           </a:p>
@@ -14473,10 +14301,428 @@
           </a:p>
         </p:txBody>
       </p:sp>
+      <p:sp>
+        <p:nvSpPr>
+          <p:cNvPr id="21" name="Content Placeholder 1"/>
+          <p:cNvSpPr txBox="1">
+            <a:spLocks/>
+          </p:cNvSpPr>
+          <p:nvPr/>
+        </p:nvSpPr>
+        <p:spPr>
+          <a:xfrm>
+            <a:off x="6282813" y="3991865"/>
+            <a:ext cx="5296570" cy="2056451"/>
+          </a:xfrm>
+          <a:prstGeom prst="rect">
+            <a:avLst/>
+          </a:prstGeom>
+          <a:solidFill>
+            <a:schemeClr val="bg1"/>
+          </a:solidFill>
+          <a:ln w="38100">
+            <a:solidFill>
+              <a:schemeClr val="accent1"/>
+            </a:solidFill>
+          </a:ln>
+        </p:spPr>
+        <p:txBody>
+          <a:bodyPr vert="horz" lIns="155448" tIns="137160" rIns="1645920" bIns="274320" rtlCol="0" anchor="t">
+            <a:noAutofit/>
+          </a:bodyPr>
+          <a:lstStyle>
+            <a:lvl1pPr marL="182880" indent="-182880" algn="l" defTabSz="914400" rtl="0" eaLnBrk="1" latinLnBrk="0" hangingPunct="1">
+              <a:lnSpc>
+                <a:spcPct val="90000"/>
+              </a:lnSpc>
+              <a:spcBef>
+                <a:spcPts val="1200"/>
+              </a:spcBef>
+              <a:buClr>
+                <a:schemeClr val="tx1"/>
+              </a:buClr>
+              <a:buFont typeface="Arial" panose="020B0604020202020204" pitchFamily="34" charset="0"/>
+              <a:buChar char="–"/>
+              <a:defRPr sz="1800" kern="1200">
+                <a:solidFill>
+                  <a:schemeClr val="tx1"/>
+                </a:solidFill>
+                <a:latin typeface="+mn-lt"/>
+                <a:ea typeface="+mn-ea"/>
+                <a:cs typeface="+mn-cs"/>
+              </a:defRPr>
+            </a:lvl1pPr>
+            <a:lvl2pPr marL="411480" indent="-182880" algn="l" defTabSz="914400" rtl="0" eaLnBrk="1" latinLnBrk="0" hangingPunct="1">
+              <a:lnSpc>
+                <a:spcPct val="90000"/>
+              </a:lnSpc>
+              <a:spcBef>
+                <a:spcPts val="800"/>
+              </a:spcBef>
+              <a:buClr>
+                <a:schemeClr val="tx1"/>
+              </a:buClr>
+              <a:buFont typeface="Arial" panose="020B0604020202020204" pitchFamily="34" charset="0"/>
+              <a:buChar char="–"/>
+              <a:defRPr sz="1600" kern="1200">
+                <a:solidFill>
+                  <a:schemeClr val="tx1"/>
+                </a:solidFill>
+                <a:latin typeface="+mn-lt"/>
+                <a:ea typeface="+mn-ea"/>
+                <a:cs typeface="+mn-cs"/>
+              </a:defRPr>
+            </a:lvl2pPr>
+            <a:lvl3pPr marL="548640" indent="-137160" algn="l" defTabSz="914400" rtl="0" eaLnBrk="1" latinLnBrk="0" hangingPunct="1">
+              <a:lnSpc>
+                <a:spcPct val="90000"/>
+              </a:lnSpc>
+              <a:spcBef>
+                <a:spcPts val="600"/>
+              </a:spcBef>
+              <a:buClr>
+                <a:schemeClr val="tx1"/>
+              </a:buClr>
+              <a:buFont typeface="Arial" panose="020B0604020202020204" pitchFamily="34" charset="0"/>
+              <a:buChar char="–"/>
+              <a:defRPr sz="1400" kern="1200">
+                <a:solidFill>
+                  <a:schemeClr val="tx1"/>
+                </a:solidFill>
+                <a:latin typeface="+mn-lt"/>
+                <a:ea typeface="+mn-ea"/>
+                <a:cs typeface="+mn-cs"/>
+              </a:defRPr>
+            </a:lvl3pPr>
+            <a:lvl4pPr marL="731520" indent="-137160" algn="l" defTabSz="914400" rtl="0" eaLnBrk="1" latinLnBrk="0" hangingPunct="1">
+              <a:lnSpc>
+                <a:spcPct val="90000"/>
+              </a:lnSpc>
+              <a:spcBef>
+                <a:spcPts val="600"/>
+              </a:spcBef>
+              <a:buClr>
+                <a:schemeClr val="tx1"/>
+              </a:buClr>
+              <a:buFont typeface="Arial" panose="020B0604020202020204" pitchFamily="34" charset="0"/>
+              <a:buChar char="–"/>
+              <a:defRPr sz="1200" kern="1200">
+                <a:solidFill>
+                  <a:schemeClr val="tx1"/>
+                </a:solidFill>
+                <a:latin typeface="+mn-lt"/>
+                <a:ea typeface="+mn-ea"/>
+                <a:cs typeface="+mn-cs"/>
+              </a:defRPr>
+            </a:lvl4pPr>
+            <a:lvl5pPr marL="868680" indent="-137160" algn="l" defTabSz="914400" rtl="0" eaLnBrk="1" latinLnBrk="0" hangingPunct="1">
+              <a:lnSpc>
+                <a:spcPct val="90000"/>
+              </a:lnSpc>
+              <a:spcBef>
+                <a:spcPts val="600"/>
+              </a:spcBef>
+              <a:buClr>
+                <a:schemeClr val="tx1"/>
+              </a:buClr>
+              <a:buFont typeface="Arial" panose="020B0604020202020204" pitchFamily="34" charset="0"/>
+              <a:buChar char="–"/>
+              <a:defRPr sz="1200" kern="1200">
+                <a:solidFill>
+                  <a:schemeClr val="tx1"/>
+                </a:solidFill>
+                <a:latin typeface="+mn-lt"/>
+                <a:ea typeface="+mn-ea"/>
+                <a:cs typeface="+mn-cs"/>
+              </a:defRPr>
+            </a:lvl5pPr>
+            <a:lvl6pPr marL="1051560" indent="-137160" algn="l" defTabSz="914400" rtl="0" eaLnBrk="1" latinLnBrk="0" hangingPunct="1">
+              <a:lnSpc>
+                <a:spcPct val="90000"/>
+              </a:lnSpc>
+              <a:spcBef>
+                <a:spcPts val="600"/>
+              </a:spcBef>
+              <a:buClr>
+                <a:schemeClr val="tx1"/>
+              </a:buClr>
+              <a:buFont typeface="Arial" panose="020B0604020202020204" pitchFamily="34" charset="0"/>
+              <a:buChar char="–"/>
+              <a:defRPr sz="1200" kern="1200">
+                <a:solidFill>
+                  <a:schemeClr val="tx1"/>
+                </a:solidFill>
+                <a:latin typeface="+mn-lt"/>
+                <a:ea typeface="+mn-ea"/>
+                <a:cs typeface="+mn-cs"/>
+              </a:defRPr>
+            </a:lvl6pPr>
+            <a:lvl7pPr marL="1188720" indent="-137160" algn="l" defTabSz="914400" rtl="0" eaLnBrk="1" latinLnBrk="0" hangingPunct="1">
+              <a:lnSpc>
+                <a:spcPct val="90000"/>
+              </a:lnSpc>
+              <a:spcBef>
+                <a:spcPts val="600"/>
+              </a:spcBef>
+              <a:buClr>
+                <a:schemeClr val="tx1"/>
+              </a:buClr>
+              <a:buFont typeface="Arial" panose="020B0604020202020204" pitchFamily="34" charset="0"/>
+              <a:buChar char="–"/>
+              <a:defRPr sz="1200" kern="1200">
+                <a:solidFill>
+                  <a:schemeClr val="tx1"/>
+                </a:solidFill>
+                <a:latin typeface="+mn-lt"/>
+                <a:ea typeface="+mn-ea"/>
+                <a:cs typeface="+mn-cs"/>
+              </a:defRPr>
+            </a:lvl7pPr>
+            <a:lvl8pPr marL="1371600" indent="-137160" algn="l" defTabSz="914400" rtl="0" eaLnBrk="1" latinLnBrk="0" hangingPunct="1">
+              <a:lnSpc>
+                <a:spcPct val="90000"/>
+              </a:lnSpc>
+              <a:spcBef>
+                <a:spcPts val="600"/>
+              </a:spcBef>
+              <a:buClr>
+                <a:schemeClr val="tx1"/>
+              </a:buClr>
+              <a:buFont typeface="Arial" panose="020B0604020202020204" pitchFamily="34" charset="0"/>
+              <a:buChar char="–"/>
+              <a:defRPr sz="1200" kern="1200">
+                <a:solidFill>
+                  <a:schemeClr val="tx1"/>
+                </a:solidFill>
+                <a:latin typeface="+mn-lt"/>
+                <a:ea typeface="+mn-ea"/>
+                <a:cs typeface="+mn-cs"/>
+              </a:defRPr>
+            </a:lvl8pPr>
+            <a:lvl9pPr marL="1554480" indent="-137160" algn="l" defTabSz="914400" rtl="0" eaLnBrk="1" latinLnBrk="0" hangingPunct="1">
+              <a:lnSpc>
+                <a:spcPct val="90000"/>
+              </a:lnSpc>
+              <a:spcBef>
+                <a:spcPts val="600"/>
+              </a:spcBef>
+              <a:buClr>
+                <a:schemeClr val="tx1"/>
+              </a:buClr>
+              <a:buFont typeface="Arial" panose="020B0604020202020204" pitchFamily="34" charset="0"/>
+              <a:buChar char="–"/>
+              <a:defRPr sz="1200" kern="1200">
+                <a:solidFill>
+                  <a:schemeClr val="tx1"/>
+                </a:solidFill>
+                <a:latin typeface="+mn-lt"/>
+                <a:ea typeface="+mn-ea"/>
+                <a:cs typeface="+mn-cs"/>
+              </a:defRPr>
+            </a:lvl9pPr>
+          </a:lstStyle>
+          <a:p>
+            <a:pPr marL="0" indent="0">
+              <a:lnSpc>
+                <a:spcPct val="100000"/>
+              </a:lnSpc>
+              <a:spcBef>
+                <a:spcPts val="1000"/>
+              </a:spcBef>
+              <a:buFont typeface="Arial" panose="020B0604020202020204" pitchFamily="34" charset="0"/>
+              <a:buNone/>
+            </a:pPr>
+            <a:r>
+              <a:rPr lang="en-US" sz="1600" b="1" dirty="0" smtClean="0"/>
+              <a:t>Partner Level </a:t>
+            </a:r>
+            <a:r>
+              <a:rPr lang="en-US" sz="1600" b="1" smtClean="0"/>
+              <a:t>of Activity</a:t>
+            </a:r>
+            <a:endParaRPr lang="en-US" sz="1600" b="1" dirty="0"/>
+          </a:p>
+        </p:txBody>
+      </p:sp>
+      <p:sp>
+        <p:nvSpPr>
+          <p:cNvPr id="4" name="TextBox 3"/>
+          <p:cNvSpPr txBox="1"/>
+          <p:nvPr/>
+        </p:nvSpPr>
+        <p:spPr>
+          <a:xfrm>
+            <a:off x="1066800" y="4159624"/>
+            <a:ext cx="349624" cy="268941"/>
+          </a:xfrm>
+          <a:prstGeom prst="rect">
+            <a:avLst/>
+          </a:prstGeom>
+          <a:noFill/>
+        </p:spPr>
+        <p:txBody>
+          <a:bodyPr wrap="none" lIns="0" tIns="0" rIns="0" bIns="0" rtlCol="0">
+            <a:noAutofit/>
+          </a:bodyPr>
+          <a:lstStyle/>
+          <a:p>
+            <a:pPr algn="ctr">
+              <a:lnSpc>
+                <a:spcPct val="90000"/>
+              </a:lnSpc>
+            </a:pPr>
+            <a:r>
+              <a:rPr lang="en-US" dirty="0"/>
+              <a:t>H</a:t>
+            </a:r>
+            <a:endParaRPr lang="en-GB" dirty="0"/>
+          </a:p>
+        </p:txBody>
+      </p:sp>
+      <p:sp>
+        <p:nvSpPr>
+          <p:cNvPr id="22" name="TextBox 21"/>
+          <p:cNvSpPr txBox="1"/>
+          <p:nvPr/>
+        </p:nvSpPr>
+        <p:spPr>
+          <a:xfrm>
+            <a:off x="2109452" y="4159624"/>
+            <a:ext cx="349624" cy="268941"/>
+          </a:xfrm>
+          <a:prstGeom prst="rect">
+            <a:avLst/>
+          </a:prstGeom>
+          <a:noFill/>
+        </p:spPr>
+        <p:txBody>
+          <a:bodyPr wrap="none" lIns="0" tIns="0" rIns="0" bIns="0" rtlCol="0">
+            <a:noAutofit/>
+          </a:bodyPr>
+          <a:lstStyle/>
+          <a:p>
+            <a:pPr algn="ctr">
+              <a:lnSpc>
+                <a:spcPct val="90000"/>
+              </a:lnSpc>
+            </a:pPr>
+            <a:r>
+              <a:rPr lang="en-US" dirty="0" smtClean="0"/>
+              <a:t>NY</a:t>
+            </a:r>
+            <a:endParaRPr lang="en-GB" dirty="0"/>
+          </a:p>
+        </p:txBody>
+      </p:sp>
+      <p:sp>
+        <p:nvSpPr>
+          <p:cNvPr id="23" name="TextBox 22"/>
+          <p:cNvSpPr txBox="1"/>
+          <p:nvPr/>
+        </p:nvSpPr>
+        <p:spPr>
+          <a:xfrm>
+            <a:off x="3152104" y="4159624"/>
+            <a:ext cx="349624" cy="268941"/>
+          </a:xfrm>
+          <a:prstGeom prst="rect">
+            <a:avLst/>
+          </a:prstGeom>
+          <a:noFill/>
+        </p:spPr>
+        <p:txBody>
+          <a:bodyPr wrap="none" lIns="0" tIns="0" rIns="0" bIns="0" rtlCol="0">
+            <a:noAutofit/>
+          </a:bodyPr>
+          <a:lstStyle/>
+          <a:p>
+            <a:pPr algn="ctr">
+              <a:lnSpc>
+                <a:spcPct val="90000"/>
+              </a:lnSpc>
+            </a:pPr>
+            <a:r>
+              <a:rPr lang="en-US" dirty="0" smtClean="0"/>
+              <a:t>SNG</a:t>
+            </a:r>
+            <a:endParaRPr lang="en-GB" dirty="0"/>
+          </a:p>
+        </p:txBody>
+      </p:sp>
+      <p:sp>
+        <p:nvSpPr>
+          <p:cNvPr id="24" name="TextBox 23"/>
+          <p:cNvSpPr txBox="1"/>
+          <p:nvPr/>
+        </p:nvSpPr>
+        <p:spPr>
+          <a:xfrm>
+            <a:off x="4194756" y="4150659"/>
+            <a:ext cx="349624" cy="268941"/>
+          </a:xfrm>
+          <a:prstGeom prst="rect">
+            <a:avLst/>
+          </a:prstGeom>
+          <a:noFill/>
+        </p:spPr>
+        <p:txBody>
+          <a:bodyPr wrap="none" lIns="0" tIns="0" rIns="0" bIns="0" rtlCol="0">
+            <a:noAutofit/>
+          </a:bodyPr>
+          <a:lstStyle/>
+          <a:p>
+            <a:pPr algn="ctr">
+              <a:lnSpc>
+                <a:spcPct val="90000"/>
+              </a:lnSpc>
+            </a:pPr>
+            <a:r>
+              <a:rPr lang="en-US" dirty="0" smtClean="0"/>
+              <a:t>LON</a:t>
+            </a:r>
+            <a:endParaRPr lang="en-GB" dirty="0"/>
+          </a:p>
+        </p:txBody>
+      </p:sp>
+      <p:sp>
+        <p:nvSpPr>
+          <p:cNvPr id="25" name="TextBox 24"/>
+          <p:cNvSpPr txBox="1"/>
+          <p:nvPr/>
+        </p:nvSpPr>
+        <p:spPr>
+          <a:xfrm>
+            <a:off x="5237408" y="4159624"/>
+            <a:ext cx="349624" cy="268941"/>
+          </a:xfrm>
+          <a:prstGeom prst="rect">
+            <a:avLst/>
+          </a:prstGeom>
+          <a:noFill/>
+        </p:spPr>
+        <p:txBody>
+          <a:bodyPr wrap="none" lIns="0" tIns="0" rIns="0" bIns="0" rtlCol="0">
+            <a:noAutofit/>
+          </a:bodyPr>
+          <a:lstStyle/>
+          <a:p>
+            <a:pPr algn="ctr">
+              <a:lnSpc>
+                <a:spcPct val="90000"/>
+              </a:lnSpc>
+            </a:pPr>
+            <a:r>
+              <a:rPr lang="en-US" dirty="0" smtClean="0"/>
+              <a:t>PA</a:t>
+            </a:r>
+            <a:endParaRPr lang="en-GB" dirty="0"/>
+          </a:p>
+        </p:txBody>
+      </p:sp>
     </p:spTree>
     <p:extLst>
       <p:ext uri="{BB962C8B-B14F-4D97-AF65-F5344CB8AC3E}">
-        <p14:creationId xmlns:p14="http://schemas.microsoft.com/office/powerpoint/2010/main" val="4142931845"/>
+        <p14:creationId xmlns:p14="http://schemas.microsoft.com/office/powerpoint/2010/main" val="2062481091"/>
       </p:ext>
     </p:extLst>
   </p:cSld>
@@ -14550,63 +14796,63 @@
                 <a:gridCol w="255798">
                   <a:extLst>
                     <a:ext uri="{9D8B030D-6E8A-4147-A177-3AD203B41FA5}">
-                      <a16:colId xmlns="" xmlns:a16="http://schemas.microsoft.com/office/drawing/2014/main" val="20000"/>
+                      <a16:colId xmlns:a16="http://schemas.microsoft.com/office/drawing/2014/main" xmlns="" val="20000"/>
                     </a:ext>
                   </a:extLst>
                 </a:gridCol>
                 <a:gridCol w="1137177">
                   <a:extLst>
                     <a:ext uri="{9D8B030D-6E8A-4147-A177-3AD203B41FA5}">
-                      <a16:colId xmlns="" xmlns:a16="http://schemas.microsoft.com/office/drawing/2014/main" val="20001"/>
+                      <a16:colId xmlns:a16="http://schemas.microsoft.com/office/drawing/2014/main" xmlns="" val="20001"/>
                     </a:ext>
                   </a:extLst>
                 </a:gridCol>
                 <a:gridCol w="1072557">
                   <a:extLst>
                     <a:ext uri="{9D8B030D-6E8A-4147-A177-3AD203B41FA5}">
-                      <a16:colId xmlns="" xmlns:a16="http://schemas.microsoft.com/office/drawing/2014/main" val="20002"/>
+                      <a16:colId xmlns:a16="http://schemas.microsoft.com/office/drawing/2014/main" xmlns="" val="20002"/>
                     </a:ext>
                   </a:extLst>
                 </a:gridCol>
                 <a:gridCol w="1072557">
                   <a:extLst>
                     <a:ext uri="{9D8B030D-6E8A-4147-A177-3AD203B41FA5}">
-                      <a16:colId xmlns="" xmlns:a16="http://schemas.microsoft.com/office/drawing/2014/main" val="20003"/>
+                      <a16:colId xmlns:a16="http://schemas.microsoft.com/office/drawing/2014/main" xmlns="" val="20003"/>
                     </a:ext>
                   </a:extLst>
                 </a:gridCol>
                 <a:gridCol w="1072557">
                   <a:extLst>
                     <a:ext uri="{9D8B030D-6E8A-4147-A177-3AD203B41FA5}">
-                      <a16:colId xmlns="" xmlns:a16="http://schemas.microsoft.com/office/drawing/2014/main" val="20004"/>
+                      <a16:colId xmlns:a16="http://schemas.microsoft.com/office/drawing/2014/main" xmlns="" val="20004"/>
                     </a:ext>
                   </a:extLst>
                 </a:gridCol>
                 <a:gridCol w="1072557">
                   <a:extLst>
                     <a:ext uri="{9D8B030D-6E8A-4147-A177-3AD203B41FA5}">
-                      <a16:colId xmlns="" xmlns:a16="http://schemas.microsoft.com/office/drawing/2014/main" val="20005"/>
+                      <a16:colId xmlns:a16="http://schemas.microsoft.com/office/drawing/2014/main" xmlns="" val="20005"/>
                     </a:ext>
                   </a:extLst>
                 </a:gridCol>
                 <a:gridCol w="1762247">
                   <a:extLst>
                     <a:ext uri="{9D8B030D-6E8A-4147-A177-3AD203B41FA5}">
-                      <a16:colId xmlns="" xmlns:a16="http://schemas.microsoft.com/office/drawing/2014/main" val="20006"/>
+                      <a16:colId xmlns:a16="http://schemas.microsoft.com/office/drawing/2014/main" xmlns="" val="20006"/>
                     </a:ext>
                   </a:extLst>
                 </a:gridCol>
                 <a:gridCol w="1762247">
                   <a:extLst>
                     <a:ext uri="{9D8B030D-6E8A-4147-A177-3AD203B41FA5}">
-                      <a16:colId xmlns="" xmlns:a16="http://schemas.microsoft.com/office/drawing/2014/main" val="20007"/>
+                      <a16:colId xmlns:a16="http://schemas.microsoft.com/office/drawing/2014/main" xmlns="" val="20007"/>
                     </a:ext>
                   </a:extLst>
                 </a:gridCol>
                 <a:gridCol w="1762247">
                   <a:extLst>
                     <a:ext uri="{9D8B030D-6E8A-4147-A177-3AD203B41FA5}">
-                      <a16:colId xmlns="" xmlns:a16="http://schemas.microsoft.com/office/drawing/2014/main" val="20008"/>
+                      <a16:colId xmlns:a16="http://schemas.microsoft.com/office/drawing/2014/main" xmlns="" val="20008"/>
                     </a:ext>
                   </a:extLst>
                 </a:gridCol>
@@ -15162,7 +15408,7 @@
                 </a:tc>
                 <a:extLst>
                   <a:ext uri="{0D108BD9-81ED-4DB2-BD59-A6C34878D82A}">
-                    <a16:rowId xmlns="" xmlns:a16="http://schemas.microsoft.com/office/drawing/2014/main" val="10000"/>
+                    <a16:rowId xmlns:a16="http://schemas.microsoft.com/office/drawing/2014/main" xmlns="" val="10000"/>
                   </a:ext>
                 </a:extLst>
               </a:tr>
@@ -15865,7 +16111,7 @@
                 </a:tc>
                 <a:extLst>
                   <a:ext uri="{0D108BD9-81ED-4DB2-BD59-A6C34878D82A}">
-                    <a16:rowId xmlns="" xmlns:a16="http://schemas.microsoft.com/office/drawing/2014/main" val="10001"/>
+                    <a16:rowId xmlns:a16="http://schemas.microsoft.com/office/drawing/2014/main" xmlns="" val="10001"/>
                   </a:ext>
                 </a:extLst>
               </a:tr>
@@ -16579,7 +16825,7 @@
                 </a:tc>
                 <a:extLst>
                   <a:ext uri="{0D108BD9-81ED-4DB2-BD59-A6C34878D82A}">
-                    <a16:rowId xmlns="" xmlns:a16="http://schemas.microsoft.com/office/drawing/2014/main" val="10002"/>
+                    <a16:rowId xmlns:a16="http://schemas.microsoft.com/office/drawing/2014/main" xmlns="" val="10002"/>
                   </a:ext>
                 </a:extLst>
               </a:tr>
@@ -17225,7 +17471,7 @@
                 </a:tc>
                 <a:extLst>
                   <a:ext uri="{0D108BD9-81ED-4DB2-BD59-A6C34878D82A}">
-                    <a16:rowId xmlns="" xmlns:a16="http://schemas.microsoft.com/office/drawing/2014/main" val="10003"/>
+                    <a16:rowId xmlns:a16="http://schemas.microsoft.com/office/drawing/2014/main" xmlns="" val="10003"/>
                   </a:ext>
                 </a:extLst>
               </a:tr>
@@ -17872,7 +18118,7 @@
                 </a:tc>
                 <a:extLst>
                   <a:ext uri="{0D108BD9-81ED-4DB2-BD59-A6C34878D82A}">
-                    <a16:rowId xmlns="" xmlns:a16="http://schemas.microsoft.com/office/drawing/2014/main" val="10004"/>
+                    <a16:rowId xmlns:a16="http://schemas.microsoft.com/office/drawing/2014/main" xmlns="" val="10004"/>
                   </a:ext>
                 </a:extLst>
               </a:tr>
@@ -18493,7 +18739,7 @@
                 </a:tc>
                 <a:extLst>
                   <a:ext uri="{0D108BD9-81ED-4DB2-BD59-A6C34878D82A}">
-                    <a16:rowId xmlns="" xmlns:a16="http://schemas.microsoft.com/office/drawing/2014/main" val="10005"/>
+                    <a16:rowId xmlns:a16="http://schemas.microsoft.com/office/drawing/2014/main" xmlns="" val="10005"/>
                   </a:ext>
                 </a:extLst>
               </a:tr>
@@ -20405,42 +20651,42 @@
                 <a:gridCol w="255798">
                   <a:extLst>
                     <a:ext uri="{9D8B030D-6E8A-4147-A177-3AD203B41FA5}">
-                      <a16:colId xmlns="" xmlns:a16="http://schemas.microsoft.com/office/drawing/2014/main" val="20000"/>
+                      <a16:colId xmlns:a16="http://schemas.microsoft.com/office/drawing/2014/main" xmlns="" val="20000"/>
                     </a:ext>
                   </a:extLst>
                 </a:gridCol>
                 <a:gridCol w="1137177">
                   <a:extLst>
                     <a:ext uri="{9D8B030D-6E8A-4147-A177-3AD203B41FA5}">
-                      <a16:colId xmlns="" xmlns:a16="http://schemas.microsoft.com/office/drawing/2014/main" val="20001"/>
+                      <a16:colId xmlns:a16="http://schemas.microsoft.com/office/drawing/2014/main" xmlns="" val="20001"/>
                     </a:ext>
                   </a:extLst>
                 </a:gridCol>
                 <a:gridCol w="1072557">
                   <a:extLst>
                     <a:ext uri="{9D8B030D-6E8A-4147-A177-3AD203B41FA5}">
-                      <a16:colId xmlns="" xmlns:a16="http://schemas.microsoft.com/office/drawing/2014/main" val="20002"/>
+                      <a16:colId xmlns:a16="http://schemas.microsoft.com/office/drawing/2014/main" xmlns="" val="20002"/>
                     </a:ext>
                   </a:extLst>
                 </a:gridCol>
                 <a:gridCol w="1072557">
                   <a:extLst>
                     <a:ext uri="{9D8B030D-6E8A-4147-A177-3AD203B41FA5}">
-                      <a16:colId xmlns="" xmlns:a16="http://schemas.microsoft.com/office/drawing/2014/main" val="20003"/>
+                      <a16:colId xmlns:a16="http://schemas.microsoft.com/office/drawing/2014/main" xmlns="" val="20003"/>
                     </a:ext>
                   </a:extLst>
                 </a:gridCol>
                 <a:gridCol w="1072557">
                   <a:extLst>
                     <a:ext uri="{9D8B030D-6E8A-4147-A177-3AD203B41FA5}">
-                      <a16:colId xmlns="" xmlns:a16="http://schemas.microsoft.com/office/drawing/2014/main" val="20004"/>
+                      <a16:colId xmlns:a16="http://schemas.microsoft.com/office/drawing/2014/main" xmlns="" val="20004"/>
                     </a:ext>
                   </a:extLst>
                 </a:gridCol>
                 <a:gridCol w="1072557">
                   <a:extLst>
                     <a:ext uri="{9D8B030D-6E8A-4147-A177-3AD203B41FA5}">
-                      <a16:colId xmlns="" xmlns:a16="http://schemas.microsoft.com/office/drawing/2014/main" val="20005"/>
+                      <a16:colId xmlns:a16="http://schemas.microsoft.com/office/drawing/2014/main" xmlns="" val="20005"/>
                     </a:ext>
                   </a:extLst>
                 </a:gridCol>
@@ -20755,7 +21001,7 @@
                 </a:tc>
                 <a:extLst>
                   <a:ext uri="{0D108BD9-81ED-4DB2-BD59-A6C34878D82A}">
-                    <a16:rowId xmlns="" xmlns:a16="http://schemas.microsoft.com/office/drawing/2014/main" val="10000"/>
+                    <a16:rowId xmlns:a16="http://schemas.microsoft.com/office/drawing/2014/main" xmlns="" val="10000"/>
                   </a:ext>
                 </a:extLst>
               </a:tr>
@@ -21222,7 +21468,7 @@
                 </a:tc>
                 <a:extLst>
                   <a:ext uri="{0D108BD9-81ED-4DB2-BD59-A6C34878D82A}">
-                    <a16:rowId xmlns="" xmlns:a16="http://schemas.microsoft.com/office/drawing/2014/main" val="10001"/>
+                    <a16:rowId xmlns:a16="http://schemas.microsoft.com/office/drawing/2014/main" xmlns="" val="10001"/>
                   </a:ext>
                 </a:extLst>
               </a:tr>
@@ -21460,28 +21706,28 @@
                 <a:gridCol w="260733">
                   <a:extLst>
                     <a:ext uri="{9D8B030D-6E8A-4147-A177-3AD203B41FA5}">
-                      <a16:colId xmlns="" xmlns:a16="http://schemas.microsoft.com/office/drawing/2014/main" val="20000"/>
+                      <a16:colId xmlns:a16="http://schemas.microsoft.com/office/drawing/2014/main" xmlns="" val="20000"/>
                     </a:ext>
                   </a:extLst>
                 </a:gridCol>
                 <a:gridCol w="1796244">
                   <a:extLst>
                     <a:ext uri="{9D8B030D-6E8A-4147-A177-3AD203B41FA5}">
-                      <a16:colId xmlns="" xmlns:a16="http://schemas.microsoft.com/office/drawing/2014/main" val="20006"/>
+                      <a16:colId xmlns:a16="http://schemas.microsoft.com/office/drawing/2014/main" xmlns="" val="20006"/>
                     </a:ext>
                   </a:extLst>
                 </a:gridCol>
                 <a:gridCol w="1796244">
                   <a:extLst>
                     <a:ext uri="{9D8B030D-6E8A-4147-A177-3AD203B41FA5}">
-                      <a16:colId xmlns="" xmlns:a16="http://schemas.microsoft.com/office/drawing/2014/main" val="20007"/>
+                      <a16:colId xmlns:a16="http://schemas.microsoft.com/office/drawing/2014/main" xmlns="" val="20007"/>
                     </a:ext>
                   </a:extLst>
                 </a:gridCol>
                 <a:gridCol w="1796244">
                   <a:extLst>
                     <a:ext uri="{9D8B030D-6E8A-4147-A177-3AD203B41FA5}">
-                      <a16:colId xmlns="" xmlns:a16="http://schemas.microsoft.com/office/drawing/2014/main" val="20008"/>
+                      <a16:colId xmlns:a16="http://schemas.microsoft.com/office/drawing/2014/main" xmlns="" val="20008"/>
                     </a:ext>
                   </a:extLst>
                 </a:gridCol>
@@ -21777,7 +22023,7 @@
                 </a:tc>
                 <a:extLst>
                   <a:ext uri="{0D108BD9-81ED-4DB2-BD59-A6C34878D82A}">
-                    <a16:rowId xmlns="" xmlns:a16="http://schemas.microsoft.com/office/drawing/2014/main" val="10000"/>
+                    <a16:rowId xmlns:a16="http://schemas.microsoft.com/office/drawing/2014/main" xmlns="" val="10000"/>
                   </a:ext>
                 </a:extLst>
               </a:tr>
@@ -22125,7 +22371,7 @@
                 </a:tc>
                 <a:extLst>
                   <a:ext uri="{0D108BD9-81ED-4DB2-BD59-A6C34878D82A}">
-                    <a16:rowId xmlns="" xmlns:a16="http://schemas.microsoft.com/office/drawing/2014/main" val="10001"/>
+                    <a16:rowId xmlns:a16="http://schemas.microsoft.com/office/drawing/2014/main" xmlns="" val="10001"/>
                   </a:ext>
                 </a:extLst>
               </a:tr>

</xml_diff>

<commit_message>
Changed Partner slide (slide 10) to remove new pie charts, move the wordcloud up and recolour the wordcloud using randomly selected colours from the HPE colour list, and to reduce the list of Partner Top Interests down to three.
</commit_message>
<xml_diff>
--- a/GCA_Customer_Insights_Month-Year.pptx
+++ b/GCA_Customer_Insights_Month-Year.pptx
@@ -20,7 +20,7 @@
     <p:sldId id="292" r:id="rId8"/>
     <p:sldId id="293" r:id="rId9"/>
     <p:sldId id="286" r:id="rId10"/>
-    <p:sldId id="296" r:id="rId11"/>
+    <p:sldId id="297" r:id="rId11"/>
     <p:sldId id="288" r:id="rId12"/>
     <p:sldId id="264" r:id="rId13"/>
     <p:sldId id="289" r:id="rId14"/>
@@ -273,7 +273,7 @@
           <a:p>
             <a:fld id="{3CA61830-C416-483F-955E-54203C65B711}" type="datetimeFigureOut">
               <a:rPr lang="en-US"/>
-              <a:t>9/19/2018</a:t>
+              <a:t>9/21/2018</a:t>
             </a:fld>
             <a:endParaRPr dirty="0"/>
           </a:p>
@@ -845,7 +845,7 @@
     </p:spTree>
     <p:extLst>
       <p:ext uri="{BB962C8B-B14F-4D97-AF65-F5344CB8AC3E}">
-        <p14:creationId xmlns:p14="http://schemas.microsoft.com/office/powerpoint/2010/main" val="983811081"/>
+        <p14:creationId xmlns:p14="http://schemas.microsoft.com/office/powerpoint/2010/main" val="3673147742"/>
       </p:ext>
     </p:extLst>
   </p:cSld>
@@ -9433,7 +9433,7 @@
           <a:p>
             <a:fld id="{C07C5E14-300D-4720-B5FE-54C7D96D4160}" type="datetime4">
               <a:rPr lang="en-US" smtClean="0"/>
-              <a:t>September 19, 2018</a:t>
+              <a:t>September 21, 2018</a:t>
             </a:fld>
             <a:endParaRPr/>
           </a:p>
@@ -9769,7 +9769,7 @@
           <a:p>
             <a:fld id="{26B45FFC-9EEF-4E69-85F5-C8F54747804D}" type="datetime4">
               <a:rPr lang="en-US" smtClean="0"/>
-              <a:t>September 19, 2018</a:t>
+              <a:t>September 21, 2018</a:t>
             </a:fld>
             <a:endParaRPr/>
           </a:p>
@@ -10003,7 +10003,7 @@
           <a:p>
             <a:fld id="{684E3265-88A3-4C30-AE11-BFDF645909E9}" type="datetime4">
               <a:rPr lang="en-US" smtClean="0"/>
-              <a:t>September 19, 2018</a:t>
+              <a:t>September 21, 2018</a:t>
             </a:fld>
             <a:endParaRPr/>
           </a:p>
@@ -10114,7 +10114,7 @@
           <a:p>
             <a:fld id="{E9F763D2-AF56-4C60-80C7-7D8FC051005C}" type="datetime4">
               <a:rPr lang="en-US" smtClean="0"/>
-              <a:t>September 19, 2018</a:t>
+              <a:t>September 21, 2018</a:t>
             </a:fld>
             <a:endParaRPr/>
           </a:p>
@@ -10392,7 +10392,7 @@
           <a:p>
             <a:fld id="{65FD8143-BFA3-46F8-9B90-B0E5CFAF7F7C}" type="datetime4">
               <a:rPr lang="en-US" smtClean="0"/>
-              <a:t>September 19, 2018</a:t>
+              <a:t>September 21, 2018</a:t>
             </a:fld>
             <a:endParaRPr/>
           </a:p>
@@ -13240,7 +13240,84 @@
       </p:grpSpPr>
       <p:sp>
         <p:nvSpPr>
-          <p:cNvPr id="7" name="Content Placeholder 1"/>
+          <p:cNvPr id="2" name="Title 1"/>
+          <p:cNvSpPr>
+            <a:spLocks noGrp="1"/>
+          </p:cNvSpPr>
+          <p:nvPr>
+            <p:ph type="title"/>
+          </p:nvPr>
+        </p:nvSpPr>
+        <p:spPr/>
+        <p:txBody>
+          <a:bodyPr/>
+          <a:lstStyle/>
+          <a:p>
+            <a:r>
+              <a:rPr sz="2800" dirty="0">
+                <a:latin typeface="Arial"/>
+              </a:rPr>
+              <a:t>Partner </a:t>
+            </a:r>
+            <a:r>
+              <a:rPr sz="2800" dirty="0" smtClean="0">
+                <a:latin typeface="Arial"/>
+              </a:rPr>
+              <a:t>Insights</a:t>
+            </a:r>
+            <a:endParaRPr lang="en-US" dirty="0"/>
+          </a:p>
+        </p:txBody>
+      </p:sp>
+      <p:sp>
+        <p:nvSpPr>
+          <p:cNvPr id="43" name="Text Placeholder 42"/>
+          <p:cNvSpPr>
+            <a:spLocks noGrp="1"/>
+          </p:cNvSpPr>
+          <p:nvPr>
+            <p:ph type="body" sz="quarter" idx="13"/>
+          </p:nvPr>
+        </p:nvSpPr>
+        <p:spPr/>
+        <p:txBody>
+          <a:bodyPr/>
+          <a:lstStyle/>
+          <a:p>
+            <a:r>
+              <a:rPr lang="en-US" dirty="0" smtClean="0"/>
+              <a:t>Themes and Feedback from Partner Visits</a:t>
+            </a:r>
+            <a:endParaRPr lang="en-US" dirty="0"/>
+          </a:p>
+        </p:txBody>
+      </p:sp>
+      <p:sp>
+        <p:nvSpPr>
+          <p:cNvPr id="3" name="Slide Number Placeholder 2"/>
+          <p:cNvSpPr>
+            <a:spLocks noGrp="1"/>
+          </p:cNvSpPr>
+          <p:nvPr>
+            <p:ph type="sldNum" sz="quarter" idx="12"/>
+          </p:nvPr>
+        </p:nvSpPr>
+        <p:spPr/>
+        <p:txBody>
+          <a:bodyPr/>
+          <a:lstStyle/>
+          <a:p>
+            <a:fld id="{B016F8AB-BCEA-4347-8BA6-BE776009BC89}" type="slidenum">
+              <a:rPr lang="en-US" smtClean="0"/>
+              <a:t>10</a:t>
+            </a:fld>
+            <a:endParaRPr lang="en-US"/>
+          </a:p>
+        </p:txBody>
+      </p:sp>
+      <p:sp>
+        <p:nvSpPr>
+          <p:cNvPr id="21" name="Content Placeholder 1"/>
           <p:cNvSpPr txBox="1">
             <a:spLocks/>
           </p:cNvSpPr>
@@ -13248,8 +13325,8 @@
         </p:nvSpPr>
         <p:spPr>
           <a:xfrm>
-            <a:off x="612608" y="1520915"/>
-            <a:ext cx="5483392" cy="1881045"/>
+            <a:off x="5013589" y="1739722"/>
+            <a:ext cx="6592570" cy="1627632"/>
           </a:xfrm>
           <a:prstGeom prst="rect">
             <a:avLst/>
@@ -13259,7 +13336,7 @@
           </a:solidFill>
           <a:ln w="38100">
             <a:solidFill>
-              <a:schemeClr val="accent1"/>
+              <a:schemeClr val="tx2"/>
             </a:solidFill>
           </a:ln>
         </p:spPr>
@@ -13469,841 +13546,13 @@
               <a:buFont typeface="Arial" panose="020B0604020202020204" pitchFamily="34" charset="0"/>
               <a:buNone/>
             </a:pPr>
-            <a:r>
-              <a:rPr lang="en-US" sz="1600" b="1" dirty="0"/>
-              <a:t>Top Partner Interests</a:t>
-            </a:r>
+            <a:endParaRPr lang="en-US" sz="1600" b="1" dirty="0"/>
           </a:p>
         </p:txBody>
       </p:sp>
       <p:sp>
         <p:nvSpPr>
-          <p:cNvPr id="2" name="Title 1"/>
-          <p:cNvSpPr>
-            <a:spLocks noGrp="1"/>
-          </p:cNvSpPr>
-          <p:nvPr>
-            <p:ph type="title"/>
-          </p:nvPr>
-        </p:nvSpPr>
-        <p:spPr/>
-        <p:txBody>
-          <a:bodyPr/>
-          <a:lstStyle/>
-          <a:p>
-            <a:r>
-              <a:rPr sz="2800" dirty="0">
-                <a:latin typeface="Arial"/>
-              </a:rPr>
-              <a:t>Partner Insights </a:t>
-            </a:r>
-            <a:endParaRPr lang="en-US" dirty="0"/>
-          </a:p>
-        </p:txBody>
-      </p:sp>
-      <p:sp>
-        <p:nvSpPr>
-          <p:cNvPr id="43" name="Text Placeholder 42"/>
-          <p:cNvSpPr>
-            <a:spLocks noGrp="1"/>
-          </p:cNvSpPr>
-          <p:nvPr>
-            <p:ph type="body" sz="quarter" idx="13"/>
-          </p:nvPr>
-        </p:nvSpPr>
-        <p:spPr/>
-        <p:txBody>
-          <a:bodyPr/>
-          <a:lstStyle/>
-          <a:p>
-            <a:r>
-              <a:rPr lang="en-US" dirty="0"/>
-              <a:t>Insights from Channel/Reseller and System Integrator engagements</a:t>
-            </a:r>
-          </a:p>
-        </p:txBody>
-      </p:sp>
-      <p:sp>
-        <p:nvSpPr>
-          <p:cNvPr id="3" name="Slide Number Placeholder 2"/>
-          <p:cNvSpPr>
-            <a:spLocks noGrp="1"/>
-          </p:cNvSpPr>
-          <p:nvPr>
-            <p:ph type="sldNum" sz="quarter" idx="12"/>
-          </p:nvPr>
-        </p:nvSpPr>
-        <p:spPr/>
-        <p:txBody>
-          <a:bodyPr/>
-          <a:lstStyle/>
-          <a:p>
-            <a:fld id="{B016F8AB-BCEA-4347-8BA6-BE776009BC89}" type="slidenum">
-              <a:rPr lang="en-US" smtClean="0"/>
-              <a:t>10</a:t>
-            </a:fld>
-            <a:endParaRPr lang="en-US"/>
-          </a:p>
-        </p:txBody>
-      </p:sp>
-      <p:sp>
-        <p:nvSpPr>
-          <p:cNvPr id="9" name="Rectangle 8"/>
-          <p:cNvSpPr/>
-          <p:nvPr/>
-        </p:nvSpPr>
-        <p:spPr bwMode="ltGray">
-          <a:xfrm>
-            <a:off x="612608" y="3601529"/>
-            <a:ext cx="5483392" cy="2446788"/>
-          </a:xfrm>
-          <a:prstGeom prst="rect">
-            <a:avLst/>
-          </a:prstGeom>
-          <a:noFill/>
-          <a:ln w="38100">
-            <a:solidFill>
-              <a:schemeClr val="accent3"/>
-            </a:solidFill>
-          </a:ln>
-        </p:spPr>
-        <p:style>
-          <a:lnRef idx="2">
-            <a:schemeClr val="accent1">
-              <a:shade val="50000"/>
-            </a:schemeClr>
-          </a:lnRef>
-          <a:fillRef idx="1">
-            <a:schemeClr val="accent1"/>
-          </a:fillRef>
-          <a:effectRef idx="0">
-            <a:schemeClr val="accent1"/>
-          </a:effectRef>
-          <a:fontRef idx="minor">
-            <a:schemeClr val="lt1"/>
-          </a:fontRef>
-        </p:style>
-        <p:txBody>
-          <a:bodyPr lIns="155448" tIns="137160" rtlCol="0" anchor="t">
-            <a:noAutofit/>
-          </a:bodyPr>
-          <a:lstStyle/>
-          <a:p>
-            <a:pPr>
-              <a:lnSpc>
-                <a:spcPct val="90000"/>
-              </a:lnSpc>
-            </a:pPr>
-            <a:r>
-              <a:rPr lang="en-US" sz="1600" b="1" dirty="0" smtClean="0">
-                <a:solidFill>
-                  <a:schemeClr val="tx1"/>
-                </a:solidFill>
-              </a:rPr>
-              <a:t>Partner Utilization of Engagement </a:t>
-            </a:r>
-            <a:r>
-              <a:rPr lang="en-US" sz="1600" b="1" dirty="0" err="1" smtClean="0">
-                <a:solidFill>
-                  <a:schemeClr val="tx1"/>
-                </a:solidFill>
-              </a:rPr>
-              <a:t>Centres</a:t>
-            </a:r>
-            <a:endParaRPr lang="en-US" sz="1600" b="1" dirty="0">
-              <a:solidFill>
-                <a:schemeClr val="tx1"/>
-              </a:solidFill>
-            </a:endParaRPr>
-          </a:p>
-          <a:p>
-            <a:pPr>
-              <a:lnSpc>
-                <a:spcPct val="90000"/>
-              </a:lnSpc>
-            </a:pPr>
-            <a:endParaRPr lang="en-US" dirty="0">
-              <a:solidFill>
-                <a:schemeClr val="tx1"/>
-              </a:solidFill>
-            </a:endParaRPr>
-          </a:p>
-        </p:txBody>
-      </p:sp>
-      <p:sp>
-        <p:nvSpPr>
-          <p:cNvPr id="31" name="Rectangle 30"/>
-          <p:cNvSpPr/>
-          <p:nvPr/>
-        </p:nvSpPr>
-        <p:spPr bwMode="ltGray">
-          <a:xfrm>
-            <a:off x="6282813" y="1520917"/>
-            <a:ext cx="5296571" cy="2265271"/>
-          </a:xfrm>
-          <a:prstGeom prst="rect">
-            <a:avLst/>
-          </a:prstGeom>
-          <a:noFill/>
-          <a:ln w="38100">
-            <a:solidFill>
-              <a:schemeClr val="accent2"/>
-            </a:solidFill>
-          </a:ln>
-        </p:spPr>
-        <p:style>
-          <a:lnRef idx="2">
-            <a:schemeClr val="accent1">
-              <a:shade val="50000"/>
-            </a:schemeClr>
-          </a:lnRef>
-          <a:fillRef idx="1">
-            <a:schemeClr val="accent1"/>
-          </a:fillRef>
-          <a:effectRef idx="0">
-            <a:schemeClr val="accent1"/>
-          </a:effectRef>
-          <a:fontRef idx="minor">
-            <a:schemeClr val="lt1"/>
-          </a:fontRef>
-        </p:style>
-        <p:txBody>
-          <a:bodyPr wrap="square" lIns="155448" tIns="137160" rIns="274320" rtlCol="0" anchor="t">
-            <a:noAutofit/>
-          </a:bodyPr>
-          <a:lstStyle/>
-          <a:p>
-            <a:pPr>
-              <a:lnSpc>
-                <a:spcPct val="90000"/>
-              </a:lnSpc>
-            </a:pPr>
-            <a:r>
-              <a:rPr lang="en-US" sz="1600" b="1" dirty="0" smtClean="0">
-                <a:solidFill>
-                  <a:schemeClr val="tx1"/>
-                </a:solidFill>
-              </a:rPr>
-              <a:t>Partner </a:t>
-            </a:r>
-            <a:r>
-              <a:rPr lang="en-US" sz="1600" b="1" dirty="0">
-                <a:solidFill>
-                  <a:schemeClr val="tx1"/>
-                </a:solidFill>
-              </a:rPr>
-              <a:t>recommendations</a:t>
-            </a:r>
-          </a:p>
-          <a:p>
-            <a:pPr marL="60325" lvl="0" indent="-60325">
-              <a:spcBef>
-                <a:spcPts val="1000"/>
-              </a:spcBef>
-              <a:spcAft>
-                <a:spcPts val="300"/>
-              </a:spcAft>
-              <a:buClr>
-                <a:prstClr val="black"/>
-              </a:buClr>
-            </a:pPr>
-            <a:r>
-              <a:rPr lang="en-US" sz="1200" i="1" dirty="0" smtClean="0">
-                <a:solidFill>
-                  <a:prstClr val="black"/>
-                </a:solidFill>
-              </a:rPr>
-              <a:t>“xxx.”</a:t>
-            </a:r>
-            <a:endParaRPr lang="en-US" sz="1200" i="1" dirty="0">
-              <a:solidFill>
-                <a:prstClr val="black"/>
-              </a:solidFill>
-            </a:endParaRPr>
-          </a:p>
-          <a:p>
-            <a:pPr marL="274320" lvl="0" indent="-171450">
-              <a:buClr>
-                <a:prstClr val="black"/>
-              </a:buClr>
-              <a:buFont typeface="MetricHPE" panose="020B0503030202060203" pitchFamily="34" charset="0"/>
-              <a:buChar char="−"/>
-            </a:pPr>
-            <a:r>
-              <a:rPr lang="en-US" sz="1100" b="1" dirty="0" smtClean="0">
-                <a:solidFill>
-                  <a:prstClr val="black"/>
-                </a:solidFill>
-              </a:rPr>
-              <a:t>Name, Company Role</a:t>
-            </a:r>
-          </a:p>
-          <a:p>
-            <a:pPr marL="102870" lvl="0">
-              <a:buClr>
-                <a:prstClr val="black"/>
-              </a:buClr>
-            </a:pPr>
-            <a:endParaRPr lang="en-US" sz="1100" b="1" i="1" dirty="0" smtClean="0">
-              <a:solidFill>
-                <a:prstClr val="black"/>
-              </a:solidFill>
-            </a:endParaRPr>
-          </a:p>
-          <a:p>
-            <a:pPr marL="60325" lvl="0" indent="-60325">
-              <a:spcBef>
-                <a:spcPts val="1000"/>
-              </a:spcBef>
-              <a:spcAft>
-                <a:spcPts val="300"/>
-              </a:spcAft>
-              <a:buClr>
-                <a:prstClr val="black"/>
-              </a:buClr>
-            </a:pPr>
-            <a:r>
-              <a:rPr lang="en-US" sz="1200" i="1" dirty="0">
-                <a:solidFill>
-                  <a:prstClr val="black"/>
-                </a:solidFill>
-              </a:rPr>
-              <a:t>“xxx.”</a:t>
-            </a:r>
-          </a:p>
-          <a:p>
-            <a:pPr marL="274320" lvl="0" indent="-171450">
-              <a:buClr>
-                <a:prstClr val="black"/>
-              </a:buClr>
-              <a:buFont typeface="MetricHPE" panose="020B0503030202060203" pitchFamily="34" charset="0"/>
-              <a:buChar char="−"/>
-            </a:pPr>
-            <a:r>
-              <a:rPr lang="en-US" sz="1100" b="1" dirty="0">
-                <a:solidFill>
-                  <a:prstClr val="black"/>
-                </a:solidFill>
-              </a:rPr>
-              <a:t>Name, Company Role</a:t>
-            </a:r>
-            <a:endParaRPr lang="en-US" sz="1100" i="1" dirty="0">
-              <a:solidFill>
-                <a:schemeClr val="tx1"/>
-              </a:solidFill>
-            </a:endParaRPr>
-          </a:p>
-          <a:p>
-            <a:pPr marL="102870" lvl="0">
-              <a:buClr>
-                <a:prstClr val="black"/>
-              </a:buClr>
-            </a:pPr>
-            <a:endParaRPr lang="en-US" sz="1100" b="1" i="1" dirty="0" smtClean="0">
-              <a:solidFill>
-                <a:prstClr val="black"/>
-              </a:solidFill>
-            </a:endParaRPr>
-          </a:p>
-          <a:p>
-            <a:pPr marL="102870" lvl="0">
-              <a:buClr>
-                <a:prstClr val="black"/>
-              </a:buClr>
-            </a:pPr>
-            <a:endParaRPr lang="en-US" sz="1100" b="1" i="1" dirty="0">
-              <a:solidFill>
-                <a:prstClr val="black"/>
-              </a:solidFill>
-            </a:endParaRPr>
-          </a:p>
-          <a:p>
-            <a:pPr>
-              <a:buClr>
-                <a:prstClr val="black"/>
-              </a:buClr>
-            </a:pPr>
-            <a:endParaRPr lang="en-US" sz="1400" dirty="0">
-              <a:solidFill>
-                <a:schemeClr val="tx1"/>
-              </a:solidFill>
-            </a:endParaRPr>
-          </a:p>
-          <a:p>
-            <a:pPr marL="171450" indent="-171450">
-              <a:buClr>
-                <a:prstClr val="black"/>
-              </a:buClr>
-              <a:buFontTx/>
-              <a:buChar char="-"/>
-            </a:pPr>
-            <a:endParaRPr lang="en-US" sz="1600" dirty="0">
-              <a:solidFill>
-                <a:schemeClr val="tx1"/>
-              </a:solidFill>
-            </a:endParaRPr>
-          </a:p>
-          <a:p>
-            <a:pPr>
-              <a:buClr>
-                <a:prstClr val="black"/>
-              </a:buClr>
-            </a:pPr>
-            <a:endParaRPr lang="en-US" sz="1600" dirty="0">
-              <a:solidFill>
-                <a:schemeClr val="tx1"/>
-              </a:solidFill>
-            </a:endParaRPr>
-          </a:p>
-          <a:p>
-            <a:pPr>
-              <a:lnSpc>
-                <a:spcPct val="90000"/>
-              </a:lnSpc>
-            </a:pPr>
-            <a:endParaRPr lang="en-US" sz="1600" b="1" dirty="0">
-              <a:solidFill>
-                <a:schemeClr val="tx1"/>
-              </a:solidFill>
-            </a:endParaRPr>
-          </a:p>
-        </p:txBody>
-      </p:sp>
-      <p:sp>
-        <p:nvSpPr>
-          <p:cNvPr id="8" name="TextBox 7"/>
-          <p:cNvSpPr txBox="1"/>
-          <p:nvPr/>
-        </p:nvSpPr>
-        <p:spPr>
-          <a:xfrm>
-            <a:off x="4737012" y="2029930"/>
-            <a:ext cx="1197602" cy="1223844"/>
-          </a:xfrm>
-          <a:prstGeom prst="rect">
-            <a:avLst/>
-          </a:prstGeom>
-          <a:noFill/>
-          <a:ln w="19050">
-            <a:solidFill>
-              <a:schemeClr val="bg1">
-                <a:lumMod val="85000"/>
-              </a:schemeClr>
-            </a:solidFill>
-          </a:ln>
-        </p:spPr>
-        <p:txBody>
-          <a:bodyPr wrap="none" lIns="91440" tIns="91440" rIns="91440" bIns="0" rtlCol="0">
-            <a:noAutofit/>
-          </a:bodyPr>
-          <a:lstStyle/>
-          <a:p>
-            <a:pPr algn="ctr">
-              <a:lnSpc>
-                <a:spcPct val="90000"/>
-              </a:lnSpc>
-            </a:pPr>
-            <a:endParaRPr lang="en-US" sz="1200" b="1" dirty="0"/>
-          </a:p>
-        </p:txBody>
-      </p:sp>
-      <p:sp>
-        <p:nvSpPr>
-          <p:cNvPr id="10" name="TextBox 9"/>
-          <p:cNvSpPr txBox="1"/>
-          <p:nvPr/>
-        </p:nvSpPr>
-        <p:spPr>
-          <a:xfrm>
-            <a:off x="3416006" y="2029930"/>
-            <a:ext cx="1197602" cy="1223844"/>
-          </a:xfrm>
-          <a:prstGeom prst="rect">
-            <a:avLst/>
-          </a:prstGeom>
-          <a:noFill/>
-          <a:ln w="19050">
-            <a:solidFill>
-              <a:schemeClr val="bg1">
-                <a:lumMod val="85000"/>
-              </a:schemeClr>
-            </a:solidFill>
-          </a:ln>
-        </p:spPr>
-        <p:txBody>
-          <a:bodyPr wrap="none" lIns="91440" tIns="91440" rIns="91440" bIns="0" rtlCol="0">
-            <a:noAutofit/>
-          </a:bodyPr>
-          <a:lstStyle/>
-          <a:p>
-            <a:pPr algn="ctr">
-              <a:lnSpc>
-                <a:spcPct val="90000"/>
-              </a:lnSpc>
-            </a:pPr>
-            <a:endParaRPr lang="en-US" sz="1200" b="1" dirty="0"/>
-          </a:p>
-        </p:txBody>
-      </p:sp>
-      <p:sp>
-        <p:nvSpPr>
-          <p:cNvPr id="11" name="TextBox 10"/>
-          <p:cNvSpPr txBox="1"/>
-          <p:nvPr/>
-        </p:nvSpPr>
-        <p:spPr>
-          <a:xfrm>
-            <a:off x="2095000" y="2029930"/>
-            <a:ext cx="1197602" cy="1223844"/>
-          </a:xfrm>
-          <a:prstGeom prst="rect">
-            <a:avLst/>
-          </a:prstGeom>
-          <a:noFill/>
-          <a:ln w="19050">
-            <a:solidFill>
-              <a:schemeClr val="bg1">
-                <a:lumMod val="85000"/>
-              </a:schemeClr>
-            </a:solidFill>
-          </a:ln>
-        </p:spPr>
-        <p:txBody>
-          <a:bodyPr wrap="none" lIns="91440" tIns="91440" rIns="91440" bIns="0" rtlCol="0">
-            <a:noAutofit/>
-          </a:bodyPr>
-          <a:lstStyle/>
-          <a:p>
-            <a:pPr algn="ctr">
-              <a:lnSpc>
-                <a:spcPct val="90000"/>
-              </a:lnSpc>
-            </a:pPr>
-            <a:endParaRPr lang="en-US" sz="1200" b="1" dirty="0"/>
-          </a:p>
-        </p:txBody>
-      </p:sp>
-      <p:sp>
-        <p:nvSpPr>
-          <p:cNvPr id="12" name="TextBox 11"/>
-          <p:cNvSpPr txBox="1"/>
-          <p:nvPr/>
-        </p:nvSpPr>
-        <p:spPr>
-          <a:xfrm>
-            <a:off x="773994" y="2029930"/>
-            <a:ext cx="1197602" cy="1223844"/>
-          </a:xfrm>
-          <a:prstGeom prst="rect">
-            <a:avLst/>
-          </a:prstGeom>
-          <a:noFill/>
-          <a:ln w="19050">
-            <a:solidFill>
-              <a:schemeClr val="bg1">
-                <a:lumMod val="85000"/>
-              </a:schemeClr>
-            </a:solidFill>
-          </a:ln>
-        </p:spPr>
-        <p:txBody>
-          <a:bodyPr wrap="none" lIns="91440" tIns="91440" rIns="91440" bIns="0" rtlCol="0">
-            <a:noAutofit/>
-          </a:bodyPr>
-          <a:lstStyle/>
-          <a:p>
-            <a:pPr algn="ctr">
-              <a:lnSpc>
-                <a:spcPct val="90000"/>
-              </a:lnSpc>
-            </a:pPr>
-            <a:endParaRPr lang="en-US" sz="1200" b="1" dirty="0"/>
-          </a:p>
-        </p:txBody>
-      </p:sp>
-      <p:sp>
-        <p:nvSpPr>
-          <p:cNvPr id="13" name="TextBox 12"/>
-          <p:cNvSpPr txBox="1"/>
-          <p:nvPr/>
-        </p:nvSpPr>
-        <p:spPr>
-          <a:xfrm>
-            <a:off x="915595" y="2967478"/>
-            <a:ext cx="914400" cy="272032"/>
-          </a:xfrm>
-          <a:prstGeom prst="rect">
-            <a:avLst/>
-          </a:prstGeom>
-          <a:noFill/>
-        </p:spPr>
-        <p:txBody>
-          <a:bodyPr wrap="none" lIns="0" tIns="0" rIns="0" bIns="0" rtlCol="0" anchor="ctr">
-            <a:noAutofit/>
-          </a:bodyPr>
-          <a:lstStyle/>
-          <a:p>
-            <a:pPr algn="ctr">
-              <a:lnSpc>
-                <a:spcPct val="90000"/>
-              </a:lnSpc>
-            </a:pPr>
-            <a:r>
-              <a:rPr lang="en-US" dirty="0" smtClean="0"/>
-              <a:t>Score-0</a:t>
-            </a:r>
-            <a:endParaRPr lang="en-US" sz="1200" dirty="0"/>
-          </a:p>
-        </p:txBody>
-      </p:sp>
-      <p:sp>
-        <p:nvSpPr>
-          <p:cNvPr id="14" name="TextBox 13"/>
-          <p:cNvSpPr txBox="1"/>
-          <p:nvPr/>
-        </p:nvSpPr>
-        <p:spPr>
-          <a:xfrm>
-            <a:off x="2236601" y="2967478"/>
-            <a:ext cx="914400" cy="272032"/>
-          </a:xfrm>
-          <a:prstGeom prst="rect">
-            <a:avLst/>
-          </a:prstGeom>
-          <a:noFill/>
-        </p:spPr>
-        <p:txBody>
-          <a:bodyPr wrap="none" lIns="0" tIns="0" rIns="0" bIns="0" rtlCol="0" anchor="ctr">
-            <a:noAutofit/>
-          </a:bodyPr>
-          <a:lstStyle/>
-          <a:p>
-            <a:pPr algn="ctr">
-              <a:lnSpc>
-                <a:spcPct val="90000"/>
-              </a:lnSpc>
-            </a:pPr>
-            <a:r>
-              <a:rPr lang="en-US" dirty="0" smtClean="0"/>
-              <a:t>Score-1</a:t>
-            </a:r>
-            <a:endParaRPr lang="en-US" sz="1200" dirty="0"/>
-          </a:p>
-        </p:txBody>
-      </p:sp>
-      <p:sp>
-        <p:nvSpPr>
-          <p:cNvPr id="15" name="TextBox 14"/>
-          <p:cNvSpPr txBox="1"/>
-          <p:nvPr/>
-        </p:nvSpPr>
-        <p:spPr>
-          <a:xfrm>
-            <a:off x="3557607" y="2967478"/>
-            <a:ext cx="914400" cy="272032"/>
-          </a:xfrm>
-          <a:prstGeom prst="rect">
-            <a:avLst/>
-          </a:prstGeom>
-          <a:noFill/>
-        </p:spPr>
-        <p:txBody>
-          <a:bodyPr wrap="none" lIns="0" tIns="0" rIns="0" bIns="0" rtlCol="0" anchor="ctr">
-            <a:noAutofit/>
-          </a:bodyPr>
-          <a:lstStyle/>
-          <a:p>
-            <a:pPr algn="ctr">
-              <a:lnSpc>
-                <a:spcPct val="90000"/>
-              </a:lnSpc>
-            </a:pPr>
-            <a:r>
-              <a:rPr lang="en-US" dirty="0" smtClean="0"/>
-              <a:t>Score-2</a:t>
-            </a:r>
-            <a:endParaRPr lang="en-US" sz="1200" dirty="0"/>
-          </a:p>
-        </p:txBody>
-      </p:sp>
-      <p:sp>
-        <p:nvSpPr>
-          <p:cNvPr id="16" name="TextBox 15"/>
-          <p:cNvSpPr txBox="1"/>
-          <p:nvPr/>
-        </p:nvSpPr>
-        <p:spPr>
-          <a:xfrm>
-            <a:off x="4878613" y="2967478"/>
-            <a:ext cx="914400" cy="272032"/>
-          </a:xfrm>
-          <a:prstGeom prst="rect">
-            <a:avLst/>
-          </a:prstGeom>
-          <a:noFill/>
-        </p:spPr>
-        <p:txBody>
-          <a:bodyPr wrap="none" lIns="0" tIns="0" rIns="0" bIns="0" rtlCol="0" anchor="ctr">
-            <a:noAutofit/>
-          </a:bodyPr>
-          <a:lstStyle/>
-          <a:p>
-            <a:pPr algn="ctr">
-              <a:lnSpc>
-                <a:spcPct val="90000"/>
-              </a:lnSpc>
-            </a:pPr>
-            <a:r>
-              <a:rPr lang="en-US" dirty="0" smtClean="0"/>
-              <a:t>Score-3</a:t>
-            </a:r>
-            <a:endParaRPr lang="en-US" sz="1200" dirty="0"/>
-          </a:p>
-        </p:txBody>
-      </p:sp>
-      <p:sp>
-        <p:nvSpPr>
-          <p:cNvPr id="17" name="TextBox 16"/>
-          <p:cNvSpPr txBox="1"/>
-          <p:nvPr/>
-        </p:nvSpPr>
-        <p:spPr>
-          <a:xfrm>
-            <a:off x="915595" y="2060849"/>
-            <a:ext cx="914400" cy="272032"/>
-          </a:xfrm>
-          <a:prstGeom prst="rect">
-            <a:avLst/>
-          </a:prstGeom>
-          <a:noFill/>
-        </p:spPr>
-        <p:txBody>
-          <a:bodyPr wrap="none" lIns="0" tIns="0" rIns="0" bIns="0" rtlCol="0" anchor="ctr">
-            <a:noAutofit/>
-          </a:bodyPr>
-          <a:lstStyle/>
-          <a:p>
-            <a:pPr algn="ctr">
-              <a:lnSpc>
-                <a:spcPct val="90000"/>
-              </a:lnSpc>
-            </a:pPr>
-            <a:r>
-              <a:rPr lang="en-US" dirty="0" smtClean="0"/>
-              <a:t>Interest-0</a:t>
-            </a:r>
-            <a:endParaRPr lang="en-US" sz="1200" b="1" dirty="0"/>
-          </a:p>
-        </p:txBody>
-      </p:sp>
-      <p:sp>
-        <p:nvSpPr>
-          <p:cNvPr id="18" name="TextBox 17"/>
-          <p:cNvSpPr txBox="1"/>
-          <p:nvPr/>
-        </p:nvSpPr>
-        <p:spPr>
-          <a:xfrm>
-            <a:off x="2236601" y="2060849"/>
-            <a:ext cx="914400" cy="272032"/>
-          </a:xfrm>
-          <a:prstGeom prst="rect">
-            <a:avLst/>
-          </a:prstGeom>
-          <a:noFill/>
-        </p:spPr>
-        <p:txBody>
-          <a:bodyPr wrap="none" lIns="0" tIns="0" rIns="0" bIns="0" rtlCol="0" anchor="ctr">
-            <a:noAutofit/>
-          </a:bodyPr>
-          <a:lstStyle/>
-          <a:p>
-            <a:pPr algn="ctr">
-              <a:lnSpc>
-                <a:spcPct val="90000"/>
-              </a:lnSpc>
-            </a:pPr>
-            <a:r>
-              <a:rPr lang="en-US" dirty="0" smtClean="0"/>
-              <a:t>Interest-1</a:t>
-            </a:r>
-            <a:endParaRPr lang="en-US" sz="1200" b="1" dirty="0"/>
-          </a:p>
-        </p:txBody>
-      </p:sp>
-      <p:sp>
-        <p:nvSpPr>
-          <p:cNvPr id="19" name="TextBox 18"/>
-          <p:cNvSpPr txBox="1"/>
-          <p:nvPr/>
-        </p:nvSpPr>
-        <p:spPr>
-          <a:xfrm>
-            <a:off x="3557607" y="2060849"/>
-            <a:ext cx="914400" cy="272032"/>
-          </a:xfrm>
-          <a:prstGeom prst="rect">
-            <a:avLst/>
-          </a:prstGeom>
-          <a:noFill/>
-        </p:spPr>
-        <p:txBody>
-          <a:bodyPr wrap="none" lIns="0" tIns="0" rIns="0" bIns="0" rtlCol="0" anchor="ctr">
-            <a:noAutofit/>
-          </a:bodyPr>
-          <a:lstStyle/>
-          <a:p>
-            <a:pPr algn="ctr">
-              <a:lnSpc>
-                <a:spcPct val="90000"/>
-              </a:lnSpc>
-            </a:pPr>
-            <a:r>
-              <a:rPr lang="en-US" dirty="0" smtClean="0"/>
-              <a:t>Interest-2</a:t>
-            </a:r>
-            <a:endParaRPr lang="en-US" sz="1200" b="1" dirty="0"/>
-          </a:p>
-        </p:txBody>
-      </p:sp>
-      <p:sp>
-        <p:nvSpPr>
-          <p:cNvPr id="20" name="TextBox 19"/>
-          <p:cNvSpPr txBox="1"/>
-          <p:nvPr/>
-        </p:nvSpPr>
-        <p:spPr>
-          <a:xfrm>
-            <a:off x="4878613" y="2060849"/>
-            <a:ext cx="914400" cy="272032"/>
-          </a:xfrm>
-          <a:prstGeom prst="rect">
-            <a:avLst/>
-          </a:prstGeom>
-          <a:noFill/>
-        </p:spPr>
-        <p:txBody>
-          <a:bodyPr wrap="none" lIns="0" tIns="0" rIns="0" bIns="0" rtlCol="0" anchor="ctr">
-            <a:noAutofit/>
-          </a:bodyPr>
-          <a:lstStyle/>
-          <a:p>
-            <a:pPr algn="ctr">
-              <a:lnSpc>
-                <a:spcPct val="90000"/>
-              </a:lnSpc>
-            </a:pPr>
-            <a:r>
-              <a:rPr lang="en-US" dirty="0" smtClean="0"/>
-              <a:t>Interest-3</a:t>
-            </a:r>
-            <a:endParaRPr lang="en-US" sz="1200" b="1" dirty="0"/>
-          </a:p>
-        </p:txBody>
-      </p:sp>
-      <p:sp>
-        <p:nvSpPr>
-          <p:cNvPr id="21" name="Content Placeholder 1"/>
+          <p:cNvPr id="27" name="Content Placeholder 1"/>
           <p:cNvSpPr txBox="1">
             <a:spLocks/>
           </p:cNvSpPr>
@@ -14311,8 +13560,8 @@
         </p:nvSpPr>
         <p:spPr>
           <a:xfrm>
-            <a:off x="6282813" y="3991865"/>
-            <a:ext cx="5296570" cy="2056451"/>
+            <a:off x="604213" y="1737887"/>
+            <a:ext cx="4164875" cy="1631302"/>
           </a:xfrm>
           <a:prstGeom prst="rect">
             <a:avLst/>
@@ -14322,7 +13571,7 @@
           </a:solidFill>
           <a:ln w="38100">
             <a:solidFill>
-              <a:schemeClr val="accent1"/>
+              <a:schemeClr val="tx2"/>
             </a:solidFill>
           </a:ln>
         </p:spPr>
@@ -14532,28 +13781,1348 @@
               <a:buFont typeface="Arial" panose="020B0604020202020204" pitchFamily="34" charset="0"/>
               <a:buNone/>
             </a:pPr>
-            <a:r>
-              <a:rPr lang="en-US" sz="1600" b="1" dirty="0" smtClean="0"/>
-              <a:t>Partner Level </a:t>
-            </a:r>
-            <a:r>
-              <a:rPr lang="en-US" sz="1600" b="1" smtClean="0"/>
-              <a:t>of Activity</a:t>
-            </a:r>
             <a:endParaRPr lang="en-US" sz="1600" b="1" dirty="0"/>
           </a:p>
         </p:txBody>
       </p:sp>
       <p:sp>
         <p:nvSpPr>
-          <p:cNvPr id="4" name="TextBox 3"/>
+          <p:cNvPr id="29" name="TextBox 28"/>
           <p:cNvSpPr txBox="1"/>
           <p:nvPr/>
         </p:nvSpPr>
         <p:spPr>
           <a:xfrm>
-            <a:off x="1066800" y="4159624"/>
-            <a:ext cx="349624" cy="268941"/>
+            <a:off x="3410258" y="1898239"/>
+            <a:ext cx="1197602" cy="1371600"/>
+          </a:xfrm>
+          <a:prstGeom prst="rect">
+            <a:avLst/>
+          </a:prstGeom>
+          <a:noFill/>
+          <a:ln w="19050">
+            <a:solidFill>
+              <a:schemeClr val="bg1">
+                <a:lumMod val="85000"/>
+              </a:schemeClr>
+            </a:solidFill>
+          </a:ln>
+        </p:spPr>
+        <p:txBody>
+          <a:bodyPr wrap="none" lIns="91440" tIns="91440" rIns="91440" bIns="0" rtlCol="0">
+            <a:noAutofit/>
+          </a:bodyPr>
+          <a:lstStyle/>
+          <a:p>
+            <a:pPr algn="ctr">
+              <a:lnSpc>
+                <a:spcPct val="90000"/>
+              </a:lnSpc>
+            </a:pPr>
+            <a:endParaRPr lang="en-US" sz="1200" b="1" dirty="0"/>
+          </a:p>
+        </p:txBody>
+      </p:sp>
+      <p:sp>
+        <p:nvSpPr>
+          <p:cNvPr id="30" name="TextBox 29"/>
+          <p:cNvSpPr txBox="1"/>
+          <p:nvPr/>
+        </p:nvSpPr>
+        <p:spPr>
+          <a:xfrm>
+            <a:off x="2089252" y="1898239"/>
+            <a:ext cx="1197602" cy="1371600"/>
+          </a:xfrm>
+          <a:prstGeom prst="rect">
+            <a:avLst/>
+          </a:prstGeom>
+          <a:noFill/>
+          <a:ln w="19050">
+            <a:solidFill>
+              <a:schemeClr val="bg1">
+                <a:lumMod val="85000"/>
+              </a:schemeClr>
+            </a:solidFill>
+          </a:ln>
+        </p:spPr>
+        <p:txBody>
+          <a:bodyPr wrap="none" lIns="91440" tIns="91440" rIns="91440" bIns="0" rtlCol="0">
+            <a:noAutofit/>
+          </a:bodyPr>
+          <a:lstStyle/>
+          <a:p>
+            <a:pPr algn="ctr">
+              <a:lnSpc>
+                <a:spcPct val="90000"/>
+              </a:lnSpc>
+            </a:pPr>
+            <a:endParaRPr lang="en-US" sz="1200" b="1" dirty="0"/>
+          </a:p>
+        </p:txBody>
+      </p:sp>
+      <p:sp>
+        <p:nvSpPr>
+          <p:cNvPr id="32" name="TextBox 31"/>
+          <p:cNvSpPr txBox="1"/>
+          <p:nvPr/>
+        </p:nvSpPr>
+        <p:spPr>
+          <a:xfrm>
+            <a:off x="768246" y="1898239"/>
+            <a:ext cx="1197602" cy="1371600"/>
+          </a:xfrm>
+          <a:prstGeom prst="rect">
+            <a:avLst/>
+          </a:prstGeom>
+          <a:noFill/>
+          <a:ln w="19050">
+            <a:solidFill>
+              <a:schemeClr val="bg1">
+                <a:lumMod val="85000"/>
+              </a:schemeClr>
+            </a:solidFill>
+          </a:ln>
+        </p:spPr>
+        <p:txBody>
+          <a:bodyPr wrap="none" lIns="91440" tIns="91440" rIns="91440" bIns="0" rtlCol="0">
+            <a:noAutofit/>
+          </a:bodyPr>
+          <a:lstStyle/>
+          <a:p>
+            <a:pPr algn="ctr">
+              <a:lnSpc>
+                <a:spcPct val="90000"/>
+              </a:lnSpc>
+            </a:pPr>
+            <a:endParaRPr lang="en-US" sz="1200" b="1" dirty="0"/>
+          </a:p>
+        </p:txBody>
+      </p:sp>
+      <p:sp>
+        <p:nvSpPr>
+          <p:cNvPr id="33" name="TextBox 32"/>
+          <p:cNvSpPr txBox="1"/>
+          <p:nvPr/>
+        </p:nvSpPr>
+        <p:spPr>
+          <a:xfrm>
+            <a:off x="909847" y="2901103"/>
+            <a:ext cx="914400" cy="272032"/>
+          </a:xfrm>
+          <a:prstGeom prst="rect">
+            <a:avLst/>
+          </a:prstGeom>
+          <a:noFill/>
+        </p:spPr>
+        <p:txBody>
+          <a:bodyPr wrap="none" lIns="0" tIns="0" rIns="0" bIns="0" rtlCol="0" anchor="ctr">
+            <a:noAutofit/>
+          </a:bodyPr>
+          <a:lstStyle/>
+          <a:p>
+            <a:pPr algn="ctr">
+              <a:lnSpc>
+                <a:spcPct val="90000"/>
+              </a:lnSpc>
+            </a:pPr>
+            <a:r>
+              <a:rPr lang="en-US" sz="2400" dirty="0" smtClean="0"/>
+              <a:t>Score-0</a:t>
+            </a:r>
+            <a:endParaRPr lang="en-US" sz="1600" dirty="0"/>
+          </a:p>
+        </p:txBody>
+      </p:sp>
+      <p:sp>
+        <p:nvSpPr>
+          <p:cNvPr id="34" name="TextBox 33"/>
+          <p:cNvSpPr txBox="1"/>
+          <p:nvPr/>
+        </p:nvSpPr>
+        <p:spPr>
+          <a:xfrm>
+            <a:off x="2230853" y="2901103"/>
+            <a:ext cx="914400" cy="272032"/>
+          </a:xfrm>
+          <a:prstGeom prst="rect">
+            <a:avLst/>
+          </a:prstGeom>
+          <a:noFill/>
+        </p:spPr>
+        <p:txBody>
+          <a:bodyPr wrap="none" lIns="0" tIns="0" rIns="0" bIns="0" rtlCol="0" anchor="ctr">
+            <a:noAutofit/>
+          </a:bodyPr>
+          <a:lstStyle/>
+          <a:p>
+            <a:pPr algn="ctr">
+              <a:lnSpc>
+                <a:spcPct val="90000"/>
+              </a:lnSpc>
+            </a:pPr>
+            <a:r>
+              <a:rPr lang="en-US" sz="2400" dirty="0" smtClean="0"/>
+              <a:t>Score-1</a:t>
+            </a:r>
+            <a:endParaRPr lang="en-US" sz="2400" dirty="0"/>
+          </a:p>
+        </p:txBody>
+      </p:sp>
+      <p:sp>
+        <p:nvSpPr>
+          <p:cNvPr id="35" name="TextBox 34"/>
+          <p:cNvSpPr txBox="1"/>
+          <p:nvPr/>
+        </p:nvSpPr>
+        <p:spPr>
+          <a:xfrm>
+            <a:off x="3551859" y="2901103"/>
+            <a:ext cx="914400" cy="272032"/>
+          </a:xfrm>
+          <a:prstGeom prst="rect">
+            <a:avLst/>
+          </a:prstGeom>
+          <a:noFill/>
+        </p:spPr>
+        <p:txBody>
+          <a:bodyPr wrap="none" lIns="0" tIns="0" rIns="0" bIns="0" rtlCol="0" anchor="ctr">
+            <a:noAutofit/>
+          </a:bodyPr>
+          <a:lstStyle/>
+          <a:p>
+            <a:pPr algn="ctr">
+              <a:lnSpc>
+                <a:spcPct val="90000"/>
+              </a:lnSpc>
+            </a:pPr>
+            <a:r>
+              <a:rPr lang="en-US" sz="2400" dirty="0" smtClean="0"/>
+              <a:t>Score-2</a:t>
+            </a:r>
+            <a:endParaRPr lang="en-US" sz="2400" dirty="0"/>
+          </a:p>
+        </p:txBody>
+      </p:sp>
+      <p:sp>
+        <p:nvSpPr>
+          <p:cNvPr id="37" name="TextBox 36"/>
+          <p:cNvSpPr txBox="1"/>
+          <p:nvPr/>
+        </p:nvSpPr>
+        <p:spPr>
+          <a:xfrm>
+            <a:off x="909847" y="1952034"/>
+            <a:ext cx="914400" cy="272032"/>
+          </a:xfrm>
+          <a:prstGeom prst="rect">
+            <a:avLst/>
+          </a:prstGeom>
+          <a:noFill/>
+        </p:spPr>
+        <p:txBody>
+          <a:bodyPr wrap="none" lIns="0" tIns="0" rIns="0" bIns="0" rtlCol="0" anchor="ctr">
+            <a:noAutofit/>
+          </a:bodyPr>
+          <a:lstStyle/>
+          <a:p>
+            <a:pPr algn="ctr">
+              <a:lnSpc>
+                <a:spcPct val="90000"/>
+              </a:lnSpc>
+            </a:pPr>
+            <a:r>
+              <a:rPr lang="en-US" dirty="0" smtClean="0"/>
+              <a:t>Interest-0</a:t>
+            </a:r>
+            <a:endParaRPr lang="en-US" sz="1200" b="1" dirty="0"/>
+          </a:p>
+        </p:txBody>
+      </p:sp>
+      <p:sp>
+        <p:nvSpPr>
+          <p:cNvPr id="38" name="TextBox 37"/>
+          <p:cNvSpPr txBox="1"/>
+          <p:nvPr/>
+        </p:nvSpPr>
+        <p:spPr>
+          <a:xfrm>
+            <a:off x="2237039" y="1952034"/>
+            <a:ext cx="914400" cy="272032"/>
+          </a:xfrm>
+          <a:prstGeom prst="rect">
+            <a:avLst/>
+          </a:prstGeom>
+          <a:noFill/>
+        </p:spPr>
+        <p:txBody>
+          <a:bodyPr wrap="none" lIns="0" tIns="0" rIns="0" bIns="0" rtlCol="0" anchor="ctr">
+            <a:noAutofit/>
+          </a:bodyPr>
+          <a:lstStyle/>
+          <a:p>
+            <a:pPr algn="ctr">
+              <a:lnSpc>
+                <a:spcPct val="90000"/>
+              </a:lnSpc>
+            </a:pPr>
+            <a:r>
+              <a:rPr lang="en-US" dirty="0"/>
+              <a:t>Interest-1</a:t>
+            </a:r>
+            <a:endParaRPr lang="en-US" sz="1200" b="1" dirty="0"/>
+          </a:p>
+        </p:txBody>
+      </p:sp>
+      <p:sp>
+        <p:nvSpPr>
+          <p:cNvPr id="39" name="TextBox 38"/>
+          <p:cNvSpPr txBox="1"/>
+          <p:nvPr/>
+        </p:nvSpPr>
+        <p:spPr>
+          <a:xfrm>
+            <a:off x="3531355" y="1952034"/>
+            <a:ext cx="914400" cy="272032"/>
+          </a:xfrm>
+          <a:prstGeom prst="rect">
+            <a:avLst/>
+          </a:prstGeom>
+          <a:noFill/>
+        </p:spPr>
+        <p:txBody>
+          <a:bodyPr wrap="none" lIns="0" tIns="0" rIns="0" bIns="0" rtlCol="0" anchor="ctr">
+            <a:noAutofit/>
+          </a:bodyPr>
+          <a:lstStyle/>
+          <a:p>
+            <a:pPr algn="ctr">
+              <a:lnSpc>
+                <a:spcPct val="90000"/>
+              </a:lnSpc>
+            </a:pPr>
+            <a:r>
+              <a:rPr lang="en-US" dirty="0" smtClean="0"/>
+              <a:t>Interest-2</a:t>
+            </a:r>
+            <a:endParaRPr lang="en-US" sz="1200" b="1" dirty="0"/>
+          </a:p>
+        </p:txBody>
+      </p:sp>
+      <p:sp>
+        <p:nvSpPr>
+          <p:cNvPr id="54" name="Rectangle 55"/>
+          <p:cNvSpPr/>
+          <p:nvPr/>
+        </p:nvSpPr>
+        <p:spPr bwMode="ltGray">
+          <a:xfrm>
+            <a:off x="612948" y="4296811"/>
+            <a:ext cx="3520440" cy="1828800"/>
+          </a:xfrm>
+          <a:prstGeom prst="rect">
+            <a:avLst/>
+          </a:prstGeom>
+          <a:solidFill>
+            <a:schemeClr val="bg1"/>
+          </a:solidFill>
+          <a:ln w="38100">
+            <a:solidFill>
+              <a:schemeClr val="accent1"/>
+            </a:solidFill>
+          </a:ln>
+        </p:spPr>
+        <p:style>
+          <a:lnRef idx="2">
+            <a:schemeClr val="accent1">
+              <a:shade val="50000"/>
+            </a:schemeClr>
+          </a:lnRef>
+          <a:fillRef idx="1">
+            <a:schemeClr val="accent1"/>
+          </a:fillRef>
+          <a:effectRef idx="0">
+            <a:schemeClr val="accent1"/>
+          </a:effectRef>
+          <a:fontRef idx="minor">
+            <a:schemeClr val="lt1"/>
+          </a:fontRef>
+        </p:style>
+        <p:txBody>
+          <a:bodyPr lIns="182880" tIns="182880" rIns="182880" bIns="182880" rtlCol="0" anchor="t"/>
+          <a:lstStyle/>
+          <a:p>
+            <a:pPr marL="45720" indent="-60325">
+              <a:spcBef>
+                <a:spcPts val="1200"/>
+              </a:spcBef>
+              <a:buClr>
+                <a:prstClr val="black"/>
+              </a:buClr>
+            </a:pPr>
+            <a:r>
+              <a:rPr lang="en-US" sz="1100" i="1" dirty="0">
+                <a:solidFill>
+                  <a:schemeClr val="tx1"/>
+                </a:solidFill>
+              </a:rPr>
+              <a:t>“Lorem ipsum dolor sit </a:t>
+            </a:r>
+            <a:r>
+              <a:rPr lang="en-US" sz="1100" i="1" dirty="0" err="1">
+                <a:solidFill>
+                  <a:schemeClr val="tx1"/>
+                </a:solidFill>
+              </a:rPr>
+              <a:t>amet</a:t>
+            </a:r>
+            <a:r>
+              <a:rPr lang="en-US" sz="1100" i="1" dirty="0">
+                <a:solidFill>
+                  <a:schemeClr val="tx1"/>
+                </a:solidFill>
+              </a:rPr>
+              <a:t>, </a:t>
+            </a:r>
+            <a:r>
+              <a:rPr lang="en-US" sz="1100" i="1" dirty="0" err="1">
+                <a:solidFill>
+                  <a:schemeClr val="tx1"/>
+                </a:solidFill>
+              </a:rPr>
+              <a:t>consectetur</a:t>
+            </a:r>
+            <a:r>
+              <a:rPr lang="en-US" sz="1100" i="1" dirty="0">
+                <a:solidFill>
+                  <a:schemeClr val="tx1"/>
+                </a:solidFill>
+              </a:rPr>
+              <a:t> </a:t>
+            </a:r>
+            <a:r>
+              <a:rPr lang="en-US" sz="1100" i="1" dirty="0" err="1">
+                <a:solidFill>
+                  <a:schemeClr val="tx1"/>
+                </a:solidFill>
+              </a:rPr>
+              <a:t>adipiscing</a:t>
+            </a:r>
+            <a:r>
+              <a:rPr lang="en-US" sz="1100" i="1" dirty="0">
+                <a:solidFill>
+                  <a:schemeClr val="tx1"/>
+                </a:solidFill>
+              </a:rPr>
+              <a:t> </a:t>
+            </a:r>
+            <a:r>
+              <a:rPr lang="en-US" sz="1100" i="1" dirty="0" err="1">
+                <a:solidFill>
+                  <a:schemeClr val="tx1"/>
+                </a:solidFill>
+              </a:rPr>
+              <a:t>elit</a:t>
+            </a:r>
+            <a:r>
+              <a:rPr lang="en-US" sz="1100" i="1" dirty="0">
+                <a:solidFill>
+                  <a:schemeClr val="tx1"/>
+                </a:solidFill>
+              </a:rPr>
+              <a:t>, </a:t>
+            </a:r>
+            <a:r>
+              <a:rPr lang="en-US" sz="1100" i="1" dirty="0" err="1">
+                <a:solidFill>
+                  <a:schemeClr val="tx1"/>
+                </a:solidFill>
+              </a:rPr>
+              <a:t>sed</a:t>
+            </a:r>
+            <a:r>
+              <a:rPr lang="en-US" sz="1100" i="1" dirty="0">
+                <a:solidFill>
+                  <a:schemeClr val="tx1"/>
+                </a:solidFill>
+              </a:rPr>
+              <a:t> do </a:t>
+            </a:r>
+            <a:r>
+              <a:rPr lang="en-US" sz="1100" i="1" dirty="0" err="1">
+                <a:solidFill>
+                  <a:schemeClr val="tx1"/>
+                </a:solidFill>
+              </a:rPr>
+              <a:t>eiusmod</a:t>
+            </a:r>
+            <a:r>
+              <a:rPr lang="en-US" sz="1100" i="1" dirty="0">
+                <a:solidFill>
+                  <a:schemeClr val="tx1"/>
+                </a:solidFill>
+              </a:rPr>
+              <a:t> </a:t>
+            </a:r>
+            <a:r>
+              <a:rPr lang="en-US" sz="1100" i="1" dirty="0" err="1">
+                <a:solidFill>
+                  <a:schemeClr val="tx1"/>
+                </a:solidFill>
+              </a:rPr>
+              <a:t>tempor</a:t>
+            </a:r>
+            <a:r>
+              <a:rPr lang="en-US" sz="1100" i="1" dirty="0">
+                <a:solidFill>
+                  <a:schemeClr val="tx1"/>
+                </a:solidFill>
+              </a:rPr>
+              <a:t> </a:t>
+            </a:r>
+            <a:r>
+              <a:rPr lang="en-US" sz="1100" i="1" dirty="0" err="1">
+                <a:solidFill>
+                  <a:schemeClr val="tx1"/>
+                </a:solidFill>
+              </a:rPr>
+              <a:t>incididunt</a:t>
+            </a:r>
+            <a:r>
+              <a:rPr lang="en-US" sz="1100" i="1" dirty="0">
+                <a:solidFill>
+                  <a:schemeClr val="tx1"/>
+                </a:solidFill>
+              </a:rPr>
+              <a:t> </a:t>
+            </a:r>
+            <a:r>
+              <a:rPr lang="en-US" sz="1100" i="1" dirty="0" err="1">
+                <a:solidFill>
+                  <a:schemeClr val="tx1"/>
+                </a:solidFill>
+              </a:rPr>
+              <a:t>ut</a:t>
+            </a:r>
+            <a:r>
+              <a:rPr lang="en-US" sz="1100" i="1" dirty="0">
+                <a:solidFill>
+                  <a:schemeClr val="tx1"/>
+                </a:solidFill>
+              </a:rPr>
+              <a:t> </a:t>
+            </a:r>
+            <a:r>
+              <a:rPr lang="en-US" sz="1100" i="1" dirty="0" err="1">
+                <a:solidFill>
+                  <a:schemeClr val="tx1"/>
+                </a:solidFill>
+              </a:rPr>
+              <a:t>labore</a:t>
+            </a:r>
+            <a:r>
+              <a:rPr lang="en-US" sz="1100" i="1" dirty="0">
+                <a:solidFill>
+                  <a:schemeClr val="tx1"/>
+                </a:solidFill>
+              </a:rPr>
+              <a:t> et </a:t>
+            </a:r>
+            <a:r>
+              <a:rPr lang="en-US" sz="1100" i="1" dirty="0" err="1">
+                <a:solidFill>
+                  <a:schemeClr val="tx1"/>
+                </a:solidFill>
+              </a:rPr>
+              <a:t>dolore</a:t>
+            </a:r>
+            <a:r>
+              <a:rPr lang="en-US" sz="1100" i="1" dirty="0">
+                <a:solidFill>
+                  <a:schemeClr val="tx1"/>
+                </a:solidFill>
+              </a:rPr>
+              <a:t> magna </a:t>
+            </a:r>
+            <a:r>
+              <a:rPr lang="en-US" sz="1100" i="1" dirty="0" err="1">
+                <a:solidFill>
+                  <a:schemeClr val="tx1"/>
+                </a:solidFill>
+              </a:rPr>
+              <a:t>aliqua</a:t>
+            </a:r>
+            <a:r>
+              <a:rPr lang="en-US" sz="1100" i="1" dirty="0" smtClean="0">
+                <a:solidFill>
+                  <a:schemeClr val="tx1"/>
+                </a:solidFill>
+              </a:rPr>
+              <a:t>..”</a:t>
+            </a:r>
+            <a:endParaRPr lang="en-US" sz="1100" i="1" dirty="0">
+              <a:solidFill>
+                <a:schemeClr val="tx1"/>
+              </a:solidFill>
+            </a:endParaRPr>
+          </a:p>
+          <a:p>
+            <a:pPr algn="r">
+              <a:buClr>
+                <a:prstClr val="black"/>
+              </a:buClr>
+            </a:pPr>
+            <a:r>
+              <a:rPr lang="en-US" sz="1000" i="1" dirty="0">
+                <a:solidFill>
+                  <a:schemeClr val="tx1"/>
+                </a:solidFill>
+              </a:rPr>
+              <a:t>- </a:t>
+            </a:r>
+            <a:r>
+              <a:rPr lang="en-US" sz="1000" b="1" dirty="0" smtClean="0">
+                <a:solidFill>
+                  <a:schemeClr val="tx1"/>
+                </a:solidFill>
+              </a:rPr>
+              <a:t>Eternal Grumbler</a:t>
+            </a:r>
+            <a:r>
+              <a:rPr lang="en-US" sz="1000" b="1" dirty="0">
+                <a:solidFill>
+                  <a:schemeClr val="tx1"/>
+                </a:solidFill>
+              </a:rPr>
+              <a:t>,</a:t>
+            </a:r>
+          </a:p>
+          <a:p>
+            <a:pPr lvl="0" algn="r"/>
+            <a:r>
+              <a:rPr lang="en-US" sz="1000" dirty="0" err="1" smtClean="0">
+                <a:solidFill>
+                  <a:schemeClr val="tx1"/>
+                </a:solidFill>
+              </a:rPr>
+              <a:t>GrumpyPartner</a:t>
+            </a:r>
+            <a:r>
+              <a:rPr lang="en-US" sz="1000" dirty="0" smtClean="0">
+                <a:solidFill>
+                  <a:schemeClr val="tx1"/>
+                </a:solidFill>
+              </a:rPr>
+              <a:t> Co</a:t>
+            </a:r>
+            <a:endParaRPr lang="en-US" sz="1000" dirty="0">
+              <a:solidFill>
+                <a:schemeClr val="tx1"/>
+              </a:solidFill>
+            </a:endParaRPr>
+          </a:p>
+          <a:p>
+            <a:pPr marL="45720" lvl="0" indent="-60325">
+              <a:spcBef>
+                <a:spcPts val="1200"/>
+              </a:spcBef>
+              <a:buClr>
+                <a:prstClr val="black"/>
+              </a:buClr>
+            </a:pPr>
+            <a:endParaRPr lang="en-US" sz="1100" i="1" dirty="0" smtClean="0">
+              <a:solidFill>
+                <a:schemeClr val="tx1"/>
+              </a:solidFill>
+            </a:endParaRPr>
+          </a:p>
+        </p:txBody>
+      </p:sp>
+      <p:sp>
+        <p:nvSpPr>
+          <p:cNvPr id="55" name="Rectangle 55"/>
+          <p:cNvSpPr/>
+          <p:nvPr/>
+        </p:nvSpPr>
+        <p:spPr bwMode="ltGray">
+          <a:xfrm>
+            <a:off x="4342349" y="4296811"/>
+            <a:ext cx="3520440" cy="1828800"/>
+          </a:xfrm>
+          <a:prstGeom prst="rect">
+            <a:avLst/>
+          </a:prstGeom>
+          <a:solidFill>
+            <a:schemeClr val="bg1"/>
+          </a:solidFill>
+          <a:ln w="38100">
+            <a:solidFill>
+              <a:schemeClr val="accent2"/>
+            </a:solidFill>
+          </a:ln>
+        </p:spPr>
+        <p:style>
+          <a:lnRef idx="2">
+            <a:schemeClr val="accent1">
+              <a:shade val="50000"/>
+            </a:schemeClr>
+          </a:lnRef>
+          <a:fillRef idx="1">
+            <a:schemeClr val="accent1"/>
+          </a:fillRef>
+          <a:effectRef idx="0">
+            <a:schemeClr val="accent1"/>
+          </a:effectRef>
+          <a:fontRef idx="minor">
+            <a:schemeClr val="lt1"/>
+          </a:fontRef>
+        </p:style>
+        <p:txBody>
+          <a:bodyPr lIns="182880" tIns="182880" rIns="182880" bIns="182880" rtlCol="0" anchor="t"/>
+          <a:lstStyle/>
+          <a:p>
+            <a:pPr marL="45720" indent="-60325">
+              <a:spcBef>
+                <a:spcPts val="1200"/>
+              </a:spcBef>
+              <a:buClr>
+                <a:prstClr val="black"/>
+              </a:buClr>
+            </a:pPr>
+            <a:r>
+              <a:rPr lang="en-US" sz="1100" i="1" dirty="0">
+                <a:solidFill>
+                  <a:schemeClr val="tx1"/>
+                </a:solidFill>
+              </a:rPr>
+              <a:t>“</a:t>
+            </a:r>
+            <a:r>
+              <a:rPr lang="en-US" sz="1100" i="1" dirty="0" err="1">
+                <a:solidFill>
+                  <a:schemeClr val="tx1"/>
+                </a:solidFill>
+              </a:rPr>
+              <a:t>Ut</a:t>
+            </a:r>
+            <a:r>
+              <a:rPr lang="en-US" sz="1100" i="1" dirty="0">
+                <a:solidFill>
+                  <a:schemeClr val="tx1"/>
+                </a:solidFill>
+              </a:rPr>
+              <a:t> </a:t>
+            </a:r>
+            <a:r>
+              <a:rPr lang="en-US" sz="1100" i="1" dirty="0" err="1">
+                <a:solidFill>
+                  <a:schemeClr val="tx1"/>
+                </a:solidFill>
+              </a:rPr>
+              <a:t>enim</a:t>
+            </a:r>
+            <a:r>
+              <a:rPr lang="en-US" sz="1100" i="1" dirty="0">
+                <a:solidFill>
+                  <a:schemeClr val="tx1"/>
+                </a:solidFill>
+              </a:rPr>
+              <a:t> ad minim </a:t>
+            </a:r>
+            <a:r>
+              <a:rPr lang="en-US" sz="1100" i="1" dirty="0" err="1">
+                <a:solidFill>
+                  <a:schemeClr val="tx1"/>
+                </a:solidFill>
+              </a:rPr>
+              <a:t>veniam</a:t>
+            </a:r>
+            <a:r>
+              <a:rPr lang="en-US" sz="1100" i="1" dirty="0">
+                <a:solidFill>
+                  <a:schemeClr val="tx1"/>
+                </a:solidFill>
+              </a:rPr>
+              <a:t>, </a:t>
+            </a:r>
+            <a:r>
+              <a:rPr lang="en-US" sz="1100" i="1" dirty="0" err="1">
+                <a:solidFill>
+                  <a:schemeClr val="tx1"/>
+                </a:solidFill>
+              </a:rPr>
+              <a:t>quis</a:t>
+            </a:r>
+            <a:r>
+              <a:rPr lang="en-US" sz="1100" i="1" dirty="0">
+                <a:solidFill>
+                  <a:schemeClr val="tx1"/>
+                </a:solidFill>
+              </a:rPr>
+              <a:t> </a:t>
+            </a:r>
+            <a:r>
+              <a:rPr lang="en-US" sz="1100" i="1" dirty="0" err="1">
+                <a:solidFill>
+                  <a:schemeClr val="tx1"/>
+                </a:solidFill>
+              </a:rPr>
+              <a:t>nostrud</a:t>
+            </a:r>
+            <a:r>
+              <a:rPr lang="en-US" sz="1100" i="1" dirty="0">
+                <a:solidFill>
+                  <a:schemeClr val="tx1"/>
+                </a:solidFill>
+              </a:rPr>
+              <a:t> exercitation </a:t>
+            </a:r>
+            <a:r>
+              <a:rPr lang="en-US" sz="1100" i="1" dirty="0" err="1">
+                <a:solidFill>
+                  <a:schemeClr val="tx1"/>
+                </a:solidFill>
+              </a:rPr>
+              <a:t>ullamco</a:t>
+            </a:r>
+            <a:r>
+              <a:rPr lang="en-US" sz="1100" i="1" dirty="0">
+                <a:solidFill>
+                  <a:schemeClr val="tx1"/>
+                </a:solidFill>
+              </a:rPr>
+              <a:t> </a:t>
+            </a:r>
+            <a:r>
+              <a:rPr lang="en-US" sz="1100" i="1" dirty="0" err="1">
+                <a:solidFill>
+                  <a:schemeClr val="tx1"/>
+                </a:solidFill>
+              </a:rPr>
+              <a:t>laboris</a:t>
+            </a:r>
+            <a:r>
+              <a:rPr lang="en-US" sz="1100" i="1" dirty="0">
+                <a:solidFill>
+                  <a:schemeClr val="tx1"/>
+                </a:solidFill>
+              </a:rPr>
+              <a:t> nisi </a:t>
+            </a:r>
+            <a:r>
+              <a:rPr lang="en-US" sz="1100" i="1" dirty="0" err="1">
+                <a:solidFill>
+                  <a:schemeClr val="tx1"/>
+                </a:solidFill>
+              </a:rPr>
+              <a:t>ut</a:t>
+            </a:r>
+            <a:r>
+              <a:rPr lang="en-US" sz="1100" i="1" dirty="0">
+                <a:solidFill>
+                  <a:schemeClr val="tx1"/>
+                </a:solidFill>
+              </a:rPr>
+              <a:t> </a:t>
+            </a:r>
+            <a:r>
+              <a:rPr lang="en-US" sz="1100" i="1" dirty="0" err="1">
+                <a:solidFill>
+                  <a:schemeClr val="tx1"/>
+                </a:solidFill>
+              </a:rPr>
+              <a:t>aliquip</a:t>
+            </a:r>
+            <a:r>
+              <a:rPr lang="en-US" sz="1100" i="1" dirty="0">
+                <a:solidFill>
+                  <a:schemeClr val="tx1"/>
+                </a:solidFill>
+              </a:rPr>
+              <a:t> ex </a:t>
+            </a:r>
+            <a:r>
+              <a:rPr lang="en-US" sz="1100" i="1" dirty="0" err="1">
+                <a:solidFill>
+                  <a:schemeClr val="tx1"/>
+                </a:solidFill>
+              </a:rPr>
+              <a:t>ea</a:t>
+            </a:r>
+            <a:r>
+              <a:rPr lang="en-US" sz="1100" i="1" dirty="0">
+                <a:solidFill>
+                  <a:schemeClr val="tx1"/>
+                </a:solidFill>
+              </a:rPr>
+              <a:t> </a:t>
+            </a:r>
+            <a:r>
+              <a:rPr lang="en-US" sz="1100" i="1" dirty="0" err="1">
+                <a:solidFill>
+                  <a:schemeClr val="tx1"/>
+                </a:solidFill>
+              </a:rPr>
+              <a:t>commodo</a:t>
+            </a:r>
+            <a:r>
+              <a:rPr lang="en-US" sz="1100" i="1" dirty="0">
+                <a:solidFill>
+                  <a:schemeClr val="tx1"/>
+                </a:solidFill>
+              </a:rPr>
+              <a:t> </a:t>
+            </a:r>
+            <a:r>
+              <a:rPr lang="en-US" sz="1100" i="1" dirty="0" err="1">
+                <a:solidFill>
+                  <a:schemeClr val="tx1"/>
+                </a:solidFill>
+              </a:rPr>
+              <a:t>consequat</a:t>
+            </a:r>
+            <a:r>
+              <a:rPr lang="en-US" sz="1100" i="1" dirty="0">
+                <a:solidFill>
+                  <a:schemeClr val="tx1"/>
+                </a:solidFill>
+              </a:rPr>
+              <a:t>. .”</a:t>
+            </a:r>
+            <a:endParaRPr lang="en-US" sz="1100" i="1" dirty="0">
+              <a:solidFill>
+                <a:schemeClr val="tx1"/>
+              </a:solidFill>
+            </a:endParaRPr>
+          </a:p>
+          <a:p>
+            <a:pPr marL="111125" indent="-171450" algn="r">
+              <a:buClr>
+                <a:prstClr val="black"/>
+              </a:buClr>
+              <a:buFontTx/>
+              <a:buChar char="-"/>
+            </a:pPr>
+            <a:r>
+              <a:rPr lang="en-US" sz="1000" b="1" dirty="0" smtClean="0">
+                <a:solidFill>
+                  <a:schemeClr val="tx1"/>
+                </a:solidFill>
+              </a:rPr>
+              <a:t>Happy Chap, </a:t>
+            </a:r>
+            <a:endParaRPr lang="en-US" sz="1000" b="1" dirty="0">
+              <a:solidFill>
+                <a:schemeClr val="tx1"/>
+              </a:solidFill>
+            </a:endParaRPr>
+          </a:p>
+          <a:p>
+            <a:pPr algn="r">
+              <a:buClr>
+                <a:prstClr val="black"/>
+              </a:buClr>
+            </a:pPr>
+            <a:r>
+              <a:rPr lang="en-US" sz="1000" dirty="0" smtClean="0">
+                <a:solidFill>
+                  <a:schemeClr val="tx1"/>
+                </a:solidFill>
+              </a:rPr>
+              <a:t>Cheerful </a:t>
+            </a:r>
+            <a:r>
+              <a:rPr lang="en-US" sz="1000" dirty="0" err="1" smtClean="0">
+                <a:solidFill>
+                  <a:schemeClr val="tx1"/>
+                </a:solidFill>
+              </a:rPr>
+              <a:t>Inc</a:t>
+            </a:r>
+            <a:r>
+              <a:rPr lang="en-US" sz="1000" dirty="0" smtClean="0">
+                <a:solidFill>
+                  <a:schemeClr val="tx1"/>
+                </a:solidFill>
+              </a:rPr>
+              <a:t>, </a:t>
+            </a:r>
+            <a:r>
+              <a:rPr lang="en-US" sz="1000" dirty="0">
+                <a:solidFill>
+                  <a:schemeClr val="tx1"/>
+                </a:solidFill>
+              </a:rPr>
+              <a:t>Manager</a:t>
+            </a:r>
+            <a:endParaRPr lang="en-US" sz="1100" dirty="0">
+              <a:solidFill>
+                <a:schemeClr val="tx1"/>
+              </a:solidFill>
+            </a:endParaRPr>
+          </a:p>
+          <a:p>
+            <a:pPr marL="45720" lvl="0" indent="-60325">
+              <a:spcBef>
+                <a:spcPts val="1200"/>
+              </a:spcBef>
+              <a:buClr>
+                <a:prstClr val="black"/>
+              </a:buClr>
+            </a:pPr>
+            <a:endParaRPr lang="en-US" sz="1000" i="1" dirty="0">
+              <a:solidFill>
+                <a:schemeClr val="tx1"/>
+              </a:solidFill>
+            </a:endParaRPr>
+          </a:p>
+        </p:txBody>
+      </p:sp>
+      <p:sp>
+        <p:nvSpPr>
+          <p:cNvPr id="56" name="Rectangle 55"/>
+          <p:cNvSpPr/>
+          <p:nvPr/>
+        </p:nvSpPr>
+        <p:spPr bwMode="ltGray">
+          <a:xfrm>
+            <a:off x="8071751" y="4296811"/>
+            <a:ext cx="3520440" cy="1828800"/>
+          </a:xfrm>
+          <a:prstGeom prst="rect">
+            <a:avLst/>
+          </a:prstGeom>
+          <a:solidFill>
+            <a:schemeClr val="bg1"/>
+          </a:solidFill>
+          <a:ln w="38100">
+            <a:solidFill>
+              <a:schemeClr val="accent3"/>
+            </a:solidFill>
+          </a:ln>
+        </p:spPr>
+        <p:style>
+          <a:lnRef idx="2">
+            <a:schemeClr val="accent1">
+              <a:shade val="50000"/>
+            </a:schemeClr>
+          </a:lnRef>
+          <a:fillRef idx="1">
+            <a:schemeClr val="accent1"/>
+          </a:fillRef>
+          <a:effectRef idx="0">
+            <a:schemeClr val="accent1"/>
+          </a:effectRef>
+          <a:fontRef idx="minor">
+            <a:schemeClr val="lt1"/>
+          </a:fontRef>
+        </p:style>
+        <p:txBody>
+          <a:bodyPr lIns="182880" tIns="182880" rIns="182880" bIns="182880" numCol="1" rtlCol="0" anchor="t"/>
+          <a:lstStyle/>
+          <a:p>
+            <a:pPr marL="45720" indent="-60325">
+              <a:spcBef>
+                <a:spcPts val="1200"/>
+              </a:spcBef>
+              <a:buClr>
+                <a:prstClr val="black"/>
+              </a:buClr>
+            </a:pPr>
+            <a:r>
+              <a:rPr lang="en-US" sz="1100" i="1" dirty="0">
+                <a:solidFill>
+                  <a:schemeClr val="tx1"/>
+                </a:solidFill>
+              </a:rPr>
+              <a:t>“</a:t>
+            </a:r>
+            <a:r>
+              <a:rPr lang="en-US" sz="1100" i="1" dirty="0" err="1">
+                <a:solidFill>
+                  <a:schemeClr val="tx1"/>
+                </a:solidFill>
+              </a:rPr>
+              <a:t>Duis</a:t>
+            </a:r>
+            <a:r>
+              <a:rPr lang="en-US" sz="1100" i="1" dirty="0">
+                <a:solidFill>
+                  <a:schemeClr val="tx1"/>
+                </a:solidFill>
+              </a:rPr>
+              <a:t> </a:t>
+            </a:r>
+            <a:r>
+              <a:rPr lang="en-US" sz="1100" i="1" dirty="0" err="1">
+                <a:solidFill>
+                  <a:schemeClr val="tx1"/>
+                </a:solidFill>
+              </a:rPr>
+              <a:t>aute</a:t>
+            </a:r>
+            <a:r>
+              <a:rPr lang="en-US" sz="1100" i="1" dirty="0">
+                <a:solidFill>
+                  <a:schemeClr val="tx1"/>
+                </a:solidFill>
+              </a:rPr>
+              <a:t> </a:t>
+            </a:r>
+            <a:r>
+              <a:rPr lang="en-US" sz="1100" i="1" dirty="0" err="1">
+                <a:solidFill>
+                  <a:schemeClr val="tx1"/>
+                </a:solidFill>
+              </a:rPr>
+              <a:t>irure</a:t>
+            </a:r>
+            <a:r>
+              <a:rPr lang="en-US" sz="1100" i="1" dirty="0">
+                <a:solidFill>
+                  <a:schemeClr val="tx1"/>
+                </a:solidFill>
+              </a:rPr>
+              <a:t> dolor in </a:t>
+            </a:r>
+            <a:r>
+              <a:rPr lang="en-US" sz="1100" i="1" dirty="0" err="1">
+                <a:solidFill>
+                  <a:schemeClr val="tx1"/>
+                </a:solidFill>
+              </a:rPr>
+              <a:t>reprehenderit</a:t>
+            </a:r>
+            <a:r>
+              <a:rPr lang="en-US" sz="1100" i="1" dirty="0">
+                <a:solidFill>
+                  <a:schemeClr val="tx1"/>
+                </a:solidFill>
+              </a:rPr>
+              <a:t> in </a:t>
+            </a:r>
+            <a:r>
+              <a:rPr lang="en-US" sz="1100" i="1" dirty="0" err="1">
+                <a:solidFill>
+                  <a:schemeClr val="tx1"/>
+                </a:solidFill>
+              </a:rPr>
+              <a:t>voluptate</a:t>
+            </a:r>
+            <a:r>
+              <a:rPr lang="en-US" sz="1100" i="1" dirty="0">
+                <a:solidFill>
+                  <a:schemeClr val="tx1"/>
+                </a:solidFill>
+              </a:rPr>
+              <a:t> </a:t>
+            </a:r>
+            <a:r>
+              <a:rPr lang="en-US" sz="1100" i="1" dirty="0" err="1">
+                <a:solidFill>
+                  <a:schemeClr val="tx1"/>
+                </a:solidFill>
+              </a:rPr>
+              <a:t>velit</a:t>
+            </a:r>
+            <a:r>
+              <a:rPr lang="en-US" sz="1100" i="1" dirty="0">
+                <a:solidFill>
+                  <a:schemeClr val="tx1"/>
+                </a:solidFill>
+              </a:rPr>
+              <a:t> </a:t>
+            </a:r>
+            <a:r>
+              <a:rPr lang="en-US" sz="1100" i="1" dirty="0" err="1">
+                <a:solidFill>
+                  <a:schemeClr val="tx1"/>
+                </a:solidFill>
+              </a:rPr>
+              <a:t>esse</a:t>
+            </a:r>
+            <a:r>
+              <a:rPr lang="en-US" sz="1100" i="1" dirty="0">
+                <a:solidFill>
+                  <a:schemeClr val="tx1"/>
+                </a:solidFill>
+              </a:rPr>
+              <a:t> </a:t>
+            </a:r>
+            <a:r>
+              <a:rPr lang="en-US" sz="1100" i="1" dirty="0" err="1">
+                <a:solidFill>
+                  <a:schemeClr val="tx1"/>
+                </a:solidFill>
+              </a:rPr>
+              <a:t>cillum</a:t>
+            </a:r>
+            <a:r>
+              <a:rPr lang="en-US" sz="1100" i="1" dirty="0">
+                <a:solidFill>
+                  <a:schemeClr val="tx1"/>
+                </a:solidFill>
+              </a:rPr>
+              <a:t> </a:t>
+            </a:r>
+            <a:r>
+              <a:rPr lang="en-US" sz="1100" i="1" dirty="0" err="1">
+                <a:solidFill>
+                  <a:schemeClr val="tx1"/>
+                </a:solidFill>
+              </a:rPr>
+              <a:t>dolore</a:t>
+            </a:r>
+            <a:r>
+              <a:rPr lang="en-US" sz="1100" i="1" dirty="0">
+                <a:solidFill>
+                  <a:schemeClr val="tx1"/>
+                </a:solidFill>
+              </a:rPr>
+              <a:t> </a:t>
+            </a:r>
+            <a:r>
+              <a:rPr lang="en-US" sz="1100" i="1" dirty="0" err="1">
+                <a:solidFill>
+                  <a:schemeClr val="tx1"/>
+                </a:solidFill>
+              </a:rPr>
+              <a:t>eu</a:t>
+            </a:r>
+            <a:r>
+              <a:rPr lang="en-US" sz="1100" i="1" dirty="0">
+                <a:solidFill>
+                  <a:schemeClr val="tx1"/>
+                </a:solidFill>
+              </a:rPr>
+              <a:t> </a:t>
+            </a:r>
+            <a:r>
+              <a:rPr lang="en-US" sz="1100" i="1" dirty="0" err="1">
+                <a:solidFill>
+                  <a:schemeClr val="tx1"/>
+                </a:solidFill>
+              </a:rPr>
+              <a:t>fugiat</a:t>
+            </a:r>
+            <a:r>
+              <a:rPr lang="en-US" sz="1100" i="1" dirty="0">
+                <a:solidFill>
+                  <a:schemeClr val="tx1"/>
+                </a:solidFill>
+              </a:rPr>
+              <a:t> </a:t>
+            </a:r>
+            <a:r>
+              <a:rPr lang="en-US" sz="1100" i="1" dirty="0" err="1">
+                <a:solidFill>
+                  <a:schemeClr val="tx1"/>
+                </a:solidFill>
+              </a:rPr>
+              <a:t>nulla</a:t>
+            </a:r>
+            <a:r>
+              <a:rPr lang="en-US" sz="1100" i="1" dirty="0">
+                <a:solidFill>
+                  <a:schemeClr val="tx1"/>
+                </a:solidFill>
+              </a:rPr>
+              <a:t> </a:t>
+            </a:r>
+            <a:r>
+              <a:rPr lang="en-US" sz="1100" i="1" dirty="0" err="1">
+                <a:solidFill>
+                  <a:schemeClr val="tx1"/>
+                </a:solidFill>
+              </a:rPr>
+              <a:t>pariatur</a:t>
+            </a:r>
+            <a:r>
+              <a:rPr lang="en-US" sz="1100" i="1" dirty="0">
+                <a:solidFill>
+                  <a:schemeClr val="tx1"/>
+                </a:solidFill>
+              </a:rPr>
+              <a:t>. .”</a:t>
+            </a:r>
+            <a:endParaRPr lang="en-US" sz="1100" i="1" dirty="0">
+              <a:solidFill>
+                <a:schemeClr val="tx1"/>
+              </a:solidFill>
+            </a:endParaRPr>
+          </a:p>
+          <a:p>
+            <a:pPr algn="r">
+              <a:buClr>
+                <a:prstClr val="black"/>
+              </a:buClr>
+            </a:pPr>
+            <a:r>
+              <a:rPr lang="en-US" sz="1000" i="1" dirty="0">
+                <a:solidFill>
+                  <a:schemeClr val="tx1"/>
+                </a:solidFill>
+              </a:rPr>
+              <a:t>- </a:t>
+            </a:r>
+            <a:r>
+              <a:rPr lang="en-US" sz="1000" b="1" dirty="0" smtClean="0">
+                <a:solidFill>
+                  <a:schemeClr val="tx1"/>
+                </a:solidFill>
+              </a:rPr>
+              <a:t>Eric Undecided,</a:t>
+            </a:r>
+            <a:endParaRPr lang="en-US" sz="1000" b="1" dirty="0">
+              <a:solidFill>
+                <a:schemeClr val="tx1"/>
+              </a:solidFill>
+            </a:endParaRPr>
+          </a:p>
+          <a:p>
+            <a:pPr lvl="0" algn="r"/>
+            <a:r>
+              <a:rPr lang="en-US" sz="1000" dirty="0" smtClean="0">
+                <a:solidFill>
+                  <a:schemeClr val="tx1"/>
+                </a:solidFill>
+              </a:rPr>
+              <a:t>Acme Distributers</a:t>
+            </a:r>
+            <a:r>
+              <a:rPr lang="en-US" sz="1000" smtClean="0">
+                <a:solidFill>
+                  <a:schemeClr val="tx1"/>
+                </a:solidFill>
+              </a:rPr>
+              <a:t>, Project </a:t>
+            </a:r>
+            <a:r>
+              <a:rPr lang="en-US" sz="1000" dirty="0" smtClean="0">
+                <a:solidFill>
+                  <a:schemeClr val="tx1"/>
+                </a:solidFill>
+              </a:rPr>
+              <a:t>Manager</a:t>
+            </a:r>
+            <a:endParaRPr lang="en-US" sz="1000" dirty="0">
+              <a:solidFill>
+                <a:schemeClr val="tx1"/>
+              </a:solidFill>
+            </a:endParaRPr>
+          </a:p>
+        </p:txBody>
+      </p:sp>
+      <p:sp>
+        <p:nvSpPr>
+          <p:cNvPr id="7" name="TextBox 6"/>
+          <p:cNvSpPr txBox="1"/>
+          <p:nvPr/>
+        </p:nvSpPr>
+        <p:spPr>
+          <a:xfrm>
+            <a:off x="604213" y="3566815"/>
+            <a:ext cx="3014270" cy="275865"/>
           </a:xfrm>
           <a:prstGeom prst="rect">
             <a:avLst/>
@@ -14566,29 +15135,71 @@
           </a:bodyPr>
           <a:lstStyle/>
           <a:p>
-            <a:pPr algn="ctr">
+            <a:pPr>
               <a:lnSpc>
                 <a:spcPct val="90000"/>
               </a:lnSpc>
             </a:pPr>
             <a:r>
-              <a:rPr lang="en-US" dirty="0"/>
-              <a:t>H</a:t>
+              <a:rPr lang="en-US" b="1" dirty="0" smtClean="0"/>
+              <a:t>Partner Requests</a:t>
             </a:r>
-            <a:endParaRPr lang="en-GB" dirty="0"/>
+            <a:endParaRPr lang="en-GB" b="1" dirty="0"/>
           </a:p>
         </p:txBody>
       </p:sp>
       <p:sp>
         <p:nvSpPr>
-          <p:cNvPr id="22" name="TextBox 21"/>
+          <p:cNvPr id="28" name="Rectangle 27"/>
+          <p:cNvSpPr/>
+          <p:nvPr/>
+        </p:nvSpPr>
+        <p:spPr>
+          <a:xfrm>
+            <a:off x="7574930" y="3373392"/>
+            <a:ext cx="4035888" cy="216982"/>
+          </a:xfrm>
+          <a:prstGeom prst="rect">
+            <a:avLst/>
+          </a:prstGeom>
+        </p:spPr>
+        <p:txBody>
+          <a:bodyPr wrap="square">
+            <a:spAutoFit/>
+          </a:bodyPr>
+          <a:lstStyle/>
+          <a:p>
+            <a:pPr marL="52388" lvl="0" indent="-52388">
+              <a:lnSpc>
+                <a:spcPct val="90000"/>
+              </a:lnSpc>
+            </a:pPr>
+            <a:r>
+              <a:rPr lang="en-US" sz="900" i="1" dirty="0" smtClean="0">
+                <a:solidFill>
+                  <a:prstClr val="black"/>
+                </a:solidFill>
+              </a:rPr>
+              <a:t>*Number of partner engagements represented by the size of partner name.</a:t>
+            </a:r>
+            <a:endParaRPr lang="en-US" sz="900" i="1" dirty="0">
+              <a:solidFill>
+                <a:prstClr val="black"/>
+              </a:solidFill>
+            </a:endParaRPr>
+          </a:p>
+        </p:txBody>
+      </p:sp>
+      <p:sp>
+        <p:nvSpPr>
+          <p:cNvPr id="4" name="TextBox 3"/>
           <p:cNvSpPr txBox="1"/>
           <p:nvPr/>
         </p:nvSpPr>
         <p:spPr>
           <a:xfrm>
-            <a:off x="2109452" y="4159624"/>
-            <a:ext cx="349624" cy="268941"/>
+            <a:off x="604213" y="1422769"/>
+            <a:ext cx="1626640" cy="359367"/>
           </a:xfrm>
           <a:prstGeom prst="rect">
             <a:avLst/>
@@ -14596,9 +15207,102 @@
           <a:noFill/>
         </p:spPr>
         <p:txBody>
-          <a:bodyPr wrap="none" lIns="0" tIns="0" rIns="0" bIns="0" rtlCol="0">
+          <a:bodyPr wrap="square" lIns="0" tIns="0" rIns="0" bIns="0" rtlCol="0">
             <a:noAutofit/>
           </a:bodyPr>
+          <a:lstStyle/>
+          <a:p>
+            <a:pPr>
+              <a:lnSpc>
+                <a:spcPct val="90000"/>
+              </a:lnSpc>
+            </a:pPr>
+            <a:r>
+              <a:rPr lang="en-US" b="1" dirty="0" smtClean="0"/>
+              <a:t>Top Interests</a:t>
+            </a:r>
+            <a:endParaRPr lang="en-US" b="1" dirty="0"/>
+          </a:p>
+        </p:txBody>
+      </p:sp>
+      <p:sp>
+        <p:nvSpPr>
+          <p:cNvPr id="31" name="TextBox 30"/>
+          <p:cNvSpPr txBox="1"/>
+          <p:nvPr/>
+        </p:nvSpPr>
+        <p:spPr>
+          <a:xfrm>
+            <a:off x="5013589" y="1426041"/>
+            <a:ext cx="3324015" cy="359367"/>
+          </a:xfrm>
+          <a:prstGeom prst="rect">
+            <a:avLst/>
+          </a:prstGeom>
+          <a:noFill/>
+        </p:spPr>
+        <p:txBody>
+          <a:bodyPr wrap="square" lIns="0" tIns="0" rIns="0" bIns="0" rtlCol="0">
+            <a:noAutofit/>
+          </a:bodyPr>
+          <a:lstStyle/>
+          <a:p>
+            <a:pPr>
+              <a:lnSpc>
+                <a:spcPct val="90000"/>
+              </a:lnSpc>
+            </a:pPr>
+            <a:r>
+              <a:rPr lang="en-US" b="1" dirty="0" smtClean="0"/>
+              <a:t>Partner Attendees</a:t>
+            </a:r>
+            <a:r>
+              <a:rPr lang="en-US" dirty="0" smtClean="0"/>
+              <a:t>*</a:t>
+            </a:r>
+            <a:endParaRPr lang="en-US" dirty="0"/>
+          </a:p>
+        </p:txBody>
+      </p:sp>
+      <p:sp>
+        <p:nvSpPr>
+          <p:cNvPr id="6" name="Rectangle 5"/>
+          <p:cNvSpPr/>
+          <p:nvPr/>
+        </p:nvSpPr>
+        <p:spPr bwMode="ltGray">
+          <a:xfrm>
+            <a:off x="604213" y="3842680"/>
+            <a:ext cx="3520440" cy="365760"/>
+          </a:xfrm>
+          <a:prstGeom prst="rect">
+            <a:avLst/>
+          </a:prstGeom>
+          <a:noFill/>
+          <a:ln w="38100">
+            <a:solidFill>
+              <a:schemeClr val="accent1"/>
+            </a:solidFill>
+          </a:ln>
+        </p:spPr>
+        <p:style>
+          <a:lnRef idx="2">
+            <a:schemeClr val="accent1">
+              <a:shade val="50000"/>
+            </a:schemeClr>
+          </a:lnRef>
+          <a:fillRef idx="1">
+            <a:schemeClr val="accent1"/>
+          </a:fillRef>
+          <a:effectRef idx="0">
+            <a:schemeClr val="accent1"/>
+          </a:effectRef>
+          <a:fontRef idx="minor">
+            <a:schemeClr val="lt1"/>
+          </a:fontRef>
+        </p:style>
+        <p:txBody>
+          <a:bodyPr rtlCol="0" anchor="ctr"/>
           <a:lstStyle/>
           <a:p>
             <a:pPr algn="ctr">
@@ -14607,33 +15311,55 @@
               </a:lnSpc>
             </a:pPr>
             <a:r>
-              <a:rPr lang="en-US" dirty="0" smtClean="0"/>
-              <a:t>NY</a:t>
+              <a:rPr lang="en-US" sz="1600" dirty="0" smtClean="0">
+                <a:solidFill>
+                  <a:schemeClr val="tx1"/>
+                </a:solidFill>
+              </a:rPr>
+              <a:t>Theme One</a:t>
             </a:r>
-            <a:endParaRPr lang="en-GB" dirty="0"/>
           </a:p>
         </p:txBody>
       </p:sp>
       <p:sp>
         <p:nvSpPr>
-          <p:cNvPr id="23" name="TextBox 22"/>
-          <p:cNvSpPr txBox="1"/>
+          <p:cNvPr id="36" name="Rectangle 35"/>
+          <p:cNvSpPr/>
           <p:nvPr/>
         </p:nvSpPr>
-        <p:spPr>
+        <p:spPr bwMode="ltGray">
           <a:xfrm>
-            <a:off x="3152104" y="4159624"/>
-            <a:ext cx="349624" cy="268941"/>
+            <a:off x="4329099" y="3842680"/>
+            <a:ext cx="3520440" cy="365760"/>
           </a:xfrm>
           <a:prstGeom prst="rect">
             <a:avLst/>
           </a:prstGeom>
           <a:noFill/>
+          <a:ln w="38100">
+            <a:solidFill>
+              <a:schemeClr val="accent2"/>
+            </a:solidFill>
+          </a:ln>
         </p:spPr>
+        <p:style>
+          <a:lnRef idx="2">
+            <a:schemeClr val="accent1">
+              <a:shade val="50000"/>
+            </a:schemeClr>
+          </a:lnRef>
+          <a:fillRef idx="1">
+            <a:schemeClr val="accent1"/>
+          </a:fillRef>
+          <a:effectRef idx="0">
+            <a:schemeClr val="accent1"/>
+          </a:effectRef>
+          <a:fontRef idx="minor">
+            <a:schemeClr val="lt1"/>
+          </a:fontRef>
+        </p:style>
         <p:txBody>
-          <a:bodyPr wrap="none" lIns="0" tIns="0" rIns="0" bIns="0" rtlCol="0">
-            <a:noAutofit/>
-          </a:bodyPr>
+          <a:bodyPr rtlCol="0" anchor="ctr"/>
           <a:lstStyle/>
           <a:p>
             <a:pPr algn="ctr">
@@ -14642,33 +15368,55 @@
               </a:lnSpc>
             </a:pPr>
             <a:r>
-              <a:rPr lang="en-US" dirty="0" smtClean="0"/>
-              <a:t>SNG</a:t>
+              <a:rPr lang="en-US" sz="1600" dirty="0" smtClean="0">
+                <a:solidFill>
+                  <a:schemeClr val="tx1"/>
+                </a:solidFill>
+              </a:rPr>
+              <a:t>Theme Two</a:t>
             </a:r>
-            <a:endParaRPr lang="en-GB" dirty="0"/>
           </a:p>
         </p:txBody>
       </p:sp>
       <p:sp>
         <p:nvSpPr>
-          <p:cNvPr id="24" name="TextBox 23"/>
-          <p:cNvSpPr txBox="1"/>
+          <p:cNvPr id="40" name="Rectangle 39"/>
+          <p:cNvSpPr/>
           <p:nvPr/>
         </p:nvSpPr>
-        <p:spPr>
+        <p:spPr bwMode="ltGray">
           <a:xfrm>
-            <a:off x="4194756" y="4150659"/>
-            <a:ext cx="349624" cy="268941"/>
+            <a:off x="8053985" y="3842680"/>
+            <a:ext cx="3520440" cy="365760"/>
           </a:xfrm>
           <a:prstGeom prst="rect">
             <a:avLst/>
           </a:prstGeom>
           <a:noFill/>
+          <a:ln w="38100">
+            <a:solidFill>
+              <a:schemeClr val="accent3"/>
+            </a:solidFill>
+          </a:ln>
         </p:spPr>
+        <p:style>
+          <a:lnRef idx="2">
+            <a:schemeClr val="accent1">
+              <a:shade val="50000"/>
+            </a:schemeClr>
+          </a:lnRef>
+          <a:fillRef idx="1">
+            <a:schemeClr val="accent1"/>
+          </a:fillRef>
+          <a:effectRef idx="0">
+            <a:schemeClr val="accent1"/>
+          </a:effectRef>
+          <a:fontRef idx="minor">
+            <a:schemeClr val="lt1"/>
+          </a:fontRef>
+        </p:style>
         <p:txBody>
-          <a:bodyPr wrap="none" lIns="0" tIns="0" rIns="0" bIns="0" rtlCol="0">
-            <a:noAutofit/>
-          </a:bodyPr>
+          <a:bodyPr rtlCol="0" anchor="ctr"/>
           <a:lstStyle/>
           <a:p>
             <a:pPr algn="ctr">
@@ -14677,52 +15425,20 @@
               </a:lnSpc>
             </a:pPr>
             <a:r>
-              <a:rPr lang="en-US" dirty="0" smtClean="0"/>
-              <a:t>LON</a:t>
+              <a:rPr lang="en-US" sz="1600" dirty="0" smtClean="0">
+                <a:solidFill>
+                  <a:schemeClr val="tx1"/>
+                </a:solidFill>
+              </a:rPr>
+              <a:t>Theme Three</a:t>
             </a:r>
-            <a:endParaRPr lang="en-GB" dirty="0"/>
-          </a:p>
-        </p:txBody>
-      </p:sp>
-      <p:sp>
-        <p:nvSpPr>
-          <p:cNvPr id="25" name="TextBox 24"/>
-          <p:cNvSpPr txBox="1"/>
-          <p:nvPr/>
-        </p:nvSpPr>
-        <p:spPr>
-          <a:xfrm>
-            <a:off x="5237408" y="4159624"/>
-            <a:ext cx="349624" cy="268941"/>
-          </a:xfrm>
-          <a:prstGeom prst="rect">
-            <a:avLst/>
-          </a:prstGeom>
-          <a:noFill/>
-        </p:spPr>
-        <p:txBody>
-          <a:bodyPr wrap="none" lIns="0" tIns="0" rIns="0" bIns="0" rtlCol="0">
-            <a:noAutofit/>
-          </a:bodyPr>
-          <a:lstStyle/>
-          <a:p>
-            <a:pPr algn="ctr">
-              <a:lnSpc>
-                <a:spcPct val="90000"/>
-              </a:lnSpc>
-            </a:pPr>
-            <a:r>
-              <a:rPr lang="en-US" dirty="0" smtClean="0"/>
-              <a:t>PA</a:t>
-            </a:r>
-            <a:endParaRPr lang="en-GB" dirty="0"/>
           </a:p>
         </p:txBody>
       </p:sp>
     </p:spTree>
     <p:extLst>
       <p:ext uri="{BB962C8B-B14F-4D97-AF65-F5344CB8AC3E}">
-        <p14:creationId xmlns:p14="http://schemas.microsoft.com/office/powerpoint/2010/main" val="2062481091"/>
+        <p14:creationId xmlns:p14="http://schemas.microsoft.com/office/powerpoint/2010/main" val="1895732318"/>
       </p:ext>
     </p:extLst>
   </p:cSld>

</xml_diff>

<commit_message>
Updated the centre insights slide, with real Powerpoint doughnut pie charts, and a 6th industry visible (still using top 6 in popularity).
</commit_message>
<xml_diff>
--- a/GCA_Customer_Insights_Month-Year.pptx
+++ b/GCA_Customer_Insights_Month-Year.pptx
@@ -19,7 +19,7 @@
     <p:sldId id="291" r:id="rId7"/>
     <p:sldId id="292" r:id="rId8"/>
     <p:sldId id="293" r:id="rId9"/>
-    <p:sldId id="286" r:id="rId10"/>
+    <p:sldId id="298" r:id="rId10"/>
     <p:sldId id="297" r:id="rId11"/>
     <p:sldId id="288" r:id="rId12"/>
     <p:sldId id="264" r:id="rId13"/>
@@ -273,7 +273,7 @@
           <a:p>
             <a:fld id="{3CA61830-C416-483F-955E-54203C65B711}" type="datetimeFigureOut">
               <a:rPr lang="en-US"/>
-              <a:t>9/21/2018</a:t>
+              <a:t>9/24/2018</a:t>
             </a:fld>
             <a:endParaRPr dirty="0"/>
           </a:p>
@@ -1978,7 +1978,7 @@
     </p:spTree>
     <p:extLst>
       <p:ext uri="{BB962C8B-B14F-4D97-AF65-F5344CB8AC3E}">
-        <p14:creationId xmlns:p14="http://schemas.microsoft.com/office/powerpoint/2010/main" val="2474288085"/>
+        <p14:creationId xmlns:p14="http://schemas.microsoft.com/office/powerpoint/2010/main" val="2843772448"/>
       </p:ext>
     </p:extLst>
   </p:cSld>
@@ -9433,7 +9433,7 @@
           <a:p>
             <a:fld id="{C07C5E14-300D-4720-B5FE-54C7D96D4160}" type="datetime4">
               <a:rPr lang="en-US" smtClean="0"/>
-              <a:t>September 21, 2018</a:t>
+              <a:t>September 24, 2018</a:t>
             </a:fld>
             <a:endParaRPr/>
           </a:p>
@@ -9769,7 +9769,7 @@
           <a:p>
             <a:fld id="{26B45FFC-9EEF-4E69-85F5-C8F54747804D}" type="datetime4">
               <a:rPr lang="en-US" smtClean="0"/>
-              <a:t>September 21, 2018</a:t>
+              <a:t>September 24, 2018</a:t>
             </a:fld>
             <a:endParaRPr/>
           </a:p>
@@ -10003,7 +10003,7 @@
           <a:p>
             <a:fld id="{684E3265-88A3-4C30-AE11-BFDF645909E9}" type="datetime4">
               <a:rPr lang="en-US" smtClean="0"/>
-              <a:t>September 21, 2018</a:t>
+              <a:t>September 24, 2018</a:t>
             </a:fld>
             <a:endParaRPr/>
           </a:p>
@@ -10114,7 +10114,7 @@
           <a:p>
             <a:fld id="{E9F763D2-AF56-4C60-80C7-7D8FC051005C}" type="datetime4">
               <a:rPr lang="en-US" smtClean="0"/>
-              <a:t>September 21, 2018</a:t>
+              <a:t>September 24, 2018</a:t>
             </a:fld>
             <a:endParaRPr/>
           </a:p>
@@ -10392,7 +10392,7 @@
           <a:p>
             <a:fld id="{65FD8143-BFA3-46F8-9B90-B0E5CFAF7F7C}" type="datetime4">
               <a:rPr lang="en-US" smtClean="0"/>
-              <a:t>September 21, 2018</a:t>
+              <a:t>September 24, 2018</a:t>
             </a:fld>
             <a:endParaRPr/>
           </a:p>
@@ -14689,11 +14689,6 @@
               </a:rPr>
               <a:t>. .”</a:t>
             </a:r>
-            <a:endParaRPr lang="en-US" sz="1100" i="1" dirty="0">
-              <a:solidFill>
-                <a:schemeClr val="tx1"/>
-              </a:solidFill>
-            </a:endParaRPr>
           </a:p>
           <a:p>
             <a:pPr marL="111125" indent="-171450" algn="r">
@@ -15045,11 +15040,6 @@
               </a:rPr>
               <a:t>. .”</a:t>
             </a:r>
-            <a:endParaRPr lang="en-US" sz="1100" i="1" dirty="0">
-              <a:solidFill>
-                <a:schemeClr val="tx1"/>
-              </a:solidFill>
-            </a:endParaRPr>
           </a:p>
           <a:p>
             <a:pPr algn="r">
@@ -43468,22 +43458,121 @@
       </p:grpSpPr>
       <p:sp>
         <p:nvSpPr>
-          <p:cNvPr id="28" name="Rectangle 55"/>
+          <p:cNvPr id="2" name="Title 1"/>
+          <p:cNvSpPr>
+            <a:spLocks noGrp="1"/>
+          </p:cNvSpPr>
+          <p:nvPr>
+            <p:ph type="title"/>
+          </p:nvPr>
+        </p:nvSpPr>
+        <p:spPr>
+          <a:xfrm>
+            <a:off x="612456" y="510831"/>
+            <a:ext cx="10969943" cy="406820"/>
+          </a:xfrm>
+        </p:spPr>
+        <p:txBody>
+          <a:bodyPr/>
+          <a:lstStyle/>
+          <a:p>
+            <a:r>
+              <a:rPr sz="2800" dirty="0">
+                <a:latin typeface="Arial"/>
+              </a:rPr>
+              <a:t>Industry Insights </a:t>
+            </a:r>
+            <a:r>
+              <a:rPr lang="en-US" dirty="0"/>
+              <a:t>(XXX - XXX)</a:t>
+            </a:r>
+          </a:p>
+        </p:txBody>
+      </p:sp>
+      <p:sp>
+        <p:nvSpPr>
+          <p:cNvPr id="3" name="Slide Number Placeholder 2"/>
+          <p:cNvSpPr>
+            <a:spLocks noGrp="1"/>
+          </p:cNvSpPr>
+          <p:nvPr>
+            <p:ph type="sldNum" sz="quarter" idx="12"/>
+          </p:nvPr>
+        </p:nvSpPr>
+        <p:spPr>
+          <a:xfrm>
+            <a:off x="11031049" y="6506675"/>
+            <a:ext cx="533399" cy="232147"/>
+          </a:xfrm>
+        </p:spPr>
+        <p:txBody>
+          <a:bodyPr/>
+          <a:lstStyle/>
+          <a:p>
+            <a:fld id="{B016F8AB-BCEA-4347-8BA6-BE776009BC89}" type="slidenum">
+              <a:rPr lang="en-US" smtClean="0"/>
+              <a:pPr/>
+              <a:t>9</a:t>
+            </a:fld>
+            <a:endParaRPr lang="en-US"/>
+          </a:p>
+        </p:txBody>
+      </p:sp>
+      <p:sp>
+        <p:nvSpPr>
+          <p:cNvPr id="5" name="Rectangle 4"/>
+          <p:cNvSpPr/>
+          <p:nvPr/>
+        </p:nvSpPr>
+        <p:spPr>
+          <a:xfrm>
+            <a:off x="4440383" y="6636384"/>
+            <a:ext cx="7592160" cy="216982"/>
+          </a:xfrm>
+          <a:prstGeom prst="rect">
+            <a:avLst/>
+          </a:prstGeom>
+        </p:spPr>
+        <p:txBody>
+          <a:bodyPr wrap="square">
+            <a:spAutoFit/>
+          </a:bodyPr>
+          <a:lstStyle/>
+          <a:p>
+            <a:pPr marL="52388" lvl="0" indent="-52388">
+              <a:lnSpc>
+                <a:spcPct val="90000"/>
+              </a:lnSpc>
+            </a:pPr>
+            <a:r>
+              <a:rPr lang="en-US" sz="900" i="1" dirty="0">
+                <a:solidFill>
+                  <a:prstClr val="black"/>
+                </a:solidFill>
+              </a:rPr>
+              <a:t>*Briefings categorized into ’Other’ category include multi-customer engagements and accounts not aligned into a category in Salesforce.</a:t>
+            </a:r>
+          </a:p>
+        </p:txBody>
+      </p:sp>
+      <p:sp>
+        <p:nvSpPr>
+          <p:cNvPr id="179" name="Rectangle 55"/>
           <p:cNvSpPr/>
           <p:nvPr/>
         </p:nvSpPr>
         <p:spPr bwMode="ltGray">
           <a:xfrm>
-            <a:off x="5152698" y="1071736"/>
-            <a:ext cx="6159794" cy="928966"/>
+            <a:off x="9294090" y="1372585"/>
+            <a:ext cx="2286000" cy="2286000"/>
           </a:xfrm>
           <a:prstGeom prst="rect">
             <a:avLst/>
           </a:prstGeom>
           <a:noFill/>
-          <a:ln w="28575">
+          <a:ln w="38100">
             <a:solidFill>
-              <a:schemeClr val="bg2"/>
+              <a:schemeClr val="accent4"/>
             </a:solidFill>
           </a:ln>
         </p:spPr>
@@ -43504,10 +43593,33 @@
           </a:fontRef>
         </p:style>
         <p:txBody>
-          <a:bodyPr lIns="182880" tIns="182880" rIns="182880" bIns="182880" rtlCol="0" anchor="ctr"/>
+          <a:bodyPr lIns="182880" tIns="182880" rIns="182880" bIns="182880" rtlCol="0" anchor="t"/>
           <a:lstStyle/>
           <a:p>
-            <a:endParaRPr lang="en-US" sz="1200" b="1" dirty="0">
+            <a:pPr marL="45720" indent="-60325">
+              <a:spcBef>
+                <a:spcPts val="1200"/>
+              </a:spcBef>
+              <a:buClr>
+                <a:prstClr val="black"/>
+              </a:buClr>
+            </a:pPr>
+            <a:endParaRPr lang="en-US" sz="1000" dirty="0">
+              <a:solidFill>
+                <a:schemeClr val="tx1"/>
+              </a:solidFill>
+            </a:endParaRPr>
+          </a:p>
+          <a:p>
+            <a:pPr marL="45720" lvl="0" indent="-60325">
+              <a:spcBef>
+                <a:spcPts val="1200"/>
+              </a:spcBef>
+              <a:buClr>
+                <a:prstClr val="black"/>
+              </a:buClr>
+            </a:pPr>
+            <a:endParaRPr lang="en-US" sz="1100" i="1" dirty="0" smtClean="0">
               <a:solidFill>
                 <a:schemeClr val="tx1"/>
               </a:solidFill>
@@ -43517,197 +43629,44 @@
       </p:sp>
       <p:sp>
         <p:nvSpPr>
-          <p:cNvPr id="29" name="Rectangle 55"/>
+          <p:cNvPr id="182" name="Rectangle 181"/>
           <p:cNvSpPr/>
           <p:nvPr/>
         </p:nvSpPr>
-        <p:spPr bwMode="ltGray">
+        <p:spPr>
           <a:xfrm>
-            <a:off x="5152698" y="2079710"/>
-            <a:ext cx="6159794" cy="928966"/>
+            <a:off x="10573782" y="1382099"/>
+            <a:ext cx="990666" cy="210968"/>
           </a:xfrm>
           <a:prstGeom prst="rect">
             <a:avLst/>
           </a:prstGeom>
-          <a:noFill/>
-          <a:ln w="28575">
-            <a:solidFill>
-              <a:schemeClr val="bg2"/>
-            </a:solidFill>
-          </a:ln>
         </p:spPr>
-        <p:style>
-          <a:lnRef idx="2">
-            <a:schemeClr val="accent1">
-              <a:shade val="50000"/>
-            </a:schemeClr>
-          </a:lnRef>
-          <a:fillRef idx="1">
-            <a:schemeClr val="accent1"/>
-          </a:fillRef>
-          <a:effectRef idx="0">
-            <a:schemeClr val="accent1"/>
-          </a:effectRef>
-          <a:fontRef idx="minor">
-            <a:schemeClr val="lt1"/>
-          </a:fontRef>
-        </p:style>
         <p:txBody>
-          <a:bodyPr lIns="182880" tIns="182880" rIns="182880" bIns="182880" rtlCol="0" anchor="ctr"/>
+          <a:bodyPr wrap="square" numCol="1" anchor="t">
+            <a:noAutofit/>
+          </a:bodyPr>
           <a:lstStyle/>
           <a:p>
-            <a:endParaRPr lang="en-US" sz="1200" b="1" dirty="0">
-              <a:solidFill>
-                <a:schemeClr val="tx1"/>
-              </a:solidFill>
-            </a:endParaRPr>
-          </a:p>
-        </p:txBody>
-      </p:sp>
-      <p:sp>
-        <p:nvSpPr>
-          <p:cNvPr id="30" name="Rectangle 55"/>
-          <p:cNvSpPr/>
-          <p:nvPr/>
-        </p:nvSpPr>
-        <p:spPr bwMode="ltGray">
-          <a:xfrm>
-            <a:off x="5152698" y="3087683"/>
-            <a:ext cx="6159794" cy="928966"/>
-          </a:xfrm>
-          <a:prstGeom prst="rect">
-            <a:avLst/>
-          </a:prstGeom>
-          <a:noFill/>
-          <a:ln w="28575">
-            <a:solidFill>
-              <a:schemeClr val="bg2"/>
-            </a:solidFill>
-          </a:ln>
-        </p:spPr>
-        <p:style>
-          <a:lnRef idx="2">
-            <a:schemeClr val="accent1">
-              <a:shade val="50000"/>
-            </a:schemeClr>
-          </a:lnRef>
-          <a:fillRef idx="1">
-            <a:schemeClr val="accent1"/>
-          </a:fillRef>
-          <a:effectRef idx="0">
-            <a:schemeClr val="accent1"/>
-          </a:effectRef>
-          <a:fontRef idx="minor">
-            <a:schemeClr val="lt1"/>
-          </a:fontRef>
-        </p:style>
-        <p:txBody>
-          <a:bodyPr lIns="182880" tIns="182880" rIns="182880" bIns="182880" rtlCol="0" anchor="ctr"/>
-          <a:lstStyle/>
-          <a:p>
-            <a:endParaRPr lang="en-US" sz="1200" b="1" dirty="0">
-              <a:solidFill>
-                <a:schemeClr val="tx1"/>
-              </a:solidFill>
-            </a:endParaRPr>
-          </a:p>
-        </p:txBody>
-      </p:sp>
-      <p:sp>
-        <p:nvSpPr>
-          <p:cNvPr id="31" name="Rectangle 55"/>
-          <p:cNvSpPr/>
-          <p:nvPr/>
-        </p:nvSpPr>
-        <p:spPr bwMode="ltGray">
-          <a:xfrm>
-            <a:off x="5152698" y="4095657"/>
-            <a:ext cx="6159794" cy="928966"/>
-          </a:xfrm>
-          <a:prstGeom prst="rect">
-            <a:avLst/>
-          </a:prstGeom>
-          <a:noFill/>
-          <a:ln w="28575">
-            <a:solidFill>
-              <a:schemeClr val="bg2"/>
-            </a:solidFill>
-          </a:ln>
-        </p:spPr>
-        <p:style>
-          <a:lnRef idx="2">
-            <a:schemeClr val="accent1">
-              <a:shade val="50000"/>
-            </a:schemeClr>
-          </a:lnRef>
-          <a:fillRef idx="1">
-            <a:schemeClr val="accent1"/>
-          </a:fillRef>
-          <a:effectRef idx="0">
-            <a:schemeClr val="accent1"/>
-          </a:effectRef>
-          <a:fontRef idx="minor">
-            <a:schemeClr val="lt1"/>
-          </a:fontRef>
-        </p:style>
-        <p:txBody>
-          <a:bodyPr lIns="182880" tIns="182880" rIns="182880" bIns="182880" rtlCol="0" anchor="ctr"/>
-          <a:lstStyle/>
-          <a:p>
-            <a:endParaRPr lang="en-US" sz="1200" b="1" dirty="0">
-              <a:solidFill>
-                <a:schemeClr val="tx1"/>
-              </a:solidFill>
-            </a:endParaRPr>
-          </a:p>
-        </p:txBody>
-      </p:sp>
-      <p:sp>
-        <p:nvSpPr>
-          <p:cNvPr id="32" name="Rectangle 55"/>
-          <p:cNvSpPr/>
-          <p:nvPr/>
-        </p:nvSpPr>
-        <p:spPr bwMode="ltGray">
-          <a:xfrm>
-            <a:off x="5152698" y="5103632"/>
-            <a:ext cx="6159794" cy="928966"/>
-          </a:xfrm>
-          <a:prstGeom prst="rect">
-            <a:avLst/>
-          </a:prstGeom>
-          <a:noFill/>
-          <a:ln w="28575">
-            <a:solidFill>
-              <a:schemeClr val="bg2"/>
-            </a:solidFill>
-          </a:ln>
-        </p:spPr>
-        <p:style>
-          <a:lnRef idx="2">
-            <a:schemeClr val="accent1">
-              <a:shade val="50000"/>
-            </a:schemeClr>
-          </a:lnRef>
-          <a:fillRef idx="1">
-            <a:schemeClr val="accent1"/>
-          </a:fillRef>
-          <a:effectRef idx="0">
-            <a:schemeClr val="accent1"/>
-          </a:effectRef>
-          <a:fontRef idx="minor">
-            <a:schemeClr val="lt1"/>
-          </a:fontRef>
-        </p:style>
-        <p:txBody>
-          <a:bodyPr lIns="182880" tIns="182880" rIns="182880" bIns="182880" rtlCol="0" anchor="ctr"/>
-          <a:lstStyle/>
-          <a:p>
-            <a:endParaRPr lang="en-US" sz="1200" b="1" dirty="0" smtClean="0">
-              <a:solidFill>
-                <a:schemeClr val="tx1"/>
-              </a:solidFill>
-            </a:endParaRPr>
+            <a:pPr algn="ctr">
+              <a:lnSpc>
+                <a:spcPct val="90000"/>
+              </a:lnSpc>
+              <a:defRPr sz="1000" b="1">
+                <a:solidFill>
+                  <a:schemeClr val="dk1"/>
+                </a:solidFill>
+              </a:defRPr>
+            </a:pPr>
+            <a:r>
+              <a:rPr lang="en-US" sz="1100" dirty="0" smtClean="0"/>
+              <a:t>Top interests</a:t>
+            </a:r>
+            <a:r>
+              <a:rPr dirty="0" smtClean="0"/>
+              <a:t> </a:t>
+            </a:r>
+            <a:endParaRPr dirty="0"/>
           </a:p>
         </p:txBody>
       </p:sp>
@@ -43719,8 +43678,8 @@
         </p:nvSpPr>
         <p:spPr bwMode="ltGray">
           <a:xfrm>
-            <a:off x="1412081" y="1071736"/>
-            <a:ext cx="3656570" cy="4960862"/>
+            <a:off x="616823" y="1998511"/>
+            <a:ext cx="3101977" cy="3075611"/>
           </a:xfrm>
           <a:prstGeom prst="rect">
             <a:avLst/>
@@ -43765,78 +43724,96 @@
                 <a:cs typeface="+mn-cs"/>
               </a:defRPr>
             </a:pPr>
-            <a:r>
-              <a:rPr lang="en-US" sz="1600" b="1" dirty="0">
-                <a:solidFill>
-                  <a:schemeClr val="tx1"/>
-                </a:solidFill>
-              </a:rPr>
-              <a:t>Briefing volume by Industry</a:t>
-            </a:r>
+            <a:endParaRPr lang="en-US" sz="1600" b="1" dirty="0">
+              <a:solidFill>
+                <a:schemeClr val="tx1"/>
+              </a:solidFill>
+            </a:endParaRPr>
           </a:p>
         </p:txBody>
       </p:sp>
       <p:sp>
         <p:nvSpPr>
-          <p:cNvPr id="2" name="Title 1"/>
-          <p:cNvSpPr>
-            <a:spLocks noGrp="1"/>
-          </p:cNvSpPr>
-          <p:nvPr>
-            <p:ph type="title"/>
-          </p:nvPr>
+          <p:cNvPr id="60" name="Rectangle 55"/>
+          <p:cNvSpPr/>
+          <p:nvPr/>
         </p:nvSpPr>
-        <p:spPr/>
+        <p:spPr bwMode="ltGray">
+          <a:xfrm>
+            <a:off x="6891018" y="1372130"/>
+            <a:ext cx="2286000" cy="2286000"/>
+          </a:xfrm>
+          <a:prstGeom prst="rect">
+            <a:avLst/>
+          </a:prstGeom>
+          <a:noFill/>
+          <a:ln w="38100">
+            <a:solidFill>
+              <a:schemeClr val="accent4"/>
+            </a:solidFill>
+          </a:ln>
+        </p:spPr>
+        <p:style>
+          <a:lnRef idx="2">
+            <a:schemeClr val="accent1">
+              <a:shade val="50000"/>
+            </a:schemeClr>
+          </a:lnRef>
+          <a:fillRef idx="1">
+            <a:schemeClr val="accent1"/>
+          </a:fillRef>
+          <a:effectRef idx="0">
+            <a:schemeClr val="accent1"/>
+          </a:effectRef>
+          <a:fontRef idx="minor">
+            <a:schemeClr val="lt1"/>
+          </a:fontRef>
+        </p:style>
         <p:txBody>
-          <a:bodyPr/>
+          <a:bodyPr lIns="182880" tIns="182880" rIns="182880" bIns="182880" rtlCol="0" anchor="t"/>
           <a:lstStyle/>
           <a:p>
-            <a:r>
-              <a:rPr lang="en-US" dirty="0"/>
-              <a:t>Industry insights </a:t>
-            </a:r>
-            <a:r>
-              <a:rPr lang="en-US" dirty="0" smtClean="0"/>
-              <a:t>(XXX - XXX)</a:t>
-            </a:r>
-            <a:endParaRPr lang="en-US" dirty="0"/>
+            <a:pPr marL="45720" indent="-60325">
+              <a:spcBef>
+                <a:spcPts val="1200"/>
+              </a:spcBef>
+              <a:buClr>
+                <a:prstClr val="black"/>
+              </a:buClr>
+            </a:pPr>
+            <a:endParaRPr lang="en-US" sz="1000" dirty="0">
+              <a:solidFill>
+                <a:schemeClr val="tx1"/>
+              </a:solidFill>
+            </a:endParaRPr>
+          </a:p>
+          <a:p>
+            <a:pPr marL="45720" lvl="0" indent="-60325">
+              <a:spcBef>
+                <a:spcPts val="1200"/>
+              </a:spcBef>
+              <a:buClr>
+                <a:prstClr val="black"/>
+              </a:buClr>
+            </a:pPr>
+            <a:endParaRPr lang="en-US" sz="1100" i="1" dirty="0" smtClean="0">
+              <a:solidFill>
+                <a:schemeClr val="tx1"/>
+              </a:solidFill>
+            </a:endParaRPr>
           </a:p>
         </p:txBody>
       </p:sp>
       <p:sp>
         <p:nvSpPr>
-          <p:cNvPr id="3" name="Slide Number Placeholder 2"/>
-          <p:cNvSpPr>
-            <a:spLocks noGrp="1"/>
-          </p:cNvSpPr>
-          <p:nvPr>
-            <p:ph type="sldNum" sz="quarter" idx="12"/>
-          </p:nvPr>
-        </p:nvSpPr>
-        <p:spPr/>
-        <p:txBody>
-          <a:bodyPr/>
-          <a:lstStyle/>
-          <a:p>
-            <a:fld id="{B016F8AB-BCEA-4347-8BA6-BE776009BC89}" type="slidenum">
-              <a:rPr lang="en-US" smtClean="0"/>
-              <a:pPr/>
-              <a:t>9</a:t>
-            </a:fld>
-            <a:endParaRPr lang="en-US"/>
-          </a:p>
-        </p:txBody>
-      </p:sp>
-      <p:sp>
-        <p:nvSpPr>
-          <p:cNvPr id="33" name="Rectangle 32"/>
+          <p:cNvPr id="62" name="Rectangle 61"/>
           <p:cNvSpPr/>
           <p:nvPr/>
         </p:nvSpPr>
         <p:spPr>
           <a:xfrm>
-            <a:off x="9815298" y="1170459"/>
-            <a:ext cx="1459486" cy="665842"/>
+            <a:off x="8170710" y="1381644"/>
+            <a:ext cx="990666" cy="210968"/>
           </a:xfrm>
           <a:prstGeom prst="rect">
             <a:avLst/>
@@ -43848,33 +43825,120 @@
           </a:bodyPr>
           <a:lstStyle/>
           <a:p>
-            <a:pPr>
+            <a:pPr algn="ctr">
               <a:lnSpc>
                 <a:spcPct val="90000"/>
               </a:lnSpc>
+              <a:defRPr sz="1000" b="1">
+                <a:solidFill>
+                  <a:schemeClr val="dk1"/>
+                </a:solidFill>
+              </a:defRPr>
             </a:pPr>
             <a:r>
-              <a:rPr lang="en-US" sz="900" b="1" dirty="0"/>
-              <a:t>Top </a:t>
-            </a:r>
-            <a:r>
-              <a:rPr lang="en-US" sz="900" b="1" dirty="0" smtClean="0"/>
-              <a:t>interests - 0</a:t>
-            </a:r>
-            <a:endParaRPr lang="en-US" sz="900" b="1" dirty="0"/>
+              <a:rPr lang="en-US" sz="1100" dirty="0" smtClean="0"/>
+              <a:t>Top interests</a:t>
+            </a:r>
+            <a:endParaRPr lang="en-US" sz="1100" b="1" dirty="0"/>
+          </a:p>
+          <a:p>
+            <a:pPr>
+              <a:defRPr sz="800">
+                <a:solidFill>
+                  <a:schemeClr val="dk2"/>
+                </a:solidFill>
+              </a:defRPr>
+            </a:pPr>
+            <a:r>
+              <a:rPr dirty="0" smtClean="0"/>
+              <a:t> </a:t>
+            </a:r>
+            <a:endParaRPr dirty="0"/>
           </a:p>
         </p:txBody>
       </p:sp>
       <p:sp>
         <p:nvSpPr>
-          <p:cNvPr id="34" name="Rectangle 33"/>
+          <p:cNvPr id="70" name="Rectangle 55"/>
+          <p:cNvSpPr/>
+          <p:nvPr/>
+        </p:nvSpPr>
+        <p:spPr bwMode="ltGray">
+          <a:xfrm>
+            <a:off x="4488571" y="1383028"/>
+            <a:ext cx="2286000" cy="2286000"/>
+          </a:xfrm>
+          <a:prstGeom prst="rect">
+            <a:avLst/>
+          </a:prstGeom>
+          <a:noFill/>
+          <a:ln w="38100">
+            <a:solidFill>
+              <a:schemeClr val="accent4"/>
+            </a:solidFill>
+          </a:ln>
+        </p:spPr>
+        <p:style>
+          <a:lnRef idx="2">
+            <a:schemeClr val="accent1">
+              <a:shade val="50000"/>
+            </a:schemeClr>
+          </a:lnRef>
+          <a:fillRef idx="1">
+            <a:schemeClr val="accent1"/>
+          </a:fillRef>
+          <a:effectRef idx="0">
+            <a:schemeClr val="accent1"/>
+          </a:effectRef>
+          <a:fontRef idx="minor">
+            <a:schemeClr val="lt1"/>
+          </a:fontRef>
+        </p:style>
+        <p:txBody>
+          <a:bodyPr lIns="182880" tIns="182880" rIns="182880" bIns="182880" rtlCol="0" anchor="t"/>
+          <a:lstStyle/>
+          <a:p>
+            <a:pPr marL="45720" indent="-60325">
+              <a:spcBef>
+                <a:spcPts val="1200"/>
+              </a:spcBef>
+              <a:buClr>
+                <a:prstClr val="black"/>
+              </a:buClr>
+            </a:pPr>
+            <a:endParaRPr lang="en-US" sz="1000" dirty="0">
+              <a:solidFill>
+                <a:schemeClr val="tx1"/>
+              </a:solidFill>
+            </a:endParaRPr>
+          </a:p>
+          <a:p>
+            <a:pPr marL="45720" lvl="0" indent="-60325">
+              <a:spcBef>
+                <a:spcPts val="1200"/>
+              </a:spcBef>
+              <a:buClr>
+                <a:prstClr val="black"/>
+              </a:buClr>
+            </a:pPr>
+            <a:endParaRPr lang="en-US" sz="1100" i="1" dirty="0" smtClean="0">
+              <a:solidFill>
+                <a:schemeClr val="tx1"/>
+              </a:solidFill>
+            </a:endParaRPr>
+          </a:p>
+        </p:txBody>
+      </p:sp>
+      <p:sp>
+        <p:nvSpPr>
+          <p:cNvPr id="72" name="Rectangle 71"/>
           <p:cNvSpPr/>
           <p:nvPr/>
         </p:nvSpPr>
         <p:spPr>
           <a:xfrm>
-            <a:off x="9815298" y="2169006"/>
-            <a:ext cx="1459486" cy="644084"/>
+            <a:off x="5768263" y="1392541"/>
+            <a:ext cx="990666" cy="335599"/>
           </a:xfrm>
           <a:prstGeom prst="rect">
             <a:avLst/>
@@ -43886,33 +43950,224 @@
           </a:bodyPr>
           <a:lstStyle/>
           <a:p>
-            <a:pPr>
+            <a:pPr algn="ctr">
               <a:lnSpc>
                 <a:spcPct val="90000"/>
               </a:lnSpc>
+              <a:defRPr sz="1000" b="1">
+                <a:solidFill>
+                  <a:schemeClr val="dk1"/>
+                </a:solidFill>
+              </a:defRPr>
             </a:pPr>
             <a:r>
-              <a:rPr lang="en-US" sz="900" b="1" dirty="0"/>
+              <a:rPr sz="1100" dirty="0"/>
               <a:t>Top </a:t>
             </a:r>
             <a:r>
-              <a:rPr lang="en-US" sz="900" b="1" dirty="0" smtClean="0"/>
-              <a:t>interests - 1</a:t>
-            </a:r>
-            <a:endParaRPr lang="en-US" sz="900" b="1" dirty="0"/>
+              <a:rPr lang="en-US" sz="1100" dirty="0" smtClean="0"/>
+              <a:t>interests</a:t>
+            </a:r>
+            <a:endParaRPr lang="en-US" sz="1100" b="1" dirty="0"/>
+          </a:p>
+          <a:p>
+            <a:pPr>
+              <a:defRPr sz="800">
+                <a:solidFill>
+                  <a:schemeClr val="dk2"/>
+                </a:solidFill>
+              </a:defRPr>
+            </a:pPr>
+            <a:r>
+              <a:rPr dirty="0" smtClean="0"/>
+              <a:t> </a:t>
+            </a:r>
+            <a:endParaRPr dirty="0"/>
           </a:p>
         </p:txBody>
       </p:sp>
       <p:sp>
         <p:nvSpPr>
-          <p:cNvPr id="35" name="Rectangle 34"/>
+          <p:cNvPr id="75" name="Rectangle 74"/>
           <p:cNvSpPr/>
           <p:nvPr/>
         </p:nvSpPr>
         <p:spPr>
           <a:xfrm>
-            <a:off x="9815298" y="3167552"/>
-            <a:ext cx="1459486" cy="665842"/>
+            <a:off x="5768263" y="3382305"/>
+            <a:ext cx="990041" cy="220421"/>
+          </a:xfrm>
+          <a:prstGeom prst="rect">
+            <a:avLst/>
+          </a:prstGeom>
+        </p:spPr>
+        <p:txBody>
+          <a:bodyPr wrap="none" anchor="ctr" anchorCtr="0">
+            <a:normAutofit fontScale="92500" lnSpcReduction="10000"/>
+          </a:bodyPr>
+          <a:lstStyle/>
+          <a:p>
+            <a:pPr algn="ctr"/>
+            <a:r>
+              <a:rPr lang="en-US" sz="1000" dirty="0" smtClean="0"/>
+              <a:t>0-interest-2</a:t>
+            </a:r>
+            <a:endParaRPr lang="en-GB" sz="800" dirty="0"/>
+          </a:p>
+        </p:txBody>
+      </p:sp>
+      <p:sp>
+        <p:nvSpPr>
+          <p:cNvPr id="77" name="TextBox 76"/>
+          <p:cNvSpPr txBox="1"/>
+          <p:nvPr/>
+        </p:nvSpPr>
+        <p:spPr>
+          <a:xfrm>
+            <a:off x="5768263" y="2129614"/>
+            <a:ext cx="990041" cy="236514"/>
+          </a:xfrm>
+          <a:prstGeom prst="rect">
+            <a:avLst/>
+          </a:prstGeom>
+          <a:noFill/>
+        </p:spPr>
+        <p:txBody>
+          <a:bodyPr wrap="none" lIns="0" tIns="0" rIns="0" bIns="0" rtlCol="0" anchor="ctr" anchorCtr="0">
+            <a:normAutofit/>
+          </a:bodyPr>
+          <a:lstStyle/>
+          <a:p>
+            <a:pPr algn="ctr">
+              <a:lnSpc>
+                <a:spcPct val="90000"/>
+              </a:lnSpc>
+            </a:pPr>
+            <a:r>
+              <a:rPr lang="en-US" sz="1000" dirty="0" smtClean="0"/>
+              <a:t>0-interest-0</a:t>
+            </a:r>
+            <a:endParaRPr lang="en-US" sz="1000" dirty="0"/>
+          </a:p>
+        </p:txBody>
+      </p:sp>
+      <p:sp>
+        <p:nvSpPr>
+          <p:cNvPr id="78" name="TextBox 77"/>
+          <p:cNvSpPr txBox="1"/>
+          <p:nvPr/>
+        </p:nvSpPr>
+        <p:spPr>
+          <a:xfrm>
+            <a:off x="5768263" y="2766831"/>
+            <a:ext cx="990041" cy="214771"/>
+          </a:xfrm>
+          <a:prstGeom prst="rect">
+            <a:avLst/>
+          </a:prstGeom>
+          <a:noFill/>
+        </p:spPr>
+        <p:txBody>
+          <a:bodyPr wrap="none" lIns="0" tIns="0" rIns="0" bIns="0" rtlCol="0" anchor="ctr" anchorCtr="0">
+            <a:normAutofit/>
+          </a:bodyPr>
+          <a:lstStyle/>
+          <a:p>
+            <a:pPr algn="ctr">
+              <a:lnSpc>
+                <a:spcPct val="90000"/>
+              </a:lnSpc>
+            </a:pPr>
+            <a:r>
+              <a:rPr lang="en-US" sz="1000" dirty="0" smtClean="0"/>
+              <a:t>0-interest-1</a:t>
+            </a:r>
+            <a:endParaRPr lang="en-US" sz="1000" dirty="0"/>
+          </a:p>
+        </p:txBody>
+      </p:sp>
+      <p:sp>
+        <p:nvSpPr>
+          <p:cNvPr id="81" name="Rectangle 55"/>
+          <p:cNvSpPr/>
+          <p:nvPr/>
+        </p:nvSpPr>
+        <p:spPr bwMode="ltGray">
+          <a:xfrm>
+            <a:off x="9294090" y="4082556"/>
+            <a:ext cx="2286000" cy="2286000"/>
+          </a:xfrm>
+          <a:prstGeom prst="rect">
+            <a:avLst/>
+          </a:prstGeom>
+          <a:noFill/>
+          <a:ln w="38100">
+            <a:solidFill>
+              <a:schemeClr val="accent4"/>
+            </a:solidFill>
+          </a:ln>
+        </p:spPr>
+        <p:style>
+          <a:lnRef idx="2">
+            <a:schemeClr val="accent1">
+              <a:shade val="50000"/>
+            </a:schemeClr>
+          </a:lnRef>
+          <a:fillRef idx="1">
+            <a:schemeClr val="accent1"/>
+          </a:fillRef>
+          <a:effectRef idx="0">
+            <a:schemeClr val="accent1"/>
+          </a:effectRef>
+          <a:fontRef idx="minor">
+            <a:schemeClr val="lt1"/>
+          </a:fontRef>
+        </p:style>
+        <p:txBody>
+          <a:bodyPr lIns="182880" tIns="182880" rIns="182880" bIns="182880" rtlCol="0" anchor="t"/>
+          <a:lstStyle/>
+          <a:p>
+            <a:pPr marL="45720" indent="-60325">
+              <a:spcBef>
+                <a:spcPts val="1200"/>
+              </a:spcBef>
+              <a:buClr>
+                <a:prstClr val="black"/>
+              </a:buClr>
+            </a:pPr>
+            <a:endParaRPr lang="en-US" sz="1000" dirty="0">
+              <a:solidFill>
+                <a:schemeClr val="tx1"/>
+              </a:solidFill>
+            </a:endParaRPr>
+          </a:p>
+          <a:p>
+            <a:pPr marL="45720" lvl="0" indent="-60325">
+              <a:spcBef>
+                <a:spcPts val="1200"/>
+              </a:spcBef>
+              <a:buClr>
+                <a:prstClr val="black"/>
+              </a:buClr>
+            </a:pPr>
+            <a:endParaRPr lang="en-US" sz="1100" i="1" dirty="0" smtClean="0">
+              <a:solidFill>
+                <a:schemeClr val="tx1"/>
+              </a:solidFill>
+            </a:endParaRPr>
+          </a:p>
+        </p:txBody>
+      </p:sp>
+      <p:sp>
+        <p:nvSpPr>
+          <p:cNvPr id="84" name="Rectangle 83"/>
+          <p:cNvSpPr/>
+          <p:nvPr/>
+        </p:nvSpPr>
+        <p:spPr>
+          <a:xfrm>
+            <a:off x="10573782" y="4092525"/>
+            <a:ext cx="990666" cy="210968"/>
           </a:xfrm>
           <a:prstGeom prst="rect">
             <a:avLst/>
@@ -43924,33 +44179,124 @@
           </a:bodyPr>
           <a:lstStyle/>
           <a:p>
-            <a:pPr>
+            <a:pPr algn="ctr">
               <a:lnSpc>
                 <a:spcPct val="90000"/>
               </a:lnSpc>
+              <a:defRPr sz="1000" b="1">
+                <a:solidFill>
+                  <a:schemeClr val="dk1"/>
+                </a:solidFill>
+              </a:defRPr>
             </a:pPr>
             <a:r>
-              <a:rPr lang="en-US" sz="900" b="1" dirty="0"/>
+              <a:rPr sz="1100" dirty="0"/>
               <a:t>Top </a:t>
             </a:r>
             <a:r>
-              <a:rPr lang="en-US" sz="900" b="1" dirty="0" smtClean="0"/>
-              <a:t>interests - 2</a:t>
-            </a:r>
-            <a:endParaRPr lang="en-US" sz="900" b="1" dirty="0"/>
+              <a:rPr lang="en-US" sz="1100" dirty="0" smtClean="0"/>
+              <a:t>interests</a:t>
+            </a:r>
+            <a:endParaRPr lang="en-US" sz="1100" b="1" dirty="0"/>
+          </a:p>
+          <a:p>
+            <a:pPr>
+              <a:defRPr sz="800">
+                <a:solidFill>
+                  <a:schemeClr val="dk2"/>
+                </a:solidFill>
+              </a:defRPr>
+            </a:pPr>
+            <a:r>
+              <a:rPr dirty="0" smtClean="0"/>
+              <a:t> </a:t>
+            </a:r>
+            <a:endParaRPr dirty="0"/>
           </a:p>
         </p:txBody>
       </p:sp>
       <p:sp>
         <p:nvSpPr>
-          <p:cNvPr id="36" name="Rectangle 35"/>
+          <p:cNvPr id="93" name="Rectangle 55"/>
+          <p:cNvSpPr/>
+          <p:nvPr/>
+        </p:nvSpPr>
+        <p:spPr bwMode="ltGray">
+          <a:xfrm>
+            <a:off x="6891018" y="4082556"/>
+            <a:ext cx="2286000" cy="2286000"/>
+          </a:xfrm>
+          <a:prstGeom prst="rect">
+            <a:avLst/>
+          </a:prstGeom>
+          <a:noFill/>
+          <a:ln w="38100">
+            <a:solidFill>
+              <a:schemeClr val="accent4"/>
+            </a:solidFill>
+          </a:ln>
+        </p:spPr>
+        <p:style>
+          <a:lnRef idx="2">
+            <a:schemeClr val="accent1">
+              <a:shade val="50000"/>
+            </a:schemeClr>
+          </a:lnRef>
+          <a:fillRef idx="1">
+            <a:schemeClr val="accent1"/>
+          </a:fillRef>
+          <a:effectRef idx="0">
+            <a:schemeClr val="accent1"/>
+          </a:effectRef>
+          <a:fontRef idx="minor">
+            <a:schemeClr val="lt1"/>
+          </a:fontRef>
+        </p:style>
+        <p:txBody>
+          <a:bodyPr lIns="182880" tIns="182880" rIns="182880" bIns="182880" rtlCol="0" anchor="t"/>
+          <a:lstStyle/>
+          <a:p>
+            <a:pPr marL="45720" indent="-60325">
+              <a:spcBef>
+                <a:spcPts val="1200"/>
+              </a:spcBef>
+              <a:buClr>
+                <a:prstClr val="black"/>
+              </a:buClr>
+            </a:pPr>
+            <a:endParaRPr lang="en-US" sz="1000" dirty="0">
+              <a:solidFill>
+                <a:schemeClr val="tx1"/>
+              </a:solidFill>
+            </a:endParaRPr>
+          </a:p>
+          <a:p>
+            <a:pPr marL="45720" lvl="0" indent="-60325">
+              <a:spcBef>
+                <a:spcPts val="1200"/>
+              </a:spcBef>
+              <a:buClr>
+                <a:prstClr val="black"/>
+              </a:buClr>
+            </a:pPr>
+            <a:endParaRPr lang="en-US" sz="1100" i="1" dirty="0" smtClean="0">
+              <a:solidFill>
+                <a:schemeClr val="tx1"/>
+              </a:solidFill>
+            </a:endParaRPr>
+          </a:p>
+        </p:txBody>
+      </p:sp>
+      <p:sp>
+        <p:nvSpPr>
+          <p:cNvPr id="95" name="Rectangle 94"/>
           <p:cNvSpPr/>
           <p:nvPr/>
         </p:nvSpPr>
         <p:spPr>
           <a:xfrm>
-            <a:off x="9815298" y="4175526"/>
-            <a:ext cx="1459486" cy="673537"/>
+            <a:off x="8170710" y="4092070"/>
+            <a:ext cx="990666" cy="210968"/>
           </a:xfrm>
           <a:prstGeom prst="rect">
             <a:avLst/>
@@ -43962,33 +44308,124 @@
           </a:bodyPr>
           <a:lstStyle/>
           <a:p>
-            <a:pPr>
+            <a:pPr algn="ctr">
               <a:lnSpc>
                 <a:spcPct val="90000"/>
               </a:lnSpc>
+              <a:defRPr sz="1000" b="1">
+                <a:solidFill>
+                  <a:schemeClr val="dk1"/>
+                </a:solidFill>
+              </a:defRPr>
             </a:pPr>
             <a:r>
-              <a:rPr lang="en-US" sz="900" b="1" dirty="0"/>
+              <a:rPr sz="1100" dirty="0"/>
               <a:t>Top </a:t>
             </a:r>
             <a:r>
-              <a:rPr lang="en-US" sz="900" b="1" dirty="0" smtClean="0"/>
-              <a:t>interests - 3</a:t>
-            </a:r>
-            <a:endParaRPr lang="en-US" sz="900" b="1" dirty="0"/>
+              <a:rPr lang="en-US" sz="1100" dirty="0" smtClean="0"/>
+              <a:t>interests</a:t>
+            </a:r>
+            <a:endParaRPr lang="en-US" sz="1100" b="1" dirty="0"/>
+          </a:p>
+          <a:p>
+            <a:pPr>
+              <a:defRPr sz="800">
+                <a:solidFill>
+                  <a:schemeClr val="dk2"/>
+                </a:solidFill>
+              </a:defRPr>
+            </a:pPr>
+            <a:r>
+              <a:rPr dirty="0" smtClean="0"/>
+              <a:t> </a:t>
+            </a:r>
+            <a:endParaRPr dirty="0"/>
           </a:p>
         </p:txBody>
       </p:sp>
       <p:sp>
         <p:nvSpPr>
-          <p:cNvPr id="37" name="Rectangle 36"/>
+          <p:cNvPr id="103" name="Rectangle 55"/>
+          <p:cNvSpPr/>
+          <p:nvPr/>
+        </p:nvSpPr>
+        <p:spPr bwMode="ltGray">
+          <a:xfrm>
+            <a:off x="4488571" y="4093454"/>
+            <a:ext cx="2286000" cy="2286000"/>
+          </a:xfrm>
+          <a:prstGeom prst="rect">
+            <a:avLst/>
+          </a:prstGeom>
+          <a:noFill/>
+          <a:ln w="38100">
+            <a:solidFill>
+              <a:schemeClr val="accent4"/>
+            </a:solidFill>
+          </a:ln>
+        </p:spPr>
+        <p:style>
+          <a:lnRef idx="2">
+            <a:schemeClr val="accent1">
+              <a:shade val="50000"/>
+            </a:schemeClr>
+          </a:lnRef>
+          <a:fillRef idx="1">
+            <a:schemeClr val="accent1"/>
+          </a:fillRef>
+          <a:effectRef idx="0">
+            <a:schemeClr val="accent1"/>
+          </a:effectRef>
+          <a:fontRef idx="minor">
+            <a:schemeClr val="lt1"/>
+          </a:fontRef>
+        </p:style>
+        <p:txBody>
+          <a:bodyPr lIns="182880" tIns="182880" rIns="182880" bIns="182880" rtlCol="0" anchor="t"/>
+          <a:lstStyle/>
+          <a:p>
+            <a:pPr marL="45720" indent="-60325">
+              <a:spcBef>
+                <a:spcPts val="1200"/>
+              </a:spcBef>
+              <a:buClr>
+                <a:prstClr val="black"/>
+              </a:buClr>
+            </a:pPr>
+            <a:endParaRPr lang="en-US" sz="1000" dirty="0">
+              <a:solidFill>
+                <a:schemeClr val="tx1"/>
+              </a:solidFill>
+            </a:endParaRPr>
+          </a:p>
+          <a:p>
+            <a:pPr marL="45720" lvl="0" indent="-60325">
+              <a:spcBef>
+                <a:spcPts val="1200"/>
+              </a:spcBef>
+              <a:buClr>
+                <a:prstClr val="black"/>
+              </a:buClr>
+            </a:pPr>
+            <a:endParaRPr lang="en-US" sz="1100" i="1" dirty="0" smtClean="0">
+              <a:solidFill>
+                <a:schemeClr val="tx1"/>
+              </a:solidFill>
+            </a:endParaRPr>
+          </a:p>
+        </p:txBody>
+      </p:sp>
+      <p:sp>
+        <p:nvSpPr>
+          <p:cNvPr id="105" name="Rectangle 104"/>
           <p:cNvSpPr/>
           <p:nvPr/>
         </p:nvSpPr>
         <p:spPr>
           <a:xfrm>
-            <a:off x="9815298" y="5174348"/>
-            <a:ext cx="1459486" cy="674746"/>
+            <a:off x="5768263" y="4102968"/>
+            <a:ext cx="990666" cy="210968"/>
           </a:xfrm>
           <a:prstGeom prst="rect">
             <a:avLst/>
@@ -44000,538 +44437,463 @@
           </a:bodyPr>
           <a:lstStyle/>
           <a:p>
-            <a:pPr>
+            <a:pPr algn="ctr">
               <a:lnSpc>
                 <a:spcPct val="90000"/>
               </a:lnSpc>
+              <a:defRPr sz="1000" b="1">
+                <a:solidFill>
+                  <a:schemeClr val="dk1"/>
+                </a:solidFill>
+              </a:defRPr>
             </a:pPr>
             <a:r>
-              <a:rPr lang="en-US" sz="900" b="1" dirty="0"/>
-              <a:t>Top </a:t>
-            </a:r>
-            <a:r>
-              <a:rPr lang="en-US" sz="900" b="1" dirty="0" smtClean="0"/>
-              <a:t>interests - 4</a:t>
-            </a:r>
-            <a:endParaRPr lang="en-US" sz="900" b="1" dirty="0"/>
+              <a:rPr lang="en-US" sz="1100" dirty="0" smtClean="0"/>
+              <a:t>Top interests</a:t>
+            </a:r>
+            <a:endParaRPr lang="en-US" sz="1100" b="1" dirty="0"/>
+          </a:p>
+          <a:p>
+            <a:pPr>
+              <a:defRPr sz="800">
+                <a:solidFill>
+                  <a:schemeClr val="dk2"/>
+                </a:solidFill>
+              </a:defRPr>
+            </a:pPr>
+            <a:r>
+              <a:rPr dirty="0" smtClean="0"/>
+              <a:t> </a:t>
+            </a:r>
+            <a:endParaRPr dirty="0"/>
           </a:p>
         </p:txBody>
       </p:sp>
-      <p:cxnSp>
-        <p:nvCxnSpPr>
-          <p:cNvPr id="10" name="Straight Connector 9"/>
-          <p:cNvCxnSpPr/>
+      <p:sp>
+        <p:nvSpPr>
+          <p:cNvPr id="6" name="Rectangle 5"/>
+          <p:cNvSpPr/>
           <p:nvPr/>
-        </p:nvCxnSpPr>
-        <p:spPr>
+        </p:nvSpPr>
+        <p:spPr bwMode="ltGray">
           <a:xfrm>
-            <a:off x="6785566" y="1170459"/>
-            <a:ext cx="0" cy="731520"/>
+            <a:off x="6891018" y="1032802"/>
+            <a:ext cx="2270358" cy="274320"/>
           </a:xfrm>
-          <a:prstGeom prst="line">
+          <a:prstGeom prst="rect">
             <a:avLst/>
           </a:prstGeom>
-          <a:ln w="12700">
+          <a:noFill/>
+          <a:ln w="38100">
             <a:solidFill>
-              <a:schemeClr val="bg2"/>
+              <a:schemeClr val="accent5"/>
             </a:solidFill>
-            <a:prstDash val="sysDot"/>
           </a:ln>
         </p:spPr>
         <p:style>
-          <a:lnRef idx="1">
-            <a:schemeClr val="accent1"/>
+          <a:lnRef idx="2">
+            <a:schemeClr val="accent1">
+              <a:shade val="50000"/>
+            </a:schemeClr>
           </a:lnRef>
-          <a:fillRef idx="0">
+          <a:fillRef idx="1">
             <a:schemeClr val="accent1"/>
           </a:fillRef>
           <a:effectRef idx="0">
             <a:schemeClr val="accent1"/>
           </a:effectRef>
           <a:fontRef idx="minor">
-            <a:schemeClr val="tx1"/>
+            <a:schemeClr val="lt1"/>
           </a:fontRef>
         </p:style>
-      </p:cxnSp>
-      <p:cxnSp>
-        <p:nvCxnSpPr>
-          <p:cNvPr id="39" name="Straight Connector 38"/>
-          <p:cNvCxnSpPr/>
+        <p:txBody>
+          <a:bodyPr rtlCol="0" anchor="ctr"/>
+          <a:lstStyle/>
+          <a:p>
+            <a:pPr algn="ctr">
+              <a:lnSpc>
+                <a:spcPct val="90000"/>
+              </a:lnSpc>
+            </a:pPr>
+            <a:endParaRPr lang="en-US" sz="1200" b="1" dirty="0" smtClean="0">
+              <a:solidFill>
+                <a:schemeClr val="tx1"/>
+              </a:solidFill>
+            </a:endParaRPr>
+          </a:p>
+        </p:txBody>
+      </p:sp>
+      <p:sp>
+        <p:nvSpPr>
+          <p:cNvPr id="114" name="Rectangle 113"/>
+          <p:cNvSpPr/>
           <p:nvPr/>
-        </p:nvCxnSpPr>
-        <p:spPr>
+        </p:nvSpPr>
+        <p:spPr bwMode="ltGray">
           <a:xfrm>
-            <a:off x="6785566" y="2178433"/>
-            <a:ext cx="0" cy="731520"/>
+            <a:off x="9294090" y="1040238"/>
+            <a:ext cx="2270358" cy="274320"/>
           </a:xfrm>
-          <a:prstGeom prst="line">
+          <a:prstGeom prst="rect">
             <a:avLst/>
           </a:prstGeom>
-          <a:ln w="12700">
+          <a:noFill/>
+          <a:ln w="38100">
             <a:solidFill>
-              <a:schemeClr val="bg2"/>
+              <a:schemeClr val="accent5"/>
             </a:solidFill>
-            <a:prstDash val="sysDot"/>
           </a:ln>
         </p:spPr>
         <p:style>
-          <a:lnRef idx="1">
-            <a:schemeClr val="accent1"/>
+          <a:lnRef idx="2">
+            <a:schemeClr val="accent1">
+              <a:shade val="50000"/>
+            </a:schemeClr>
           </a:lnRef>
-          <a:fillRef idx="0">
+          <a:fillRef idx="1">
             <a:schemeClr val="accent1"/>
           </a:fillRef>
           <a:effectRef idx="0">
             <a:schemeClr val="accent1"/>
           </a:effectRef>
           <a:fontRef idx="minor">
-            <a:schemeClr val="tx1"/>
+            <a:schemeClr val="lt1"/>
           </a:fontRef>
         </p:style>
-      </p:cxnSp>
-      <p:cxnSp>
-        <p:nvCxnSpPr>
-          <p:cNvPr id="40" name="Straight Connector 39"/>
-          <p:cNvCxnSpPr/>
+        <p:txBody>
+          <a:bodyPr rtlCol="0" anchor="ctr"/>
+          <a:lstStyle/>
+          <a:p>
+            <a:pPr algn="ctr">
+              <a:lnSpc>
+                <a:spcPct val="90000"/>
+              </a:lnSpc>
+            </a:pPr>
+            <a:endParaRPr lang="en-US" sz="1200" b="1" dirty="0" smtClean="0">
+              <a:solidFill>
+                <a:schemeClr val="tx1"/>
+              </a:solidFill>
+            </a:endParaRPr>
+          </a:p>
+        </p:txBody>
+      </p:sp>
+      <p:sp>
+        <p:nvSpPr>
+          <p:cNvPr id="115" name="Rectangle 114"/>
+          <p:cNvSpPr/>
           <p:nvPr/>
-        </p:nvCxnSpPr>
-        <p:spPr>
+        </p:nvSpPr>
+        <p:spPr bwMode="ltGray">
           <a:xfrm>
-            <a:off x="6785566" y="3186406"/>
-            <a:ext cx="0" cy="731520"/>
+            <a:off x="4488571" y="1029395"/>
+            <a:ext cx="2270358" cy="274320"/>
           </a:xfrm>
-          <a:prstGeom prst="line">
+          <a:prstGeom prst="rect">
             <a:avLst/>
           </a:prstGeom>
-          <a:ln w="12700">
+          <a:noFill/>
+          <a:ln w="38100">
             <a:solidFill>
-              <a:schemeClr val="bg2"/>
+              <a:schemeClr val="accent5"/>
             </a:solidFill>
-            <a:prstDash val="sysDot"/>
           </a:ln>
         </p:spPr>
         <p:style>
-          <a:lnRef idx="1">
-            <a:schemeClr val="accent1"/>
+          <a:lnRef idx="2">
+            <a:schemeClr val="accent1">
+              <a:shade val="50000"/>
+            </a:schemeClr>
           </a:lnRef>
-          <a:fillRef idx="0">
+          <a:fillRef idx="1">
             <a:schemeClr val="accent1"/>
           </a:fillRef>
           <a:effectRef idx="0">
             <a:schemeClr val="accent1"/>
           </a:effectRef>
           <a:fontRef idx="minor">
-            <a:schemeClr val="tx1"/>
+            <a:schemeClr val="lt1"/>
           </a:fontRef>
         </p:style>
-      </p:cxnSp>
-      <p:cxnSp>
-        <p:nvCxnSpPr>
-          <p:cNvPr id="41" name="Straight Connector 40"/>
-          <p:cNvCxnSpPr/>
+        <p:txBody>
+          <a:bodyPr rtlCol="0" anchor="ctr"/>
+          <a:lstStyle/>
+          <a:p>
+            <a:pPr algn="ctr">
+              <a:lnSpc>
+                <a:spcPct val="90000"/>
+              </a:lnSpc>
+            </a:pPr>
+            <a:endParaRPr lang="en-US" sz="1200" b="1" dirty="0" smtClean="0">
+              <a:solidFill>
+                <a:schemeClr val="tx1"/>
+              </a:solidFill>
+            </a:endParaRPr>
+          </a:p>
+        </p:txBody>
+      </p:sp>
+      <p:sp>
+        <p:nvSpPr>
+          <p:cNvPr id="116" name="Rectangle 115"/>
+          <p:cNvSpPr/>
           <p:nvPr/>
-        </p:nvCxnSpPr>
-        <p:spPr>
+        </p:nvSpPr>
+        <p:spPr bwMode="ltGray">
           <a:xfrm>
-            <a:off x="6785566" y="4194380"/>
-            <a:ext cx="0" cy="731520"/>
+            <a:off x="6891018" y="3742071"/>
+            <a:ext cx="2270358" cy="274320"/>
           </a:xfrm>
-          <a:prstGeom prst="line">
+          <a:prstGeom prst="rect">
             <a:avLst/>
           </a:prstGeom>
-          <a:ln w="12700">
+          <a:noFill/>
+          <a:ln w="38100">
             <a:solidFill>
-              <a:schemeClr val="bg2"/>
+              <a:schemeClr val="accent5"/>
             </a:solidFill>
-            <a:prstDash val="sysDot"/>
           </a:ln>
         </p:spPr>
         <p:style>
-          <a:lnRef idx="1">
-            <a:schemeClr val="accent1"/>
+          <a:lnRef idx="2">
+            <a:schemeClr val="accent1">
+              <a:shade val="50000"/>
+            </a:schemeClr>
           </a:lnRef>
-          <a:fillRef idx="0">
+          <a:fillRef idx="1">
             <a:schemeClr val="accent1"/>
           </a:fillRef>
           <a:effectRef idx="0">
             <a:schemeClr val="accent1"/>
           </a:effectRef>
           <a:fontRef idx="minor">
-            <a:schemeClr val="tx1"/>
+            <a:schemeClr val="lt1"/>
           </a:fontRef>
         </p:style>
-      </p:cxnSp>
-      <p:cxnSp>
-        <p:nvCxnSpPr>
-          <p:cNvPr id="42" name="Straight Connector 41"/>
-          <p:cNvCxnSpPr/>
+        <p:txBody>
+          <a:bodyPr rtlCol="0" anchor="ctr"/>
+          <a:lstStyle/>
+          <a:p>
+            <a:pPr algn="ctr">
+              <a:lnSpc>
+                <a:spcPct val="90000"/>
+              </a:lnSpc>
+            </a:pPr>
+            <a:endParaRPr lang="en-US" sz="1200" b="1" dirty="0" smtClean="0">
+              <a:solidFill>
+                <a:schemeClr val="tx1"/>
+              </a:solidFill>
+            </a:endParaRPr>
+          </a:p>
+        </p:txBody>
+      </p:sp>
+      <p:sp>
+        <p:nvSpPr>
+          <p:cNvPr id="117" name="Rectangle 116"/>
+          <p:cNvSpPr/>
           <p:nvPr/>
-        </p:nvCxnSpPr>
-        <p:spPr>
+        </p:nvSpPr>
+        <p:spPr bwMode="ltGray">
           <a:xfrm>
-            <a:off x="6785566" y="5202355"/>
-            <a:ext cx="0" cy="731520"/>
+            <a:off x="9309732" y="3750059"/>
+            <a:ext cx="2270358" cy="274320"/>
           </a:xfrm>
-          <a:prstGeom prst="line">
+          <a:prstGeom prst="rect">
             <a:avLst/>
           </a:prstGeom>
-          <a:ln w="12700">
+          <a:noFill/>
+          <a:ln w="38100">
             <a:solidFill>
-              <a:schemeClr val="bg2"/>
+              <a:schemeClr val="accent5"/>
             </a:solidFill>
-            <a:prstDash val="sysDot"/>
           </a:ln>
         </p:spPr>
         <p:style>
-          <a:lnRef idx="1">
-            <a:schemeClr val="accent1"/>
+          <a:lnRef idx="2">
+            <a:schemeClr val="accent1">
+              <a:shade val="50000"/>
+            </a:schemeClr>
           </a:lnRef>
-          <a:fillRef idx="0">
+          <a:fillRef idx="1">
             <a:schemeClr val="accent1"/>
           </a:fillRef>
           <a:effectRef idx="0">
             <a:schemeClr val="accent1"/>
           </a:effectRef>
           <a:fontRef idx="minor">
-            <a:schemeClr val="tx1"/>
+            <a:schemeClr val="lt1"/>
           </a:fontRef>
         </p:style>
-      </p:cxnSp>
+        <p:txBody>
+          <a:bodyPr rtlCol="0" anchor="ctr"/>
+          <a:lstStyle/>
+          <a:p>
+            <a:pPr algn="ctr">
+              <a:lnSpc>
+                <a:spcPct val="90000"/>
+              </a:lnSpc>
+            </a:pPr>
+            <a:endParaRPr lang="en-US" sz="1200" b="1" dirty="0" smtClean="0">
+              <a:solidFill>
+                <a:schemeClr val="tx1"/>
+              </a:solidFill>
+            </a:endParaRPr>
+          </a:p>
+        </p:txBody>
+      </p:sp>
       <p:sp>
         <p:nvSpPr>
-          <p:cNvPr id="43" name="Rectangle 42"/>
+          <p:cNvPr id="118" name="Rectangle 117"/>
+          <p:cNvSpPr/>
+          <p:nvPr/>
+        </p:nvSpPr>
+        <p:spPr bwMode="ltGray">
+          <a:xfrm>
+            <a:off x="4488571" y="3738664"/>
+            <a:ext cx="2270358" cy="274320"/>
+          </a:xfrm>
+          <a:prstGeom prst="rect">
+            <a:avLst/>
+          </a:prstGeom>
+          <a:noFill/>
+          <a:ln w="38100">
+            <a:solidFill>
+              <a:schemeClr val="accent5"/>
+            </a:solidFill>
+          </a:ln>
+        </p:spPr>
+        <p:style>
+          <a:lnRef idx="2">
+            <a:schemeClr val="accent1">
+              <a:shade val="50000"/>
+            </a:schemeClr>
+          </a:lnRef>
+          <a:fillRef idx="1">
+            <a:schemeClr val="accent1"/>
+          </a:fillRef>
+          <a:effectRef idx="0">
+            <a:schemeClr val="accent1"/>
+          </a:effectRef>
+          <a:fontRef idx="minor">
+            <a:schemeClr val="lt1"/>
+          </a:fontRef>
+        </p:style>
+        <p:txBody>
+          <a:bodyPr rtlCol="0" anchor="ctr"/>
+          <a:lstStyle/>
+          <a:p>
+            <a:pPr algn="ctr">
+              <a:lnSpc>
+                <a:spcPct val="90000"/>
+              </a:lnSpc>
+            </a:pPr>
+            <a:endParaRPr lang="en-US" sz="1200" b="1" dirty="0" smtClean="0">
+              <a:solidFill>
+                <a:schemeClr val="tx1"/>
+              </a:solidFill>
+            </a:endParaRPr>
+          </a:p>
+        </p:txBody>
+      </p:sp>
+      <p:sp>
+        <p:nvSpPr>
+          <p:cNvPr id="119" name="Rectangle 118"/>
+          <p:cNvSpPr/>
+          <p:nvPr/>
+        </p:nvSpPr>
+        <p:spPr bwMode="ltGray">
+          <a:xfrm>
+            <a:off x="612456" y="1381644"/>
+            <a:ext cx="3108960" cy="457200"/>
+          </a:xfrm>
+          <a:prstGeom prst="rect">
+            <a:avLst/>
+          </a:prstGeom>
+          <a:noFill/>
+          <a:ln w="38100">
+            <a:solidFill>
+              <a:schemeClr val="accent1"/>
+            </a:solidFill>
+          </a:ln>
+        </p:spPr>
+        <p:style>
+          <a:lnRef idx="2">
+            <a:schemeClr val="accent1">
+              <a:shade val="50000"/>
+            </a:schemeClr>
+          </a:lnRef>
+          <a:fillRef idx="1">
+            <a:schemeClr val="accent1"/>
+          </a:fillRef>
+          <a:effectRef idx="0">
+            <a:schemeClr val="accent1"/>
+          </a:effectRef>
+          <a:fontRef idx="minor">
+            <a:schemeClr val="lt1"/>
+          </a:fontRef>
+        </p:style>
+        <p:txBody>
+          <a:bodyPr rtlCol="0" anchor="ctr"/>
+          <a:lstStyle/>
+          <a:p>
+            <a:pPr algn="ctr">
+              <a:lnSpc>
+                <a:spcPct val="90000"/>
+              </a:lnSpc>
+            </a:pPr>
+            <a:r>
+              <a:rPr lang="en-US" sz="1600" b="1" dirty="0" smtClean="0">
+                <a:solidFill>
+                  <a:schemeClr val="tx1"/>
+                </a:solidFill>
+              </a:rPr>
+              <a:t>Briefing Volume by Industry</a:t>
+            </a:r>
+          </a:p>
+        </p:txBody>
+      </p:sp>
+      <p:sp>
+        <p:nvSpPr>
+          <p:cNvPr id="69" name="Rectangle 68"/>
           <p:cNvSpPr/>
           <p:nvPr/>
         </p:nvSpPr>
         <p:spPr>
           <a:xfrm>
-            <a:off x="6813271" y="1130156"/>
-            <a:ext cx="759054" cy="322262"/>
+            <a:off x="8149628" y="3373355"/>
+            <a:ext cx="990042" cy="229371"/>
           </a:xfrm>
           <a:prstGeom prst="rect">
             <a:avLst/>
           </a:prstGeom>
         </p:spPr>
         <p:txBody>
-          <a:bodyPr wrap="square" numCol="1" anchor="ctr">
-            <a:noAutofit/>
+          <a:bodyPr wrap="none" anchor="ctr" anchorCtr="0">
+            <a:normAutofit lnSpcReduction="10000"/>
           </a:bodyPr>
           <a:lstStyle/>
           <a:p>
-            <a:r>
-              <a:rPr lang="en-US" sz="900" dirty="0"/>
-              <a:t>Briefings by center</a:t>
-            </a:r>
-            <a:endParaRPr lang="en-US" sz="800" dirty="0"/>
+            <a:pPr algn="ctr"/>
+            <a:r>
+              <a:rPr lang="en-US" sz="1000" dirty="0"/>
+              <a:t>1</a:t>
+            </a:r>
+            <a:r>
+              <a:rPr lang="en-US" sz="1000" dirty="0" smtClean="0"/>
+              <a:t>-interest-2</a:t>
+            </a:r>
+            <a:endParaRPr lang="en-GB" sz="800" dirty="0"/>
           </a:p>
         </p:txBody>
       </p:sp>
       <p:sp>
         <p:nvSpPr>
-          <p:cNvPr id="44" name="Rectangle 43"/>
-          <p:cNvSpPr/>
-          <p:nvPr/>
-        </p:nvSpPr>
-        <p:spPr>
-          <a:xfrm>
-            <a:off x="6813271" y="2147775"/>
-            <a:ext cx="759054" cy="322262"/>
-          </a:xfrm>
-          <a:prstGeom prst="rect">
-            <a:avLst/>
-          </a:prstGeom>
-        </p:spPr>
-        <p:txBody>
-          <a:bodyPr wrap="square" numCol="1" anchor="ctr">
-            <a:noAutofit/>
-          </a:bodyPr>
-          <a:lstStyle/>
-          <a:p>
-            <a:r>
-              <a:rPr lang="en-US" sz="900" dirty="0"/>
-              <a:t>Briefings by center</a:t>
-            </a:r>
-            <a:endParaRPr lang="en-US" sz="800" dirty="0"/>
-          </a:p>
-        </p:txBody>
-      </p:sp>
-      <p:sp>
-        <p:nvSpPr>
-          <p:cNvPr id="45" name="Rectangle 44"/>
-          <p:cNvSpPr/>
-          <p:nvPr/>
-        </p:nvSpPr>
-        <p:spPr>
-          <a:xfrm>
-            <a:off x="6813271" y="3168888"/>
-            <a:ext cx="759054" cy="322262"/>
-          </a:xfrm>
-          <a:prstGeom prst="rect">
-            <a:avLst/>
-          </a:prstGeom>
-        </p:spPr>
-        <p:txBody>
-          <a:bodyPr wrap="square" numCol="1" anchor="ctr">
-            <a:noAutofit/>
-          </a:bodyPr>
-          <a:lstStyle/>
-          <a:p>
-            <a:r>
-              <a:rPr lang="en-US" sz="900" dirty="0"/>
-              <a:t>Briefings by center</a:t>
-            </a:r>
-            <a:endParaRPr lang="en-US" sz="800" dirty="0"/>
-          </a:p>
-        </p:txBody>
-      </p:sp>
-      <p:sp>
-        <p:nvSpPr>
-          <p:cNvPr id="46" name="Rectangle 45"/>
-          <p:cNvSpPr/>
-          <p:nvPr/>
-        </p:nvSpPr>
-        <p:spPr>
-          <a:xfrm>
-            <a:off x="6813271" y="4186507"/>
-            <a:ext cx="759054" cy="322262"/>
-          </a:xfrm>
-          <a:prstGeom prst="rect">
-            <a:avLst/>
-          </a:prstGeom>
-        </p:spPr>
-        <p:txBody>
-          <a:bodyPr wrap="square" numCol="1" anchor="ctr">
-            <a:noAutofit/>
-          </a:bodyPr>
-          <a:lstStyle/>
-          <a:p>
-            <a:r>
-              <a:rPr lang="en-US" sz="900" dirty="0"/>
-              <a:t>Briefings by center</a:t>
-            </a:r>
-            <a:endParaRPr lang="en-US" sz="800" dirty="0"/>
-          </a:p>
-        </p:txBody>
-      </p:sp>
-      <p:sp>
-        <p:nvSpPr>
-          <p:cNvPr id="47" name="Rectangle 46"/>
-          <p:cNvSpPr/>
-          <p:nvPr/>
-        </p:nvSpPr>
-        <p:spPr>
-          <a:xfrm>
-            <a:off x="6813271" y="5193202"/>
-            <a:ext cx="759054" cy="322262"/>
-          </a:xfrm>
-          <a:prstGeom prst="rect">
-            <a:avLst/>
-          </a:prstGeom>
-        </p:spPr>
-        <p:txBody>
-          <a:bodyPr wrap="square" numCol="1" anchor="ctr">
-            <a:noAutofit/>
-          </a:bodyPr>
-          <a:lstStyle/>
-          <a:p>
-            <a:r>
-              <a:rPr lang="en-US" sz="900" dirty="0"/>
-              <a:t>Briefings by center</a:t>
-            </a:r>
-            <a:endParaRPr lang="en-US" sz="800" dirty="0"/>
-          </a:p>
-        </p:txBody>
-      </p:sp>
-      <p:cxnSp>
-        <p:nvCxnSpPr>
-          <p:cNvPr id="48" name="Straight Connector 47"/>
-          <p:cNvCxnSpPr/>
-          <p:nvPr/>
-        </p:nvCxnSpPr>
-        <p:spPr>
-          <a:xfrm>
-            <a:off x="9769312" y="1170459"/>
-            <a:ext cx="0" cy="731520"/>
-          </a:xfrm>
-          <a:prstGeom prst="line">
-            <a:avLst/>
-          </a:prstGeom>
-          <a:ln w="12700">
-            <a:solidFill>
-              <a:schemeClr val="bg2"/>
-            </a:solidFill>
-            <a:prstDash val="sysDot"/>
-          </a:ln>
-        </p:spPr>
-        <p:style>
-          <a:lnRef idx="1">
-            <a:schemeClr val="accent1"/>
-          </a:lnRef>
-          <a:fillRef idx="0">
-            <a:schemeClr val="accent1"/>
-          </a:fillRef>
-          <a:effectRef idx="0">
-            <a:schemeClr val="accent1"/>
-          </a:effectRef>
-          <a:fontRef idx="minor">
-            <a:schemeClr val="tx1"/>
-          </a:fontRef>
-        </p:style>
-      </p:cxnSp>
-      <p:cxnSp>
-        <p:nvCxnSpPr>
-          <p:cNvPr id="49" name="Straight Connector 48"/>
-          <p:cNvCxnSpPr/>
-          <p:nvPr/>
-        </p:nvCxnSpPr>
-        <p:spPr>
-          <a:xfrm>
-            <a:off x="9769312" y="2178433"/>
-            <a:ext cx="0" cy="731520"/>
-          </a:xfrm>
-          <a:prstGeom prst="line">
-            <a:avLst/>
-          </a:prstGeom>
-          <a:ln w="12700">
-            <a:solidFill>
-              <a:schemeClr val="bg2"/>
-            </a:solidFill>
-            <a:prstDash val="sysDot"/>
-          </a:ln>
-        </p:spPr>
-        <p:style>
-          <a:lnRef idx="1">
-            <a:schemeClr val="accent1"/>
-          </a:lnRef>
-          <a:fillRef idx="0">
-            <a:schemeClr val="accent1"/>
-          </a:fillRef>
-          <a:effectRef idx="0">
-            <a:schemeClr val="accent1"/>
-          </a:effectRef>
-          <a:fontRef idx="minor">
-            <a:schemeClr val="tx1"/>
-          </a:fontRef>
-        </p:style>
-      </p:cxnSp>
-      <p:cxnSp>
-        <p:nvCxnSpPr>
-          <p:cNvPr id="50" name="Straight Connector 49"/>
-          <p:cNvCxnSpPr/>
-          <p:nvPr/>
-        </p:nvCxnSpPr>
-        <p:spPr>
-          <a:xfrm>
-            <a:off x="9769312" y="3186406"/>
-            <a:ext cx="0" cy="731520"/>
-          </a:xfrm>
-          <a:prstGeom prst="line">
-            <a:avLst/>
-          </a:prstGeom>
-          <a:ln w="12700">
-            <a:solidFill>
-              <a:schemeClr val="bg2"/>
-            </a:solidFill>
-            <a:prstDash val="sysDot"/>
-          </a:ln>
-        </p:spPr>
-        <p:style>
-          <a:lnRef idx="1">
-            <a:schemeClr val="accent1"/>
-          </a:lnRef>
-          <a:fillRef idx="0">
-            <a:schemeClr val="accent1"/>
-          </a:fillRef>
-          <a:effectRef idx="0">
-            <a:schemeClr val="accent1"/>
-          </a:effectRef>
-          <a:fontRef idx="minor">
-            <a:schemeClr val="tx1"/>
-          </a:fontRef>
-        </p:style>
-      </p:cxnSp>
-      <p:cxnSp>
-        <p:nvCxnSpPr>
-          <p:cNvPr id="51" name="Straight Connector 50"/>
-          <p:cNvCxnSpPr/>
-          <p:nvPr/>
-        </p:nvCxnSpPr>
-        <p:spPr>
-          <a:xfrm>
-            <a:off x="9769312" y="4194380"/>
-            <a:ext cx="0" cy="731520"/>
-          </a:xfrm>
-          <a:prstGeom prst="line">
-            <a:avLst/>
-          </a:prstGeom>
-          <a:ln w="12700">
-            <a:solidFill>
-              <a:schemeClr val="bg2"/>
-            </a:solidFill>
-            <a:prstDash val="sysDot"/>
-          </a:ln>
-        </p:spPr>
-        <p:style>
-          <a:lnRef idx="1">
-            <a:schemeClr val="accent1"/>
-          </a:lnRef>
-          <a:fillRef idx="0">
-            <a:schemeClr val="accent1"/>
-          </a:fillRef>
-          <a:effectRef idx="0">
-            <a:schemeClr val="accent1"/>
-          </a:effectRef>
-          <a:fontRef idx="minor">
-            <a:schemeClr val="tx1"/>
-          </a:fontRef>
-        </p:style>
-      </p:cxnSp>
-      <p:cxnSp>
-        <p:nvCxnSpPr>
-          <p:cNvPr id="52" name="Straight Connector 51"/>
-          <p:cNvCxnSpPr/>
-          <p:nvPr/>
-        </p:nvCxnSpPr>
-        <p:spPr>
-          <a:xfrm>
-            <a:off x="9769312" y="5202355"/>
-            <a:ext cx="0" cy="731520"/>
-          </a:xfrm>
-          <a:prstGeom prst="line">
-            <a:avLst/>
-          </a:prstGeom>
-          <a:ln w="12700">
-            <a:solidFill>
-              <a:schemeClr val="bg2"/>
-            </a:solidFill>
-            <a:prstDash val="sysDot"/>
-          </a:ln>
-        </p:spPr>
-        <p:style>
-          <a:lnRef idx="1">
-            <a:schemeClr val="accent1"/>
-          </a:lnRef>
-          <a:fillRef idx="0">
-            <a:schemeClr val="accent1"/>
-          </a:fillRef>
-          <a:effectRef idx="0">
-            <a:schemeClr val="accent1"/>
-          </a:effectRef>
-          <a:fontRef idx="minor">
-            <a:schemeClr val="tx1"/>
-          </a:fontRef>
-        </p:style>
-      </p:cxnSp>
-      <p:sp>
-        <p:nvSpPr>
-          <p:cNvPr id="4" name="TextBox 3"/>
+          <p:cNvPr id="71" name="TextBox 70"/>
           <p:cNvSpPr txBox="1"/>
           <p:nvPr/>
         </p:nvSpPr>
         <p:spPr>
           <a:xfrm>
-            <a:off x="5242387" y="1277687"/>
-            <a:ext cx="1459132" cy="558614"/>
+            <a:off x="8149628" y="2129614"/>
+            <a:ext cx="990041" cy="236514"/>
           </a:xfrm>
           <a:prstGeom prst="rect">
             <a:avLst/>
@@ -44539,7 +44901,501 @@
           <a:noFill/>
         </p:spPr>
         <p:txBody>
-          <a:bodyPr wrap="square" lIns="0" tIns="0" rIns="0" bIns="0" rtlCol="0">
+          <a:bodyPr wrap="none" lIns="0" tIns="0" rIns="0" bIns="0" rtlCol="0" anchor="ctr" anchorCtr="0">
+            <a:normAutofit/>
+          </a:bodyPr>
+          <a:lstStyle/>
+          <a:p>
+            <a:pPr algn="ctr">
+              <a:lnSpc>
+                <a:spcPct val="90000"/>
+              </a:lnSpc>
+            </a:pPr>
+            <a:r>
+              <a:rPr lang="en-US" sz="1000" dirty="0" smtClean="0"/>
+              <a:t>1-interest-0</a:t>
+            </a:r>
+            <a:endParaRPr lang="en-US" sz="1000" dirty="0"/>
+          </a:p>
+        </p:txBody>
+      </p:sp>
+      <p:sp>
+        <p:nvSpPr>
+          <p:cNvPr id="79" name="TextBox 78"/>
+          <p:cNvSpPr txBox="1"/>
+          <p:nvPr/>
+        </p:nvSpPr>
+        <p:spPr>
+          <a:xfrm>
+            <a:off x="8149628" y="2766831"/>
+            <a:ext cx="990041" cy="214771"/>
+          </a:xfrm>
+          <a:prstGeom prst="rect">
+            <a:avLst/>
+          </a:prstGeom>
+          <a:noFill/>
+        </p:spPr>
+        <p:txBody>
+          <a:bodyPr wrap="none" lIns="0" tIns="0" rIns="0" bIns="0" rtlCol="0" anchor="ctr" anchorCtr="0">
+            <a:normAutofit/>
+          </a:bodyPr>
+          <a:lstStyle/>
+          <a:p>
+            <a:pPr algn="ctr">
+              <a:lnSpc>
+                <a:spcPct val="90000"/>
+              </a:lnSpc>
+            </a:pPr>
+            <a:r>
+              <a:rPr lang="en-US" sz="1000" dirty="0" smtClean="0"/>
+              <a:t>1-interest-1</a:t>
+            </a:r>
+            <a:endParaRPr lang="en-US" sz="1000" dirty="0"/>
+          </a:p>
+        </p:txBody>
+      </p:sp>
+      <p:sp>
+        <p:nvSpPr>
+          <p:cNvPr id="80" name="Rectangle 79"/>
+          <p:cNvSpPr/>
+          <p:nvPr/>
+        </p:nvSpPr>
+        <p:spPr>
+          <a:xfrm>
+            <a:off x="10573782" y="3382305"/>
+            <a:ext cx="976802" cy="220421"/>
+          </a:xfrm>
+          <a:prstGeom prst="rect">
+            <a:avLst/>
+          </a:prstGeom>
+        </p:spPr>
+        <p:txBody>
+          <a:bodyPr wrap="none" anchor="ctr" anchorCtr="0">
+            <a:normAutofit fontScale="92500" lnSpcReduction="10000"/>
+          </a:bodyPr>
+          <a:lstStyle/>
+          <a:p>
+            <a:pPr algn="ctr"/>
+            <a:r>
+              <a:rPr lang="en-US" sz="1000" dirty="0" smtClean="0"/>
+              <a:t>2-interest-2</a:t>
+            </a:r>
+            <a:endParaRPr lang="en-GB" sz="800" dirty="0"/>
+          </a:p>
+        </p:txBody>
+      </p:sp>
+      <p:sp>
+        <p:nvSpPr>
+          <p:cNvPr id="82" name="TextBox 81"/>
+          <p:cNvSpPr txBox="1"/>
+          <p:nvPr/>
+        </p:nvSpPr>
+        <p:spPr>
+          <a:xfrm>
+            <a:off x="10560543" y="2129614"/>
+            <a:ext cx="990041" cy="236514"/>
+          </a:xfrm>
+          <a:prstGeom prst="rect">
+            <a:avLst/>
+          </a:prstGeom>
+          <a:noFill/>
+        </p:spPr>
+        <p:txBody>
+          <a:bodyPr wrap="none" lIns="0" tIns="0" rIns="0" bIns="0" rtlCol="0" anchor="ctr" anchorCtr="0">
+            <a:normAutofit/>
+          </a:bodyPr>
+          <a:lstStyle/>
+          <a:p>
+            <a:pPr algn="ctr">
+              <a:lnSpc>
+                <a:spcPct val="90000"/>
+              </a:lnSpc>
+            </a:pPr>
+            <a:r>
+              <a:rPr lang="en-US" sz="1000" dirty="0"/>
+              <a:t>2</a:t>
+            </a:r>
+            <a:r>
+              <a:rPr lang="en-US" sz="1000" dirty="0" smtClean="0"/>
+              <a:t>-interest-0</a:t>
+            </a:r>
+            <a:endParaRPr lang="en-US" sz="1000" dirty="0"/>
+          </a:p>
+        </p:txBody>
+      </p:sp>
+      <p:sp>
+        <p:nvSpPr>
+          <p:cNvPr id="83" name="TextBox 82"/>
+          <p:cNvSpPr txBox="1"/>
+          <p:nvPr/>
+        </p:nvSpPr>
+        <p:spPr>
+          <a:xfrm>
+            <a:off x="10560543" y="2766831"/>
+            <a:ext cx="990041" cy="214771"/>
+          </a:xfrm>
+          <a:prstGeom prst="rect">
+            <a:avLst/>
+          </a:prstGeom>
+          <a:noFill/>
+        </p:spPr>
+        <p:txBody>
+          <a:bodyPr wrap="none" lIns="0" tIns="0" rIns="0" bIns="0" rtlCol="0" anchor="ctr" anchorCtr="0">
+            <a:normAutofit/>
+          </a:bodyPr>
+          <a:lstStyle/>
+          <a:p>
+            <a:pPr algn="ctr">
+              <a:lnSpc>
+                <a:spcPct val="90000"/>
+              </a:lnSpc>
+            </a:pPr>
+            <a:r>
+              <a:rPr lang="en-US" sz="1000" dirty="0"/>
+              <a:t>2</a:t>
+            </a:r>
+            <a:r>
+              <a:rPr lang="en-US" sz="1000" dirty="0" smtClean="0"/>
+              <a:t>-interest-1</a:t>
+            </a:r>
+            <a:endParaRPr lang="en-US" sz="1000" dirty="0"/>
+          </a:p>
+        </p:txBody>
+      </p:sp>
+      <p:sp>
+        <p:nvSpPr>
+          <p:cNvPr id="89" name="Rectangle 88"/>
+          <p:cNvSpPr/>
+          <p:nvPr/>
+        </p:nvSpPr>
+        <p:spPr>
+          <a:xfrm>
+            <a:off x="5768263" y="6070237"/>
+            <a:ext cx="990041" cy="217151"/>
+          </a:xfrm>
+          <a:prstGeom prst="rect">
+            <a:avLst/>
+          </a:prstGeom>
+        </p:spPr>
+        <p:txBody>
+          <a:bodyPr wrap="none" anchor="ctr" anchorCtr="0">
+            <a:normAutofit fontScale="92500" lnSpcReduction="10000"/>
+          </a:bodyPr>
+          <a:lstStyle/>
+          <a:p>
+            <a:pPr algn="ctr"/>
+            <a:r>
+              <a:rPr lang="en-US" sz="1000" dirty="0"/>
+              <a:t>3</a:t>
+            </a:r>
+            <a:r>
+              <a:rPr lang="en-US" sz="1000" dirty="0" smtClean="0"/>
+              <a:t>-interest-2</a:t>
+            </a:r>
+            <a:endParaRPr lang="en-GB" sz="800" dirty="0"/>
+          </a:p>
+        </p:txBody>
+      </p:sp>
+      <p:sp>
+        <p:nvSpPr>
+          <p:cNvPr id="92" name="TextBox 91"/>
+          <p:cNvSpPr txBox="1"/>
+          <p:nvPr/>
+        </p:nvSpPr>
+        <p:spPr>
+          <a:xfrm>
+            <a:off x="5768263" y="4814178"/>
+            <a:ext cx="990041" cy="236514"/>
+          </a:xfrm>
+          <a:prstGeom prst="rect">
+            <a:avLst/>
+          </a:prstGeom>
+          <a:noFill/>
+        </p:spPr>
+        <p:txBody>
+          <a:bodyPr wrap="none" lIns="0" tIns="0" rIns="0" bIns="0" rtlCol="0" anchor="ctr" anchorCtr="0">
+            <a:normAutofit/>
+          </a:bodyPr>
+          <a:lstStyle/>
+          <a:p>
+            <a:pPr algn="ctr">
+              <a:lnSpc>
+                <a:spcPct val="90000"/>
+              </a:lnSpc>
+            </a:pPr>
+            <a:r>
+              <a:rPr lang="en-US" sz="1000" dirty="0"/>
+              <a:t>3</a:t>
+            </a:r>
+            <a:r>
+              <a:rPr lang="en-US" sz="1000" dirty="0" smtClean="0"/>
+              <a:t>-interest-0</a:t>
+            </a:r>
+            <a:endParaRPr lang="en-US" sz="1000" dirty="0"/>
+          </a:p>
+        </p:txBody>
+      </p:sp>
+      <p:sp>
+        <p:nvSpPr>
+          <p:cNvPr id="94" name="TextBox 93"/>
+          <p:cNvSpPr txBox="1"/>
+          <p:nvPr/>
+        </p:nvSpPr>
+        <p:spPr>
+          <a:xfrm>
+            <a:off x="5768263" y="5451395"/>
+            <a:ext cx="990041" cy="214771"/>
+          </a:xfrm>
+          <a:prstGeom prst="rect">
+            <a:avLst/>
+          </a:prstGeom>
+          <a:noFill/>
+        </p:spPr>
+        <p:txBody>
+          <a:bodyPr wrap="none" lIns="0" tIns="0" rIns="0" bIns="0" rtlCol="0" anchor="ctr" anchorCtr="0">
+            <a:normAutofit/>
+          </a:bodyPr>
+          <a:lstStyle/>
+          <a:p>
+            <a:pPr algn="ctr">
+              <a:lnSpc>
+                <a:spcPct val="90000"/>
+              </a:lnSpc>
+            </a:pPr>
+            <a:r>
+              <a:rPr lang="en-US" sz="1000" dirty="0"/>
+              <a:t>3</a:t>
+            </a:r>
+            <a:r>
+              <a:rPr lang="en-US" sz="1000" dirty="0" smtClean="0"/>
+              <a:t>-interest-1</a:t>
+            </a:r>
+            <a:endParaRPr lang="en-US" sz="1000" dirty="0"/>
+          </a:p>
+        </p:txBody>
+      </p:sp>
+      <p:sp>
+        <p:nvSpPr>
+          <p:cNvPr id="102" name="Rectangle 101"/>
+          <p:cNvSpPr/>
+          <p:nvPr/>
+        </p:nvSpPr>
+        <p:spPr>
+          <a:xfrm>
+            <a:off x="8170710" y="6070237"/>
+            <a:ext cx="968959" cy="222583"/>
+          </a:xfrm>
+          <a:prstGeom prst="rect">
+            <a:avLst/>
+          </a:prstGeom>
+        </p:spPr>
+        <p:txBody>
+          <a:bodyPr wrap="none" anchor="ctr" anchorCtr="0">
+            <a:normAutofit fontScale="92500" lnSpcReduction="10000"/>
+          </a:bodyPr>
+          <a:lstStyle/>
+          <a:p>
+            <a:pPr algn="ctr"/>
+            <a:r>
+              <a:rPr lang="en-US" sz="1000" dirty="0" smtClean="0"/>
+              <a:t>4-interest-2</a:t>
+            </a:r>
+            <a:endParaRPr lang="en-GB" sz="800" dirty="0"/>
+          </a:p>
+        </p:txBody>
+      </p:sp>
+      <p:sp>
+        <p:nvSpPr>
+          <p:cNvPr id="104" name="TextBox 103"/>
+          <p:cNvSpPr txBox="1"/>
+          <p:nvPr/>
+        </p:nvSpPr>
+        <p:spPr>
+          <a:xfrm>
+            <a:off x="8149628" y="4814178"/>
+            <a:ext cx="990041" cy="236514"/>
+          </a:xfrm>
+          <a:prstGeom prst="rect">
+            <a:avLst/>
+          </a:prstGeom>
+          <a:noFill/>
+        </p:spPr>
+        <p:txBody>
+          <a:bodyPr wrap="none" lIns="0" tIns="0" rIns="0" bIns="0" rtlCol="0" anchor="ctr" anchorCtr="0">
+            <a:normAutofit/>
+          </a:bodyPr>
+          <a:lstStyle/>
+          <a:p>
+            <a:pPr algn="ctr">
+              <a:lnSpc>
+                <a:spcPct val="90000"/>
+              </a:lnSpc>
+            </a:pPr>
+            <a:r>
+              <a:rPr lang="en-US" sz="1000" dirty="0" smtClean="0"/>
+              <a:t>4-interest-0</a:t>
+            </a:r>
+            <a:endParaRPr lang="en-US" sz="1000" dirty="0"/>
+          </a:p>
+        </p:txBody>
+      </p:sp>
+      <p:sp>
+        <p:nvSpPr>
+          <p:cNvPr id="112" name="TextBox 111"/>
+          <p:cNvSpPr txBox="1"/>
+          <p:nvPr/>
+        </p:nvSpPr>
+        <p:spPr>
+          <a:xfrm>
+            <a:off x="8149628" y="5451395"/>
+            <a:ext cx="990041" cy="214771"/>
+          </a:xfrm>
+          <a:prstGeom prst="rect">
+            <a:avLst/>
+          </a:prstGeom>
+          <a:noFill/>
+        </p:spPr>
+        <p:txBody>
+          <a:bodyPr wrap="none" lIns="0" tIns="0" rIns="0" bIns="0" rtlCol="0" anchor="ctr" anchorCtr="0">
+            <a:normAutofit/>
+          </a:bodyPr>
+          <a:lstStyle/>
+          <a:p>
+            <a:pPr algn="ctr">
+              <a:lnSpc>
+                <a:spcPct val="90000"/>
+              </a:lnSpc>
+            </a:pPr>
+            <a:r>
+              <a:rPr lang="en-US" sz="1000" dirty="0" smtClean="0"/>
+              <a:t>4-interest-1</a:t>
+            </a:r>
+            <a:endParaRPr lang="en-US" sz="1000" dirty="0"/>
+          </a:p>
+        </p:txBody>
+      </p:sp>
+      <p:sp>
+        <p:nvSpPr>
+          <p:cNvPr id="113" name="Rectangle 112"/>
+          <p:cNvSpPr/>
+          <p:nvPr/>
+        </p:nvSpPr>
+        <p:spPr>
+          <a:xfrm>
+            <a:off x="10560543" y="6066869"/>
+            <a:ext cx="976802" cy="225951"/>
+          </a:xfrm>
+          <a:prstGeom prst="rect">
+            <a:avLst/>
+          </a:prstGeom>
+        </p:spPr>
+        <p:txBody>
+          <a:bodyPr wrap="none" anchor="ctr" anchorCtr="0">
+            <a:normAutofit fontScale="92500" lnSpcReduction="10000"/>
+          </a:bodyPr>
+          <a:lstStyle/>
+          <a:p>
+            <a:pPr algn="ctr"/>
+            <a:r>
+              <a:rPr lang="en-US" sz="1000" dirty="0"/>
+              <a:t>5</a:t>
+            </a:r>
+            <a:r>
+              <a:rPr lang="en-US" sz="1000" dirty="0" smtClean="0"/>
+              <a:t>-interest-2</a:t>
+            </a:r>
+            <a:endParaRPr lang="en-GB" sz="800" dirty="0"/>
+          </a:p>
+        </p:txBody>
+      </p:sp>
+      <p:sp>
+        <p:nvSpPr>
+          <p:cNvPr id="120" name="TextBox 119"/>
+          <p:cNvSpPr txBox="1"/>
+          <p:nvPr/>
+        </p:nvSpPr>
+        <p:spPr>
+          <a:xfrm>
+            <a:off x="10560543" y="4814178"/>
+            <a:ext cx="990041" cy="236514"/>
+          </a:xfrm>
+          <a:prstGeom prst="rect">
+            <a:avLst/>
+          </a:prstGeom>
+          <a:noFill/>
+        </p:spPr>
+        <p:txBody>
+          <a:bodyPr wrap="none" lIns="0" tIns="0" rIns="0" bIns="0" rtlCol="0" anchor="ctr" anchorCtr="0">
+            <a:normAutofit/>
+          </a:bodyPr>
+          <a:lstStyle/>
+          <a:p>
+            <a:pPr algn="ctr">
+              <a:lnSpc>
+                <a:spcPct val="90000"/>
+              </a:lnSpc>
+            </a:pPr>
+            <a:r>
+              <a:rPr lang="en-US" sz="1000" dirty="0" smtClean="0"/>
+              <a:t>5-interest-0</a:t>
+            </a:r>
+            <a:endParaRPr lang="en-US" sz="1000" dirty="0"/>
+          </a:p>
+        </p:txBody>
+      </p:sp>
+      <p:sp>
+        <p:nvSpPr>
+          <p:cNvPr id="121" name="TextBox 120"/>
+          <p:cNvSpPr txBox="1"/>
+          <p:nvPr/>
+        </p:nvSpPr>
+        <p:spPr>
+          <a:xfrm>
+            <a:off x="10560543" y="5451395"/>
+            <a:ext cx="990041" cy="214771"/>
+          </a:xfrm>
+          <a:prstGeom prst="rect">
+            <a:avLst/>
+          </a:prstGeom>
+          <a:noFill/>
+        </p:spPr>
+        <p:txBody>
+          <a:bodyPr wrap="none" lIns="0" tIns="0" rIns="0" bIns="0" rtlCol="0" anchor="ctr" anchorCtr="0">
+            <a:normAutofit/>
+          </a:bodyPr>
+          <a:lstStyle/>
+          <a:p>
+            <a:pPr algn="ctr">
+              <a:lnSpc>
+                <a:spcPct val="90000"/>
+              </a:lnSpc>
+            </a:pPr>
+            <a:r>
+              <a:rPr lang="en-US" sz="1000" dirty="0" smtClean="0"/>
+              <a:t>5-interest-1</a:t>
+            </a:r>
+            <a:endParaRPr lang="en-US" sz="1000" dirty="0"/>
+          </a:p>
+        </p:txBody>
+      </p:sp>
+      <p:sp>
+        <p:nvSpPr>
+          <p:cNvPr id="7" name="TextBox 6"/>
+          <p:cNvSpPr txBox="1"/>
+          <p:nvPr/>
+        </p:nvSpPr>
+        <p:spPr>
+          <a:xfrm>
+            <a:off x="4488571" y="1047360"/>
+            <a:ext cx="2269733" cy="255198"/>
+          </a:xfrm>
+          <a:prstGeom prst="rect">
+            <a:avLst/>
+          </a:prstGeom>
+          <a:noFill/>
+        </p:spPr>
+        <p:txBody>
+          <a:bodyPr wrap="none" lIns="0" tIns="0" rIns="0" bIns="0" rtlCol="0" anchor="ctr">
             <a:noAutofit/>
           </a:bodyPr>
           <a:lstStyle/>
@@ -44559,14 +45415,14 @@
       </p:sp>
       <p:sp>
         <p:nvSpPr>
-          <p:cNvPr id="38" name="TextBox 37"/>
+          <p:cNvPr id="122" name="TextBox 121"/>
           <p:cNvSpPr txBox="1"/>
           <p:nvPr/>
         </p:nvSpPr>
         <p:spPr>
           <a:xfrm>
-            <a:off x="5253419" y="2301720"/>
-            <a:ext cx="1459131" cy="530696"/>
+            <a:off x="6890393" y="1047360"/>
+            <a:ext cx="2269733" cy="255198"/>
           </a:xfrm>
           <a:prstGeom prst="rect">
             <a:avLst/>
@@ -44574,7 +45430,7 @@
           <a:noFill/>
         </p:spPr>
         <p:txBody>
-          <a:bodyPr wrap="square" lIns="0" tIns="0" rIns="0" bIns="0" rtlCol="0">
+          <a:bodyPr wrap="none" lIns="0" tIns="0" rIns="0" bIns="0" rtlCol="0" anchor="ctr">
             <a:noAutofit/>
           </a:bodyPr>
           <a:lstStyle/>
@@ -44594,14 +45450,14 @@
       </p:sp>
       <p:sp>
         <p:nvSpPr>
-          <p:cNvPr id="53" name="TextBox 52"/>
+          <p:cNvPr id="123" name="TextBox 122"/>
           <p:cNvSpPr txBox="1"/>
           <p:nvPr/>
         </p:nvSpPr>
         <p:spPr>
           <a:xfrm>
-            <a:off x="5242387" y="3230686"/>
-            <a:ext cx="1459132" cy="592234"/>
+            <a:off x="9303740" y="1047360"/>
+            <a:ext cx="2269733" cy="255198"/>
           </a:xfrm>
           <a:prstGeom prst="rect">
             <a:avLst/>
@@ -44609,7 +45465,7 @@
           <a:noFill/>
         </p:spPr>
         <p:txBody>
-          <a:bodyPr wrap="square" lIns="0" tIns="0" rIns="0" bIns="0" rtlCol="0">
+          <a:bodyPr wrap="none" lIns="0" tIns="0" rIns="0" bIns="0" rtlCol="0" anchor="ctr">
             <a:noAutofit/>
           </a:bodyPr>
           <a:lstStyle/>
@@ -44629,14 +45485,14 @@
       </p:sp>
       <p:sp>
         <p:nvSpPr>
-          <p:cNvPr id="54" name="TextBox 53"/>
+          <p:cNvPr id="124" name="TextBox 123"/>
           <p:cNvSpPr txBox="1"/>
           <p:nvPr/>
         </p:nvSpPr>
         <p:spPr>
           <a:xfrm>
-            <a:off x="5242387" y="4289387"/>
-            <a:ext cx="1459132" cy="559675"/>
+            <a:off x="4488571" y="3762826"/>
+            <a:ext cx="2269733" cy="255198"/>
           </a:xfrm>
           <a:prstGeom prst="rect">
             <a:avLst/>
@@ -44644,7 +45500,7 @@
           <a:noFill/>
         </p:spPr>
         <p:txBody>
-          <a:bodyPr wrap="square" lIns="0" tIns="0" rIns="0" bIns="0" rtlCol="0">
+          <a:bodyPr wrap="none" lIns="0" tIns="0" rIns="0" bIns="0" rtlCol="0" anchor="ctr">
             <a:noAutofit/>
           </a:bodyPr>
           <a:lstStyle/>
@@ -44664,14 +45520,14 @@
       </p:sp>
       <p:sp>
         <p:nvSpPr>
-          <p:cNvPr id="55" name="TextBox 54"/>
+          <p:cNvPr id="125" name="TextBox 124"/>
           <p:cNvSpPr txBox="1"/>
           <p:nvPr/>
         </p:nvSpPr>
         <p:spPr>
           <a:xfrm>
-            <a:off x="5242387" y="5317466"/>
-            <a:ext cx="1459132" cy="554080"/>
+            <a:off x="6890392" y="3762826"/>
+            <a:ext cx="2269733" cy="255198"/>
           </a:xfrm>
           <a:prstGeom prst="rect">
             <a:avLst/>
@@ -44679,7 +45535,7 @@
           <a:noFill/>
         </p:spPr>
         <p:txBody>
-          <a:bodyPr wrap="square" lIns="0" tIns="0" rIns="0" bIns="0" rtlCol="0">
+          <a:bodyPr wrap="none" lIns="0" tIns="0" rIns="0" bIns="0" rtlCol="0" anchor="ctr">
             <a:noAutofit/>
           </a:bodyPr>
           <a:lstStyle/>
@@ -44697,10 +45553,45 @@
           </a:p>
         </p:txBody>
       </p:sp>
+      <p:sp>
+        <p:nvSpPr>
+          <p:cNvPr id="126" name="TextBox 125"/>
+          <p:cNvSpPr txBox="1"/>
+          <p:nvPr/>
+        </p:nvSpPr>
+        <p:spPr>
+          <a:xfrm>
+            <a:off x="9291588" y="3762826"/>
+            <a:ext cx="2269733" cy="255198"/>
+          </a:xfrm>
+          <a:prstGeom prst="rect">
+            <a:avLst/>
+          </a:prstGeom>
+          <a:noFill/>
+        </p:spPr>
+        <p:txBody>
+          <a:bodyPr wrap="none" lIns="0" tIns="0" rIns="0" bIns="0" rtlCol="0" anchor="ctr">
+            <a:noAutofit/>
+          </a:bodyPr>
+          <a:lstStyle/>
+          <a:p>
+            <a:pPr algn="ctr">
+              <a:lnSpc>
+                <a:spcPct val="90000"/>
+              </a:lnSpc>
+            </a:pPr>
+            <a:r>
+              <a:rPr lang="en-US" sz="1600" dirty="0" smtClean="0"/>
+              <a:t>Industry-5</a:t>
+            </a:r>
+            <a:endParaRPr lang="en-GB" sz="1600" dirty="0"/>
+          </a:p>
+        </p:txBody>
+      </p:sp>
     </p:spTree>
     <p:extLst>
       <p:ext uri="{BB962C8B-B14F-4D97-AF65-F5344CB8AC3E}">
-        <p14:creationId xmlns:p14="http://schemas.microsoft.com/office/powerpoint/2010/main" val="1123383672"/>
+        <p14:creationId xmlns:p14="http://schemas.microsoft.com/office/powerpoint/2010/main" val="4209728806"/>
       </p:ext>
     </p:extLst>
   </p:cSld>

</xml_diff>

<commit_message>
Updated Industry Insights slide to use top eight industries. Updated Partner wordcloud to be based on number of attendees, rather than number of visits.
</commit_message>
<xml_diff>
--- a/GCA_Customer_Insights_Month-Year.pptx
+++ b/GCA_Customer_Insights_Month-Year.pptx
@@ -19,7 +19,7 @@
     <p:sldId id="291" r:id="rId7"/>
     <p:sldId id="292" r:id="rId8"/>
     <p:sldId id="293" r:id="rId9"/>
-    <p:sldId id="298" r:id="rId10"/>
+    <p:sldId id="299" r:id="rId10"/>
     <p:sldId id="297" r:id="rId11"/>
     <p:sldId id="288" r:id="rId12"/>
     <p:sldId id="264" r:id="rId13"/>
@@ -273,7 +273,7 @@
           <a:p>
             <a:fld id="{3CA61830-C416-483F-955E-54203C65B711}" type="datetimeFigureOut">
               <a:rPr lang="en-US"/>
-              <a:t>9/24/2018</a:t>
+              <a:t>9/26/2018</a:t>
             </a:fld>
             <a:endParaRPr dirty="0"/>
           </a:p>
@@ -1947,6 +1947,10 @@
           <a:bodyPr/>
           <a:lstStyle/>
           <a:p>
+            <a:r>
+              <a:rPr lang="en-US" dirty="0" smtClean="0"/>
+              <a:t>Energy and Travel &amp; Trans – add extra boxes?</a:t>
+            </a:r>
             <a:endParaRPr lang="en-US" dirty="0"/>
           </a:p>
         </p:txBody>
@@ -1978,7 +1982,7 @@
     </p:spTree>
     <p:extLst>
       <p:ext uri="{BB962C8B-B14F-4D97-AF65-F5344CB8AC3E}">
-        <p14:creationId xmlns:p14="http://schemas.microsoft.com/office/powerpoint/2010/main" val="2843772448"/>
+        <p14:creationId xmlns:p14="http://schemas.microsoft.com/office/powerpoint/2010/main" val="2016633492"/>
       </p:ext>
     </p:extLst>
   </p:cSld>
@@ -9433,7 +9437,7 @@
           <a:p>
             <a:fld id="{C07C5E14-300D-4720-B5FE-54C7D96D4160}" type="datetime4">
               <a:rPr lang="en-US" smtClean="0"/>
-              <a:t>September 24, 2018</a:t>
+              <a:t>September 26, 2018</a:t>
             </a:fld>
             <a:endParaRPr/>
           </a:p>
@@ -9769,7 +9773,7 @@
           <a:p>
             <a:fld id="{26B45FFC-9EEF-4E69-85F5-C8F54747804D}" type="datetime4">
               <a:rPr lang="en-US" smtClean="0"/>
-              <a:t>September 24, 2018</a:t>
+              <a:t>September 26, 2018</a:t>
             </a:fld>
             <a:endParaRPr/>
           </a:p>
@@ -10003,7 +10007,7 @@
           <a:p>
             <a:fld id="{684E3265-88A3-4C30-AE11-BFDF645909E9}" type="datetime4">
               <a:rPr lang="en-US" smtClean="0"/>
-              <a:t>September 24, 2018</a:t>
+              <a:t>September 26, 2018</a:t>
             </a:fld>
             <a:endParaRPr/>
           </a:p>
@@ -10114,7 +10118,7 @@
           <a:p>
             <a:fld id="{E9F763D2-AF56-4C60-80C7-7D8FC051005C}" type="datetime4">
               <a:rPr lang="en-US" smtClean="0"/>
-              <a:t>September 24, 2018</a:t>
+              <a:t>September 26, 2018</a:t>
             </a:fld>
             <a:endParaRPr/>
           </a:p>
@@ -10392,7 +10396,7 @@
           <a:p>
             <a:fld id="{65FD8143-BFA3-46F8-9B90-B0E5CFAF7F7C}" type="datetime4">
               <a:rPr lang="en-US" smtClean="0"/>
-              <a:t>September 24, 2018</a:t>
+              <a:t>September 26, 2018</a:t>
             </a:fld>
             <a:endParaRPr/>
           </a:p>
@@ -15502,63 +15506,63 @@
                 <a:gridCol w="255798">
                   <a:extLst>
                     <a:ext uri="{9D8B030D-6E8A-4147-A177-3AD203B41FA5}">
-                      <a16:colId xmlns:a16="http://schemas.microsoft.com/office/drawing/2014/main" xmlns="" val="20000"/>
+                      <a16:colId xmlns="" xmlns:a16="http://schemas.microsoft.com/office/drawing/2014/main" val="20000"/>
                     </a:ext>
                   </a:extLst>
                 </a:gridCol>
                 <a:gridCol w="1137177">
                   <a:extLst>
                     <a:ext uri="{9D8B030D-6E8A-4147-A177-3AD203B41FA5}">
-                      <a16:colId xmlns:a16="http://schemas.microsoft.com/office/drawing/2014/main" xmlns="" val="20001"/>
+                      <a16:colId xmlns="" xmlns:a16="http://schemas.microsoft.com/office/drawing/2014/main" val="20001"/>
                     </a:ext>
                   </a:extLst>
                 </a:gridCol>
                 <a:gridCol w="1072557">
                   <a:extLst>
                     <a:ext uri="{9D8B030D-6E8A-4147-A177-3AD203B41FA5}">
-                      <a16:colId xmlns:a16="http://schemas.microsoft.com/office/drawing/2014/main" xmlns="" val="20002"/>
+                      <a16:colId xmlns="" xmlns:a16="http://schemas.microsoft.com/office/drawing/2014/main" val="20002"/>
                     </a:ext>
                   </a:extLst>
                 </a:gridCol>
                 <a:gridCol w="1072557">
                   <a:extLst>
                     <a:ext uri="{9D8B030D-6E8A-4147-A177-3AD203B41FA5}">
-                      <a16:colId xmlns:a16="http://schemas.microsoft.com/office/drawing/2014/main" xmlns="" val="20003"/>
+                      <a16:colId xmlns="" xmlns:a16="http://schemas.microsoft.com/office/drawing/2014/main" val="20003"/>
                     </a:ext>
                   </a:extLst>
                 </a:gridCol>
                 <a:gridCol w="1072557">
                   <a:extLst>
                     <a:ext uri="{9D8B030D-6E8A-4147-A177-3AD203B41FA5}">
-                      <a16:colId xmlns:a16="http://schemas.microsoft.com/office/drawing/2014/main" xmlns="" val="20004"/>
+                      <a16:colId xmlns="" xmlns:a16="http://schemas.microsoft.com/office/drawing/2014/main" val="20004"/>
                     </a:ext>
                   </a:extLst>
                 </a:gridCol>
                 <a:gridCol w="1072557">
                   <a:extLst>
                     <a:ext uri="{9D8B030D-6E8A-4147-A177-3AD203B41FA5}">
-                      <a16:colId xmlns:a16="http://schemas.microsoft.com/office/drawing/2014/main" xmlns="" val="20005"/>
+                      <a16:colId xmlns="" xmlns:a16="http://schemas.microsoft.com/office/drawing/2014/main" val="20005"/>
                     </a:ext>
                   </a:extLst>
                 </a:gridCol>
                 <a:gridCol w="1762247">
                   <a:extLst>
                     <a:ext uri="{9D8B030D-6E8A-4147-A177-3AD203B41FA5}">
-                      <a16:colId xmlns:a16="http://schemas.microsoft.com/office/drawing/2014/main" xmlns="" val="20006"/>
+                      <a16:colId xmlns="" xmlns:a16="http://schemas.microsoft.com/office/drawing/2014/main" val="20006"/>
                     </a:ext>
                   </a:extLst>
                 </a:gridCol>
                 <a:gridCol w="1762247">
                   <a:extLst>
                     <a:ext uri="{9D8B030D-6E8A-4147-A177-3AD203B41FA5}">
-                      <a16:colId xmlns:a16="http://schemas.microsoft.com/office/drawing/2014/main" xmlns="" val="20007"/>
+                      <a16:colId xmlns="" xmlns:a16="http://schemas.microsoft.com/office/drawing/2014/main" val="20007"/>
                     </a:ext>
                   </a:extLst>
                 </a:gridCol>
                 <a:gridCol w="1762247">
                   <a:extLst>
                     <a:ext uri="{9D8B030D-6E8A-4147-A177-3AD203B41FA5}">
-                      <a16:colId xmlns:a16="http://schemas.microsoft.com/office/drawing/2014/main" xmlns="" val="20008"/>
+                      <a16:colId xmlns="" xmlns:a16="http://schemas.microsoft.com/office/drawing/2014/main" val="20008"/>
                     </a:ext>
                   </a:extLst>
                 </a:gridCol>
@@ -16114,7 +16118,7 @@
                 </a:tc>
                 <a:extLst>
                   <a:ext uri="{0D108BD9-81ED-4DB2-BD59-A6C34878D82A}">
-                    <a16:rowId xmlns:a16="http://schemas.microsoft.com/office/drawing/2014/main" xmlns="" val="10000"/>
+                    <a16:rowId xmlns="" xmlns:a16="http://schemas.microsoft.com/office/drawing/2014/main" val="10000"/>
                   </a:ext>
                 </a:extLst>
               </a:tr>
@@ -16817,7 +16821,7 @@
                 </a:tc>
                 <a:extLst>
                   <a:ext uri="{0D108BD9-81ED-4DB2-BD59-A6C34878D82A}">
-                    <a16:rowId xmlns:a16="http://schemas.microsoft.com/office/drawing/2014/main" xmlns="" val="10001"/>
+                    <a16:rowId xmlns="" xmlns:a16="http://schemas.microsoft.com/office/drawing/2014/main" val="10001"/>
                   </a:ext>
                 </a:extLst>
               </a:tr>
@@ -17531,7 +17535,7 @@
                 </a:tc>
                 <a:extLst>
                   <a:ext uri="{0D108BD9-81ED-4DB2-BD59-A6C34878D82A}">
-                    <a16:rowId xmlns:a16="http://schemas.microsoft.com/office/drawing/2014/main" xmlns="" val="10002"/>
+                    <a16:rowId xmlns="" xmlns:a16="http://schemas.microsoft.com/office/drawing/2014/main" val="10002"/>
                   </a:ext>
                 </a:extLst>
               </a:tr>
@@ -18177,7 +18181,7 @@
                 </a:tc>
                 <a:extLst>
                   <a:ext uri="{0D108BD9-81ED-4DB2-BD59-A6C34878D82A}">
-                    <a16:rowId xmlns:a16="http://schemas.microsoft.com/office/drawing/2014/main" xmlns="" val="10003"/>
+                    <a16:rowId xmlns="" xmlns:a16="http://schemas.microsoft.com/office/drawing/2014/main" val="10003"/>
                   </a:ext>
                 </a:extLst>
               </a:tr>
@@ -18824,7 +18828,7 @@
                 </a:tc>
                 <a:extLst>
                   <a:ext uri="{0D108BD9-81ED-4DB2-BD59-A6C34878D82A}">
-                    <a16:rowId xmlns:a16="http://schemas.microsoft.com/office/drawing/2014/main" xmlns="" val="10004"/>
+                    <a16:rowId xmlns="" xmlns:a16="http://schemas.microsoft.com/office/drawing/2014/main" val="10004"/>
                   </a:ext>
                 </a:extLst>
               </a:tr>
@@ -19445,7 +19449,7 @@
                 </a:tc>
                 <a:extLst>
                   <a:ext uri="{0D108BD9-81ED-4DB2-BD59-A6C34878D82A}">
-                    <a16:rowId xmlns:a16="http://schemas.microsoft.com/office/drawing/2014/main" xmlns="" val="10005"/>
+                    <a16:rowId xmlns="" xmlns:a16="http://schemas.microsoft.com/office/drawing/2014/main" val="10005"/>
                   </a:ext>
                 </a:extLst>
               </a:tr>
@@ -21357,42 +21361,42 @@
                 <a:gridCol w="255798">
                   <a:extLst>
                     <a:ext uri="{9D8B030D-6E8A-4147-A177-3AD203B41FA5}">
-                      <a16:colId xmlns:a16="http://schemas.microsoft.com/office/drawing/2014/main" xmlns="" val="20000"/>
+                      <a16:colId xmlns="" xmlns:a16="http://schemas.microsoft.com/office/drawing/2014/main" val="20000"/>
                     </a:ext>
                   </a:extLst>
                 </a:gridCol>
                 <a:gridCol w="1137177">
                   <a:extLst>
                     <a:ext uri="{9D8B030D-6E8A-4147-A177-3AD203B41FA5}">
-                      <a16:colId xmlns:a16="http://schemas.microsoft.com/office/drawing/2014/main" xmlns="" val="20001"/>
+                      <a16:colId xmlns="" xmlns:a16="http://schemas.microsoft.com/office/drawing/2014/main" val="20001"/>
                     </a:ext>
                   </a:extLst>
                 </a:gridCol>
                 <a:gridCol w="1072557">
                   <a:extLst>
                     <a:ext uri="{9D8B030D-6E8A-4147-A177-3AD203B41FA5}">
-                      <a16:colId xmlns:a16="http://schemas.microsoft.com/office/drawing/2014/main" xmlns="" val="20002"/>
+                      <a16:colId xmlns="" xmlns:a16="http://schemas.microsoft.com/office/drawing/2014/main" val="20002"/>
                     </a:ext>
                   </a:extLst>
                 </a:gridCol>
                 <a:gridCol w="1072557">
                   <a:extLst>
                     <a:ext uri="{9D8B030D-6E8A-4147-A177-3AD203B41FA5}">
-                      <a16:colId xmlns:a16="http://schemas.microsoft.com/office/drawing/2014/main" xmlns="" val="20003"/>
+                      <a16:colId xmlns="" xmlns:a16="http://schemas.microsoft.com/office/drawing/2014/main" val="20003"/>
                     </a:ext>
                   </a:extLst>
                 </a:gridCol>
                 <a:gridCol w="1072557">
                   <a:extLst>
                     <a:ext uri="{9D8B030D-6E8A-4147-A177-3AD203B41FA5}">
-                      <a16:colId xmlns:a16="http://schemas.microsoft.com/office/drawing/2014/main" xmlns="" val="20004"/>
+                      <a16:colId xmlns="" xmlns:a16="http://schemas.microsoft.com/office/drawing/2014/main" val="20004"/>
                     </a:ext>
                   </a:extLst>
                 </a:gridCol>
                 <a:gridCol w="1072557">
                   <a:extLst>
                     <a:ext uri="{9D8B030D-6E8A-4147-A177-3AD203B41FA5}">
-                      <a16:colId xmlns:a16="http://schemas.microsoft.com/office/drawing/2014/main" xmlns="" val="20005"/>
+                      <a16:colId xmlns="" xmlns:a16="http://schemas.microsoft.com/office/drawing/2014/main" val="20005"/>
                     </a:ext>
                   </a:extLst>
                 </a:gridCol>
@@ -21707,7 +21711,7 @@
                 </a:tc>
                 <a:extLst>
                   <a:ext uri="{0D108BD9-81ED-4DB2-BD59-A6C34878D82A}">
-                    <a16:rowId xmlns:a16="http://schemas.microsoft.com/office/drawing/2014/main" xmlns="" val="10000"/>
+                    <a16:rowId xmlns="" xmlns:a16="http://schemas.microsoft.com/office/drawing/2014/main" val="10000"/>
                   </a:ext>
                 </a:extLst>
               </a:tr>
@@ -22174,7 +22178,7 @@
                 </a:tc>
                 <a:extLst>
                   <a:ext uri="{0D108BD9-81ED-4DB2-BD59-A6C34878D82A}">
-                    <a16:rowId xmlns:a16="http://schemas.microsoft.com/office/drawing/2014/main" xmlns="" val="10001"/>
+                    <a16:rowId xmlns="" xmlns:a16="http://schemas.microsoft.com/office/drawing/2014/main" val="10001"/>
                   </a:ext>
                 </a:extLst>
               </a:tr>
@@ -22412,28 +22416,28 @@
                 <a:gridCol w="260733">
                   <a:extLst>
                     <a:ext uri="{9D8B030D-6E8A-4147-A177-3AD203B41FA5}">
-                      <a16:colId xmlns:a16="http://schemas.microsoft.com/office/drawing/2014/main" xmlns="" val="20000"/>
+                      <a16:colId xmlns="" xmlns:a16="http://schemas.microsoft.com/office/drawing/2014/main" val="20000"/>
                     </a:ext>
                   </a:extLst>
                 </a:gridCol>
                 <a:gridCol w="1796244">
                   <a:extLst>
                     <a:ext uri="{9D8B030D-6E8A-4147-A177-3AD203B41FA5}">
-                      <a16:colId xmlns:a16="http://schemas.microsoft.com/office/drawing/2014/main" xmlns="" val="20006"/>
+                      <a16:colId xmlns="" xmlns:a16="http://schemas.microsoft.com/office/drawing/2014/main" val="20006"/>
                     </a:ext>
                   </a:extLst>
                 </a:gridCol>
                 <a:gridCol w="1796244">
                   <a:extLst>
                     <a:ext uri="{9D8B030D-6E8A-4147-A177-3AD203B41FA5}">
-                      <a16:colId xmlns:a16="http://schemas.microsoft.com/office/drawing/2014/main" xmlns="" val="20007"/>
+                      <a16:colId xmlns="" xmlns:a16="http://schemas.microsoft.com/office/drawing/2014/main" val="20007"/>
                     </a:ext>
                   </a:extLst>
                 </a:gridCol>
                 <a:gridCol w="1796244">
                   <a:extLst>
                     <a:ext uri="{9D8B030D-6E8A-4147-A177-3AD203B41FA5}">
-                      <a16:colId xmlns:a16="http://schemas.microsoft.com/office/drawing/2014/main" xmlns="" val="20008"/>
+                      <a16:colId xmlns="" xmlns:a16="http://schemas.microsoft.com/office/drawing/2014/main" val="20008"/>
                     </a:ext>
                   </a:extLst>
                 </a:gridCol>
@@ -22729,7 +22733,7 @@
                 </a:tc>
                 <a:extLst>
                   <a:ext uri="{0D108BD9-81ED-4DB2-BD59-A6C34878D82A}">
-                    <a16:rowId xmlns:a16="http://schemas.microsoft.com/office/drawing/2014/main" xmlns="" val="10000"/>
+                    <a16:rowId xmlns="" xmlns:a16="http://schemas.microsoft.com/office/drawing/2014/main" val="10000"/>
                   </a:ext>
                 </a:extLst>
               </a:tr>
@@ -23077,7 +23081,7 @@
                 </a:tc>
                 <a:extLst>
                   <a:ext uri="{0D108BD9-81ED-4DB2-BD59-A6C34878D82A}">
-                    <a16:rowId xmlns:a16="http://schemas.microsoft.com/office/drawing/2014/main" xmlns="" val="10001"/>
+                    <a16:rowId xmlns="" xmlns:a16="http://schemas.microsoft.com/office/drawing/2014/main" val="10001"/>
                   </a:ext>
                 </a:extLst>
               </a:tr>
@@ -43468,8 +43472,8 @@
         </p:nvSpPr>
         <p:spPr>
           <a:xfrm>
-            <a:off x="612456" y="510831"/>
-            <a:ext cx="10969943" cy="406820"/>
+            <a:off x="652955" y="503383"/>
+            <a:ext cx="7184006" cy="406820"/>
           </a:xfrm>
         </p:spPr>
         <p:txBody>
@@ -43483,38 +43487,14 @@
               <a:t>Industry Insights </a:t>
             </a:r>
             <a:r>
-              <a:rPr lang="en-US" dirty="0"/>
-              <a:t>(XXX - XXX)</a:t>
-            </a:r>
-          </a:p>
-        </p:txBody>
-      </p:sp>
-      <p:sp>
-        <p:nvSpPr>
-          <p:cNvPr id="3" name="Slide Number Placeholder 2"/>
-          <p:cNvSpPr>
-            <a:spLocks noGrp="1"/>
-          </p:cNvSpPr>
-          <p:nvPr>
-            <p:ph type="sldNum" sz="quarter" idx="12"/>
-          </p:nvPr>
-        </p:nvSpPr>
-        <p:spPr>
-          <a:xfrm>
-            <a:off x="11031049" y="6506675"/>
-            <a:ext cx="533399" cy="232147"/>
-          </a:xfrm>
-        </p:spPr>
-        <p:txBody>
-          <a:bodyPr/>
-          <a:lstStyle/>
-          <a:p>
-            <a:fld id="{B016F8AB-BCEA-4347-8BA6-BE776009BC89}" type="slidenum">
-              <a:rPr lang="en-US" smtClean="0"/>
-              <a:pPr/>
-              <a:t>9</a:t>
-            </a:fld>
-            <a:endParaRPr lang="en-US"/>
+              <a:rPr lang="en-US" sz="2800" dirty="0" smtClean="0">
+                <a:latin typeface="Arial"/>
+              </a:rPr>
+              <a:t>(XXX-XXX)</a:t>
+            </a:r>
+            <a:endParaRPr sz="2800" dirty="0">
+              <a:latin typeface="Arial"/>
+            </a:endParaRPr>
           </a:p>
         </p:txBody>
       </p:sp>
@@ -43526,7 +43506,7 @@
         </p:nvSpPr>
         <p:spPr>
           <a:xfrm>
-            <a:off x="4440383" y="6636384"/>
+            <a:off x="1846707" y="6409013"/>
             <a:ext cx="7592160" cy="216982"/>
           </a:xfrm>
           <a:prstGeom prst="rect">
@@ -43563,8 +43543,8 @@
         </p:nvSpPr>
         <p:spPr bwMode="ltGray">
           <a:xfrm>
-            <a:off x="9294090" y="1372585"/>
-            <a:ext cx="2286000" cy="2286000"/>
+            <a:off x="6074155" y="4083601"/>
+            <a:ext cx="1838626" cy="2209491"/>
           </a:xfrm>
           <a:prstGeom prst="rect">
             <a:avLst/>
@@ -43572,7 +43552,7 @@
           <a:noFill/>
           <a:ln w="38100">
             <a:solidFill>
-              <a:schemeClr val="accent4"/>
+              <a:schemeClr val="bg2"/>
             </a:solidFill>
           </a:ln>
         </p:spPr>
@@ -43635,8 +43615,8 @@
         </p:nvSpPr>
         <p:spPr>
           <a:xfrm>
-            <a:off x="10573782" y="1382099"/>
-            <a:ext cx="990666" cy="210968"/>
+            <a:off x="6824385" y="4111136"/>
+            <a:ext cx="1080557" cy="228737"/>
           </a:xfrm>
           <a:prstGeom prst="rect">
             <a:avLst/>
@@ -43678,8 +43658,8 @@
         </p:nvSpPr>
         <p:spPr bwMode="ltGray">
           <a:xfrm>
-            <a:off x="616823" y="1998511"/>
-            <a:ext cx="3101977" cy="3075611"/>
+            <a:off x="711992" y="1958547"/>
+            <a:ext cx="2963400" cy="2674535"/>
           </a:xfrm>
           <a:prstGeom prst="rect">
             <a:avLst/>
@@ -43740,8 +43720,8 @@
         </p:nvSpPr>
         <p:spPr bwMode="ltGray">
           <a:xfrm>
-            <a:off x="6891018" y="1372130"/>
-            <a:ext cx="2286000" cy="2286000"/>
+            <a:off x="6051786" y="1464086"/>
+            <a:ext cx="1856046" cy="2209491"/>
           </a:xfrm>
           <a:prstGeom prst="rect">
             <a:avLst/>
@@ -43749,7 +43729,7 @@
           <a:noFill/>
           <a:ln w="38100">
             <a:solidFill>
-              <a:schemeClr val="accent4"/>
+              <a:schemeClr val="bg2"/>
             </a:solidFill>
           </a:ln>
         </p:spPr>
@@ -43812,8 +43792,8 @@
         </p:nvSpPr>
         <p:spPr>
           <a:xfrm>
-            <a:off x="8170710" y="1381644"/>
-            <a:ext cx="990666" cy="210968"/>
+            <a:off x="6813447" y="1484644"/>
+            <a:ext cx="1080557" cy="228737"/>
           </a:xfrm>
           <a:prstGeom prst="rect">
             <a:avLst/>
@@ -43865,8 +43845,8 @@
         </p:nvSpPr>
         <p:spPr bwMode="ltGray">
           <a:xfrm>
-            <a:off x="4488571" y="1383028"/>
-            <a:ext cx="2286000" cy="2286000"/>
+            <a:off x="4117781" y="1463239"/>
+            <a:ext cx="1830127" cy="2209491"/>
           </a:xfrm>
           <a:prstGeom prst="rect">
             <a:avLst/>
@@ -43874,7 +43854,7 @@
           <a:noFill/>
           <a:ln w="38100">
             <a:solidFill>
-              <a:schemeClr val="accent4"/>
+              <a:schemeClr val="bg2"/>
             </a:solidFill>
           </a:ln>
         </p:spPr>
@@ -43931,878 +43911,14 @@
       </p:sp>
       <p:sp>
         <p:nvSpPr>
-          <p:cNvPr id="72" name="Rectangle 71"/>
-          <p:cNvSpPr/>
-          <p:nvPr/>
-        </p:nvSpPr>
-        <p:spPr>
-          <a:xfrm>
-            <a:off x="5768263" y="1392541"/>
-            <a:ext cx="990666" cy="335599"/>
-          </a:xfrm>
-          <a:prstGeom prst="rect">
-            <a:avLst/>
-          </a:prstGeom>
-        </p:spPr>
-        <p:txBody>
-          <a:bodyPr wrap="square" numCol="1" anchor="t">
-            <a:noAutofit/>
-          </a:bodyPr>
-          <a:lstStyle/>
-          <a:p>
-            <a:pPr algn="ctr">
-              <a:lnSpc>
-                <a:spcPct val="90000"/>
-              </a:lnSpc>
-              <a:defRPr sz="1000" b="1">
-                <a:solidFill>
-                  <a:schemeClr val="dk1"/>
-                </a:solidFill>
-              </a:defRPr>
-            </a:pPr>
-            <a:r>
-              <a:rPr sz="1100" dirty="0"/>
-              <a:t>Top </a:t>
-            </a:r>
-            <a:r>
-              <a:rPr lang="en-US" sz="1100" dirty="0" smtClean="0"/>
-              <a:t>interests</a:t>
-            </a:r>
-            <a:endParaRPr lang="en-US" sz="1100" b="1" dirty="0"/>
-          </a:p>
-          <a:p>
-            <a:pPr>
-              <a:defRPr sz="800">
-                <a:solidFill>
-                  <a:schemeClr val="dk2"/>
-                </a:solidFill>
-              </a:defRPr>
-            </a:pPr>
-            <a:r>
-              <a:rPr dirty="0" smtClean="0"/>
-              <a:t> </a:t>
-            </a:r>
-            <a:endParaRPr dirty="0"/>
-          </a:p>
-        </p:txBody>
-      </p:sp>
-      <p:sp>
-        <p:nvSpPr>
-          <p:cNvPr id="75" name="Rectangle 74"/>
-          <p:cNvSpPr/>
-          <p:nvPr/>
-        </p:nvSpPr>
-        <p:spPr>
-          <a:xfrm>
-            <a:off x="5768263" y="3382305"/>
-            <a:ext cx="990041" cy="220421"/>
-          </a:xfrm>
-          <a:prstGeom prst="rect">
-            <a:avLst/>
-          </a:prstGeom>
-        </p:spPr>
-        <p:txBody>
-          <a:bodyPr wrap="none" anchor="ctr" anchorCtr="0">
-            <a:normAutofit fontScale="92500" lnSpcReduction="10000"/>
-          </a:bodyPr>
-          <a:lstStyle/>
-          <a:p>
-            <a:pPr algn="ctr"/>
-            <a:r>
-              <a:rPr lang="en-US" sz="1000" dirty="0" smtClean="0"/>
-              <a:t>0-interest-2</a:t>
-            </a:r>
-            <a:endParaRPr lang="en-GB" sz="800" dirty="0"/>
-          </a:p>
-        </p:txBody>
-      </p:sp>
-      <p:sp>
-        <p:nvSpPr>
-          <p:cNvPr id="77" name="TextBox 76"/>
-          <p:cNvSpPr txBox="1"/>
-          <p:nvPr/>
-        </p:nvSpPr>
-        <p:spPr>
-          <a:xfrm>
-            <a:off x="5768263" y="2129614"/>
-            <a:ext cx="990041" cy="236514"/>
-          </a:xfrm>
-          <a:prstGeom prst="rect">
-            <a:avLst/>
-          </a:prstGeom>
-          <a:noFill/>
-        </p:spPr>
-        <p:txBody>
-          <a:bodyPr wrap="none" lIns="0" tIns="0" rIns="0" bIns="0" rtlCol="0" anchor="ctr" anchorCtr="0">
-            <a:normAutofit/>
-          </a:bodyPr>
-          <a:lstStyle/>
-          <a:p>
-            <a:pPr algn="ctr">
-              <a:lnSpc>
-                <a:spcPct val="90000"/>
-              </a:lnSpc>
-            </a:pPr>
-            <a:r>
-              <a:rPr lang="en-US" sz="1000" dirty="0" smtClean="0"/>
-              <a:t>0-interest-0</a:t>
-            </a:r>
-            <a:endParaRPr lang="en-US" sz="1000" dirty="0"/>
-          </a:p>
-        </p:txBody>
-      </p:sp>
-      <p:sp>
-        <p:nvSpPr>
-          <p:cNvPr id="78" name="TextBox 77"/>
-          <p:cNvSpPr txBox="1"/>
-          <p:nvPr/>
-        </p:nvSpPr>
-        <p:spPr>
-          <a:xfrm>
-            <a:off x="5768263" y="2766831"/>
-            <a:ext cx="990041" cy="214771"/>
-          </a:xfrm>
-          <a:prstGeom prst="rect">
-            <a:avLst/>
-          </a:prstGeom>
-          <a:noFill/>
-        </p:spPr>
-        <p:txBody>
-          <a:bodyPr wrap="none" lIns="0" tIns="0" rIns="0" bIns="0" rtlCol="0" anchor="ctr" anchorCtr="0">
-            <a:normAutofit/>
-          </a:bodyPr>
-          <a:lstStyle/>
-          <a:p>
-            <a:pPr algn="ctr">
-              <a:lnSpc>
-                <a:spcPct val="90000"/>
-              </a:lnSpc>
-            </a:pPr>
-            <a:r>
-              <a:rPr lang="en-US" sz="1000" dirty="0" smtClean="0"/>
-              <a:t>0-interest-1</a:t>
-            </a:r>
-            <a:endParaRPr lang="en-US" sz="1000" dirty="0"/>
-          </a:p>
-        </p:txBody>
-      </p:sp>
-      <p:sp>
-        <p:nvSpPr>
-          <p:cNvPr id="81" name="Rectangle 55"/>
-          <p:cNvSpPr/>
-          <p:nvPr/>
-        </p:nvSpPr>
-        <p:spPr bwMode="ltGray">
-          <a:xfrm>
-            <a:off x="9294090" y="4082556"/>
-            <a:ext cx="2286000" cy="2286000"/>
-          </a:xfrm>
-          <a:prstGeom prst="rect">
-            <a:avLst/>
-          </a:prstGeom>
-          <a:noFill/>
-          <a:ln w="38100">
-            <a:solidFill>
-              <a:schemeClr val="accent4"/>
-            </a:solidFill>
-          </a:ln>
-        </p:spPr>
-        <p:style>
-          <a:lnRef idx="2">
-            <a:schemeClr val="accent1">
-              <a:shade val="50000"/>
-            </a:schemeClr>
-          </a:lnRef>
-          <a:fillRef idx="1">
-            <a:schemeClr val="accent1"/>
-          </a:fillRef>
-          <a:effectRef idx="0">
-            <a:schemeClr val="accent1"/>
-          </a:effectRef>
-          <a:fontRef idx="minor">
-            <a:schemeClr val="lt1"/>
-          </a:fontRef>
-        </p:style>
-        <p:txBody>
-          <a:bodyPr lIns="182880" tIns="182880" rIns="182880" bIns="182880" rtlCol="0" anchor="t"/>
-          <a:lstStyle/>
-          <a:p>
-            <a:pPr marL="45720" indent="-60325">
-              <a:spcBef>
-                <a:spcPts val="1200"/>
-              </a:spcBef>
-              <a:buClr>
-                <a:prstClr val="black"/>
-              </a:buClr>
-            </a:pPr>
-            <a:endParaRPr lang="en-US" sz="1000" dirty="0">
-              <a:solidFill>
-                <a:schemeClr val="tx1"/>
-              </a:solidFill>
-            </a:endParaRPr>
-          </a:p>
-          <a:p>
-            <a:pPr marL="45720" lvl="0" indent="-60325">
-              <a:spcBef>
-                <a:spcPts val="1200"/>
-              </a:spcBef>
-              <a:buClr>
-                <a:prstClr val="black"/>
-              </a:buClr>
-            </a:pPr>
-            <a:endParaRPr lang="en-US" sz="1100" i="1" dirty="0" smtClean="0">
-              <a:solidFill>
-                <a:schemeClr val="tx1"/>
-              </a:solidFill>
-            </a:endParaRPr>
-          </a:p>
-        </p:txBody>
-      </p:sp>
-      <p:sp>
-        <p:nvSpPr>
-          <p:cNvPr id="84" name="Rectangle 83"/>
-          <p:cNvSpPr/>
-          <p:nvPr/>
-        </p:nvSpPr>
-        <p:spPr>
-          <a:xfrm>
-            <a:off x="10573782" y="4092525"/>
-            <a:ext cx="990666" cy="210968"/>
-          </a:xfrm>
-          <a:prstGeom prst="rect">
-            <a:avLst/>
-          </a:prstGeom>
-        </p:spPr>
-        <p:txBody>
-          <a:bodyPr wrap="square" numCol="1" anchor="t">
-            <a:noAutofit/>
-          </a:bodyPr>
-          <a:lstStyle/>
-          <a:p>
-            <a:pPr algn="ctr">
-              <a:lnSpc>
-                <a:spcPct val="90000"/>
-              </a:lnSpc>
-              <a:defRPr sz="1000" b="1">
-                <a:solidFill>
-                  <a:schemeClr val="dk1"/>
-                </a:solidFill>
-              </a:defRPr>
-            </a:pPr>
-            <a:r>
-              <a:rPr sz="1100" dirty="0"/>
-              <a:t>Top </a:t>
-            </a:r>
-            <a:r>
-              <a:rPr lang="en-US" sz="1100" dirty="0" smtClean="0"/>
-              <a:t>interests</a:t>
-            </a:r>
-            <a:endParaRPr lang="en-US" sz="1100" b="1" dirty="0"/>
-          </a:p>
-          <a:p>
-            <a:pPr>
-              <a:defRPr sz="800">
-                <a:solidFill>
-                  <a:schemeClr val="dk2"/>
-                </a:solidFill>
-              </a:defRPr>
-            </a:pPr>
-            <a:r>
-              <a:rPr dirty="0" smtClean="0"/>
-              <a:t> </a:t>
-            </a:r>
-            <a:endParaRPr dirty="0"/>
-          </a:p>
-        </p:txBody>
-      </p:sp>
-      <p:sp>
-        <p:nvSpPr>
-          <p:cNvPr id="93" name="Rectangle 55"/>
-          <p:cNvSpPr/>
-          <p:nvPr/>
-        </p:nvSpPr>
-        <p:spPr bwMode="ltGray">
-          <a:xfrm>
-            <a:off x="6891018" y="4082556"/>
-            <a:ext cx="2286000" cy="2286000"/>
-          </a:xfrm>
-          <a:prstGeom prst="rect">
-            <a:avLst/>
-          </a:prstGeom>
-          <a:noFill/>
-          <a:ln w="38100">
-            <a:solidFill>
-              <a:schemeClr val="accent4"/>
-            </a:solidFill>
-          </a:ln>
-        </p:spPr>
-        <p:style>
-          <a:lnRef idx="2">
-            <a:schemeClr val="accent1">
-              <a:shade val="50000"/>
-            </a:schemeClr>
-          </a:lnRef>
-          <a:fillRef idx="1">
-            <a:schemeClr val="accent1"/>
-          </a:fillRef>
-          <a:effectRef idx="0">
-            <a:schemeClr val="accent1"/>
-          </a:effectRef>
-          <a:fontRef idx="minor">
-            <a:schemeClr val="lt1"/>
-          </a:fontRef>
-        </p:style>
-        <p:txBody>
-          <a:bodyPr lIns="182880" tIns="182880" rIns="182880" bIns="182880" rtlCol="0" anchor="t"/>
-          <a:lstStyle/>
-          <a:p>
-            <a:pPr marL="45720" indent="-60325">
-              <a:spcBef>
-                <a:spcPts val="1200"/>
-              </a:spcBef>
-              <a:buClr>
-                <a:prstClr val="black"/>
-              </a:buClr>
-            </a:pPr>
-            <a:endParaRPr lang="en-US" sz="1000" dirty="0">
-              <a:solidFill>
-                <a:schemeClr val="tx1"/>
-              </a:solidFill>
-            </a:endParaRPr>
-          </a:p>
-          <a:p>
-            <a:pPr marL="45720" lvl="0" indent="-60325">
-              <a:spcBef>
-                <a:spcPts val="1200"/>
-              </a:spcBef>
-              <a:buClr>
-                <a:prstClr val="black"/>
-              </a:buClr>
-            </a:pPr>
-            <a:endParaRPr lang="en-US" sz="1100" i="1" dirty="0" smtClean="0">
-              <a:solidFill>
-                <a:schemeClr val="tx1"/>
-              </a:solidFill>
-            </a:endParaRPr>
-          </a:p>
-        </p:txBody>
-      </p:sp>
-      <p:sp>
-        <p:nvSpPr>
-          <p:cNvPr id="95" name="Rectangle 94"/>
-          <p:cNvSpPr/>
-          <p:nvPr/>
-        </p:nvSpPr>
-        <p:spPr>
-          <a:xfrm>
-            <a:off x="8170710" y="4092070"/>
-            <a:ext cx="990666" cy="210968"/>
-          </a:xfrm>
-          <a:prstGeom prst="rect">
-            <a:avLst/>
-          </a:prstGeom>
-        </p:spPr>
-        <p:txBody>
-          <a:bodyPr wrap="square" numCol="1" anchor="t">
-            <a:noAutofit/>
-          </a:bodyPr>
-          <a:lstStyle/>
-          <a:p>
-            <a:pPr algn="ctr">
-              <a:lnSpc>
-                <a:spcPct val="90000"/>
-              </a:lnSpc>
-              <a:defRPr sz="1000" b="1">
-                <a:solidFill>
-                  <a:schemeClr val="dk1"/>
-                </a:solidFill>
-              </a:defRPr>
-            </a:pPr>
-            <a:r>
-              <a:rPr sz="1100" dirty="0"/>
-              <a:t>Top </a:t>
-            </a:r>
-            <a:r>
-              <a:rPr lang="en-US" sz="1100" dirty="0" smtClean="0"/>
-              <a:t>interests</a:t>
-            </a:r>
-            <a:endParaRPr lang="en-US" sz="1100" b="1" dirty="0"/>
-          </a:p>
-          <a:p>
-            <a:pPr>
-              <a:defRPr sz="800">
-                <a:solidFill>
-                  <a:schemeClr val="dk2"/>
-                </a:solidFill>
-              </a:defRPr>
-            </a:pPr>
-            <a:r>
-              <a:rPr dirty="0" smtClean="0"/>
-              <a:t> </a:t>
-            </a:r>
-            <a:endParaRPr dirty="0"/>
-          </a:p>
-        </p:txBody>
-      </p:sp>
-      <p:sp>
-        <p:nvSpPr>
-          <p:cNvPr id="103" name="Rectangle 55"/>
-          <p:cNvSpPr/>
-          <p:nvPr/>
-        </p:nvSpPr>
-        <p:spPr bwMode="ltGray">
-          <a:xfrm>
-            <a:off x="4488571" y="4093454"/>
-            <a:ext cx="2286000" cy="2286000"/>
-          </a:xfrm>
-          <a:prstGeom prst="rect">
-            <a:avLst/>
-          </a:prstGeom>
-          <a:noFill/>
-          <a:ln w="38100">
-            <a:solidFill>
-              <a:schemeClr val="accent4"/>
-            </a:solidFill>
-          </a:ln>
-        </p:spPr>
-        <p:style>
-          <a:lnRef idx="2">
-            <a:schemeClr val="accent1">
-              <a:shade val="50000"/>
-            </a:schemeClr>
-          </a:lnRef>
-          <a:fillRef idx="1">
-            <a:schemeClr val="accent1"/>
-          </a:fillRef>
-          <a:effectRef idx="0">
-            <a:schemeClr val="accent1"/>
-          </a:effectRef>
-          <a:fontRef idx="minor">
-            <a:schemeClr val="lt1"/>
-          </a:fontRef>
-        </p:style>
-        <p:txBody>
-          <a:bodyPr lIns="182880" tIns="182880" rIns="182880" bIns="182880" rtlCol="0" anchor="t"/>
-          <a:lstStyle/>
-          <a:p>
-            <a:pPr marL="45720" indent="-60325">
-              <a:spcBef>
-                <a:spcPts val="1200"/>
-              </a:spcBef>
-              <a:buClr>
-                <a:prstClr val="black"/>
-              </a:buClr>
-            </a:pPr>
-            <a:endParaRPr lang="en-US" sz="1000" dirty="0">
-              <a:solidFill>
-                <a:schemeClr val="tx1"/>
-              </a:solidFill>
-            </a:endParaRPr>
-          </a:p>
-          <a:p>
-            <a:pPr marL="45720" lvl="0" indent="-60325">
-              <a:spcBef>
-                <a:spcPts val="1200"/>
-              </a:spcBef>
-              <a:buClr>
-                <a:prstClr val="black"/>
-              </a:buClr>
-            </a:pPr>
-            <a:endParaRPr lang="en-US" sz="1100" i="1" dirty="0" smtClean="0">
-              <a:solidFill>
-                <a:schemeClr val="tx1"/>
-              </a:solidFill>
-            </a:endParaRPr>
-          </a:p>
-        </p:txBody>
-      </p:sp>
-      <p:sp>
-        <p:nvSpPr>
-          <p:cNvPr id="105" name="Rectangle 104"/>
-          <p:cNvSpPr/>
-          <p:nvPr/>
-        </p:nvSpPr>
-        <p:spPr>
-          <a:xfrm>
-            <a:off x="5768263" y="4102968"/>
-            <a:ext cx="990666" cy="210968"/>
-          </a:xfrm>
-          <a:prstGeom prst="rect">
-            <a:avLst/>
-          </a:prstGeom>
-        </p:spPr>
-        <p:txBody>
-          <a:bodyPr wrap="square" numCol="1" anchor="t">
-            <a:noAutofit/>
-          </a:bodyPr>
-          <a:lstStyle/>
-          <a:p>
-            <a:pPr algn="ctr">
-              <a:lnSpc>
-                <a:spcPct val="90000"/>
-              </a:lnSpc>
-              <a:defRPr sz="1000" b="1">
-                <a:solidFill>
-                  <a:schemeClr val="dk1"/>
-                </a:solidFill>
-              </a:defRPr>
-            </a:pPr>
-            <a:r>
-              <a:rPr lang="en-US" sz="1100" dirty="0" smtClean="0"/>
-              <a:t>Top interests</a:t>
-            </a:r>
-            <a:endParaRPr lang="en-US" sz="1100" b="1" dirty="0"/>
-          </a:p>
-          <a:p>
-            <a:pPr>
-              <a:defRPr sz="800">
-                <a:solidFill>
-                  <a:schemeClr val="dk2"/>
-                </a:solidFill>
-              </a:defRPr>
-            </a:pPr>
-            <a:r>
-              <a:rPr dirty="0" smtClean="0"/>
-              <a:t> </a:t>
-            </a:r>
-            <a:endParaRPr dirty="0"/>
-          </a:p>
-        </p:txBody>
-      </p:sp>
-      <p:sp>
-        <p:nvSpPr>
-          <p:cNvPr id="6" name="Rectangle 5"/>
-          <p:cNvSpPr/>
-          <p:nvPr/>
-        </p:nvSpPr>
-        <p:spPr bwMode="ltGray">
-          <a:xfrm>
-            <a:off x="6891018" y="1032802"/>
-            <a:ext cx="2270358" cy="274320"/>
-          </a:xfrm>
-          <a:prstGeom prst="rect">
-            <a:avLst/>
-          </a:prstGeom>
-          <a:noFill/>
-          <a:ln w="38100">
-            <a:solidFill>
-              <a:schemeClr val="accent5"/>
-            </a:solidFill>
-          </a:ln>
-        </p:spPr>
-        <p:style>
-          <a:lnRef idx="2">
-            <a:schemeClr val="accent1">
-              <a:shade val="50000"/>
-            </a:schemeClr>
-          </a:lnRef>
-          <a:fillRef idx="1">
-            <a:schemeClr val="accent1"/>
-          </a:fillRef>
-          <a:effectRef idx="0">
-            <a:schemeClr val="accent1"/>
-          </a:effectRef>
-          <a:fontRef idx="minor">
-            <a:schemeClr val="lt1"/>
-          </a:fontRef>
-        </p:style>
-        <p:txBody>
-          <a:bodyPr rtlCol="0" anchor="ctr"/>
-          <a:lstStyle/>
-          <a:p>
-            <a:pPr algn="ctr">
-              <a:lnSpc>
-                <a:spcPct val="90000"/>
-              </a:lnSpc>
-            </a:pPr>
-            <a:endParaRPr lang="en-US" sz="1200" b="1" dirty="0" smtClean="0">
-              <a:solidFill>
-                <a:schemeClr val="tx1"/>
-              </a:solidFill>
-            </a:endParaRPr>
-          </a:p>
-        </p:txBody>
-      </p:sp>
-      <p:sp>
-        <p:nvSpPr>
           <p:cNvPr id="114" name="Rectangle 113"/>
           <p:cNvSpPr/>
           <p:nvPr/>
         </p:nvSpPr>
         <p:spPr bwMode="ltGray">
           <a:xfrm>
-            <a:off x="9294090" y="1040238"/>
-            <a:ext cx="2270358" cy="274320"/>
-          </a:xfrm>
-          <a:prstGeom prst="rect">
-            <a:avLst/>
-          </a:prstGeom>
-          <a:noFill/>
-          <a:ln w="38100">
-            <a:solidFill>
-              <a:schemeClr val="accent5"/>
-            </a:solidFill>
-          </a:ln>
-        </p:spPr>
-        <p:style>
-          <a:lnRef idx="2">
-            <a:schemeClr val="accent1">
-              <a:shade val="50000"/>
-            </a:schemeClr>
-          </a:lnRef>
-          <a:fillRef idx="1">
-            <a:schemeClr val="accent1"/>
-          </a:fillRef>
-          <a:effectRef idx="0">
-            <a:schemeClr val="accent1"/>
-          </a:effectRef>
-          <a:fontRef idx="minor">
-            <a:schemeClr val="lt1"/>
-          </a:fontRef>
-        </p:style>
-        <p:txBody>
-          <a:bodyPr rtlCol="0" anchor="ctr"/>
-          <a:lstStyle/>
-          <a:p>
-            <a:pPr algn="ctr">
-              <a:lnSpc>
-                <a:spcPct val="90000"/>
-              </a:lnSpc>
-            </a:pPr>
-            <a:endParaRPr lang="en-US" sz="1200" b="1" dirty="0" smtClean="0">
-              <a:solidFill>
-                <a:schemeClr val="tx1"/>
-              </a:solidFill>
-            </a:endParaRPr>
-          </a:p>
-        </p:txBody>
-      </p:sp>
-      <p:sp>
-        <p:nvSpPr>
-          <p:cNvPr id="115" name="Rectangle 114"/>
-          <p:cNvSpPr/>
-          <p:nvPr/>
-        </p:nvSpPr>
-        <p:spPr bwMode="ltGray">
-          <a:xfrm>
-            <a:off x="4488571" y="1029395"/>
-            <a:ext cx="2270358" cy="274320"/>
-          </a:xfrm>
-          <a:prstGeom prst="rect">
-            <a:avLst/>
-          </a:prstGeom>
-          <a:noFill/>
-          <a:ln w="38100">
-            <a:solidFill>
-              <a:schemeClr val="accent5"/>
-            </a:solidFill>
-          </a:ln>
-        </p:spPr>
-        <p:style>
-          <a:lnRef idx="2">
-            <a:schemeClr val="accent1">
-              <a:shade val="50000"/>
-            </a:schemeClr>
-          </a:lnRef>
-          <a:fillRef idx="1">
-            <a:schemeClr val="accent1"/>
-          </a:fillRef>
-          <a:effectRef idx="0">
-            <a:schemeClr val="accent1"/>
-          </a:effectRef>
-          <a:fontRef idx="minor">
-            <a:schemeClr val="lt1"/>
-          </a:fontRef>
-        </p:style>
-        <p:txBody>
-          <a:bodyPr rtlCol="0" anchor="ctr"/>
-          <a:lstStyle/>
-          <a:p>
-            <a:pPr algn="ctr">
-              <a:lnSpc>
-                <a:spcPct val="90000"/>
-              </a:lnSpc>
-            </a:pPr>
-            <a:endParaRPr lang="en-US" sz="1200" b="1" dirty="0" smtClean="0">
-              <a:solidFill>
-                <a:schemeClr val="tx1"/>
-              </a:solidFill>
-            </a:endParaRPr>
-          </a:p>
-        </p:txBody>
-      </p:sp>
-      <p:sp>
-        <p:nvSpPr>
-          <p:cNvPr id="116" name="Rectangle 115"/>
-          <p:cNvSpPr/>
-          <p:nvPr/>
-        </p:nvSpPr>
-        <p:spPr bwMode="ltGray">
-          <a:xfrm>
-            <a:off x="6891018" y="3742071"/>
-            <a:ext cx="2270358" cy="274320"/>
-          </a:xfrm>
-          <a:prstGeom prst="rect">
-            <a:avLst/>
-          </a:prstGeom>
-          <a:noFill/>
-          <a:ln w="38100">
-            <a:solidFill>
-              <a:schemeClr val="accent5"/>
-            </a:solidFill>
-          </a:ln>
-        </p:spPr>
-        <p:style>
-          <a:lnRef idx="2">
-            <a:schemeClr val="accent1">
-              <a:shade val="50000"/>
-            </a:schemeClr>
-          </a:lnRef>
-          <a:fillRef idx="1">
-            <a:schemeClr val="accent1"/>
-          </a:fillRef>
-          <a:effectRef idx="0">
-            <a:schemeClr val="accent1"/>
-          </a:effectRef>
-          <a:fontRef idx="minor">
-            <a:schemeClr val="lt1"/>
-          </a:fontRef>
-        </p:style>
-        <p:txBody>
-          <a:bodyPr rtlCol="0" anchor="ctr"/>
-          <a:lstStyle/>
-          <a:p>
-            <a:pPr algn="ctr">
-              <a:lnSpc>
-                <a:spcPct val="90000"/>
-              </a:lnSpc>
-            </a:pPr>
-            <a:endParaRPr lang="en-US" sz="1200" b="1" dirty="0" smtClean="0">
-              <a:solidFill>
-                <a:schemeClr val="tx1"/>
-              </a:solidFill>
-            </a:endParaRPr>
-          </a:p>
-        </p:txBody>
-      </p:sp>
-      <p:sp>
-        <p:nvSpPr>
-          <p:cNvPr id="117" name="Rectangle 116"/>
-          <p:cNvSpPr/>
-          <p:nvPr/>
-        </p:nvSpPr>
-        <p:spPr bwMode="ltGray">
-          <a:xfrm>
-            <a:off x="9309732" y="3750059"/>
-            <a:ext cx="2270358" cy="274320"/>
-          </a:xfrm>
-          <a:prstGeom prst="rect">
-            <a:avLst/>
-          </a:prstGeom>
-          <a:noFill/>
-          <a:ln w="38100">
-            <a:solidFill>
-              <a:schemeClr val="accent5"/>
-            </a:solidFill>
-          </a:ln>
-        </p:spPr>
-        <p:style>
-          <a:lnRef idx="2">
-            <a:schemeClr val="accent1">
-              <a:shade val="50000"/>
-            </a:schemeClr>
-          </a:lnRef>
-          <a:fillRef idx="1">
-            <a:schemeClr val="accent1"/>
-          </a:fillRef>
-          <a:effectRef idx="0">
-            <a:schemeClr val="accent1"/>
-          </a:effectRef>
-          <a:fontRef idx="minor">
-            <a:schemeClr val="lt1"/>
-          </a:fontRef>
-        </p:style>
-        <p:txBody>
-          <a:bodyPr rtlCol="0" anchor="ctr"/>
-          <a:lstStyle/>
-          <a:p>
-            <a:pPr algn="ctr">
-              <a:lnSpc>
-                <a:spcPct val="90000"/>
-              </a:lnSpc>
-            </a:pPr>
-            <a:endParaRPr lang="en-US" sz="1200" b="1" dirty="0" smtClean="0">
-              <a:solidFill>
-                <a:schemeClr val="tx1"/>
-              </a:solidFill>
-            </a:endParaRPr>
-          </a:p>
-        </p:txBody>
-      </p:sp>
-      <p:sp>
-        <p:nvSpPr>
-          <p:cNvPr id="118" name="Rectangle 117"/>
-          <p:cNvSpPr/>
-          <p:nvPr/>
-        </p:nvSpPr>
-        <p:spPr bwMode="ltGray">
-          <a:xfrm>
-            <a:off x="4488571" y="3738664"/>
-            <a:ext cx="2270358" cy="274320"/>
-          </a:xfrm>
-          <a:prstGeom prst="rect">
-            <a:avLst/>
-          </a:prstGeom>
-          <a:noFill/>
-          <a:ln w="38100">
-            <a:solidFill>
-              <a:schemeClr val="accent5"/>
-            </a:solidFill>
-          </a:ln>
-        </p:spPr>
-        <p:style>
-          <a:lnRef idx="2">
-            <a:schemeClr val="accent1">
-              <a:shade val="50000"/>
-            </a:schemeClr>
-          </a:lnRef>
-          <a:fillRef idx="1">
-            <a:schemeClr val="accent1"/>
-          </a:fillRef>
-          <a:effectRef idx="0">
-            <a:schemeClr val="accent1"/>
-          </a:effectRef>
-          <a:fontRef idx="minor">
-            <a:schemeClr val="lt1"/>
-          </a:fontRef>
-        </p:style>
-        <p:txBody>
-          <a:bodyPr rtlCol="0" anchor="ctr"/>
-          <a:lstStyle/>
-          <a:p>
-            <a:pPr algn="ctr">
-              <a:lnSpc>
-                <a:spcPct val="90000"/>
-              </a:lnSpc>
-            </a:pPr>
-            <a:endParaRPr lang="en-US" sz="1200" b="1" dirty="0" smtClean="0">
-              <a:solidFill>
-                <a:schemeClr val="tx1"/>
-              </a:solidFill>
-            </a:endParaRPr>
-          </a:p>
-        </p:txBody>
-      </p:sp>
-      <p:sp>
-        <p:nvSpPr>
-          <p:cNvPr id="119" name="Rectangle 118"/>
-          <p:cNvSpPr/>
-          <p:nvPr/>
-        </p:nvSpPr>
-        <p:spPr bwMode="ltGray">
-          <a:xfrm>
-            <a:off x="612456" y="1381644"/>
-            <a:ext cx="3108960" cy="457200"/>
+            <a:off x="6068704" y="3761572"/>
+            <a:ext cx="1843494" cy="317576"/>
           </a:xfrm>
           <a:prstGeom prst="rect">
             <a:avLst/>
@@ -44839,6 +43955,60 @@
                 <a:spcPct val="90000"/>
               </a:lnSpc>
             </a:pPr>
+            <a:endParaRPr lang="en-US" sz="1200" b="1" dirty="0" smtClean="0">
+              <a:solidFill>
+                <a:schemeClr val="tx1"/>
+              </a:solidFill>
+            </a:endParaRPr>
+          </a:p>
+        </p:txBody>
+      </p:sp>
+      <p:sp>
+        <p:nvSpPr>
+          <p:cNvPr id="119" name="Rectangle 118"/>
+          <p:cNvSpPr/>
+          <p:nvPr/>
+        </p:nvSpPr>
+        <p:spPr bwMode="ltGray">
+          <a:xfrm>
+            <a:off x="706656" y="1569926"/>
+            <a:ext cx="2968736" cy="397579"/>
+          </a:xfrm>
+          <a:prstGeom prst="rect">
+            <a:avLst/>
+          </a:prstGeom>
+          <a:noFill/>
+          <a:ln w="38100">
+            <a:solidFill>
+              <a:schemeClr val="accent1"/>
+            </a:solidFill>
+          </a:ln>
+        </p:spPr>
+        <p:style>
+          <a:lnRef idx="2">
+            <a:schemeClr val="accent1">
+              <a:shade val="50000"/>
+            </a:schemeClr>
+          </a:lnRef>
+          <a:fillRef idx="1">
+            <a:schemeClr val="accent1"/>
+          </a:fillRef>
+          <a:effectRef idx="0">
+            <a:schemeClr val="accent1"/>
+          </a:effectRef>
+          <a:fontRef idx="minor">
+            <a:schemeClr val="lt1"/>
+          </a:fontRef>
+        </p:style>
+        <p:txBody>
+          <a:bodyPr rtlCol="0" anchor="ctr"/>
+          <a:lstStyle/>
+          <a:p>
+            <a:pPr algn="ctr">
+              <a:lnSpc>
+                <a:spcPct val="90000"/>
+              </a:lnSpc>
+            </a:pPr>
             <a:r>
               <a:rPr lang="en-US" sz="1600" b="1" dirty="0" smtClean="0">
                 <a:solidFill>
@@ -44852,14 +44022,1303 @@
       </p:sp>
       <p:sp>
         <p:nvSpPr>
-          <p:cNvPr id="69" name="Rectangle 68"/>
+          <p:cNvPr id="122" name="TextBox 121"/>
+          <p:cNvSpPr txBox="1"/>
+          <p:nvPr/>
+        </p:nvSpPr>
+        <p:spPr>
+          <a:xfrm>
+            <a:off x="6126150" y="1186200"/>
+            <a:ext cx="1676484" cy="307558"/>
+          </a:xfrm>
+          <a:prstGeom prst="rect">
+            <a:avLst/>
+          </a:prstGeom>
+          <a:noFill/>
+        </p:spPr>
+        <p:txBody>
+          <a:bodyPr wrap="none" lIns="0" tIns="0" rIns="0" bIns="0" rtlCol="0" anchor="ctr">
+            <a:noAutofit/>
+          </a:bodyPr>
+          <a:lstStyle/>
+          <a:p>
+            <a:pPr algn="ctr">
+              <a:lnSpc>
+                <a:spcPct val="90000"/>
+              </a:lnSpc>
+            </a:pPr>
+            <a:r>
+              <a:rPr lang="en-GB" dirty="0" smtClean="0"/>
+              <a:t>Industry-1</a:t>
+            </a:r>
+            <a:endParaRPr lang="en-GB" sz="1600" dirty="0"/>
+          </a:p>
+        </p:txBody>
+      </p:sp>
+      <p:sp>
+        <p:nvSpPr>
+          <p:cNvPr id="123" name="TextBox 122"/>
+          <p:cNvSpPr txBox="1"/>
+          <p:nvPr/>
+        </p:nvSpPr>
+        <p:spPr>
+          <a:xfrm>
+            <a:off x="6077361" y="3802053"/>
+            <a:ext cx="1802117" cy="290238"/>
+          </a:xfrm>
+          <a:prstGeom prst="rect">
+            <a:avLst/>
+          </a:prstGeom>
+          <a:noFill/>
+          <a:ln>
+            <a:noFill/>
+          </a:ln>
+        </p:spPr>
+        <p:txBody>
+          <a:bodyPr wrap="none" lIns="0" tIns="0" rIns="0" bIns="0" rtlCol="0" anchor="ctr">
+            <a:noAutofit/>
+          </a:bodyPr>
+          <a:lstStyle/>
+          <a:p>
+            <a:pPr algn="ctr">
+              <a:lnSpc>
+                <a:spcPct val="90000"/>
+              </a:lnSpc>
+            </a:pPr>
+            <a:r>
+              <a:rPr lang="en-US" dirty="0" smtClean="0"/>
+              <a:t>Industry-5</a:t>
+            </a:r>
+            <a:endParaRPr lang="en-GB" sz="1600" dirty="0"/>
+          </a:p>
+        </p:txBody>
+      </p:sp>
+      <p:sp>
+        <p:nvSpPr>
+          <p:cNvPr id="115" name="Rectangle 114"/>
+          <p:cNvSpPr/>
+          <p:nvPr/>
+        </p:nvSpPr>
+        <p:spPr bwMode="ltGray">
+          <a:xfrm>
+            <a:off x="6049306" y="1158997"/>
+            <a:ext cx="1858526" cy="319148"/>
+          </a:xfrm>
+          <a:prstGeom prst="rect">
+            <a:avLst/>
+          </a:prstGeom>
+          <a:noFill/>
+          <a:ln w="38100">
+            <a:solidFill>
+              <a:schemeClr val="accent1"/>
+            </a:solidFill>
+          </a:ln>
+        </p:spPr>
+        <p:style>
+          <a:lnRef idx="2">
+            <a:schemeClr val="accent1">
+              <a:shade val="50000"/>
+            </a:schemeClr>
+          </a:lnRef>
+          <a:fillRef idx="1">
+            <a:schemeClr val="accent1"/>
+          </a:fillRef>
+          <a:effectRef idx="0">
+            <a:schemeClr val="accent1"/>
+          </a:effectRef>
+          <a:fontRef idx="minor">
+            <a:schemeClr val="lt1"/>
+          </a:fontRef>
+        </p:style>
+        <p:txBody>
+          <a:bodyPr rtlCol="0" anchor="ctr"/>
+          <a:lstStyle/>
+          <a:p>
+            <a:pPr algn="ctr">
+              <a:lnSpc>
+                <a:spcPct val="90000"/>
+              </a:lnSpc>
+            </a:pPr>
+            <a:endParaRPr lang="en-US" sz="1200" b="1" dirty="0" smtClean="0">
+              <a:solidFill>
+                <a:schemeClr val="tx1"/>
+              </a:solidFill>
+            </a:endParaRPr>
+          </a:p>
+        </p:txBody>
+      </p:sp>
+      <p:sp>
+        <p:nvSpPr>
+          <p:cNvPr id="7" name="TextBox 6"/>
+          <p:cNvSpPr txBox="1"/>
+          <p:nvPr/>
+        </p:nvSpPr>
+        <p:spPr>
+          <a:xfrm>
+            <a:off x="4244958" y="1190904"/>
+            <a:ext cx="1669969" cy="278719"/>
+          </a:xfrm>
+          <a:prstGeom prst="rect">
+            <a:avLst/>
+          </a:prstGeom>
+          <a:noFill/>
+        </p:spPr>
+        <p:txBody>
+          <a:bodyPr wrap="none" lIns="0" tIns="0" rIns="0" bIns="0" rtlCol="0" anchor="ctr">
+            <a:noAutofit/>
+          </a:bodyPr>
+          <a:lstStyle/>
+          <a:p>
+            <a:pPr algn="ctr">
+              <a:lnSpc>
+                <a:spcPct val="90000"/>
+              </a:lnSpc>
+            </a:pPr>
+            <a:r>
+              <a:rPr lang="en-US" dirty="0" smtClean="0"/>
+              <a:t>Industry-0</a:t>
+            </a:r>
+            <a:endParaRPr lang="en-GB" sz="1600" dirty="0"/>
+          </a:p>
+        </p:txBody>
+      </p:sp>
+      <p:sp>
+        <p:nvSpPr>
+          <p:cNvPr id="6" name="Rectangle 5"/>
+          <p:cNvSpPr/>
+          <p:nvPr/>
+        </p:nvSpPr>
+        <p:spPr bwMode="ltGray">
+          <a:xfrm>
+            <a:off x="4117781" y="1159284"/>
+            <a:ext cx="1838353" cy="305388"/>
+          </a:xfrm>
+          <a:prstGeom prst="rect">
+            <a:avLst/>
+          </a:prstGeom>
+          <a:noFill/>
+          <a:ln w="38100">
+            <a:solidFill>
+              <a:schemeClr val="accent1"/>
+            </a:solidFill>
+          </a:ln>
+        </p:spPr>
+        <p:style>
+          <a:lnRef idx="2">
+            <a:schemeClr val="accent1">
+              <a:shade val="50000"/>
+            </a:schemeClr>
+          </a:lnRef>
+          <a:fillRef idx="1">
+            <a:schemeClr val="accent1"/>
+          </a:fillRef>
+          <a:effectRef idx="0">
+            <a:schemeClr val="accent1"/>
+          </a:effectRef>
+          <a:fontRef idx="minor">
+            <a:schemeClr val="lt1"/>
+          </a:fontRef>
+        </p:style>
+        <p:txBody>
+          <a:bodyPr rtlCol="0" anchor="ctr"/>
+          <a:lstStyle/>
+          <a:p>
+            <a:pPr algn="ctr">
+              <a:lnSpc>
+                <a:spcPct val="90000"/>
+              </a:lnSpc>
+            </a:pPr>
+            <a:endParaRPr lang="en-US" sz="1200" b="1" dirty="0" smtClean="0">
+              <a:solidFill>
+                <a:schemeClr val="tx1"/>
+              </a:solidFill>
+            </a:endParaRPr>
+          </a:p>
+        </p:txBody>
+      </p:sp>
+      <p:sp>
+        <p:nvSpPr>
+          <p:cNvPr id="87" name="Rectangle 55"/>
+          <p:cNvSpPr/>
+          <p:nvPr/>
+        </p:nvSpPr>
+        <p:spPr bwMode="ltGray">
+          <a:xfrm>
+            <a:off x="4111109" y="4083312"/>
+            <a:ext cx="1838626" cy="2209491"/>
+          </a:xfrm>
+          <a:prstGeom prst="rect">
+            <a:avLst/>
+          </a:prstGeom>
+          <a:noFill/>
+          <a:ln w="38100">
+            <a:solidFill>
+              <a:schemeClr val="bg2"/>
+            </a:solidFill>
+          </a:ln>
+        </p:spPr>
+        <p:style>
+          <a:lnRef idx="2">
+            <a:schemeClr val="accent1">
+              <a:shade val="50000"/>
+            </a:schemeClr>
+          </a:lnRef>
+          <a:fillRef idx="1">
+            <a:schemeClr val="accent1"/>
+          </a:fillRef>
+          <a:effectRef idx="0">
+            <a:schemeClr val="accent1"/>
+          </a:effectRef>
+          <a:fontRef idx="minor">
+            <a:schemeClr val="lt1"/>
+          </a:fontRef>
+        </p:style>
+        <p:txBody>
+          <a:bodyPr lIns="182880" tIns="182880" rIns="182880" bIns="182880" rtlCol="0" anchor="t"/>
+          <a:lstStyle/>
+          <a:p>
+            <a:pPr marL="45720" indent="-60325">
+              <a:spcBef>
+                <a:spcPts val="1200"/>
+              </a:spcBef>
+              <a:buClr>
+                <a:prstClr val="black"/>
+              </a:buClr>
+            </a:pPr>
+            <a:endParaRPr lang="en-US" sz="1000" dirty="0">
+              <a:solidFill>
+                <a:schemeClr val="tx1"/>
+              </a:solidFill>
+            </a:endParaRPr>
+          </a:p>
+          <a:p>
+            <a:pPr marL="45720" lvl="0" indent="-60325">
+              <a:spcBef>
+                <a:spcPts val="1200"/>
+              </a:spcBef>
+              <a:buClr>
+                <a:prstClr val="black"/>
+              </a:buClr>
+            </a:pPr>
+            <a:endParaRPr lang="en-US" sz="1100" i="1" dirty="0" smtClean="0">
+              <a:solidFill>
+                <a:schemeClr val="tx1"/>
+              </a:solidFill>
+            </a:endParaRPr>
+          </a:p>
+        </p:txBody>
+      </p:sp>
+      <p:sp>
+        <p:nvSpPr>
+          <p:cNvPr id="88" name="Rectangle 87"/>
           <p:cNvSpPr/>
           <p:nvPr/>
         </p:nvSpPr>
         <p:spPr>
           <a:xfrm>
-            <a:off x="8149628" y="3373355"/>
-            <a:ext cx="990042" cy="229371"/>
+            <a:off x="4883402" y="4143892"/>
+            <a:ext cx="1080557" cy="228737"/>
+          </a:xfrm>
+          <a:prstGeom prst="rect">
+            <a:avLst/>
+          </a:prstGeom>
+        </p:spPr>
+        <p:txBody>
+          <a:bodyPr wrap="square" numCol="1" anchor="t">
+            <a:noAutofit/>
+          </a:bodyPr>
+          <a:lstStyle/>
+          <a:p>
+            <a:pPr algn="ctr">
+              <a:lnSpc>
+                <a:spcPct val="90000"/>
+              </a:lnSpc>
+              <a:defRPr sz="1000" b="1">
+                <a:solidFill>
+                  <a:schemeClr val="dk1"/>
+                </a:solidFill>
+              </a:defRPr>
+            </a:pPr>
+            <a:r>
+              <a:rPr sz="1100" dirty="0"/>
+              <a:t>Top </a:t>
+            </a:r>
+            <a:r>
+              <a:rPr lang="en-US" sz="1100" dirty="0" smtClean="0"/>
+              <a:t>interests</a:t>
+            </a:r>
+            <a:endParaRPr lang="en-US" sz="1100" b="1" dirty="0"/>
+          </a:p>
+          <a:p>
+            <a:pPr>
+              <a:defRPr sz="800">
+                <a:solidFill>
+                  <a:schemeClr val="dk2"/>
+                </a:solidFill>
+              </a:defRPr>
+            </a:pPr>
+            <a:r>
+              <a:rPr dirty="0" smtClean="0"/>
+              <a:t> </a:t>
+            </a:r>
+            <a:endParaRPr dirty="0"/>
+          </a:p>
+        </p:txBody>
+      </p:sp>
+      <p:sp>
+        <p:nvSpPr>
+          <p:cNvPr id="97" name="Rectangle 96"/>
+          <p:cNvSpPr/>
+          <p:nvPr/>
+        </p:nvSpPr>
+        <p:spPr bwMode="ltGray">
+          <a:xfrm>
+            <a:off x="4119731" y="3761283"/>
+            <a:ext cx="1841367" cy="316097"/>
+          </a:xfrm>
+          <a:prstGeom prst="rect">
+            <a:avLst/>
+          </a:prstGeom>
+          <a:noFill/>
+          <a:ln w="38100">
+            <a:solidFill>
+              <a:schemeClr val="accent1"/>
+            </a:solidFill>
+          </a:ln>
+        </p:spPr>
+        <p:style>
+          <a:lnRef idx="2">
+            <a:schemeClr val="accent1">
+              <a:shade val="50000"/>
+            </a:schemeClr>
+          </a:lnRef>
+          <a:fillRef idx="1">
+            <a:schemeClr val="accent1"/>
+          </a:fillRef>
+          <a:effectRef idx="0">
+            <a:schemeClr val="accent1"/>
+          </a:effectRef>
+          <a:fontRef idx="minor">
+            <a:schemeClr val="lt1"/>
+          </a:fontRef>
+        </p:style>
+        <p:txBody>
+          <a:bodyPr rtlCol="0" anchor="ctr"/>
+          <a:lstStyle/>
+          <a:p>
+            <a:pPr algn="ctr">
+              <a:lnSpc>
+                <a:spcPct val="90000"/>
+              </a:lnSpc>
+            </a:pPr>
+            <a:endParaRPr lang="en-US" sz="1200" b="1" dirty="0" smtClean="0">
+              <a:solidFill>
+                <a:schemeClr val="tx1"/>
+              </a:solidFill>
+            </a:endParaRPr>
+          </a:p>
+        </p:txBody>
+      </p:sp>
+      <p:sp>
+        <p:nvSpPr>
+          <p:cNvPr id="98" name="TextBox 97"/>
+          <p:cNvSpPr txBox="1"/>
+          <p:nvPr/>
+        </p:nvSpPr>
+        <p:spPr>
+          <a:xfrm>
+            <a:off x="4199700" y="3828031"/>
+            <a:ext cx="1657364" cy="264260"/>
+          </a:xfrm>
+          <a:prstGeom prst="rect">
+            <a:avLst/>
+          </a:prstGeom>
+          <a:noFill/>
+          <a:ln>
+            <a:noFill/>
+          </a:ln>
+        </p:spPr>
+        <p:txBody>
+          <a:bodyPr wrap="none" lIns="0" tIns="0" rIns="0" bIns="0" rtlCol="0" anchor="ctr">
+            <a:noAutofit/>
+          </a:bodyPr>
+          <a:lstStyle/>
+          <a:p>
+            <a:pPr algn="ctr">
+              <a:lnSpc>
+                <a:spcPct val="90000"/>
+              </a:lnSpc>
+            </a:pPr>
+            <a:r>
+              <a:rPr lang="en-US" dirty="0" smtClean="0"/>
+              <a:t>Industry-4</a:t>
+            </a:r>
+            <a:endParaRPr lang="en-GB" sz="1600" dirty="0"/>
+          </a:p>
+        </p:txBody>
+      </p:sp>
+      <p:sp>
+        <p:nvSpPr>
+          <p:cNvPr id="107" name="Rectangle 55"/>
+          <p:cNvSpPr/>
+          <p:nvPr/>
+        </p:nvSpPr>
+        <p:spPr bwMode="ltGray">
+          <a:xfrm>
+            <a:off x="8006193" y="1463359"/>
+            <a:ext cx="1830127" cy="2209491"/>
+          </a:xfrm>
+          <a:prstGeom prst="rect">
+            <a:avLst/>
+          </a:prstGeom>
+          <a:noFill/>
+          <a:ln w="38100">
+            <a:solidFill>
+              <a:schemeClr val="bg2"/>
+            </a:solidFill>
+          </a:ln>
+        </p:spPr>
+        <p:style>
+          <a:lnRef idx="2">
+            <a:schemeClr val="accent1">
+              <a:shade val="50000"/>
+            </a:schemeClr>
+          </a:lnRef>
+          <a:fillRef idx="1">
+            <a:schemeClr val="accent1"/>
+          </a:fillRef>
+          <a:effectRef idx="0">
+            <a:schemeClr val="accent1"/>
+          </a:effectRef>
+          <a:fontRef idx="minor">
+            <a:schemeClr val="lt1"/>
+          </a:fontRef>
+        </p:style>
+        <p:txBody>
+          <a:bodyPr lIns="182880" tIns="182880" rIns="182880" bIns="182880" rtlCol="0" anchor="t"/>
+          <a:lstStyle/>
+          <a:p>
+            <a:pPr marL="45720" indent="-60325">
+              <a:spcBef>
+                <a:spcPts val="1200"/>
+              </a:spcBef>
+              <a:buClr>
+                <a:prstClr val="black"/>
+              </a:buClr>
+            </a:pPr>
+            <a:endParaRPr lang="en-US" sz="1000" dirty="0">
+              <a:solidFill>
+                <a:schemeClr val="tx1"/>
+              </a:solidFill>
+            </a:endParaRPr>
+          </a:p>
+          <a:p>
+            <a:pPr marL="45720" lvl="0" indent="-60325">
+              <a:spcBef>
+                <a:spcPts val="1200"/>
+              </a:spcBef>
+              <a:buClr>
+                <a:prstClr val="black"/>
+              </a:buClr>
+            </a:pPr>
+            <a:endParaRPr lang="en-US" sz="1100" i="1" dirty="0" smtClean="0">
+              <a:solidFill>
+                <a:schemeClr val="tx1"/>
+              </a:solidFill>
+            </a:endParaRPr>
+          </a:p>
+        </p:txBody>
+      </p:sp>
+      <p:sp>
+        <p:nvSpPr>
+          <p:cNvPr id="108" name="Rectangle 107"/>
+          <p:cNvSpPr/>
+          <p:nvPr/>
+        </p:nvSpPr>
+        <p:spPr>
+          <a:xfrm>
+            <a:off x="8802551" y="1483917"/>
+            <a:ext cx="1080557" cy="228737"/>
+          </a:xfrm>
+          <a:prstGeom prst="rect">
+            <a:avLst/>
+          </a:prstGeom>
+        </p:spPr>
+        <p:txBody>
+          <a:bodyPr wrap="square" numCol="1" anchor="t">
+            <a:noAutofit/>
+          </a:bodyPr>
+          <a:lstStyle/>
+          <a:p>
+            <a:pPr algn="ctr">
+              <a:lnSpc>
+                <a:spcPct val="90000"/>
+              </a:lnSpc>
+              <a:defRPr sz="1000" b="1">
+                <a:solidFill>
+                  <a:schemeClr val="dk1"/>
+                </a:solidFill>
+              </a:defRPr>
+            </a:pPr>
+            <a:r>
+              <a:rPr sz="1100" dirty="0"/>
+              <a:t>Top </a:t>
+            </a:r>
+            <a:r>
+              <a:rPr lang="en-US" sz="1100" dirty="0" smtClean="0"/>
+              <a:t>interests</a:t>
+            </a:r>
+            <a:endParaRPr lang="en-US" sz="1100" b="1" dirty="0"/>
+          </a:p>
+          <a:p>
+            <a:pPr>
+              <a:defRPr sz="800">
+                <a:solidFill>
+                  <a:schemeClr val="dk2"/>
+                </a:solidFill>
+              </a:defRPr>
+            </a:pPr>
+            <a:r>
+              <a:rPr dirty="0" smtClean="0"/>
+              <a:t> </a:t>
+            </a:r>
+            <a:endParaRPr dirty="0"/>
+          </a:p>
+        </p:txBody>
+      </p:sp>
+      <p:sp>
+        <p:nvSpPr>
+          <p:cNvPr id="127" name="Rectangle 126"/>
+          <p:cNvSpPr/>
+          <p:nvPr/>
+        </p:nvSpPr>
+        <p:spPr bwMode="ltGray">
+          <a:xfrm>
+            <a:off x="8006192" y="1167303"/>
+            <a:ext cx="1830129" cy="298403"/>
+          </a:xfrm>
+          <a:prstGeom prst="rect">
+            <a:avLst/>
+          </a:prstGeom>
+          <a:noFill/>
+          <a:ln w="38100">
+            <a:solidFill>
+              <a:schemeClr val="accent1"/>
+            </a:solidFill>
+          </a:ln>
+        </p:spPr>
+        <p:style>
+          <a:lnRef idx="2">
+            <a:schemeClr val="accent1">
+              <a:shade val="50000"/>
+            </a:schemeClr>
+          </a:lnRef>
+          <a:fillRef idx="1">
+            <a:schemeClr val="accent1"/>
+          </a:fillRef>
+          <a:effectRef idx="0">
+            <a:schemeClr val="accent1"/>
+          </a:effectRef>
+          <a:fontRef idx="minor">
+            <a:schemeClr val="lt1"/>
+          </a:fontRef>
+        </p:style>
+        <p:txBody>
+          <a:bodyPr rtlCol="0" anchor="ctr"/>
+          <a:lstStyle/>
+          <a:p>
+            <a:pPr algn="ctr">
+              <a:lnSpc>
+                <a:spcPct val="90000"/>
+              </a:lnSpc>
+            </a:pPr>
+            <a:endParaRPr lang="en-US" sz="1200" b="1" dirty="0" smtClean="0">
+              <a:solidFill>
+                <a:schemeClr val="tx1"/>
+              </a:solidFill>
+            </a:endParaRPr>
+          </a:p>
+        </p:txBody>
+      </p:sp>
+      <p:sp>
+        <p:nvSpPr>
+          <p:cNvPr id="128" name="TextBox 127"/>
+          <p:cNvSpPr txBox="1"/>
+          <p:nvPr/>
+        </p:nvSpPr>
+        <p:spPr>
+          <a:xfrm>
+            <a:off x="8116442" y="1197498"/>
+            <a:ext cx="1591944" cy="272125"/>
+          </a:xfrm>
+          <a:prstGeom prst="rect">
+            <a:avLst/>
+          </a:prstGeom>
+          <a:noFill/>
+        </p:spPr>
+        <p:txBody>
+          <a:bodyPr wrap="none" lIns="0" tIns="0" rIns="0" bIns="0" rtlCol="0" anchor="ctr">
+            <a:noAutofit/>
+          </a:bodyPr>
+          <a:lstStyle/>
+          <a:p>
+            <a:pPr algn="ctr">
+              <a:lnSpc>
+                <a:spcPct val="90000"/>
+              </a:lnSpc>
+            </a:pPr>
+            <a:r>
+              <a:rPr lang="en-US" dirty="0" smtClean="0"/>
+              <a:t>Industry-2</a:t>
+            </a:r>
+            <a:endParaRPr lang="en-GB" sz="1600" dirty="0"/>
+          </a:p>
+        </p:txBody>
+      </p:sp>
+      <p:sp>
+        <p:nvSpPr>
+          <p:cNvPr id="134" name="Rectangle 55"/>
+          <p:cNvSpPr/>
+          <p:nvPr/>
+        </p:nvSpPr>
+        <p:spPr bwMode="ltGray">
+          <a:xfrm>
+            <a:off x="8012265" y="4074107"/>
+            <a:ext cx="1838626" cy="2209491"/>
+          </a:xfrm>
+          <a:prstGeom prst="rect">
+            <a:avLst/>
+          </a:prstGeom>
+          <a:noFill/>
+          <a:ln w="38100">
+            <a:solidFill>
+              <a:schemeClr val="bg2"/>
+            </a:solidFill>
+          </a:ln>
+        </p:spPr>
+        <p:style>
+          <a:lnRef idx="2">
+            <a:schemeClr val="accent1">
+              <a:shade val="50000"/>
+            </a:schemeClr>
+          </a:lnRef>
+          <a:fillRef idx="1">
+            <a:schemeClr val="accent1"/>
+          </a:fillRef>
+          <a:effectRef idx="0">
+            <a:schemeClr val="accent1"/>
+          </a:effectRef>
+          <a:fontRef idx="minor">
+            <a:schemeClr val="lt1"/>
+          </a:fontRef>
+        </p:style>
+        <p:txBody>
+          <a:bodyPr lIns="182880" tIns="182880" rIns="182880" bIns="182880" rtlCol="0" anchor="t"/>
+          <a:lstStyle/>
+          <a:p>
+            <a:pPr marL="45720" indent="-60325">
+              <a:spcBef>
+                <a:spcPts val="1200"/>
+              </a:spcBef>
+              <a:buClr>
+                <a:prstClr val="black"/>
+              </a:buClr>
+            </a:pPr>
+            <a:endParaRPr lang="en-US" sz="1000" dirty="0">
+              <a:solidFill>
+                <a:schemeClr val="tx1"/>
+              </a:solidFill>
+            </a:endParaRPr>
+          </a:p>
+          <a:p>
+            <a:pPr marL="45720" lvl="0" indent="-60325">
+              <a:spcBef>
+                <a:spcPts val="1200"/>
+              </a:spcBef>
+              <a:buClr>
+                <a:prstClr val="black"/>
+              </a:buClr>
+            </a:pPr>
+            <a:endParaRPr lang="en-US" sz="1100" i="1" dirty="0" smtClean="0">
+              <a:solidFill>
+                <a:schemeClr val="tx1"/>
+              </a:solidFill>
+            </a:endParaRPr>
+          </a:p>
+        </p:txBody>
+      </p:sp>
+      <p:sp>
+        <p:nvSpPr>
+          <p:cNvPr id="135" name="Rectangle 134"/>
+          <p:cNvSpPr/>
+          <p:nvPr/>
+        </p:nvSpPr>
+        <p:spPr>
+          <a:xfrm>
+            <a:off x="8808622" y="4115088"/>
+            <a:ext cx="1080557" cy="228737"/>
+          </a:xfrm>
+          <a:prstGeom prst="rect">
+            <a:avLst/>
+          </a:prstGeom>
+        </p:spPr>
+        <p:txBody>
+          <a:bodyPr wrap="square" numCol="1" anchor="t">
+            <a:noAutofit/>
+          </a:bodyPr>
+          <a:lstStyle/>
+          <a:p>
+            <a:pPr algn="ctr">
+              <a:lnSpc>
+                <a:spcPct val="90000"/>
+              </a:lnSpc>
+              <a:defRPr sz="1000" b="1">
+                <a:solidFill>
+                  <a:schemeClr val="dk1"/>
+                </a:solidFill>
+              </a:defRPr>
+            </a:pPr>
+            <a:r>
+              <a:rPr lang="en-US" sz="1100" dirty="0" smtClean="0"/>
+              <a:t>Top interests</a:t>
+            </a:r>
+            <a:endParaRPr lang="en-US" sz="1100" b="1" dirty="0"/>
+          </a:p>
+          <a:p>
+            <a:pPr>
+              <a:defRPr sz="800">
+                <a:solidFill>
+                  <a:schemeClr val="dk2"/>
+                </a:solidFill>
+              </a:defRPr>
+            </a:pPr>
+            <a:r>
+              <a:rPr dirty="0" smtClean="0"/>
+              <a:t> </a:t>
+            </a:r>
+            <a:endParaRPr dirty="0"/>
+          </a:p>
+        </p:txBody>
+      </p:sp>
+      <p:sp>
+        <p:nvSpPr>
+          <p:cNvPr id="136" name="Rectangle 135"/>
+          <p:cNvSpPr/>
+          <p:nvPr/>
+        </p:nvSpPr>
+        <p:spPr bwMode="ltGray">
+          <a:xfrm>
+            <a:off x="8024298" y="3763508"/>
+            <a:ext cx="1826594" cy="310045"/>
+          </a:xfrm>
+          <a:prstGeom prst="rect">
+            <a:avLst/>
+          </a:prstGeom>
+          <a:noFill/>
+          <a:ln w="38100">
+            <a:solidFill>
+              <a:schemeClr val="accent1"/>
+            </a:solidFill>
+          </a:ln>
+        </p:spPr>
+        <p:style>
+          <a:lnRef idx="2">
+            <a:schemeClr val="accent1">
+              <a:shade val="50000"/>
+            </a:schemeClr>
+          </a:lnRef>
+          <a:fillRef idx="1">
+            <a:schemeClr val="accent1"/>
+          </a:fillRef>
+          <a:effectRef idx="0">
+            <a:schemeClr val="accent1"/>
+          </a:effectRef>
+          <a:fontRef idx="minor">
+            <a:schemeClr val="lt1"/>
+          </a:fontRef>
+        </p:style>
+        <p:txBody>
+          <a:bodyPr rtlCol="0" anchor="ctr"/>
+          <a:lstStyle/>
+          <a:p>
+            <a:pPr algn="ctr">
+              <a:lnSpc>
+                <a:spcPct val="90000"/>
+              </a:lnSpc>
+            </a:pPr>
+            <a:endParaRPr lang="en-US" sz="1200" b="1" dirty="0" smtClean="0">
+              <a:solidFill>
+                <a:schemeClr val="tx1"/>
+              </a:solidFill>
+            </a:endParaRPr>
+          </a:p>
+        </p:txBody>
+      </p:sp>
+      <p:sp>
+        <p:nvSpPr>
+          <p:cNvPr id="140" name="TextBox 139"/>
+          <p:cNvSpPr txBox="1"/>
+          <p:nvPr/>
+        </p:nvSpPr>
+        <p:spPr>
+          <a:xfrm>
+            <a:off x="8217280" y="3814354"/>
+            <a:ext cx="1424547" cy="277937"/>
+          </a:xfrm>
+          <a:prstGeom prst="rect">
+            <a:avLst/>
+          </a:prstGeom>
+          <a:noFill/>
+          <a:ln>
+            <a:noFill/>
+          </a:ln>
+        </p:spPr>
+        <p:txBody>
+          <a:bodyPr wrap="none" lIns="0" tIns="0" rIns="0" bIns="0" rtlCol="0" anchor="ctr">
+            <a:noAutofit/>
+          </a:bodyPr>
+          <a:lstStyle/>
+          <a:p>
+            <a:pPr algn="ctr">
+              <a:lnSpc>
+                <a:spcPct val="90000"/>
+              </a:lnSpc>
+            </a:pPr>
+            <a:r>
+              <a:rPr lang="en-US" dirty="0" smtClean="0"/>
+              <a:t>Industry-6</a:t>
+            </a:r>
+            <a:endParaRPr lang="en-GB" sz="1600" dirty="0"/>
+          </a:p>
+        </p:txBody>
+      </p:sp>
+      <p:sp>
+        <p:nvSpPr>
+          <p:cNvPr id="72" name="Rectangle 71"/>
+          <p:cNvSpPr/>
+          <p:nvPr/>
+        </p:nvSpPr>
+        <p:spPr>
+          <a:xfrm>
+            <a:off x="4890075" y="1483798"/>
+            <a:ext cx="1080557" cy="252316"/>
+          </a:xfrm>
+          <a:prstGeom prst="rect">
+            <a:avLst/>
+          </a:prstGeom>
+        </p:spPr>
+        <p:txBody>
+          <a:bodyPr wrap="square" numCol="1" anchor="t">
+            <a:noAutofit/>
+          </a:bodyPr>
+          <a:lstStyle/>
+          <a:p>
+            <a:pPr algn="ctr">
+              <a:lnSpc>
+                <a:spcPct val="90000"/>
+              </a:lnSpc>
+              <a:defRPr sz="1000" b="1">
+                <a:solidFill>
+                  <a:schemeClr val="dk1"/>
+                </a:solidFill>
+              </a:defRPr>
+            </a:pPr>
+            <a:r>
+              <a:rPr sz="1100" dirty="0" smtClean="0"/>
+              <a:t>Top</a:t>
+            </a:r>
+            <a:r>
+              <a:rPr lang="en-US" sz="1100" dirty="0" smtClean="0"/>
+              <a:t> interests</a:t>
+            </a:r>
+            <a:endParaRPr lang="en-US" sz="1100" b="1" dirty="0"/>
+          </a:p>
+        </p:txBody>
+      </p:sp>
+      <p:sp>
+        <p:nvSpPr>
+          <p:cNvPr id="74" name="Rectangle 55"/>
+          <p:cNvSpPr/>
+          <p:nvPr/>
+        </p:nvSpPr>
+        <p:spPr bwMode="ltGray">
+          <a:xfrm>
+            <a:off x="9937763" y="1463239"/>
+            <a:ext cx="1826608" cy="2189155"/>
+          </a:xfrm>
+          <a:prstGeom prst="rect">
+            <a:avLst/>
+          </a:prstGeom>
+          <a:noFill/>
+          <a:ln w="38100">
+            <a:solidFill>
+              <a:schemeClr val="bg2"/>
+            </a:solidFill>
+          </a:ln>
+        </p:spPr>
+        <p:style>
+          <a:lnRef idx="2">
+            <a:schemeClr val="accent1">
+              <a:shade val="50000"/>
+            </a:schemeClr>
+          </a:lnRef>
+          <a:fillRef idx="1">
+            <a:schemeClr val="accent1"/>
+          </a:fillRef>
+          <a:effectRef idx="0">
+            <a:schemeClr val="accent1"/>
+          </a:effectRef>
+          <a:fontRef idx="minor">
+            <a:schemeClr val="lt1"/>
+          </a:fontRef>
+        </p:style>
+        <p:txBody>
+          <a:bodyPr lIns="182880" tIns="182880" rIns="182880" bIns="182880" rtlCol="0" anchor="t"/>
+          <a:lstStyle/>
+          <a:p>
+            <a:pPr marL="45720" indent="-60325">
+              <a:spcBef>
+                <a:spcPts val="1200"/>
+              </a:spcBef>
+              <a:buClr>
+                <a:prstClr val="black"/>
+              </a:buClr>
+            </a:pPr>
+            <a:endParaRPr lang="en-US" sz="1000" dirty="0">
+              <a:solidFill>
+                <a:schemeClr val="tx1"/>
+              </a:solidFill>
+            </a:endParaRPr>
+          </a:p>
+          <a:p>
+            <a:pPr marL="45720" lvl="0" indent="-60325">
+              <a:spcBef>
+                <a:spcPts val="1200"/>
+              </a:spcBef>
+              <a:buClr>
+                <a:prstClr val="black"/>
+              </a:buClr>
+            </a:pPr>
+            <a:endParaRPr lang="en-US" sz="1100" i="1" dirty="0" smtClean="0">
+              <a:solidFill>
+                <a:schemeClr val="tx1"/>
+              </a:solidFill>
+            </a:endParaRPr>
+          </a:p>
+        </p:txBody>
+      </p:sp>
+      <p:sp>
+        <p:nvSpPr>
+          <p:cNvPr id="76" name="Rectangle 75"/>
+          <p:cNvSpPr/>
+          <p:nvPr/>
+        </p:nvSpPr>
+        <p:spPr>
+          <a:xfrm>
+            <a:off x="10708851" y="1472681"/>
+            <a:ext cx="1080557" cy="228737"/>
+          </a:xfrm>
+          <a:prstGeom prst="rect">
+            <a:avLst/>
+          </a:prstGeom>
+        </p:spPr>
+        <p:txBody>
+          <a:bodyPr wrap="square" numCol="1" anchor="t">
+            <a:noAutofit/>
+          </a:bodyPr>
+          <a:lstStyle/>
+          <a:p>
+            <a:pPr algn="ctr">
+              <a:lnSpc>
+                <a:spcPct val="90000"/>
+              </a:lnSpc>
+              <a:defRPr sz="1000" b="1">
+                <a:solidFill>
+                  <a:schemeClr val="dk1"/>
+                </a:solidFill>
+              </a:defRPr>
+            </a:pPr>
+            <a:r>
+              <a:rPr lang="en-US" sz="1100" dirty="0" smtClean="0"/>
+              <a:t>Top interests</a:t>
+            </a:r>
+            <a:endParaRPr lang="en-US" sz="1100" b="1" dirty="0"/>
+          </a:p>
+          <a:p>
+            <a:pPr>
+              <a:defRPr sz="800">
+                <a:solidFill>
+                  <a:schemeClr val="dk2"/>
+                </a:solidFill>
+              </a:defRPr>
+            </a:pPr>
+            <a:r>
+              <a:rPr dirty="0" smtClean="0"/>
+              <a:t> </a:t>
+            </a:r>
+            <a:endParaRPr dirty="0"/>
+          </a:p>
+        </p:txBody>
+      </p:sp>
+      <p:sp>
+        <p:nvSpPr>
+          <p:cNvPr id="86" name="TextBox 85"/>
+          <p:cNvSpPr txBox="1"/>
+          <p:nvPr/>
+        </p:nvSpPr>
+        <p:spPr>
+          <a:xfrm>
+            <a:off x="10081092" y="1162065"/>
+            <a:ext cx="1537351" cy="307558"/>
+          </a:xfrm>
+          <a:prstGeom prst="rect">
+            <a:avLst/>
+          </a:prstGeom>
+          <a:noFill/>
+        </p:spPr>
+        <p:txBody>
+          <a:bodyPr wrap="none" lIns="0" tIns="0" rIns="0" bIns="0" rtlCol="0" anchor="ctr">
+            <a:noAutofit/>
+          </a:bodyPr>
+          <a:lstStyle/>
+          <a:p>
+            <a:pPr algn="ctr">
+              <a:lnSpc>
+                <a:spcPct val="90000"/>
+              </a:lnSpc>
+            </a:pPr>
+            <a:r>
+              <a:rPr lang="en-GB" dirty="0" smtClean="0"/>
+              <a:t>Industry-3</a:t>
+            </a:r>
+            <a:endParaRPr lang="en-GB" sz="1600" dirty="0"/>
+          </a:p>
+        </p:txBody>
+      </p:sp>
+      <p:sp>
+        <p:nvSpPr>
+          <p:cNvPr id="95" name="Rectangle 94"/>
+          <p:cNvSpPr/>
+          <p:nvPr/>
+        </p:nvSpPr>
+        <p:spPr bwMode="ltGray">
+          <a:xfrm>
+            <a:off x="9934681" y="1168300"/>
+            <a:ext cx="1830172" cy="295525"/>
+          </a:xfrm>
+          <a:prstGeom prst="rect">
+            <a:avLst/>
+          </a:prstGeom>
+          <a:noFill/>
+          <a:ln w="38100">
+            <a:solidFill>
+              <a:schemeClr val="accent1"/>
+            </a:solidFill>
+          </a:ln>
+        </p:spPr>
+        <p:style>
+          <a:lnRef idx="2">
+            <a:schemeClr val="accent1">
+              <a:shade val="50000"/>
+            </a:schemeClr>
+          </a:lnRef>
+          <a:fillRef idx="1">
+            <a:schemeClr val="accent1"/>
+          </a:fillRef>
+          <a:effectRef idx="0">
+            <a:schemeClr val="accent1"/>
+          </a:effectRef>
+          <a:fontRef idx="minor">
+            <a:schemeClr val="lt1"/>
+          </a:fontRef>
+        </p:style>
+        <p:txBody>
+          <a:bodyPr rtlCol="0" anchor="ctr"/>
+          <a:lstStyle/>
+          <a:p>
+            <a:pPr algn="ctr">
+              <a:lnSpc>
+                <a:spcPct val="90000"/>
+              </a:lnSpc>
+            </a:pPr>
+            <a:endParaRPr lang="en-US" sz="1200" b="1" dirty="0" smtClean="0">
+              <a:solidFill>
+                <a:schemeClr val="tx1"/>
+              </a:solidFill>
+            </a:endParaRPr>
+          </a:p>
+        </p:txBody>
+      </p:sp>
+      <p:sp>
+        <p:nvSpPr>
+          <p:cNvPr id="102" name="Rectangle 55"/>
+          <p:cNvSpPr/>
+          <p:nvPr/>
+        </p:nvSpPr>
+        <p:spPr bwMode="ltGray">
+          <a:xfrm>
+            <a:off x="9931363" y="4080589"/>
+            <a:ext cx="1833008" cy="2209491"/>
+          </a:xfrm>
+          <a:prstGeom prst="rect">
+            <a:avLst/>
+          </a:prstGeom>
+          <a:noFill/>
+          <a:ln w="38100">
+            <a:solidFill>
+              <a:schemeClr val="bg2"/>
+            </a:solidFill>
+          </a:ln>
+        </p:spPr>
+        <p:style>
+          <a:lnRef idx="2">
+            <a:schemeClr val="accent1">
+              <a:shade val="50000"/>
+            </a:schemeClr>
+          </a:lnRef>
+          <a:fillRef idx="1">
+            <a:schemeClr val="accent1"/>
+          </a:fillRef>
+          <a:effectRef idx="0">
+            <a:schemeClr val="accent1"/>
+          </a:effectRef>
+          <a:fontRef idx="minor">
+            <a:schemeClr val="lt1"/>
+          </a:fontRef>
+        </p:style>
+        <p:txBody>
+          <a:bodyPr lIns="182880" tIns="182880" rIns="182880" bIns="182880" rtlCol="0" anchor="t"/>
+          <a:lstStyle/>
+          <a:p>
+            <a:pPr marL="45720" indent="-60325">
+              <a:spcBef>
+                <a:spcPts val="1200"/>
+              </a:spcBef>
+              <a:buClr>
+                <a:prstClr val="black"/>
+              </a:buClr>
+            </a:pPr>
+            <a:endParaRPr lang="en-US" sz="1000" dirty="0">
+              <a:solidFill>
+                <a:schemeClr val="tx1"/>
+              </a:solidFill>
+            </a:endParaRPr>
+          </a:p>
+          <a:p>
+            <a:pPr marL="45720" lvl="0" indent="-60325">
+              <a:spcBef>
+                <a:spcPts val="1200"/>
+              </a:spcBef>
+              <a:buClr>
+                <a:prstClr val="black"/>
+              </a:buClr>
+            </a:pPr>
+            <a:endParaRPr lang="en-US" sz="1100" i="1" dirty="0" smtClean="0">
+              <a:solidFill>
+                <a:schemeClr val="tx1"/>
+              </a:solidFill>
+            </a:endParaRPr>
+          </a:p>
+        </p:txBody>
+      </p:sp>
+      <p:sp>
+        <p:nvSpPr>
+          <p:cNvPr id="103" name="Rectangle 102"/>
+          <p:cNvSpPr/>
+          <p:nvPr/>
+        </p:nvSpPr>
+        <p:spPr>
+          <a:xfrm>
+            <a:off x="10693024" y="4110574"/>
+            <a:ext cx="1080557" cy="228737"/>
+          </a:xfrm>
+          <a:prstGeom prst="rect">
+            <a:avLst/>
+          </a:prstGeom>
+        </p:spPr>
+        <p:txBody>
+          <a:bodyPr wrap="square" numCol="1" anchor="t">
+            <a:noAutofit/>
+          </a:bodyPr>
+          <a:lstStyle/>
+          <a:p>
+            <a:pPr algn="ctr">
+              <a:lnSpc>
+                <a:spcPct val="90000"/>
+              </a:lnSpc>
+              <a:defRPr sz="1000" b="1">
+                <a:solidFill>
+                  <a:schemeClr val="dk1"/>
+                </a:solidFill>
+              </a:defRPr>
+            </a:pPr>
+            <a:r>
+              <a:rPr lang="en-US" sz="1100" dirty="0" smtClean="0"/>
+              <a:t>Top interests</a:t>
+            </a:r>
+            <a:endParaRPr lang="en-US" sz="1100" b="1" dirty="0"/>
+          </a:p>
+          <a:p>
+            <a:pPr>
+              <a:defRPr sz="800">
+                <a:solidFill>
+                  <a:schemeClr val="dk2"/>
+                </a:solidFill>
+              </a:defRPr>
+            </a:pPr>
+            <a:r>
+              <a:rPr dirty="0" smtClean="0"/>
+              <a:t> </a:t>
+            </a:r>
+            <a:endParaRPr dirty="0"/>
+          </a:p>
+        </p:txBody>
+      </p:sp>
+      <p:sp>
+        <p:nvSpPr>
+          <p:cNvPr id="113" name="TextBox 112"/>
+          <p:cNvSpPr txBox="1"/>
+          <p:nvPr/>
+        </p:nvSpPr>
+        <p:spPr>
+          <a:xfrm>
+            <a:off x="10029508" y="3784733"/>
+            <a:ext cx="1633636" cy="307558"/>
+          </a:xfrm>
+          <a:prstGeom prst="rect">
+            <a:avLst/>
+          </a:prstGeom>
+          <a:noFill/>
+        </p:spPr>
+        <p:txBody>
+          <a:bodyPr wrap="none" lIns="0" tIns="0" rIns="0" bIns="0" rtlCol="0" anchor="ctr">
+            <a:noAutofit/>
+          </a:bodyPr>
+          <a:lstStyle/>
+          <a:p>
+            <a:pPr algn="ctr">
+              <a:lnSpc>
+                <a:spcPct val="90000"/>
+              </a:lnSpc>
+            </a:pPr>
+            <a:r>
+              <a:rPr lang="en-GB" dirty="0" smtClean="0"/>
+              <a:t>Industry-7</a:t>
+            </a:r>
+            <a:endParaRPr lang="en-GB" sz="1600" dirty="0"/>
+          </a:p>
+        </p:txBody>
+      </p:sp>
+      <p:sp>
+        <p:nvSpPr>
+          <p:cNvPr id="124" name="Rectangle 123"/>
+          <p:cNvSpPr/>
+          <p:nvPr/>
+        </p:nvSpPr>
+        <p:spPr>
+          <a:xfrm>
+            <a:off x="4915367" y="3367900"/>
+            <a:ext cx="990041" cy="220421"/>
           </a:xfrm>
           <a:prstGeom prst="rect">
             <a:avLst/>
@@ -44867,18 +45326,14 @@
         </p:spPr>
         <p:txBody>
           <a:bodyPr wrap="none" anchor="ctr" anchorCtr="0">
-            <a:normAutofit lnSpcReduction="10000"/>
+            <a:noAutofit/>
           </a:bodyPr>
           <a:lstStyle/>
           <a:p>
             <a:pPr algn="ctr"/>
             <a:r>
-              <a:rPr lang="en-US" sz="1000" dirty="0"/>
-              <a:t>1</a:t>
-            </a:r>
-            <a:r>
               <a:rPr lang="en-US" sz="1000" dirty="0" smtClean="0"/>
-              <a:t>-interest-2</a:t>
+              <a:t>0-interest-2</a:t>
             </a:r>
             <a:endParaRPr lang="en-GB" sz="800" dirty="0"/>
           </a:p>
@@ -44886,13 +45341,13 @@
       </p:sp>
       <p:sp>
         <p:nvSpPr>
-          <p:cNvPr id="71" name="TextBox 70"/>
+          <p:cNvPr id="125" name="TextBox 124"/>
           <p:cNvSpPr txBox="1"/>
           <p:nvPr/>
         </p:nvSpPr>
         <p:spPr>
           <a:xfrm>
-            <a:off x="8149628" y="2129614"/>
+            <a:off x="4915367" y="2129614"/>
             <a:ext cx="990041" cy="236514"/>
           </a:xfrm>
           <a:prstGeom prst="rect">
@@ -44913,7 +45368,7 @@
             </a:pPr>
             <a:r>
               <a:rPr lang="en-US" sz="1000" dirty="0" smtClean="0"/>
-              <a:t>1-interest-0</a:t>
+              <a:t>0-interest-0</a:t>
             </a:r>
             <a:endParaRPr lang="en-US" sz="1000" dirty="0"/>
           </a:p>
@@ -44921,13 +45376,13 @@
       </p:sp>
       <p:sp>
         <p:nvSpPr>
-          <p:cNvPr id="79" name="TextBox 78"/>
+          <p:cNvPr id="126" name="TextBox 125"/>
           <p:cNvSpPr txBox="1"/>
           <p:nvPr/>
         </p:nvSpPr>
         <p:spPr>
           <a:xfrm>
-            <a:off x="8149628" y="2766831"/>
+            <a:off x="4915367" y="2759628"/>
             <a:ext cx="990041" cy="214771"/>
           </a:xfrm>
           <a:prstGeom prst="rect">
@@ -44948,7 +45403,7 @@
             </a:pPr>
             <a:r>
               <a:rPr lang="en-US" sz="1000" dirty="0" smtClean="0"/>
-              <a:t>1-interest-1</a:t>
+              <a:t>0-interest-1</a:t>
             </a:r>
             <a:endParaRPr lang="en-US" sz="1000" dirty="0"/>
           </a:p>
@@ -44956,14 +45411,14 @@
       </p:sp>
       <p:sp>
         <p:nvSpPr>
-          <p:cNvPr id="80" name="Rectangle 79"/>
+          <p:cNvPr id="144" name="Rectangle 143"/>
           <p:cNvSpPr/>
           <p:nvPr/>
         </p:nvSpPr>
         <p:spPr>
           <a:xfrm>
-            <a:off x="10573782" y="3382305"/>
-            <a:ext cx="976802" cy="220421"/>
+            <a:off x="6866644" y="3373355"/>
+            <a:ext cx="990042" cy="229371"/>
           </a:xfrm>
           <a:prstGeom prst="rect">
             <a:avLst/>
@@ -44971,14 +45426,18 @@
         </p:spPr>
         <p:txBody>
           <a:bodyPr wrap="none" anchor="ctr" anchorCtr="0">
-            <a:normAutofit fontScale="92500" lnSpcReduction="10000"/>
+            <a:normAutofit lnSpcReduction="10000"/>
           </a:bodyPr>
           <a:lstStyle/>
           <a:p>
             <a:pPr algn="ctr"/>
             <a:r>
+              <a:rPr lang="en-US" sz="1000" dirty="0"/>
+              <a:t>1</a:t>
+            </a:r>
+            <a:r>
               <a:rPr lang="en-US" sz="1000" dirty="0" smtClean="0"/>
-              <a:t>2-interest-2</a:t>
+              <a:t>-interest-2</a:t>
             </a:r>
             <a:endParaRPr lang="en-GB" sz="800" dirty="0"/>
           </a:p>
@@ -44986,13 +45445,13 @@
       </p:sp>
       <p:sp>
         <p:nvSpPr>
-          <p:cNvPr id="82" name="TextBox 81"/>
+          <p:cNvPr id="145" name="TextBox 144"/>
           <p:cNvSpPr txBox="1"/>
           <p:nvPr/>
         </p:nvSpPr>
         <p:spPr>
           <a:xfrm>
-            <a:off x="10560543" y="2129614"/>
+            <a:off x="6866644" y="2129614"/>
             <a:ext cx="990041" cy="236514"/>
           </a:xfrm>
           <a:prstGeom prst="rect">
@@ -45012,12 +45471,8 @@
               </a:lnSpc>
             </a:pPr>
             <a:r>
-              <a:rPr lang="en-US" sz="1000" dirty="0"/>
-              <a:t>2</a:t>
-            </a:r>
-            <a:r>
               <a:rPr lang="en-US" sz="1000" dirty="0" smtClean="0"/>
-              <a:t>-interest-0</a:t>
+              <a:t>1-interest-0</a:t>
             </a:r>
             <a:endParaRPr lang="en-US" sz="1000" dirty="0"/>
           </a:p>
@@ -45025,13 +45480,13 @@
       </p:sp>
       <p:sp>
         <p:nvSpPr>
-          <p:cNvPr id="83" name="TextBox 82"/>
+          <p:cNvPr id="146" name="TextBox 145"/>
           <p:cNvSpPr txBox="1"/>
           <p:nvPr/>
         </p:nvSpPr>
         <p:spPr>
           <a:xfrm>
-            <a:off x="10560543" y="2766831"/>
+            <a:off x="6866644" y="2766831"/>
             <a:ext cx="990041" cy="214771"/>
           </a:xfrm>
           <a:prstGeom prst="rect">
@@ -45051,12 +45506,8 @@
               </a:lnSpc>
             </a:pPr>
             <a:r>
-              <a:rPr lang="en-US" sz="1000" dirty="0"/>
-              <a:t>2</a:t>
-            </a:r>
-            <a:r>
               <a:rPr lang="en-US" sz="1000" dirty="0" smtClean="0"/>
-              <a:t>-interest-1</a:t>
+              <a:t>1-interest-1</a:t>
             </a:r>
             <a:endParaRPr lang="en-US" sz="1000" dirty="0"/>
           </a:p>
@@ -45064,14 +45515,14 @@
       </p:sp>
       <p:sp>
         <p:nvSpPr>
-          <p:cNvPr id="89" name="Rectangle 88"/>
+          <p:cNvPr id="147" name="Rectangle 146"/>
           <p:cNvSpPr/>
           <p:nvPr/>
         </p:nvSpPr>
         <p:spPr>
           <a:xfrm>
-            <a:off x="5768263" y="6070237"/>
-            <a:ext cx="990041" cy="217151"/>
+            <a:off x="8803551" y="3373355"/>
+            <a:ext cx="990042" cy="229371"/>
           </a:xfrm>
           <a:prstGeom prst="rect">
             <a:avLst/>
@@ -45079,14 +45530,14 @@
         </p:spPr>
         <p:txBody>
           <a:bodyPr wrap="none" anchor="ctr" anchorCtr="0">
-            <a:normAutofit fontScale="92500" lnSpcReduction="10000"/>
+            <a:normAutofit lnSpcReduction="10000"/>
           </a:bodyPr>
           <a:lstStyle/>
           <a:p>
             <a:pPr algn="ctr"/>
             <a:r>
               <a:rPr lang="en-US" sz="1000" dirty="0"/>
-              <a:t>3</a:t>
+              <a:t>2</a:t>
             </a:r>
             <a:r>
               <a:rPr lang="en-US" sz="1000" dirty="0" smtClean="0"/>
@@ -45098,13 +45549,13 @@
       </p:sp>
       <p:sp>
         <p:nvSpPr>
-          <p:cNvPr id="92" name="TextBox 91"/>
+          <p:cNvPr id="148" name="TextBox 147"/>
           <p:cNvSpPr txBox="1"/>
           <p:nvPr/>
         </p:nvSpPr>
         <p:spPr>
           <a:xfrm>
-            <a:off x="5768263" y="4814178"/>
+            <a:off x="8803551" y="2129614"/>
             <a:ext cx="990041" cy="236514"/>
           </a:xfrm>
           <a:prstGeom prst="rect">
@@ -45124,12 +45575,8 @@
               </a:lnSpc>
             </a:pPr>
             <a:r>
-              <a:rPr lang="en-US" sz="1000" dirty="0"/>
-              <a:t>3</a:t>
-            </a:r>
-            <a:r>
               <a:rPr lang="en-US" sz="1000" dirty="0" smtClean="0"/>
-              <a:t>-interest-0</a:t>
+              <a:t>2-interest-0</a:t>
             </a:r>
             <a:endParaRPr lang="en-US" sz="1000" dirty="0"/>
           </a:p>
@@ -45137,13 +45584,13 @@
       </p:sp>
       <p:sp>
         <p:nvSpPr>
-          <p:cNvPr id="94" name="TextBox 93"/>
+          <p:cNvPr id="149" name="TextBox 148"/>
           <p:cNvSpPr txBox="1"/>
           <p:nvPr/>
         </p:nvSpPr>
         <p:spPr>
           <a:xfrm>
-            <a:off x="5768263" y="5451395"/>
+            <a:off x="8803551" y="2766831"/>
             <a:ext cx="990041" cy="214771"/>
           </a:xfrm>
           <a:prstGeom prst="rect">
@@ -45164,7 +45611,7 @@
             </a:pPr>
             <a:r>
               <a:rPr lang="en-US" sz="1000" dirty="0"/>
-              <a:t>3</a:t>
+              <a:t>2</a:t>
             </a:r>
             <a:r>
               <a:rPr lang="en-US" sz="1000" dirty="0" smtClean="0"/>
@@ -45176,14 +45623,14 @@
       </p:sp>
       <p:sp>
         <p:nvSpPr>
-          <p:cNvPr id="102" name="Rectangle 101"/>
+          <p:cNvPr id="150" name="Rectangle 149"/>
           <p:cNvSpPr/>
           <p:nvPr/>
         </p:nvSpPr>
         <p:spPr>
           <a:xfrm>
-            <a:off x="8170710" y="6070237"/>
-            <a:ext cx="968959" cy="222583"/>
+            <a:off x="10721405" y="3373355"/>
+            <a:ext cx="990042" cy="229371"/>
           </a:xfrm>
           <a:prstGeom prst="rect">
             <a:avLst/>
@@ -45191,14 +45638,14 @@
         </p:spPr>
         <p:txBody>
           <a:bodyPr wrap="none" anchor="ctr" anchorCtr="0">
-            <a:normAutofit fontScale="92500" lnSpcReduction="10000"/>
+            <a:normAutofit lnSpcReduction="10000"/>
           </a:bodyPr>
           <a:lstStyle/>
           <a:p>
             <a:pPr algn="ctr"/>
             <a:r>
               <a:rPr lang="en-US" sz="1000" dirty="0" smtClean="0"/>
-              <a:t>4-interest-2</a:t>
+              <a:t>3-interest-2</a:t>
             </a:r>
             <a:endParaRPr lang="en-GB" sz="800" dirty="0"/>
           </a:p>
@@ -45206,13 +45653,13 @@
       </p:sp>
       <p:sp>
         <p:nvSpPr>
-          <p:cNvPr id="104" name="TextBox 103"/>
+          <p:cNvPr id="151" name="TextBox 150"/>
           <p:cNvSpPr txBox="1"/>
           <p:nvPr/>
         </p:nvSpPr>
         <p:spPr>
           <a:xfrm>
-            <a:off x="8149628" y="4814178"/>
+            <a:off x="10721405" y="2129614"/>
             <a:ext cx="990041" cy="236514"/>
           </a:xfrm>
           <a:prstGeom prst="rect">
@@ -45233,7 +45680,7 @@
             </a:pPr>
             <a:r>
               <a:rPr lang="en-US" sz="1000" dirty="0" smtClean="0"/>
-              <a:t>4-interest-0</a:t>
+              <a:t>3-interest-0</a:t>
             </a:r>
             <a:endParaRPr lang="en-US" sz="1000" dirty="0"/>
           </a:p>
@@ -45241,13 +45688,13 @@
       </p:sp>
       <p:sp>
         <p:nvSpPr>
-          <p:cNvPr id="112" name="TextBox 111"/>
+          <p:cNvPr id="152" name="TextBox 151"/>
           <p:cNvSpPr txBox="1"/>
           <p:nvPr/>
         </p:nvSpPr>
         <p:spPr>
           <a:xfrm>
-            <a:off x="8149628" y="5451395"/>
+            <a:off x="10721405" y="2766831"/>
             <a:ext cx="990041" cy="214771"/>
           </a:xfrm>
           <a:prstGeom prst="rect">
@@ -45268,7 +45715,7 @@
             </a:pPr>
             <a:r>
               <a:rPr lang="en-US" sz="1000" dirty="0" smtClean="0"/>
-              <a:t>4-interest-1</a:t>
+              <a:t>3-interest-1</a:t>
             </a:r>
             <a:endParaRPr lang="en-US" sz="1000" dirty="0"/>
           </a:p>
@@ -45276,14 +45723,14 @@
       </p:sp>
       <p:sp>
         <p:nvSpPr>
-          <p:cNvPr id="113" name="Rectangle 112"/>
+          <p:cNvPr id="153" name="Rectangle 152"/>
           <p:cNvSpPr/>
           <p:nvPr/>
         </p:nvSpPr>
         <p:spPr>
           <a:xfrm>
-            <a:off x="10560543" y="6066869"/>
-            <a:ext cx="976802" cy="225951"/>
+            <a:off x="4915367" y="6003171"/>
+            <a:ext cx="990041" cy="220421"/>
           </a:xfrm>
           <a:prstGeom prst="rect">
             <a:avLst/>
@@ -45297,12 +45744,8 @@
           <a:p>
             <a:pPr algn="ctr"/>
             <a:r>
-              <a:rPr lang="en-US" sz="1000" dirty="0"/>
-              <a:t>5</a:t>
-            </a:r>
-            <a:r>
               <a:rPr lang="en-US" sz="1000" dirty="0" smtClean="0"/>
-              <a:t>-interest-2</a:t>
+              <a:t>4-interest-2</a:t>
             </a:r>
             <a:endParaRPr lang="en-GB" sz="800" dirty="0"/>
           </a:p>
@@ -45310,13 +45753,13 @@
       </p:sp>
       <p:sp>
         <p:nvSpPr>
-          <p:cNvPr id="120" name="TextBox 119"/>
+          <p:cNvPr id="154" name="TextBox 153"/>
           <p:cNvSpPr txBox="1"/>
           <p:nvPr/>
         </p:nvSpPr>
         <p:spPr>
           <a:xfrm>
-            <a:off x="10560543" y="4814178"/>
+            <a:off x="4915367" y="4764885"/>
             <a:ext cx="990041" cy="236514"/>
           </a:xfrm>
           <a:prstGeom prst="rect">
@@ -45337,7 +45780,7 @@
             </a:pPr>
             <a:r>
               <a:rPr lang="en-US" sz="1000" dirty="0" smtClean="0"/>
-              <a:t>5-interest-0</a:t>
+              <a:t>4-interest-0</a:t>
             </a:r>
             <a:endParaRPr lang="en-US" sz="1000" dirty="0"/>
           </a:p>
@@ -45345,13 +45788,13 @@
       </p:sp>
       <p:sp>
         <p:nvSpPr>
-          <p:cNvPr id="121" name="TextBox 120"/>
+          <p:cNvPr id="155" name="TextBox 154"/>
           <p:cNvSpPr txBox="1"/>
           <p:nvPr/>
         </p:nvSpPr>
         <p:spPr>
           <a:xfrm>
-            <a:off x="10560543" y="5451395"/>
+            <a:off x="4915367" y="5394899"/>
             <a:ext cx="990041" cy="214771"/>
           </a:xfrm>
           <a:prstGeom prst="rect">
@@ -45372,7 +45815,7 @@
             </a:pPr>
             <a:r>
               <a:rPr lang="en-US" sz="1000" dirty="0" smtClean="0"/>
-              <a:t>5-interest-1</a:t>
+              <a:t>4-interest-1</a:t>
             </a:r>
             <a:endParaRPr lang="en-US" sz="1000" dirty="0"/>
           </a:p>
@@ -45380,14 +45823,44 @@
       </p:sp>
       <p:sp>
         <p:nvSpPr>
-          <p:cNvPr id="7" name="TextBox 6"/>
+          <p:cNvPr id="156" name="Rectangle 155"/>
+          <p:cNvSpPr/>
+          <p:nvPr/>
+        </p:nvSpPr>
+        <p:spPr>
+          <a:xfrm>
+            <a:off x="6866644" y="6008626"/>
+            <a:ext cx="990042" cy="229371"/>
+          </a:xfrm>
+          <a:prstGeom prst="rect">
+            <a:avLst/>
+          </a:prstGeom>
+        </p:spPr>
+        <p:txBody>
+          <a:bodyPr wrap="none" anchor="ctr" anchorCtr="0">
+            <a:normAutofit lnSpcReduction="10000"/>
+          </a:bodyPr>
+          <a:lstStyle/>
+          <a:p>
+            <a:pPr algn="ctr"/>
+            <a:r>
+              <a:rPr lang="en-US" sz="1000" dirty="0" smtClean="0"/>
+              <a:t>5-interest-2</a:t>
+            </a:r>
+            <a:endParaRPr lang="en-GB" sz="800" dirty="0"/>
+          </a:p>
+        </p:txBody>
+      </p:sp>
+      <p:sp>
+        <p:nvSpPr>
+          <p:cNvPr id="157" name="TextBox 156"/>
           <p:cNvSpPr txBox="1"/>
           <p:nvPr/>
         </p:nvSpPr>
         <p:spPr>
           <a:xfrm>
-            <a:off x="4488571" y="1047360"/>
-            <a:ext cx="2269733" cy="255198"/>
+            <a:off x="6866644" y="4764885"/>
+            <a:ext cx="990041" cy="236514"/>
           </a:xfrm>
           <a:prstGeom prst="rect">
             <a:avLst/>
@@ -45395,8 +45868,8 @@
           <a:noFill/>
         </p:spPr>
         <p:txBody>
-          <a:bodyPr wrap="none" lIns="0" tIns="0" rIns="0" bIns="0" rtlCol="0" anchor="ctr">
-            <a:noAutofit/>
+          <a:bodyPr wrap="none" lIns="0" tIns="0" rIns="0" bIns="0" rtlCol="0" anchor="ctr" anchorCtr="0">
+            <a:normAutofit/>
           </a:bodyPr>
           <a:lstStyle/>
           <a:p>
@@ -45406,23 +45879,23 @@
               </a:lnSpc>
             </a:pPr>
             <a:r>
-              <a:rPr lang="en-US" sz="1600" dirty="0" smtClean="0"/>
-              <a:t>Industry-0</a:t>
-            </a:r>
-            <a:endParaRPr lang="en-GB" sz="1600" dirty="0"/>
+              <a:rPr lang="en-US" sz="1000" dirty="0" smtClean="0"/>
+              <a:t>5-interest-0</a:t>
+            </a:r>
+            <a:endParaRPr lang="en-US" sz="1000" dirty="0"/>
           </a:p>
         </p:txBody>
       </p:sp>
       <p:sp>
         <p:nvSpPr>
-          <p:cNvPr id="122" name="TextBox 121"/>
+          <p:cNvPr id="158" name="TextBox 157"/>
           <p:cNvSpPr txBox="1"/>
           <p:nvPr/>
         </p:nvSpPr>
         <p:spPr>
           <a:xfrm>
-            <a:off x="6890393" y="1047360"/>
-            <a:ext cx="2269733" cy="255198"/>
+            <a:off x="6866644" y="5402102"/>
+            <a:ext cx="990041" cy="214771"/>
           </a:xfrm>
           <a:prstGeom prst="rect">
             <a:avLst/>
@@ -45430,8 +45903,8 @@
           <a:noFill/>
         </p:spPr>
         <p:txBody>
-          <a:bodyPr wrap="none" lIns="0" tIns="0" rIns="0" bIns="0" rtlCol="0" anchor="ctr">
-            <a:noAutofit/>
+          <a:bodyPr wrap="none" lIns="0" tIns="0" rIns="0" bIns="0" rtlCol="0" anchor="ctr" anchorCtr="0">
+            <a:normAutofit/>
           </a:bodyPr>
           <a:lstStyle/>
           <a:p>
@@ -45441,23 +45914,53 @@
               </a:lnSpc>
             </a:pPr>
             <a:r>
-              <a:rPr lang="en-US" sz="1600" dirty="0" smtClean="0"/>
-              <a:t>Industry-1</a:t>
-            </a:r>
-            <a:endParaRPr lang="en-GB" sz="1600" dirty="0"/>
+              <a:rPr lang="en-US" sz="1000" dirty="0" smtClean="0"/>
+              <a:t>5-interest-1</a:t>
+            </a:r>
+            <a:endParaRPr lang="en-US" sz="1000" dirty="0"/>
           </a:p>
         </p:txBody>
       </p:sp>
       <p:sp>
         <p:nvSpPr>
-          <p:cNvPr id="123" name="TextBox 122"/>
+          <p:cNvPr id="159" name="Rectangle 158"/>
+          <p:cNvSpPr/>
+          <p:nvPr/>
+        </p:nvSpPr>
+        <p:spPr>
+          <a:xfrm>
+            <a:off x="8803551" y="6008626"/>
+            <a:ext cx="990042" cy="229371"/>
+          </a:xfrm>
+          <a:prstGeom prst="rect">
+            <a:avLst/>
+          </a:prstGeom>
+        </p:spPr>
+        <p:txBody>
+          <a:bodyPr wrap="none" anchor="ctr" anchorCtr="0">
+            <a:normAutofit lnSpcReduction="10000"/>
+          </a:bodyPr>
+          <a:lstStyle/>
+          <a:p>
+            <a:pPr algn="ctr"/>
+            <a:r>
+              <a:rPr lang="en-US" sz="1000" dirty="0" smtClean="0"/>
+              <a:t>6-interest-2</a:t>
+            </a:r>
+            <a:endParaRPr lang="en-GB" sz="800" dirty="0"/>
+          </a:p>
+        </p:txBody>
+      </p:sp>
+      <p:sp>
+        <p:nvSpPr>
+          <p:cNvPr id="160" name="TextBox 159"/>
           <p:cNvSpPr txBox="1"/>
           <p:nvPr/>
         </p:nvSpPr>
         <p:spPr>
           <a:xfrm>
-            <a:off x="9303740" y="1047360"/>
-            <a:ext cx="2269733" cy="255198"/>
+            <a:off x="8803551" y="4764885"/>
+            <a:ext cx="990041" cy="236514"/>
           </a:xfrm>
           <a:prstGeom prst="rect">
             <a:avLst/>
@@ -45465,8 +45968,8 @@
           <a:noFill/>
         </p:spPr>
         <p:txBody>
-          <a:bodyPr wrap="none" lIns="0" tIns="0" rIns="0" bIns="0" rtlCol="0" anchor="ctr">
-            <a:noAutofit/>
+          <a:bodyPr wrap="none" lIns="0" tIns="0" rIns="0" bIns="0" rtlCol="0" anchor="ctr" anchorCtr="0">
+            <a:normAutofit/>
           </a:bodyPr>
           <a:lstStyle/>
           <a:p>
@@ -45476,23 +45979,23 @@
               </a:lnSpc>
             </a:pPr>
             <a:r>
-              <a:rPr lang="en-US" sz="1600" dirty="0" smtClean="0"/>
-              <a:t>Industry-2</a:t>
-            </a:r>
-            <a:endParaRPr lang="en-GB" sz="1600" dirty="0"/>
+              <a:rPr lang="en-US" sz="1000" dirty="0" smtClean="0"/>
+              <a:t>6-interest-0</a:t>
+            </a:r>
+            <a:endParaRPr lang="en-US" sz="1000" dirty="0"/>
           </a:p>
         </p:txBody>
       </p:sp>
       <p:sp>
         <p:nvSpPr>
-          <p:cNvPr id="124" name="TextBox 123"/>
+          <p:cNvPr id="161" name="TextBox 160"/>
           <p:cNvSpPr txBox="1"/>
           <p:nvPr/>
         </p:nvSpPr>
         <p:spPr>
           <a:xfrm>
-            <a:off x="4488571" y="3762826"/>
-            <a:ext cx="2269733" cy="255198"/>
+            <a:off x="8803551" y="5402102"/>
+            <a:ext cx="990041" cy="214771"/>
           </a:xfrm>
           <a:prstGeom prst="rect">
             <a:avLst/>
@@ -45500,8 +46003,8 @@
           <a:noFill/>
         </p:spPr>
         <p:txBody>
-          <a:bodyPr wrap="none" lIns="0" tIns="0" rIns="0" bIns="0" rtlCol="0" anchor="ctr">
-            <a:noAutofit/>
+          <a:bodyPr wrap="none" lIns="0" tIns="0" rIns="0" bIns="0" rtlCol="0" anchor="ctr" anchorCtr="0">
+            <a:normAutofit/>
           </a:bodyPr>
           <a:lstStyle/>
           <a:p>
@@ -45511,23 +46014,53 @@
               </a:lnSpc>
             </a:pPr>
             <a:r>
-              <a:rPr lang="en-US" sz="1600" dirty="0" smtClean="0"/>
-              <a:t>Industry-3</a:t>
-            </a:r>
-            <a:endParaRPr lang="en-GB" sz="1600" dirty="0"/>
+              <a:rPr lang="en-US" sz="1000" dirty="0" smtClean="0"/>
+              <a:t>6-interest-1</a:t>
+            </a:r>
+            <a:endParaRPr lang="en-US" sz="1000" dirty="0"/>
           </a:p>
         </p:txBody>
       </p:sp>
       <p:sp>
         <p:nvSpPr>
-          <p:cNvPr id="125" name="TextBox 124"/>
+          <p:cNvPr id="162" name="Rectangle 161"/>
+          <p:cNvSpPr/>
+          <p:nvPr/>
+        </p:nvSpPr>
+        <p:spPr>
+          <a:xfrm>
+            <a:off x="10721405" y="6008626"/>
+            <a:ext cx="990042" cy="229371"/>
+          </a:xfrm>
+          <a:prstGeom prst="rect">
+            <a:avLst/>
+          </a:prstGeom>
+        </p:spPr>
+        <p:txBody>
+          <a:bodyPr wrap="none" anchor="ctr" anchorCtr="0">
+            <a:normAutofit lnSpcReduction="10000"/>
+          </a:bodyPr>
+          <a:lstStyle/>
+          <a:p>
+            <a:pPr algn="ctr"/>
+            <a:r>
+              <a:rPr lang="en-US" sz="1000" dirty="0" smtClean="0"/>
+              <a:t>7-interest-2</a:t>
+            </a:r>
+            <a:endParaRPr lang="en-GB" sz="800" dirty="0"/>
+          </a:p>
+        </p:txBody>
+      </p:sp>
+      <p:sp>
+        <p:nvSpPr>
+          <p:cNvPr id="163" name="TextBox 162"/>
           <p:cNvSpPr txBox="1"/>
           <p:nvPr/>
         </p:nvSpPr>
         <p:spPr>
           <a:xfrm>
-            <a:off x="6890392" y="3762826"/>
-            <a:ext cx="2269733" cy="255198"/>
+            <a:off x="10721405" y="4764885"/>
+            <a:ext cx="990041" cy="236514"/>
           </a:xfrm>
           <a:prstGeom prst="rect">
             <a:avLst/>
@@ -45535,8 +46068,8 @@
           <a:noFill/>
         </p:spPr>
         <p:txBody>
-          <a:bodyPr wrap="none" lIns="0" tIns="0" rIns="0" bIns="0" rtlCol="0" anchor="ctr">
-            <a:noAutofit/>
+          <a:bodyPr wrap="none" lIns="0" tIns="0" rIns="0" bIns="0" rtlCol="0" anchor="ctr" anchorCtr="0">
+            <a:normAutofit/>
           </a:bodyPr>
           <a:lstStyle/>
           <a:p>
@@ -45546,23 +46079,23 @@
               </a:lnSpc>
             </a:pPr>
             <a:r>
-              <a:rPr lang="en-US" sz="1600" dirty="0" smtClean="0"/>
-              <a:t>Industry-4</a:t>
-            </a:r>
-            <a:endParaRPr lang="en-GB" sz="1600" dirty="0"/>
+              <a:rPr lang="en-US" sz="1000" dirty="0" smtClean="0"/>
+              <a:t>7-interest-0</a:t>
+            </a:r>
+            <a:endParaRPr lang="en-US" sz="1000" dirty="0"/>
           </a:p>
         </p:txBody>
       </p:sp>
       <p:sp>
         <p:nvSpPr>
-          <p:cNvPr id="126" name="TextBox 125"/>
+          <p:cNvPr id="164" name="TextBox 163"/>
           <p:cNvSpPr txBox="1"/>
           <p:nvPr/>
         </p:nvSpPr>
         <p:spPr>
           <a:xfrm>
-            <a:off x="9291588" y="3762826"/>
-            <a:ext cx="2269733" cy="255198"/>
+            <a:off x="10721405" y="5402102"/>
+            <a:ext cx="990041" cy="214771"/>
           </a:xfrm>
           <a:prstGeom prst="rect">
             <a:avLst/>
@@ -45570,8 +46103,8 @@
           <a:noFill/>
         </p:spPr>
         <p:txBody>
-          <a:bodyPr wrap="none" lIns="0" tIns="0" rIns="0" bIns="0" rtlCol="0" anchor="ctr">
-            <a:noAutofit/>
+          <a:bodyPr wrap="none" lIns="0" tIns="0" rIns="0" bIns="0" rtlCol="0" anchor="ctr" anchorCtr="0">
+            <a:normAutofit/>
           </a:bodyPr>
           <a:lstStyle/>
           <a:p>
@@ -45581,17 +46114,71 @@
               </a:lnSpc>
             </a:pPr>
             <a:r>
-              <a:rPr lang="en-US" sz="1600" dirty="0" smtClean="0"/>
-              <a:t>Industry-5</a:t>
-            </a:r>
-            <a:endParaRPr lang="en-GB" sz="1600" dirty="0"/>
+              <a:rPr lang="en-US" sz="1000" dirty="0" smtClean="0"/>
+              <a:t>7-interest-1</a:t>
+            </a:r>
+            <a:endParaRPr lang="en-US" sz="1000" dirty="0"/>
+          </a:p>
+        </p:txBody>
+      </p:sp>
+      <p:sp>
+        <p:nvSpPr>
+          <p:cNvPr id="165" name="Rectangle 164"/>
+          <p:cNvSpPr/>
+          <p:nvPr/>
+        </p:nvSpPr>
+        <p:spPr bwMode="ltGray">
+          <a:xfrm>
+            <a:off x="9930780" y="3763508"/>
+            <a:ext cx="1826594" cy="310045"/>
+          </a:xfrm>
+          <a:prstGeom prst="rect">
+            <a:avLst/>
+          </a:prstGeom>
+          <a:noFill/>
+          <a:ln w="38100">
+            <a:solidFill>
+              <a:schemeClr val="accent1"/>
+            </a:solidFill>
+          </a:ln>
+        </p:spPr>
+        <p:style>
+          <a:lnRef idx="2">
+            <a:schemeClr val="accent1">
+              <a:shade val="50000"/>
+            </a:schemeClr>
+          </a:lnRef>
+          <a:fillRef idx="1">
+            <a:schemeClr val="accent1"/>
+          </a:fillRef>
+          <a:effectRef idx="0">
+            <a:schemeClr val="accent1"/>
+          </a:effectRef>
+          <a:fontRef idx="minor">
+            <a:schemeClr val="lt1"/>
+          </a:fontRef>
+        </p:style>
+        <p:txBody>
+          <a:bodyPr rtlCol="0" anchor="ctr"/>
+          <a:lstStyle/>
+          <a:p>
+            <a:pPr algn="ctr">
+              <a:lnSpc>
+                <a:spcPct val="90000"/>
+              </a:lnSpc>
+            </a:pPr>
+            <a:endParaRPr lang="en-US" sz="1200" b="1" dirty="0" smtClean="0">
+              <a:solidFill>
+                <a:schemeClr val="tx1"/>
+              </a:solidFill>
+            </a:endParaRPr>
           </a:p>
         </p:txBody>
       </p:sp>
     </p:spTree>
     <p:extLst>
       <p:ext uri="{BB962C8B-B14F-4D97-AF65-F5344CB8AC3E}">
-        <p14:creationId xmlns:p14="http://schemas.microsoft.com/office/powerpoint/2010/main" val="4209728806"/>
+        <p14:creationId xmlns:p14="http://schemas.microsoft.com/office/powerpoint/2010/main" val="1075763391"/>
       </p:ext>
     </p:extLst>
   </p:cSld>

</xml_diff>